<commit_message>
Added model to training notebook
</commit_message>
<xml_diff>
--- a/Data Validation for Data Science.pptx
+++ b/Data Validation for Data Science.pptx
@@ -6,9 +6,12 @@
   </p:sldMasterIdLst>
   <p:sldIdLst>
     <p:sldId id="256" r:id="rId2"/>
-    <p:sldId id="258" r:id="rId3"/>
-    <p:sldId id="257" r:id="rId4"/>
-    <p:sldId id="259" r:id="rId5"/>
+    <p:sldId id="259" r:id="rId3"/>
+    <p:sldId id="258" r:id="rId4"/>
+    <p:sldId id="257" r:id="rId5"/>
+    <p:sldId id="262" r:id="rId6"/>
+    <p:sldId id="261" r:id="rId7"/>
+    <p:sldId id="260" r:id="rId8"/>
   </p:sldIdLst>
   <p:sldSz cx="12192000" cy="6858000"/>
   <p:notesSz cx="6858000" cy="9144000"/>
@@ -210,7 +213,7 @@
           <a:effectLst/>
           <a:extLst>
             <a:ext uri="{91240B29-F687-4f45-9708-019B960494DF}">
-              <a14:hiddenLine xmlns="" xmlns:a14="http://schemas.microsoft.com/office/drawing/2010/main" w="9525">
+              <a14:hiddenLine xmlns:a14="http://schemas.microsoft.com/office/drawing/2010/main" xmlns="" w="9525">
                 <a:solidFill>
                   <a:srgbClr val="000000"/>
                 </a:solidFill>
@@ -1720,7 +1723,7 @@
           <a:ln/>
           <a:extLst>
             <a:ext uri="{91240B29-F687-4f45-9708-019B960494DF}">
-              <a14:hiddenLine xmlns="" xmlns:a14="http://schemas.microsoft.com/office/drawing/2010/main" w="9525">
+              <a14:hiddenLine xmlns:a14="http://schemas.microsoft.com/office/drawing/2010/main" xmlns="" w="9525">
                 <a:solidFill>
                   <a:srgbClr val="000000"/>
                 </a:solidFill>
@@ -1992,7 +1995,7 @@
           <a:ln/>
           <a:extLst>
             <a:ext uri="{91240B29-F687-4f45-9708-019B960494DF}">
-              <a14:hiddenLine xmlns="" xmlns:a14="http://schemas.microsoft.com/office/drawing/2010/main" w="9525">
+              <a14:hiddenLine xmlns:a14="http://schemas.microsoft.com/office/drawing/2010/main" xmlns="" w="9525">
                 <a:solidFill>
                   <a:srgbClr val="000000"/>
                 </a:solidFill>
@@ -2272,7 +2275,7 @@
           <a:ln/>
           <a:extLst>
             <a:ext uri="{91240B29-F687-4f45-9708-019B960494DF}">
-              <a14:hiddenLine xmlns="" xmlns:a14="http://schemas.microsoft.com/office/drawing/2010/main" w="9525">
+              <a14:hiddenLine xmlns:a14="http://schemas.microsoft.com/office/drawing/2010/main" xmlns="" w="9525">
                 <a:solidFill>
                   <a:srgbClr val="000000"/>
                 </a:solidFill>
@@ -2892,7 +2895,7 @@
           <a:ln/>
           <a:extLst>
             <a:ext uri="{91240B29-F687-4f45-9708-019B960494DF}">
-              <a14:hiddenLine xmlns="" xmlns:a14="http://schemas.microsoft.com/office/drawing/2010/main" w="9525">
+              <a14:hiddenLine xmlns:a14="http://schemas.microsoft.com/office/drawing/2010/main" xmlns="" w="9525">
                 <a:solidFill>
                   <a:srgbClr val="000000"/>
                 </a:solidFill>
@@ -3228,7 +3231,7 @@
           <a:ln/>
           <a:extLst>
             <a:ext uri="{91240B29-F687-4f45-9708-019B960494DF}">
-              <a14:hiddenLine xmlns="" xmlns:a14="http://schemas.microsoft.com/office/drawing/2010/main" w="9525">
+              <a14:hiddenLine xmlns:a14="http://schemas.microsoft.com/office/drawing/2010/main" xmlns="" w="9525">
                 <a:solidFill>
                   <a:srgbClr val="000000"/>
                 </a:solidFill>
@@ -3702,7 +3705,7 @@
           <a:ln/>
           <a:extLst>
             <a:ext uri="{91240B29-F687-4f45-9708-019B960494DF}">
-              <a14:hiddenLine xmlns="" xmlns:a14="http://schemas.microsoft.com/office/drawing/2010/main" w="9525">
+              <a14:hiddenLine xmlns:a14="http://schemas.microsoft.com/office/drawing/2010/main" xmlns="" w="9525">
                 <a:solidFill>
                   <a:srgbClr val="000000"/>
                 </a:solidFill>
@@ -4125,7 +4128,7 @@
           <a:ln/>
           <a:extLst>
             <a:ext uri="{91240B29-F687-4f45-9708-019B960494DF}">
-              <a14:hiddenLine xmlns="" xmlns:a14="http://schemas.microsoft.com/office/drawing/2010/main" w="9525">
+              <a14:hiddenLine xmlns:a14="http://schemas.microsoft.com/office/drawing/2010/main" xmlns="" w="9525">
                 <a:solidFill>
                   <a:srgbClr val="000000"/>
                 </a:solidFill>
@@ -5579,96 +5582,68 @@
           <a:chExt cx="0" cy="0"/>
         </a:xfrm>
       </p:grpSpPr>
-      <p:sp>
-        <p:nvSpPr>
-          <p:cNvPr id="2" name="Title 1">
+      <p:pic>
+        <p:nvPicPr>
+          <p:cNvPr id="3" name="Picture 2">
             <a:extLst>
               <a:ext uri="{FF2B5EF4-FFF2-40B4-BE49-F238E27FC236}">
-                <a16:creationId xmlns:a16="http://schemas.microsoft.com/office/drawing/2014/main" id="{8B4F5F9C-17E5-4606-E9BA-E4D5BBA6FDA8}"/>
+                <a16:creationId xmlns:a16="http://schemas.microsoft.com/office/drawing/2014/main" id="{6FCB81E4-808D-65F4-5AA6-EF48920BD827}"/>
               </a:ext>
             </a:extLst>
           </p:cNvPr>
-          <p:cNvSpPr>
-            <a:spLocks noGrp="1"/>
-          </p:cNvSpPr>
-          <p:nvPr>
-            <p:ph type="title"/>
-          </p:nvPr>
-        </p:nvSpPr>
-        <p:spPr/>
-        <p:txBody>
-          <a:bodyPr/>
-          <a:lstStyle/>
-          <a:p>
-            <a:r>
-              <a:rPr lang="en-US" dirty="0"/>
-              <a:t>About me</a:t>
-            </a:r>
-          </a:p>
-        </p:txBody>
-      </p:sp>
-      <p:sp>
-        <p:nvSpPr>
-          <p:cNvPr id="3" name="Content Placeholder 2">
+          <p:cNvPicPr>
+            <a:picLocks noChangeAspect="1"/>
+          </p:cNvPicPr>
+          <p:nvPr/>
+        </p:nvPicPr>
+        <p:blipFill>
+          <a:blip r:embed="rId2"/>
+          <a:stretch>
+            <a:fillRect/>
+          </a:stretch>
+        </p:blipFill>
+        <p:spPr>
+          <a:xfrm>
+            <a:off x="923643" y="1274863"/>
+            <a:ext cx="10344714" cy="2285460"/>
+          </a:xfrm>
+          <a:prstGeom prst="rect">
+            <a:avLst/>
+          </a:prstGeom>
+        </p:spPr>
+      </p:pic>
+      <p:sp>
+        <p:nvSpPr>
+          <p:cNvPr id="4" name="TextBox 3">
             <a:extLst>
               <a:ext uri="{FF2B5EF4-FFF2-40B4-BE49-F238E27FC236}">
-                <a16:creationId xmlns:a16="http://schemas.microsoft.com/office/drawing/2014/main" id="{B67A8532-B940-8768-0C94-4AABD6A34127}"/>
+                <a16:creationId xmlns:a16="http://schemas.microsoft.com/office/drawing/2014/main" id="{DBA772F5-8003-B09A-07B0-5FBA77C12EB6}"/>
               </a:ext>
             </a:extLst>
           </p:cNvPr>
-          <p:cNvSpPr>
-            <a:spLocks noGrp="1"/>
-          </p:cNvSpPr>
-          <p:nvPr>
-            <p:ph idx="1"/>
-          </p:nvPr>
-        </p:nvSpPr>
-        <p:spPr/>
-        <p:txBody>
-          <a:bodyPr/>
-          <a:lstStyle/>
-          <a:p>
-            <a:r>
-              <a:rPr lang="en-US" dirty="0"/>
-              <a:t>Machine Learning Engineer @ Zimmer Biomet</a:t>
-            </a:r>
-          </a:p>
-          <a:p>
-            <a:r>
-              <a:rPr lang="en-US" dirty="0"/>
-              <a:t>Up until a year ago Data Scientist @ </a:t>
-            </a:r>
-            <a:r>
-              <a:rPr lang="en-US" dirty="0" err="1"/>
-              <a:t>Zeelo</a:t>
-            </a:r>
-            <a:endParaRPr lang="en-US" dirty="0"/>
-          </a:p>
-          <a:p>
-            <a:r>
-              <a:rPr lang="en-US" dirty="0"/>
-              <a:t>MSc in Social Data Science from the London School of Economics</a:t>
-            </a:r>
-          </a:p>
-          <a:p>
-            <a:r>
-              <a:rPr lang="en-US" dirty="0"/>
-              <a:t>Previously worked in the finance and fintech industries</a:t>
-            </a:r>
-          </a:p>
-          <a:p>
-            <a:pPr marL="0" indent="0">
-              <a:buNone/>
-            </a:pPr>
-            <a:r>
-              <a:rPr lang="en-US" dirty="0"/>
-              <a:t>Also…</a:t>
-            </a:r>
-          </a:p>
-          <a:p>
-            <a:r>
-              <a:rPr lang="en-US" dirty="0"/>
-              <a:t>I like finding bugs</a:t>
+          <p:cNvSpPr txBox="1"/>
+          <p:nvPr/>
+        </p:nvSpPr>
+        <p:spPr>
+          <a:xfrm>
+            <a:off x="1412132" y="4813696"/>
+            <a:ext cx="9367736" cy="769441"/>
+          </a:xfrm>
+          <a:prstGeom prst="rect">
+            <a:avLst/>
+          </a:prstGeom>
+          <a:noFill/>
+        </p:spPr>
+        <p:txBody>
+          <a:bodyPr wrap="square" rtlCol="0">
+            <a:spAutoFit/>
+          </a:bodyPr>
+          <a:lstStyle/>
+          <a:p>
+            <a:pPr algn="ctr"/>
+            <a:r>
+              <a:rPr lang="en-US" sz="4400" dirty="0"/>
+              <a:t>Looks familiar?</a:t>
             </a:r>
           </a:p>
         </p:txBody>
@@ -5676,7 +5651,7 @@
     </p:spTree>
     <p:extLst>
       <p:ext uri="{BB962C8B-B14F-4D97-AF65-F5344CB8AC3E}">
-        <p14:creationId xmlns:p14="http://schemas.microsoft.com/office/powerpoint/2010/main" val="3424294084"/>
+        <p14:creationId xmlns:p14="http://schemas.microsoft.com/office/powerpoint/2010/main" val="4017294590"/>
       </p:ext>
     </p:extLst>
   </p:cSld>
@@ -5708,6 +5683,130 @@
           <p:cNvPr id="2" name="Title 1">
             <a:extLst>
               <a:ext uri="{FF2B5EF4-FFF2-40B4-BE49-F238E27FC236}">
+                <a16:creationId xmlns:a16="http://schemas.microsoft.com/office/drawing/2014/main" id="{8B4F5F9C-17E5-4606-E9BA-E4D5BBA6FDA8}"/>
+              </a:ext>
+            </a:extLst>
+          </p:cNvPr>
+          <p:cNvSpPr>
+            <a:spLocks noGrp="1"/>
+          </p:cNvSpPr>
+          <p:nvPr>
+            <p:ph type="title"/>
+          </p:nvPr>
+        </p:nvSpPr>
+        <p:spPr/>
+        <p:txBody>
+          <a:bodyPr/>
+          <a:lstStyle/>
+          <a:p>
+            <a:r>
+              <a:rPr lang="en-US" dirty="0"/>
+              <a:t>About me</a:t>
+            </a:r>
+          </a:p>
+        </p:txBody>
+      </p:sp>
+      <p:sp>
+        <p:nvSpPr>
+          <p:cNvPr id="3" name="Content Placeholder 2">
+            <a:extLst>
+              <a:ext uri="{FF2B5EF4-FFF2-40B4-BE49-F238E27FC236}">
+                <a16:creationId xmlns:a16="http://schemas.microsoft.com/office/drawing/2014/main" id="{B67A8532-B940-8768-0C94-4AABD6A34127}"/>
+              </a:ext>
+            </a:extLst>
+          </p:cNvPr>
+          <p:cNvSpPr>
+            <a:spLocks noGrp="1"/>
+          </p:cNvSpPr>
+          <p:nvPr>
+            <p:ph idx="1"/>
+          </p:nvPr>
+        </p:nvSpPr>
+        <p:spPr/>
+        <p:txBody>
+          <a:bodyPr/>
+          <a:lstStyle/>
+          <a:p>
+            <a:r>
+              <a:rPr lang="en-US" dirty="0"/>
+              <a:t>Machine Learning Engineer @ Zimmer Biomet</a:t>
+            </a:r>
+          </a:p>
+          <a:p>
+            <a:r>
+              <a:rPr lang="en-US" dirty="0"/>
+              <a:t>Up until a year ago Data Scientist @ </a:t>
+            </a:r>
+            <a:r>
+              <a:rPr lang="en-US" dirty="0" err="1"/>
+              <a:t>Zeelo</a:t>
+            </a:r>
+            <a:endParaRPr lang="en-US" dirty="0"/>
+          </a:p>
+          <a:p>
+            <a:r>
+              <a:rPr lang="en-US" dirty="0"/>
+              <a:t>MSc in Social Data Science from the London School of Economics</a:t>
+            </a:r>
+          </a:p>
+          <a:p>
+            <a:r>
+              <a:rPr lang="en-US" dirty="0"/>
+              <a:t>Previously worked in the finance and fintech industries</a:t>
+            </a:r>
+          </a:p>
+          <a:p>
+            <a:pPr marL="0" indent="0">
+              <a:buNone/>
+            </a:pPr>
+            <a:r>
+              <a:rPr lang="en-US" dirty="0"/>
+              <a:t>Also…</a:t>
+            </a:r>
+          </a:p>
+          <a:p>
+            <a:r>
+              <a:rPr lang="en-US" dirty="0"/>
+              <a:t>I like finding bugs</a:t>
+            </a:r>
+          </a:p>
+        </p:txBody>
+      </p:sp>
+    </p:spTree>
+    <p:extLst>
+      <p:ext uri="{BB962C8B-B14F-4D97-AF65-F5344CB8AC3E}">
+        <p14:creationId xmlns:p14="http://schemas.microsoft.com/office/powerpoint/2010/main" val="3424294084"/>
+      </p:ext>
+    </p:extLst>
+  </p:cSld>
+  <p:clrMapOvr>
+    <a:masterClrMapping/>
+  </p:clrMapOvr>
+</p:sld>
+</file>
+
+<file path=ppt/slides/slide4.xml><?xml version="1.0" encoding="utf-8"?>
+<p:sld xmlns:a="http://schemas.openxmlformats.org/drawingml/2006/main" xmlns:r="http://schemas.openxmlformats.org/officeDocument/2006/relationships" xmlns:p="http://schemas.openxmlformats.org/presentationml/2006/main">
+  <p:cSld>
+    <p:spTree>
+      <p:nvGrpSpPr>
+        <p:cNvPr id="1" name=""/>
+        <p:cNvGrpSpPr/>
+        <p:nvPr/>
+      </p:nvGrpSpPr>
+      <p:grpSpPr>
+        <a:xfrm>
+          <a:off x="0" y="0"/>
+          <a:ext cx="0" cy="0"/>
+          <a:chOff x="0" y="0"/>
+          <a:chExt cx="0" cy="0"/>
+        </a:xfrm>
+      </p:grpSpPr>
+      <p:sp>
+        <p:nvSpPr>
+          <p:cNvPr id="2" name="Title 1">
+            <a:extLst>
+              <a:ext uri="{FF2B5EF4-FFF2-40B4-BE49-F238E27FC236}">
                 <a16:creationId xmlns:a16="http://schemas.microsoft.com/office/drawing/2014/main" id="{DB10E3E9-FC40-3BC7-E713-A1903C1ED10C}"/>
               </a:ext>
             </a:extLst>
@@ -5752,12 +5851,20 @@
           <a:bodyPr/>
           <a:lstStyle/>
           <a:p>
+            <a:pPr>
+              <a:buFont typeface="+mj-lt"/>
+              <a:buAutoNum type="arabicPeriod"/>
+            </a:pPr>
             <a:r>
               <a:rPr lang="en-US" dirty="0"/>
               <a:t>Who needs data validation anyway?</a:t>
             </a:r>
           </a:p>
           <a:p>
+            <a:pPr>
+              <a:buFont typeface="+mj-lt"/>
+              <a:buAutoNum type="arabicPeriod"/>
+            </a:pPr>
             <a:r>
               <a:rPr lang="en-US" dirty="0"/>
               <a:t>Validation in training pipelines using </a:t>
@@ -5769,12 +5876,20 @@
             <a:endParaRPr lang="en-US" dirty="0"/>
           </a:p>
           <a:p>
+            <a:pPr>
+              <a:buFont typeface="+mj-lt"/>
+              <a:buAutoNum type="arabicPeriod"/>
+            </a:pPr>
             <a:r>
               <a:rPr lang="en-US" dirty="0"/>
               <a:t>Validation in databases using Great Expectations</a:t>
             </a:r>
           </a:p>
           <a:p>
+            <a:pPr>
+              <a:buFont typeface="+mj-lt"/>
+              <a:buAutoNum type="arabicPeriod"/>
+            </a:pPr>
             <a:r>
               <a:rPr lang="en-US" dirty="0"/>
               <a:t>Validation in model serving using </a:t>
@@ -5786,6 +5901,10 @@
             <a:endParaRPr lang="en-US" dirty="0"/>
           </a:p>
           <a:p>
+            <a:pPr>
+              <a:buFont typeface="+mj-lt"/>
+              <a:buAutoNum type="arabicPeriod"/>
+            </a:pPr>
             <a:r>
               <a:rPr lang="en-US" dirty="0"/>
               <a:t>Other tools and concepts</a:t>
@@ -5806,7 +5925,111 @@
 </p:sld>
 </file>
 
-<file path=ppt/slides/slide4.xml><?xml version="1.0" encoding="utf-8"?>
+<file path=ppt/slides/slide5.xml><?xml version="1.0" encoding="utf-8"?>
+<p:sld xmlns:a="http://schemas.openxmlformats.org/drawingml/2006/main" xmlns:r="http://schemas.openxmlformats.org/officeDocument/2006/relationships" xmlns:p="http://schemas.openxmlformats.org/presentationml/2006/main">
+  <p:cSld>
+    <p:spTree>
+      <p:nvGrpSpPr>
+        <p:cNvPr id="1" name=""/>
+        <p:cNvGrpSpPr/>
+        <p:nvPr/>
+      </p:nvGrpSpPr>
+      <p:grpSpPr>
+        <a:xfrm>
+          <a:off x="0" y="0"/>
+          <a:ext cx="0" cy="0"/>
+          <a:chOff x="0" y="0"/>
+          <a:chExt cx="0" cy="0"/>
+        </a:xfrm>
+      </p:grpSpPr>
+      <p:sp>
+        <p:nvSpPr>
+          <p:cNvPr id="2" name="Title 1">
+            <a:extLst>
+              <a:ext uri="{FF2B5EF4-FFF2-40B4-BE49-F238E27FC236}">
+                <a16:creationId xmlns:a16="http://schemas.microsoft.com/office/drawing/2014/main" id="{DB10E3E9-FC40-3BC7-E713-A1903C1ED10C}"/>
+              </a:ext>
+            </a:extLst>
+          </p:cNvPr>
+          <p:cNvSpPr>
+            <a:spLocks noGrp="1"/>
+          </p:cNvSpPr>
+          <p:nvPr>
+            <p:ph type="title"/>
+          </p:nvPr>
+        </p:nvSpPr>
+        <p:spPr>
+          <a:xfrm>
+            <a:off x="810000" y="472589"/>
+            <a:ext cx="10571998" cy="970450"/>
+          </a:xfrm>
+        </p:spPr>
+        <p:txBody>
+          <a:bodyPr/>
+          <a:lstStyle/>
+          <a:p>
+            <a:r>
+              <a:rPr lang="en-US" dirty="0"/>
+              <a:t>Tutorial Instructions</a:t>
+            </a:r>
+          </a:p>
+        </p:txBody>
+      </p:sp>
+      <p:sp>
+        <p:nvSpPr>
+          <p:cNvPr id="3" name="Content Placeholder 2">
+            <a:extLst>
+              <a:ext uri="{FF2B5EF4-FFF2-40B4-BE49-F238E27FC236}">
+                <a16:creationId xmlns:a16="http://schemas.microsoft.com/office/drawing/2014/main" id="{B9D0CADA-8E26-726F-2115-18E96767ED49}"/>
+              </a:ext>
+            </a:extLst>
+          </p:cNvPr>
+          <p:cNvSpPr>
+            <a:spLocks noGrp="1"/>
+          </p:cNvSpPr>
+          <p:nvPr>
+            <p:ph idx="1"/>
+          </p:nvPr>
+        </p:nvSpPr>
+        <p:spPr/>
+        <p:txBody>
+          <a:bodyPr/>
+          <a:lstStyle/>
+          <a:p>
+            <a:pPr>
+              <a:buFont typeface="+mj-lt"/>
+              <a:buAutoNum type="arabicPeriod"/>
+            </a:pPr>
+            <a:r>
+              <a:rPr lang="en-US" dirty="0"/>
+              <a:t>Environment requirements: Python 3.7 and up with </a:t>
+            </a:r>
+            <a:r>
+              <a:rPr lang="en-US" dirty="0" err="1"/>
+              <a:t>Jupyter</a:t>
+            </a:r>
+            <a:r>
+              <a:rPr lang="en-US"/>
+              <a:t> installed</a:t>
+            </a:r>
+            <a:endParaRPr lang="en-US" dirty="0"/>
+          </a:p>
+        </p:txBody>
+      </p:sp>
+    </p:spTree>
+    <p:extLst>
+      <p:ext uri="{BB962C8B-B14F-4D97-AF65-F5344CB8AC3E}">
+        <p14:creationId xmlns:p14="http://schemas.microsoft.com/office/powerpoint/2010/main" val="1216031236"/>
+      </p:ext>
+    </p:extLst>
+  </p:cSld>
+  <p:clrMapOvr>
+    <a:masterClrMapping/>
+  </p:clrMapOvr>
+</p:sld>
+</file>
+
+<file path=ppt/slides/slide6.xml><?xml version="1.0" encoding="utf-8"?>
 <p:sld xmlns:a="http://schemas.openxmlformats.org/drawingml/2006/main" xmlns:r="http://schemas.openxmlformats.org/officeDocument/2006/relationships" xmlns:p="http://schemas.openxmlformats.org/presentationml/2006/main">
   <p:cSld>
     <p:spTree>
@@ -5892,7 +6115,67 @@
     </p:spTree>
     <p:extLst>
       <p:ext uri="{BB962C8B-B14F-4D97-AF65-F5344CB8AC3E}">
-        <p14:creationId xmlns:p14="http://schemas.microsoft.com/office/powerpoint/2010/main" val="4017294590"/>
+        <p14:creationId xmlns:p14="http://schemas.microsoft.com/office/powerpoint/2010/main" val="3878078665"/>
+      </p:ext>
+    </p:extLst>
+  </p:cSld>
+  <p:clrMapOvr>
+    <a:masterClrMapping/>
+  </p:clrMapOvr>
+</p:sld>
+</file>
+
+<file path=ppt/slides/slide7.xml><?xml version="1.0" encoding="utf-8"?>
+<p:sld xmlns:a="http://schemas.openxmlformats.org/drawingml/2006/main" xmlns:r="http://schemas.openxmlformats.org/officeDocument/2006/relationships" xmlns:p="http://schemas.openxmlformats.org/presentationml/2006/main">
+  <p:cSld>
+    <p:spTree>
+      <p:nvGrpSpPr>
+        <p:cNvPr id="1" name=""/>
+        <p:cNvGrpSpPr/>
+        <p:nvPr/>
+      </p:nvGrpSpPr>
+      <p:grpSpPr>
+        <a:xfrm>
+          <a:off x="0" y="0"/>
+          <a:ext cx="0" cy="0"/>
+          <a:chOff x="0" y="0"/>
+          <a:chExt cx="0" cy="0"/>
+        </a:xfrm>
+      </p:grpSpPr>
+      <p:pic>
+        <p:nvPicPr>
+          <p:cNvPr id="7" name="Picture 6">
+            <a:extLst>
+              <a:ext uri="{FF2B5EF4-FFF2-40B4-BE49-F238E27FC236}">
+                <a16:creationId xmlns:a16="http://schemas.microsoft.com/office/drawing/2014/main" id="{9F74481F-C26C-5863-A96C-A84945A6586E}"/>
+              </a:ext>
+            </a:extLst>
+          </p:cNvPr>
+          <p:cNvPicPr>
+            <a:picLocks noChangeAspect="1"/>
+          </p:cNvPicPr>
+          <p:nvPr/>
+        </p:nvPicPr>
+        <p:blipFill>
+          <a:blip r:embed="rId2"/>
+          <a:stretch>
+            <a:fillRect/>
+          </a:stretch>
+        </p:blipFill>
+        <p:spPr>
+          <a:xfrm>
+            <a:off x="6350" y="1866900"/>
+            <a:ext cx="12179300" cy="3124200"/>
+          </a:xfrm>
+          <a:prstGeom prst="rect">
+            <a:avLst/>
+          </a:prstGeom>
+        </p:spPr>
+      </p:pic>
+    </p:spTree>
+    <p:extLst>
+      <p:ext uri="{BB962C8B-B14F-4D97-AF65-F5344CB8AC3E}">
+        <p14:creationId xmlns:p14="http://schemas.microsoft.com/office/powerpoint/2010/main" val="1024213508"/>
       </p:ext>
     </p:extLst>
   </p:cSld>

</xml_diff>

<commit_message>
Added a few slides
</commit_message>
<xml_diff>
--- a/Data Validation for Data Science.pptx
+++ b/Data Validation for Data Science.pptx
@@ -7,11 +7,13 @@
   <p:sldIdLst>
     <p:sldId id="256" r:id="rId2"/>
     <p:sldId id="259" r:id="rId3"/>
-    <p:sldId id="258" r:id="rId4"/>
-    <p:sldId id="257" r:id="rId5"/>
-    <p:sldId id="262" r:id="rId6"/>
-    <p:sldId id="261" r:id="rId7"/>
-    <p:sldId id="260" r:id="rId8"/>
+    <p:sldId id="260" r:id="rId4"/>
+    <p:sldId id="258" r:id="rId5"/>
+    <p:sldId id="257" r:id="rId6"/>
+    <p:sldId id="262" r:id="rId7"/>
+    <p:sldId id="265" r:id="rId8"/>
+    <p:sldId id="263" r:id="rId9"/>
+    <p:sldId id="264" r:id="rId10"/>
   </p:sldIdLst>
   <p:sldSz cx="12192000" cy="6858000"/>
   <p:notesSz cx="6858000" cy="9144000"/>
@@ -213,7 +215,7 @@
           <a:effectLst/>
           <a:extLst>
             <a:ext uri="{91240B29-F687-4f45-9708-019B960494DF}">
-              <a14:hiddenLine xmlns:a14="http://schemas.microsoft.com/office/drawing/2010/main" xmlns="" w="9525">
+              <a14:hiddenLine xmlns="" xmlns:a14="http://schemas.microsoft.com/office/drawing/2010/main" w="9525">
                 <a:solidFill>
                   <a:srgbClr val="000000"/>
                 </a:solidFill>
@@ -406,7 +408,7 @@
             <a:fld id="{08B9EBBA-996F-894A-B54A-D6246ED52CEA}" type="datetimeFigureOut">
               <a:rPr lang="en-US" dirty="0"/>
               <a:pPr/>
-              <a:t>5/15/22</a:t>
+              <a:t>5/16/22</a:t>
             </a:fld>
             <a:endParaRPr lang="en-US" dirty="0"/>
           </a:p>
@@ -721,7 +723,7 @@
             <a:fld id="{18C79C5D-2A6F-F04D-97DA-BEF2467B64E4}" type="datetimeFigureOut">
               <a:rPr lang="en-US" dirty="0"/>
               <a:pPr/>
-              <a:t>5/15/22</a:t>
+              <a:t>5/16/22</a:t>
             </a:fld>
             <a:endParaRPr lang="en-US" dirty="0"/>
           </a:p>
@@ -1206,7 +1208,7 @@
             <a:fld id="{8DFA1846-DA80-1C48-A609-854EA85C59AD}" type="datetimeFigureOut">
               <a:rPr lang="en-US" dirty="0"/>
               <a:pPr/>
-              <a:t>5/15/22</a:t>
+              <a:t>5/16/22</a:t>
             </a:fld>
             <a:endParaRPr lang="en-US" dirty="0"/>
           </a:p>
@@ -1572,7 +1574,7 @@
             <a:fld id="{FBF54567-0DE4-3F47-BF90-CB84690072F9}" type="datetimeFigureOut">
               <a:rPr lang="en-US" dirty="0"/>
               <a:pPr/>
-              <a:t>5/15/22</a:t>
+              <a:t>5/16/22</a:t>
             </a:fld>
             <a:endParaRPr lang="en-US" dirty="0"/>
           </a:p>
@@ -1723,7 +1725,7 @@
           <a:ln/>
           <a:extLst>
             <a:ext uri="{91240B29-F687-4f45-9708-019B960494DF}">
-              <a14:hiddenLine xmlns:a14="http://schemas.microsoft.com/office/drawing/2010/main" xmlns="" w="9525">
+              <a14:hiddenLine xmlns="" xmlns:a14="http://schemas.microsoft.com/office/drawing/2010/main" w="9525">
                 <a:solidFill>
                   <a:srgbClr val="000000"/>
                 </a:solidFill>
@@ -1842,7 +1844,7 @@
             <a:fld id="{C6C52C72-DE31-F449-A4ED-4C594FD91407}" type="datetimeFigureOut">
               <a:rPr lang="en-US" dirty="0"/>
               <a:pPr/>
-              <a:t>5/15/22</a:t>
+              <a:t>5/16/22</a:t>
             </a:fld>
             <a:endParaRPr lang="en-US" dirty="0"/>
           </a:p>
@@ -1995,7 +1997,7 @@
           <a:ln/>
           <a:extLst>
             <a:ext uri="{91240B29-F687-4f45-9708-019B960494DF}">
-              <a14:hiddenLine xmlns:a14="http://schemas.microsoft.com/office/drawing/2010/main" xmlns="" w="9525">
+              <a14:hiddenLine xmlns="" xmlns:a14="http://schemas.microsoft.com/office/drawing/2010/main" w="9525">
                 <a:solidFill>
                   <a:srgbClr val="000000"/>
                 </a:solidFill>
@@ -2124,7 +2126,7 @@
             <a:fld id="{ED62726E-379B-B349-9EED-81ED093FA806}" type="datetimeFigureOut">
               <a:rPr lang="en-US" dirty="0"/>
               <a:pPr/>
-              <a:t>5/15/22</a:t>
+              <a:t>5/16/22</a:t>
             </a:fld>
             <a:endParaRPr lang="en-US" dirty="0"/>
           </a:p>
@@ -2275,7 +2277,7 @@
           <a:ln/>
           <a:extLst>
             <a:ext uri="{91240B29-F687-4f45-9708-019B960494DF}">
-              <a14:hiddenLine xmlns:a14="http://schemas.microsoft.com/office/drawing/2010/main" xmlns="" w="9525">
+              <a14:hiddenLine xmlns="" xmlns:a14="http://schemas.microsoft.com/office/drawing/2010/main" w="9525">
                 <a:solidFill>
                   <a:srgbClr val="000000"/>
                 </a:solidFill>
@@ -2404,7 +2406,7 @@
             <a:fld id="{9B3A1323-8D79-1946-B0D7-40001CF92E9D}" type="datetimeFigureOut">
               <a:rPr lang="en-US" dirty="0"/>
               <a:pPr/>
-              <a:t>5/15/22</a:t>
+              <a:t>5/16/22</a:t>
             </a:fld>
             <a:endParaRPr lang="en-US" dirty="0"/>
           </a:p>
@@ -2744,7 +2746,7 @@
             <a:fld id="{8DFA1846-DA80-1C48-A609-854EA85C59AD}" type="datetimeFigureOut">
               <a:rPr lang="en-US" dirty="0"/>
               <a:pPr/>
-              <a:t>5/15/22</a:t>
+              <a:t>5/16/22</a:t>
             </a:fld>
             <a:endParaRPr lang="en-US" dirty="0"/>
           </a:p>
@@ -2895,7 +2897,7 @@
           <a:ln/>
           <a:extLst>
             <a:ext uri="{91240B29-F687-4f45-9708-019B960494DF}">
-              <a14:hiddenLine xmlns:a14="http://schemas.microsoft.com/office/drawing/2010/main" xmlns="" w="9525">
+              <a14:hiddenLine xmlns="" xmlns:a14="http://schemas.microsoft.com/office/drawing/2010/main" w="9525">
                 <a:solidFill>
                   <a:srgbClr val="000000"/>
                 </a:solidFill>
@@ -3080,7 +3082,7 @@
             <a:fld id="{57302355-E14B-8545-A8F8-0FE83CC9D524}" type="datetimeFigureOut">
               <a:rPr lang="en-US" dirty="0"/>
               <a:pPr/>
-              <a:t>5/15/22</a:t>
+              <a:t>5/16/22</a:t>
             </a:fld>
             <a:endParaRPr lang="en-US" dirty="0"/>
           </a:p>
@@ -3231,7 +3233,7 @@
           <a:ln/>
           <a:extLst>
             <a:ext uri="{91240B29-F687-4f45-9708-019B960494DF}">
-              <a14:hiddenLine xmlns:a14="http://schemas.microsoft.com/office/drawing/2010/main" xmlns="" w="9525">
+              <a14:hiddenLine xmlns="" xmlns:a14="http://schemas.microsoft.com/office/drawing/2010/main" w="9525">
                 <a:solidFill>
                   <a:srgbClr val="000000"/>
                 </a:solidFill>
@@ -3554,7 +3556,7 @@
             <a:fld id="{02640F58-564D-2B4F-AE67-E407BA4FCF45}" type="datetimeFigureOut">
               <a:rPr lang="en-US" dirty="0"/>
               <a:pPr/>
-              <a:t>5/15/22</a:t>
+              <a:t>5/16/22</a:t>
             </a:fld>
             <a:endParaRPr lang="en-US" dirty="0"/>
           </a:p>
@@ -3705,7 +3707,7 @@
           <a:ln/>
           <a:extLst>
             <a:ext uri="{91240B29-F687-4f45-9708-019B960494DF}">
-              <a14:hiddenLine xmlns:a14="http://schemas.microsoft.com/office/drawing/2010/main" xmlns="" w="9525">
+              <a14:hiddenLine xmlns="" xmlns:a14="http://schemas.microsoft.com/office/drawing/2010/main" w="9525">
                 <a:solidFill>
                   <a:srgbClr val="000000"/>
                 </a:solidFill>
@@ -3772,7 +3774,7 @@
             <a:fld id="{F13A34C8-038E-2045-AF43-DF7DBB8E0E9E}" type="datetimeFigureOut">
               <a:rPr lang="en-US" dirty="0"/>
               <a:pPr/>
-              <a:t>5/15/22</a:t>
+              <a:t>5/16/22</a:t>
             </a:fld>
             <a:endParaRPr lang="en-US" dirty="0"/>
           </a:p>
@@ -3864,7 +3866,7 @@
             <a:fld id="{8818C68F-D26B-8F47-958C-23B49CF8A634}" type="datetimeFigureOut">
               <a:rPr lang="en-US" dirty="0"/>
               <a:pPr/>
-              <a:t>5/15/22</a:t>
+              <a:t>5/16/22</a:t>
             </a:fld>
             <a:endParaRPr lang="en-US" dirty="0"/>
           </a:p>
@@ -4128,7 +4130,7 @@
           <a:ln/>
           <a:extLst>
             <a:ext uri="{91240B29-F687-4f45-9708-019B960494DF}">
-              <a14:hiddenLine xmlns:a14="http://schemas.microsoft.com/office/drawing/2010/main" xmlns="" w="9525">
+              <a14:hiddenLine xmlns="" xmlns:a14="http://schemas.microsoft.com/office/drawing/2010/main" w="9525">
                 <a:solidFill>
                   <a:srgbClr val="000000"/>
                 </a:solidFill>
@@ -4328,7 +4330,7 @@
             <a:fld id="{D0DF5E60-9974-AC48-9591-99C2BB44B7CF}" type="datetimeFigureOut">
               <a:rPr lang="en-US" dirty="0"/>
               <a:pPr/>
-              <a:t>5/15/22</a:t>
+              <a:t>5/16/22</a:t>
             </a:fld>
             <a:endParaRPr lang="en-US" dirty="0"/>
           </a:p>
@@ -4638,7 +4640,7 @@
             <a:fld id="{18C79C5D-2A6F-F04D-97DA-BEF2467B64E4}" type="datetimeFigureOut">
               <a:rPr lang="en-US" dirty="0"/>
               <a:pPr/>
-              <a:t>5/15/22</a:t>
+              <a:t>5/16/22</a:t>
             </a:fld>
             <a:endParaRPr lang="en-US" dirty="0"/>
           </a:p>
@@ -4905,7 +4907,7 @@
             <a:fld id="{09B482E8-6E0E-1B4F-B1FD-C69DB9E858D9}" type="datetimeFigureOut">
               <a:rPr lang="en-US" dirty="0"/>
               <a:pPr/>
-              <a:t>5/15/22</a:t>
+              <a:t>5/16/22</a:t>
             </a:fld>
             <a:endParaRPr lang="en-US" dirty="0"/>
           </a:p>
@@ -5604,7 +5606,7 @@
         </p:blipFill>
         <p:spPr>
           <a:xfrm>
-            <a:off x="923643" y="1274863"/>
+            <a:off x="923643" y="729579"/>
             <a:ext cx="10344714" cy="2285460"/>
           </a:xfrm>
           <a:prstGeom prst="rect">
@@ -5626,8 +5628,8 @@
         </p:nvSpPr>
         <p:spPr>
           <a:xfrm>
-            <a:off x="1412132" y="4813696"/>
-            <a:ext cx="9367736" cy="769441"/>
+            <a:off x="923643" y="3294776"/>
+            <a:ext cx="6330906" cy="769441"/>
           </a:xfrm>
           <a:prstGeom prst="rect">
             <a:avLst/>
@@ -5648,6 +5650,76 @@
           </a:p>
         </p:txBody>
       </p:sp>
+      <p:pic>
+        <p:nvPicPr>
+          <p:cNvPr id="3074" name="Picture 2" descr="Extreme Facepalm | Computer Reaction Faces | Know Your Meme">
+            <a:extLst>
+              <a:ext uri="{FF2B5EF4-FFF2-40B4-BE49-F238E27FC236}">
+                <a16:creationId xmlns:a16="http://schemas.microsoft.com/office/drawing/2014/main" id="{35F1E091-94EE-691D-36FC-6EE2E66AB4DE}"/>
+              </a:ext>
+            </a:extLst>
+          </p:cNvPr>
+          <p:cNvPicPr>
+            <a:picLocks noChangeAspect="1" noChangeArrowheads="1"/>
+          </p:cNvPicPr>
+          <p:nvPr/>
+        </p:nvPicPr>
+        <p:blipFill>
+          <a:blip r:embed="rId3">
+            <a:extLst>
+              <a:ext uri="{28A0092B-C50C-407E-A947-70E740481C1C}">
+                <a14:useLocalDpi xmlns:a14="http://schemas.microsoft.com/office/drawing/2010/main" val="0"/>
+              </a:ext>
+            </a:extLst>
+          </a:blip>
+          <a:srcRect/>
+          <a:stretch>
+            <a:fillRect/>
+          </a:stretch>
+        </p:blipFill>
+        <p:spPr bwMode="auto">
+          <a:xfrm>
+            <a:off x="6769916" y="4205148"/>
+            <a:ext cx="3253645" cy="2085422"/>
+          </a:xfrm>
+          <a:prstGeom prst="roundRect">
+            <a:avLst>
+              <a:gd name="adj" fmla="val 16667"/>
+            </a:avLst>
+          </a:prstGeom>
+          <a:ln>
+            <a:noFill/>
+          </a:ln>
+          <a:effectLst>
+            <a:outerShdw blurRad="76200" dist="38100" dir="7800000" algn="tl" rotWithShape="0">
+              <a:srgbClr val="000000">
+                <a:alpha val="40000"/>
+              </a:srgbClr>
+            </a:outerShdw>
+          </a:effectLst>
+          <a:scene3d>
+            <a:camera prst="orthographicFront"/>
+            <a:lightRig rig="contrasting" dir="t">
+              <a:rot lat="0" lon="0" rev="4200000"/>
+            </a:lightRig>
+          </a:scene3d>
+          <a:sp3d prstMaterial="plastic">
+            <a:bevelT w="381000" h="114300" prst="relaxedInset"/>
+            <a:contourClr>
+              <a:srgbClr val="969696"/>
+            </a:contourClr>
+          </a:sp3d>
+          <a:extLst>
+            <a:ext uri="{909E8E84-426E-40DD-AFC4-6F175D3DCCD1}">
+              <a14:hiddenFill xmlns:a14="http://schemas.microsoft.com/office/drawing/2010/main">
+                <a:solidFill>
+                  <a:srgbClr val="FFFFFF"/>
+                </a:solidFill>
+              </a14:hiddenFill>
+            </a:ext>
+          </a:extLst>
+        </p:spPr>
+      </p:pic>
     </p:spTree>
     <p:extLst>
       <p:ext uri="{BB962C8B-B14F-4D97-AF65-F5344CB8AC3E}">
@@ -5662,470 +5734,6 @@
 </file>
 
 <file path=ppt/slides/slide3.xml><?xml version="1.0" encoding="utf-8"?>
-<p:sld xmlns:a="http://schemas.openxmlformats.org/drawingml/2006/main" xmlns:r="http://schemas.openxmlformats.org/officeDocument/2006/relationships" xmlns:p="http://schemas.openxmlformats.org/presentationml/2006/main">
-  <p:cSld>
-    <p:spTree>
-      <p:nvGrpSpPr>
-        <p:cNvPr id="1" name=""/>
-        <p:cNvGrpSpPr/>
-        <p:nvPr/>
-      </p:nvGrpSpPr>
-      <p:grpSpPr>
-        <a:xfrm>
-          <a:off x="0" y="0"/>
-          <a:ext cx="0" cy="0"/>
-          <a:chOff x="0" y="0"/>
-          <a:chExt cx="0" cy="0"/>
-        </a:xfrm>
-      </p:grpSpPr>
-      <p:sp>
-        <p:nvSpPr>
-          <p:cNvPr id="2" name="Title 1">
-            <a:extLst>
-              <a:ext uri="{FF2B5EF4-FFF2-40B4-BE49-F238E27FC236}">
-                <a16:creationId xmlns:a16="http://schemas.microsoft.com/office/drawing/2014/main" id="{8B4F5F9C-17E5-4606-E9BA-E4D5BBA6FDA8}"/>
-              </a:ext>
-            </a:extLst>
-          </p:cNvPr>
-          <p:cNvSpPr>
-            <a:spLocks noGrp="1"/>
-          </p:cNvSpPr>
-          <p:nvPr>
-            <p:ph type="title"/>
-          </p:nvPr>
-        </p:nvSpPr>
-        <p:spPr/>
-        <p:txBody>
-          <a:bodyPr/>
-          <a:lstStyle/>
-          <a:p>
-            <a:r>
-              <a:rPr lang="en-US" dirty="0"/>
-              <a:t>About me</a:t>
-            </a:r>
-          </a:p>
-        </p:txBody>
-      </p:sp>
-      <p:sp>
-        <p:nvSpPr>
-          <p:cNvPr id="3" name="Content Placeholder 2">
-            <a:extLst>
-              <a:ext uri="{FF2B5EF4-FFF2-40B4-BE49-F238E27FC236}">
-                <a16:creationId xmlns:a16="http://schemas.microsoft.com/office/drawing/2014/main" id="{B67A8532-B940-8768-0C94-4AABD6A34127}"/>
-              </a:ext>
-            </a:extLst>
-          </p:cNvPr>
-          <p:cNvSpPr>
-            <a:spLocks noGrp="1"/>
-          </p:cNvSpPr>
-          <p:nvPr>
-            <p:ph idx="1"/>
-          </p:nvPr>
-        </p:nvSpPr>
-        <p:spPr/>
-        <p:txBody>
-          <a:bodyPr/>
-          <a:lstStyle/>
-          <a:p>
-            <a:r>
-              <a:rPr lang="en-US" dirty="0"/>
-              <a:t>Machine Learning Engineer @ Zimmer Biomet</a:t>
-            </a:r>
-          </a:p>
-          <a:p>
-            <a:r>
-              <a:rPr lang="en-US" dirty="0"/>
-              <a:t>Up until a year ago Data Scientist @ </a:t>
-            </a:r>
-            <a:r>
-              <a:rPr lang="en-US" dirty="0" err="1"/>
-              <a:t>Zeelo</a:t>
-            </a:r>
-            <a:endParaRPr lang="en-US" dirty="0"/>
-          </a:p>
-          <a:p>
-            <a:r>
-              <a:rPr lang="en-US" dirty="0"/>
-              <a:t>MSc in Social Data Science from the London School of Economics</a:t>
-            </a:r>
-          </a:p>
-          <a:p>
-            <a:r>
-              <a:rPr lang="en-US" dirty="0"/>
-              <a:t>Previously worked in the finance and fintech industries</a:t>
-            </a:r>
-          </a:p>
-          <a:p>
-            <a:pPr marL="0" indent="0">
-              <a:buNone/>
-            </a:pPr>
-            <a:r>
-              <a:rPr lang="en-US" dirty="0"/>
-              <a:t>Also…</a:t>
-            </a:r>
-          </a:p>
-          <a:p>
-            <a:r>
-              <a:rPr lang="en-US" dirty="0"/>
-              <a:t>I like finding bugs</a:t>
-            </a:r>
-          </a:p>
-        </p:txBody>
-      </p:sp>
-    </p:spTree>
-    <p:extLst>
-      <p:ext uri="{BB962C8B-B14F-4D97-AF65-F5344CB8AC3E}">
-        <p14:creationId xmlns:p14="http://schemas.microsoft.com/office/powerpoint/2010/main" val="3424294084"/>
-      </p:ext>
-    </p:extLst>
-  </p:cSld>
-  <p:clrMapOvr>
-    <a:masterClrMapping/>
-  </p:clrMapOvr>
-</p:sld>
-</file>
-
-<file path=ppt/slides/slide4.xml><?xml version="1.0" encoding="utf-8"?>
-<p:sld xmlns:a="http://schemas.openxmlformats.org/drawingml/2006/main" xmlns:r="http://schemas.openxmlformats.org/officeDocument/2006/relationships" xmlns:p="http://schemas.openxmlformats.org/presentationml/2006/main">
-  <p:cSld>
-    <p:spTree>
-      <p:nvGrpSpPr>
-        <p:cNvPr id="1" name=""/>
-        <p:cNvGrpSpPr/>
-        <p:nvPr/>
-      </p:nvGrpSpPr>
-      <p:grpSpPr>
-        <a:xfrm>
-          <a:off x="0" y="0"/>
-          <a:ext cx="0" cy="0"/>
-          <a:chOff x="0" y="0"/>
-          <a:chExt cx="0" cy="0"/>
-        </a:xfrm>
-      </p:grpSpPr>
-      <p:sp>
-        <p:nvSpPr>
-          <p:cNvPr id="2" name="Title 1">
-            <a:extLst>
-              <a:ext uri="{FF2B5EF4-FFF2-40B4-BE49-F238E27FC236}">
-                <a16:creationId xmlns:a16="http://schemas.microsoft.com/office/drawing/2014/main" id="{DB10E3E9-FC40-3BC7-E713-A1903C1ED10C}"/>
-              </a:ext>
-            </a:extLst>
-          </p:cNvPr>
-          <p:cNvSpPr>
-            <a:spLocks noGrp="1"/>
-          </p:cNvSpPr>
-          <p:nvPr>
-            <p:ph type="title"/>
-          </p:nvPr>
-        </p:nvSpPr>
-        <p:spPr/>
-        <p:txBody>
-          <a:bodyPr/>
-          <a:lstStyle/>
-          <a:p>
-            <a:r>
-              <a:rPr lang="en-US" dirty="0"/>
-              <a:t>Agenda</a:t>
-            </a:r>
-          </a:p>
-        </p:txBody>
-      </p:sp>
-      <p:sp>
-        <p:nvSpPr>
-          <p:cNvPr id="3" name="Content Placeholder 2">
-            <a:extLst>
-              <a:ext uri="{FF2B5EF4-FFF2-40B4-BE49-F238E27FC236}">
-                <a16:creationId xmlns:a16="http://schemas.microsoft.com/office/drawing/2014/main" id="{B9D0CADA-8E26-726F-2115-18E96767ED49}"/>
-              </a:ext>
-            </a:extLst>
-          </p:cNvPr>
-          <p:cNvSpPr>
-            <a:spLocks noGrp="1"/>
-          </p:cNvSpPr>
-          <p:nvPr>
-            <p:ph idx="1"/>
-          </p:nvPr>
-        </p:nvSpPr>
-        <p:spPr/>
-        <p:txBody>
-          <a:bodyPr/>
-          <a:lstStyle/>
-          <a:p>
-            <a:pPr>
-              <a:buFont typeface="+mj-lt"/>
-              <a:buAutoNum type="arabicPeriod"/>
-            </a:pPr>
-            <a:r>
-              <a:rPr lang="en-US" dirty="0"/>
-              <a:t>Who needs data validation anyway?</a:t>
-            </a:r>
-          </a:p>
-          <a:p>
-            <a:pPr>
-              <a:buFont typeface="+mj-lt"/>
-              <a:buAutoNum type="arabicPeriod"/>
-            </a:pPr>
-            <a:r>
-              <a:rPr lang="en-US" dirty="0"/>
-              <a:t>Validation in training pipelines using </a:t>
-            </a:r>
-            <a:r>
-              <a:rPr lang="en-US" dirty="0" err="1"/>
-              <a:t>Pandera</a:t>
-            </a:r>
-            <a:endParaRPr lang="en-US" dirty="0"/>
-          </a:p>
-          <a:p>
-            <a:pPr>
-              <a:buFont typeface="+mj-lt"/>
-              <a:buAutoNum type="arabicPeriod"/>
-            </a:pPr>
-            <a:r>
-              <a:rPr lang="en-US" dirty="0"/>
-              <a:t>Validation in databases using Great Expectations</a:t>
-            </a:r>
-          </a:p>
-          <a:p>
-            <a:pPr>
-              <a:buFont typeface="+mj-lt"/>
-              <a:buAutoNum type="arabicPeriod"/>
-            </a:pPr>
-            <a:r>
-              <a:rPr lang="en-US" dirty="0"/>
-              <a:t>Validation in model serving using </a:t>
-            </a:r>
-            <a:r>
-              <a:rPr lang="en-US" dirty="0" err="1"/>
-              <a:t>Pydantic</a:t>
-            </a:r>
-            <a:endParaRPr lang="en-US" dirty="0"/>
-          </a:p>
-          <a:p>
-            <a:pPr>
-              <a:buFont typeface="+mj-lt"/>
-              <a:buAutoNum type="arabicPeriod"/>
-            </a:pPr>
-            <a:r>
-              <a:rPr lang="en-US" dirty="0"/>
-              <a:t>Other tools and concepts</a:t>
-            </a:r>
-          </a:p>
-        </p:txBody>
-      </p:sp>
-    </p:spTree>
-    <p:extLst>
-      <p:ext uri="{BB962C8B-B14F-4D97-AF65-F5344CB8AC3E}">
-        <p14:creationId xmlns:p14="http://schemas.microsoft.com/office/powerpoint/2010/main" val="1610285228"/>
-      </p:ext>
-    </p:extLst>
-  </p:cSld>
-  <p:clrMapOvr>
-    <a:masterClrMapping/>
-  </p:clrMapOvr>
-</p:sld>
-</file>
-
-<file path=ppt/slides/slide5.xml><?xml version="1.0" encoding="utf-8"?>
-<p:sld xmlns:a="http://schemas.openxmlformats.org/drawingml/2006/main" xmlns:r="http://schemas.openxmlformats.org/officeDocument/2006/relationships" xmlns:p="http://schemas.openxmlformats.org/presentationml/2006/main">
-  <p:cSld>
-    <p:spTree>
-      <p:nvGrpSpPr>
-        <p:cNvPr id="1" name=""/>
-        <p:cNvGrpSpPr/>
-        <p:nvPr/>
-      </p:nvGrpSpPr>
-      <p:grpSpPr>
-        <a:xfrm>
-          <a:off x="0" y="0"/>
-          <a:ext cx="0" cy="0"/>
-          <a:chOff x="0" y="0"/>
-          <a:chExt cx="0" cy="0"/>
-        </a:xfrm>
-      </p:grpSpPr>
-      <p:sp>
-        <p:nvSpPr>
-          <p:cNvPr id="2" name="Title 1">
-            <a:extLst>
-              <a:ext uri="{FF2B5EF4-FFF2-40B4-BE49-F238E27FC236}">
-                <a16:creationId xmlns:a16="http://schemas.microsoft.com/office/drawing/2014/main" id="{DB10E3E9-FC40-3BC7-E713-A1903C1ED10C}"/>
-              </a:ext>
-            </a:extLst>
-          </p:cNvPr>
-          <p:cNvSpPr>
-            <a:spLocks noGrp="1"/>
-          </p:cNvSpPr>
-          <p:nvPr>
-            <p:ph type="title"/>
-          </p:nvPr>
-        </p:nvSpPr>
-        <p:spPr>
-          <a:xfrm>
-            <a:off x="810000" y="472589"/>
-            <a:ext cx="10571998" cy="970450"/>
-          </a:xfrm>
-        </p:spPr>
-        <p:txBody>
-          <a:bodyPr/>
-          <a:lstStyle/>
-          <a:p>
-            <a:r>
-              <a:rPr lang="en-US" dirty="0"/>
-              <a:t>Tutorial Instructions</a:t>
-            </a:r>
-          </a:p>
-        </p:txBody>
-      </p:sp>
-      <p:sp>
-        <p:nvSpPr>
-          <p:cNvPr id="3" name="Content Placeholder 2">
-            <a:extLst>
-              <a:ext uri="{FF2B5EF4-FFF2-40B4-BE49-F238E27FC236}">
-                <a16:creationId xmlns:a16="http://schemas.microsoft.com/office/drawing/2014/main" id="{B9D0CADA-8E26-726F-2115-18E96767ED49}"/>
-              </a:ext>
-            </a:extLst>
-          </p:cNvPr>
-          <p:cNvSpPr>
-            <a:spLocks noGrp="1"/>
-          </p:cNvSpPr>
-          <p:nvPr>
-            <p:ph idx="1"/>
-          </p:nvPr>
-        </p:nvSpPr>
-        <p:spPr/>
-        <p:txBody>
-          <a:bodyPr/>
-          <a:lstStyle/>
-          <a:p>
-            <a:pPr>
-              <a:buFont typeface="+mj-lt"/>
-              <a:buAutoNum type="arabicPeriod"/>
-            </a:pPr>
-            <a:r>
-              <a:rPr lang="en-US" dirty="0"/>
-              <a:t>Environment requirements: Python 3.7 and up with </a:t>
-            </a:r>
-            <a:r>
-              <a:rPr lang="en-US" dirty="0" err="1"/>
-              <a:t>Jupyter</a:t>
-            </a:r>
-            <a:r>
-              <a:rPr lang="en-US"/>
-              <a:t> installed</a:t>
-            </a:r>
-            <a:endParaRPr lang="en-US" dirty="0"/>
-          </a:p>
-        </p:txBody>
-      </p:sp>
-    </p:spTree>
-    <p:extLst>
-      <p:ext uri="{BB962C8B-B14F-4D97-AF65-F5344CB8AC3E}">
-        <p14:creationId xmlns:p14="http://schemas.microsoft.com/office/powerpoint/2010/main" val="1216031236"/>
-      </p:ext>
-    </p:extLst>
-  </p:cSld>
-  <p:clrMapOvr>
-    <a:masterClrMapping/>
-  </p:clrMapOvr>
-</p:sld>
-</file>
-
-<file path=ppt/slides/slide6.xml><?xml version="1.0" encoding="utf-8"?>
-<p:sld xmlns:a="http://schemas.openxmlformats.org/drawingml/2006/main" xmlns:r="http://schemas.openxmlformats.org/officeDocument/2006/relationships" xmlns:p="http://schemas.openxmlformats.org/presentationml/2006/main">
-  <p:cSld>
-    <p:spTree>
-      <p:nvGrpSpPr>
-        <p:cNvPr id="1" name=""/>
-        <p:cNvGrpSpPr/>
-        <p:nvPr/>
-      </p:nvGrpSpPr>
-      <p:grpSpPr>
-        <a:xfrm>
-          <a:off x="0" y="0"/>
-          <a:ext cx="0" cy="0"/>
-          <a:chOff x="0" y="0"/>
-          <a:chExt cx="0" cy="0"/>
-        </a:xfrm>
-      </p:grpSpPr>
-      <p:pic>
-        <p:nvPicPr>
-          <p:cNvPr id="3" name="Picture 2">
-            <a:extLst>
-              <a:ext uri="{FF2B5EF4-FFF2-40B4-BE49-F238E27FC236}">
-                <a16:creationId xmlns:a16="http://schemas.microsoft.com/office/drawing/2014/main" id="{6FCB81E4-808D-65F4-5AA6-EF48920BD827}"/>
-              </a:ext>
-            </a:extLst>
-          </p:cNvPr>
-          <p:cNvPicPr>
-            <a:picLocks noChangeAspect="1"/>
-          </p:cNvPicPr>
-          <p:nvPr/>
-        </p:nvPicPr>
-        <p:blipFill>
-          <a:blip r:embed="rId2"/>
-          <a:stretch>
-            <a:fillRect/>
-          </a:stretch>
-        </p:blipFill>
-        <p:spPr>
-          <a:xfrm>
-            <a:off x="923643" y="1274863"/>
-            <a:ext cx="10344714" cy="2285460"/>
-          </a:xfrm>
-          <a:prstGeom prst="rect">
-            <a:avLst/>
-          </a:prstGeom>
-        </p:spPr>
-      </p:pic>
-      <p:sp>
-        <p:nvSpPr>
-          <p:cNvPr id="4" name="TextBox 3">
-            <a:extLst>
-              <a:ext uri="{FF2B5EF4-FFF2-40B4-BE49-F238E27FC236}">
-                <a16:creationId xmlns:a16="http://schemas.microsoft.com/office/drawing/2014/main" id="{DBA772F5-8003-B09A-07B0-5FBA77C12EB6}"/>
-              </a:ext>
-            </a:extLst>
-          </p:cNvPr>
-          <p:cNvSpPr txBox="1"/>
-          <p:nvPr/>
-        </p:nvSpPr>
-        <p:spPr>
-          <a:xfrm>
-            <a:off x="1412132" y="4813696"/>
-            <a:ext cx="9367736" cy="769441"/>
-          </a:xfrm>
-          <a:prstGeom prst="rect">
-            <a:avLst/>
-          </a:prstGeom>
-          <a:noFill/>
-        </p:spPr>
-        <p:txBody>
-          <a:bodyPr wrap="square" rtlCol="0">
-            <a:spAutoFit/>
-          </a:bodyPr>
-          <a:lstStyle/>
-          <a:p>
-            <a:pPr algn="ctr"/>
-            <a:r>
-              <a:rPr lang="en-US" sz="4400" dirty="0"/>
-              <a:t>Looks familiar?</a:t>
-            </a:r>
-          </a:p>
-        </p:txBody>
-      </p:sp>
-    </p:spTree>
-    <p:extLst>
-      <p:ext uri="{BB962C8B-B14F-4D97-AF65-F5344CB8AC3E}">
-        <p14:creationId xmlns:p14="http://schemas.microsoft.com/office/powerpoint/2010/main" val="3878078665"/>
-      </p:ext>
-    </p:extLst>
-  </p:cSld>
-  <p:clrMapOvr>
-    <a:masterClrMapping/>
-  </p:clrMapOvr>
-</p:sld>
-</file>
-
-<file path=ppt/slides/slide7.xml><?xml version="1.0" encoding="utf-8"?>
 <p:sld xmlns:a="http://schemas.openxmlformats.org/drawingml/2006/main" xmlns:r="http://schemas.openxmlformats.org/officeDocument/2006/relationships" xmlns:p="http://schemas.openxmlformats.org/presentationml/2006/main">
   <p:cSld>
     <p:spTree>
@@ -6164,8 +5772,38 @@
         </p:blipFill>
         <p:spPr>
           <a:xfrm>
-            <a:off x="6350" y="1866900"/>
+            <a:off x="6350" y="359433"/>
             <a:ext cx="12179300" cy="3124200"/>
+          </a:xfrm>
+          <a:prstGeom prst="rect">
+            <a:avLst/>
+          </a:prstGeom>
+        </p:spPr>
+      </p:pic>
+      <p:pic>
+        <p:nvPicPr>
+          <p:cNvPr id="3" name="Picture 2">
+            <a:extLst>
+              <a:ext uri="{FF2B5EF4-FFF2-40B4-BE49-F238E27FC236}">
+                <a16:creationId xmlns:a16="http://schemas.microsoft.com/office/drawing/2014/main" id="{E8045CC8-E85A-C1C1-BA18-8222EE3B2FD0}"/>
+              </a:ext>
+            </a:extLst>
+          </p:cNvPr>
+          <p:cNvPicPr>
+            <a:picLocks noChangeAspect="1"/>
+          </p:cNvPicPr>
+          <p:nvPr/>
+        </p:nvPicPr>
+        <p:blipFill>
+          <a:blip r:embed="rId3"/>
+          <a:stretch>
+            <a:fillRect/>
+          </a:stretch>
+        </p:blipFill>
+        <p:spPr>
+          <a:xfrm>
+            <a:off x="629174" y="4078883"/>
+            <a:ext cx="10344714" cy="2285460"/>
           </a:xfrm>
           <a:prstGeom prst="rect">
             <a:avLst/>
@@ -6176,6 +5814,1169 @@
     <p:extLst>
       <p:ext uri="{BB962C8B-B14F-4D97-AF65-F5344CB8AC3E}">
         <p14:creationId xmlns:p14="http://schemas.microsoft.com/office/powerpoint/2010/main" val="1024213508"/>
+      </p:ext>
+    </p:extLst>
+  </p:cSld>
+  <p:clrMapOvr>
+    <a:masterClrMapping/>
+  </p:clrMapOvr>
+</p:sld>
+</file>
+
+<file path=ppt/slides/slide4.xml><?xml version="1.0" encoding="utf-8"?>
+<p:sld xmlns:a="http://schemas.openxmlformats.org/drawingml/2006/main" xmlns:r="http://schemas.openxmlformats.org/officeDocument/2006/relationships" xmlns:p="http://schemas.openxmlformats.org/presentationml/2006/main">
+  <p:cSld>
+    <p:spTree>
+      <p:nvGrpSpPr>
+        <p:cNvPr id="1" name=""/>
+        <p:cNvGrpSpPr/>
+        <p:nvPr/>
+      </p:nvGrpSpPr>
+      <p:grpSpPr>
+        <a:xfrm>
+          <a:off x="0" y="0"/>
+          <a:ext cx="0" cy="0"/>
+          <a:chOff x="0" y="0"/>
+          <a:chExt cx="0" cy="0"/>
+        </a:xfrm>
+      </p:grpSpPr>
+      <p:sp>
+        <p:nvSpPr>
+          <p:cNvPr id="2" name="Title 1">
+            <a:extLst>
+              <a:ext uri="{FF2B5EF4-FFF2-40B4-BE49-F238E27FC236}">
+                <a16:creationId xmlns:a16="http://schemas.microsoft.com/office/drawing/2014/main" id="{8B4F5F9C-17E5-4606-E9BA-E4D5BBA6FDA8}"/>
+              </a:ext>
+            </a:extLst>
+          </p:cNvPr>
+          <p:cNvSpPr>
+            <a:spLocks noGrp="1"/>
+          </p:cNvSpPr>
+          <p:nvPr>
+            <p:ph type="title"/>
+          </p:nvPr>
+        </p:nvSpPr>
+        <p:spPr/>
+        <p:txBody>
+          <a:bodyPr/>
+          <a:lstStyle/>
+          <a:p>
+            <a:r>
+              <a:rPr lang="en-US" dirty="0"/>
+              <a:t>About me</a:t>
+            </a:r>
+          </a:p>
+        </p:txBody>
+      </p:sp>
+      <p:sp>
+        <p:nvSpPr>
+          <p:cNvPr id="3" name="Content Placeholder 2">
+            <a:extLst>
+              <a:ext uri="{FF2B5EF4-FFF2-40B4-BE49-F238E27FC236}">
+                <a16:creationId xmlns:a16="http://schemas.microsoft.com/office/drawing/2014/main" id="{B67A8532-B940-8768-0C94-4AABD6A34127}"/>
+              </a:ext>
+            </a:extLst>
+          </p:cNvPr>
+          <p:cNvSpPr>
+            <a:spLocks noGrp="1"/>
+          </p:cNvSpPr>
+          <p:nvPr>
+            <p:ph idx="1"/>
+          </p:nvPr>
+        </p:nvSpPr>
+        <p:spPr/>
+        <p:txBody>
+          <a:bodyPr/>
+          <a:lstStyle/>
+          <a:p>
+            <a:r>
+              <a:rPr lang="en-US" dirty="0"/>
+              <a:t>Machine Learning Engineer @ Zimmer Biomet</a:t>
+            </a:r>
+          </a:p>
+          <a:p>
+            <a:r>
+              <a:rPr lang="en-US" dirty="0"/>
+              <a:t>Up until a year ago Data Scientist @ </a:t>
+            </a:r>
+            <a:r>
+              <a:rPr lang="en-US" dirty="0" err="1"/>
+              <a:t>Zeelo</a:t>
+            </a:r>
+            <a:endParaRPr lang="en-US" dirty="0"/>
+          </a:p>
+          <a:p>
+            <a:r>
+              <a:rPr lang="en-US" dirty="0"/>
+              <a:t>MSc in Social Data Science from the London School of Economics</a:t>
+            </a:r>
+          </a:p>
+          <a:p>
+            <a:r>
+              <a:rPr lang="en-US" dirty="0"/>
+              <a:t>Previously worked in the finance and fintech industries</a:t>
+            </a:r>
+          </a:p>
+          <a:p>
+            <a:pPr marL="0" indent="0">
+              <a:buNone/>
+            </a:pPr>
+            <a:r>
+              <a:rPr lang="en-US" dirty="0"/>
+              <a:t>Also…</a:t>
+            </a:r>
+          </a:p>
+          <a:p>
+            <a:r>
+              <a:rPr lang="en-US" dirty="0"/>
+              <a:t>I like finding bugs</a:t>
+            </a:r>
+          </a:p>
+        </p:txBody>
+      </p:sp>
+    </p:spTree>
+    <p:extLst>
+      <p:ext uri="{BB962C8B-B14F-4D97-AF65-F5344CB8AC3E}">
+        <p14:creationId xmlns:p14="http://schemas.microsoft.com/office/powerpoint/2010/main" val="3424294084"/>
+      </p:ext>
+    </p:extLst>
+  </p:cSld>
+  <p:clrMapOvr>
+    <a:masterClrMapping/>
+  </p:clrMapOvr>
+</p:sld>
+</file>
+
+<file path=ppt/slides/slide5.xml><?xml version="1.0" encoding="utf-8"?>
+<p:sld xmlns:a="http://schemas.openxmlformats.org/drawingml/2006/main" xmlns:r="http://schemas.openxmlformats.org/officeDocument/2006/relationships" xmlns:p="http://schemas.openxmlformats.org/presentationml/2006/main">
+  <p:cSld>
+    <p:spTree>
+      <p:nvGrpSpPr>
+        <p:cNvPr id="1" name=""/>
+        <p:cNvGrpSpPr/>
+        <p:nvPr/>
+      </p:nvGrpSpPr>
+      <p:grpSpPr>
+        <a:xfrm>
+          <a:off x="0" y="0"/>
+          <a:ext cx="0" cy="0"/>
+          <a:chOff x="0" y="0"/>
+          <a:chExt cx="0" cy="0"/>
+        </a:xfrm>
+      </p:grpSpPr>
+      <p:sp>
+        <p:nvSpPr>
+          <p:cNvPr id="2" name="Title 1">
+            <a:extLst>
+              <a:ext uri="{FF2B5EF4-FFF2-40B4-BE49-F238E27FC236}">
+                <a16:creationId xmlns:a16="http://schemas.microsoft.com/office/drawing/2014/main" id="{DB10E3E9-FC40-3BC7-E713-A1903C1ED10C}"/>
+              </a:ext>
+            </a:extLst>
+          </p:cNvPr>
+          <p:cNvSpPr>
+            <a:spLocks noGrp="1"/>
+          </p:cNvSpPr>
+          <p:nvPr>
+            <p:ph type="title"/>
+          </p:nvPr>
+        </p:nvSpPr>
+        <p:spPr/>
+        <p:txBody>
+          <a:bodyPr/>
+          <a:lstStyle/>
+          <a:p>
+            <a:r>
+              <a:rPr lang="en-US" dirty="0"/>
+              <a:t>Agenda</a:t>
+            </a:r>
+          </a:p>
+        </p:txBody>
+      </p:sp>
+      <p:sp>
+        <p:nvSpPr>
+          <p:cNvPr id="3" name="Content Placeholder 2">
+            <a:extLst>
+              <a:ext uri="{FF2B5EF4-FFF2-40B4-BE49-F238E27FC236}">
+                <a16:creationId xmlns:a16="http://schemas.microsoft.com/office/drawing/2014/main" id="{B9D0CADA-8E26-726F-2115-18E96767ED49}"/>
+              </a:ext>
+            </a:extLst>
+          </p:cNvPr>
+          <p:cNvSpPr>
+            <a:spLocks noGrp="1"/>
+          </p:cNvSpPr>
+          <p:nvPr>
+            <p:ph idx="1"/>
+          </p:nvPr>
+        </p:nvSpPr>
+        <p:spPr/>
+        <p:txBody>
+          <a:bodyPr/>
+          <a:lstStyle/>
+          <a:p>
+            <a:pPr>
+              <a:buFont typeface="+mj-lt"/>
+              <a:buAutoNum type="arabicPeriod"/>
+            </a:pPr>
+            <a:r>
+              <a:rPr lang="en-US" dirty="0"/>
+              <a:t>Who needs data validation anyway?</a:t>
+            </a:r>
+          </a:p>
+          <a:p>
+            <a:pPr>
+              <a:buFont typeface="+mj-lt"/>
+              <a:buAutoNum type="arabicPeriod"/>
+            </a:pPr>
+            <a:r>
+              <a:rPr lang="en-US" dirty="0"/>
+              <a:t>Validation in training pipelines using </a:t>
+            </a:r>
+            <a:r>
+              <a:rPr lang="en-US" dirty="0" err="1"/>
+              <a:t>Pandera</a:t>
+            </a:r>
+            <a:endParaRPr lang="en-US" dirty="0"/>
+          </a:p>
+          <a:p>
+            <a:pPr>
+              <a:buFont typeface="+mj-lt"/>
+              <a:buAutoNum type="arabicPeriod"/>
+            </a:pPr>
+            <a:r>
+              <a:rPr lang="en-US" dirty="0"/>
+              <a:t>Validation in databases using Great Expectations</a:t>
+            </a:r>
+          </a:p>
+          <a:p>
+            <a:pPr>
+              <a:buFont typeface="+mj-lt"/>
+              <a:buAutoNum type="arabicPeriod"/>
+            </a:pPr>
+            <a:r>
+              <a:rPr lang="en-US" dirty="0"/>
+              <a:t>Validation in model serving using </a:t>
+            </a:r>
+            <a:r>
+              <a:rPr lang="en-US" dirty="0" err="1"/>
+              <a:t>Pydantic</a:t>
+            </a:r>
+            <a:endParaRPr lang="en-US" dirty="0"/>
+          </a:p>
+          <a:p>
+            <a:pPr>
+              <a:buFont typeface="+mj-lt"/>
+              <a:buAutoNum type="arabicPeriod"/>
+            </a:pPr>
+            <a:r>
+              <a:rPr lang="en-US" dirty="0"/>
+              <a:t>Other tools and concepts</a:t>
+            </a:r>
+          </a:p>
+        </p:txBody>
+      </p:sp>
+    </p:spTree>
+    <p:extLst>
+      <p:ext uri="{BB962C8B-B14F-4D97-AF65-F5344CB8AC3E}">
+        <p14:creationId xmlns:p14="http://schemas.microsoft.com/office/powerpoint/2010/main" val="1610285228"/>
+      </p:ext>
+    </p:extLst>
+  </p:cSld>
+  <p:clrMapOvr>
+    <a:masterClrMapping/>
+  </p:clrMapOvr>
+</p:sld>
+</file>
+
+<file path=ppt/slides/slide6.xml><?xml version="1.0" encoding="utf-8"?>
+<p:sld xmlns:a="http://schemas.openxmlformats.org/drawingml/2006/main" xmlns:r="http://schemas.openxmlformats.org/officeDocument/2006/relationships" xmlns:p="http://schemas.openxmlformats.org/presentationml/2006/main">
+  <p:cSld>
+    <p:spTree>
+      <p:nvGrpSpPr>
+        <p:cNvPr id="1" name=""/>
+        <p:cNvGrpSpPr/>
+        <p:nvPr/>
+      </p:nvGrpSpPr>
+      <p:grpSpPr>
+        <a:xfrm>
+          <a:off x="0" y="0"/>
+          <a:ext cx="0" cy="0"/>
+          <a:chOff x="0" y="0"/>
+          <a:chExt cx="0" cy="0"/>
+        </a:xfrm>
+      </p:grpSpPr>
+      <p:sp>
+        <p:nvSpPr>
+          <p:cNvPr id="2" name="Title 1">
+            <a:extLst>
+              <a:ext uri="{FF2B5EF4-FFF2-40B4-BE49-F238E27FC236}">
+                <a16:creationId xmlns:a16="http://schemas.microsoft.com/office/drawing/2014/main" id="{DB10E3E9-FC40-3BC7-E713-A1903C1ED10C}"/>
+              </a:ext>
+            </a:extLst>
+          </p:cNvPr>
+          <p:cNvSpPr>
+            <a:spLocks noGrp="1"/>
+          </p:cNvSpPr>
+          <p:nvPr>
+            <p:ph type="title"/>
+          </p:nvPr>
+        </p:nvSpPr>
+        <p:spPr/>
+        <p:txBody>
+          <a:bodyPr/>
+          <a:lstStyle/>
+          <a:p>
+            <a:r>
+              <a:rPr lang="en-US" dirty="0"/>
+              <a:t>Tutorial Instructions</a:t>
+            </a:r>
+          </a:p>
+        </p:txBody>
+      </p:sp>
+      <p:sp>
+        <p:nvSpPr>
+          <p:cNvPr id="3" name="Content Placeholder 2">
+            <a:extLst>
+              <a:ext uri="{FF2B5EF4-FFF2-40B4-BE49-F238E27FC236}">
+                <a16:creationId xmlns:a16="http://schemas.microsoft.com/office/drawing/2014/main" id="{B9D0CADA-8E26-726F-2115-18E96767ED49}"/>
+              </a:ext>
+            </a:extLst>
+          </p:cNvPr>
+          <p:cNvSpPr>
+            <a:spLocks noGrp="1"/>
+          </p:cNvSpPr>
+          <p:nvPr>
+            <p:ph sz="half" idx="1"/>
+          </p:nvPr>
+        </p:nvSpPr>
+        <p:spPr>
+          <a:xfrm>
+            <a:off x="692819" y="2587606"/>
+            <a:ext cx="5185873" cy="2153116"/>
+          </a:xfrm>
+        </p:spPr>
+        <p:txBody>
+          <a:bodyPr/>
+          <a:lstStyle/>
+          <a:p>
+            <a:r>
+              <a:rPr lang="en-US" dirty="0"/>
+              <a:t>Environment requirements: Python 3.7 and up with </a:t>
+            </a:r>
+            <a:r>
+              <a:rPr lang="en-US" dirty="0" err="1"/>
+              <a:t>Jupyter</a:t>
+            </a:r>
+            <a:r>
+              <a:rPr lang="en-US" dirty="0"/>
+              <a:t> installed.</a:t>
+            </a:r>
+          </a:p>
+          <a:p>
+            <a:r>
+              <a:rPr lang="en-US" dirty="0"/>
+              <a:t>Clone the repository from GitHub using the CLI:</a:t>
+            </a:r>
+          </a:p>
+          <a:p>
+            <a:pPr>
+              <a:buFont typeface="+mj-lt"/>
+              <a:buAutoNum type="arabicPeriod"/>
+            </a:pPr>
+            <a:endParaRPr lang="en-US" dirty="0"/>
+          </a:p>
+        </p:txBody>
+      </p:sp>
+      <p:sp>
+        <p:nvSpPr>
+          <p:cNvPr id="4" name="Content Placeholder 3">
+            <a:extLst>
+              <a:ext uri="{FF2B5EF4-FFF2-40B4-BE49-F238E27FC236}">
+                <a16:creationId xmlns:a16="http://schemas.microsoft.com/office/drawing/2014/main" id="{8E52164C-F15B-430A-6161-BAE787E2D702}"/>
+              </a:ext>
+            </a:extLst>
+          </p:cNvPr>
+          <p:cNvSpPr>
+            <a:spLocks noGrp="1"/>
+          </p:cNvSpPr>
+          <p:nvPr>
+            <p:ph sz="half" idx="2"/>
+          </p:nvPr>
+        </p:nvSpPr>
+        <p:spPr>
+          <a:xfrm>
+            <a:off x="6187415" y="2255843"/>
+            <a:ext cx="5194583" cy="2064488"/>
+          </a:xfrm>
+        </p:spPr>
+        <p:txBody>
+          <a:bodyPr/>
+          <a:lstStyle/>
+          <a:p>
+            <a:r>
+              <a:rPr lang="en-US" dirty="0"/>
+              <a:t>Alternatively, click the ”Open in </a:t>
+            </a:r>
+            <a:r>
+              <a:rPr lang="en-US" dirty="0" err="1"/>
+              <a:t>Colab</a:t>
+            </a:r>
+            <a:r>
+              <a:rPr lang="en-US" dirty="0"/>
+              <a:t>” link straight from the notebook on GitHub.</a:t>
+            </a:r>
+          </a:p>
+          <a:p>
+            <a:endParaRPr lang="en-US" dirty="0"/>
+          </a:p>
+        </p:txBody>
+      </p:sp>
+      <p:pic>
+        <p:nvPicPr>
+          <p:cNvPr id="5" name="Picture 4">
+            <a:extLst>
+              <a:ext uri="{FF2B5EF4-FFF2-40B4-BE49-F238E27FC236}">
+                <a16:creationId xmlns:a16="http://schemas.microsoft.com/office/drawing/2014/main" id="{5266819B-D131-C874-E6C3-D17B879377FA}"/>
+              </a:ext>
+            </a:extLst>
+          </p:cNvPr>
+          <p:cNvPicPr>
+            <a:picLocks noChangeAspect="1"/>
+          </p:cNvPicPr>
+          <p:nvPr/>
+        </p:nvPicPr>
+        <p:blipFill rotWithShape="1">
+          <a:blip r:embed="rId2"/>
+          <a:srcRect l="9549" t="29907" r="9540" b="28889"/>
+          <a:stretch/>
+        </p:blipFill>
+        <p:spPr>
+          <a:xfrm>
+            <a:off x="906009" y="4429388"/>
+            <a:ext cx="4672670" cy="763398"/>
+          </a:xfrm>
+          <a:prstGeom prst="roundRect">
+            <a:avLst>
+              <a:gd name="adj" fmla="val 16667"/>
+            </a:avLst>
+          </a:prstGeom>
+          <a:ln>
+            <a:noFill/>
+          </a:ln>
+          <a:effectLst>
+            <a:outerShdw blurRad="76200" dist="38100" dir="7800000" algn="tl" rotWithShape="0">
+              <a:srgbClr val="000000">
+                <a:alpha val="40000"/>
+              </a:srgbClr>
+            </a:outerShdw>
+          </a:effectLst>
+          <a:scene3d>
+            <a:camera prst="orthographicFront"/>
+            <a:lightRig rig="contrasting" dir="t">
+              <a:rot lat="0" lon="0" rev="4200000"/>
+            </a:lightRig>
+          </a:scene3d>
+          <a:sp3d prstMaterial="plastic">
+            <a:bevelT w="381000" h="114300" prst="relaxedInset"/>
+            <a:contourClr>
+              <a:srgbClr val="969696"/>
+            </a:contourClr>
+          </a:sp3d>
+        </p:spPr>
+      </p:pic>
+      <p:pic>
+        <p:nvPicPr>
+          <p:cNvPr id="1026" name="Picture 2">
+            <a:extLst>
+              <a:ext uri="{FF2B5EF4-FFF2-40B4-BE49-F238E27FC236}">
+                <a16:creationId xmlns:a16="http://schemas.microsoft.com/office/drawing/2014/main" id="{B200BC60-7B15-0049-D416-FC2774CA56F2}"/>
+              </a:ext>
+            </a:extLst>
+          </p:cNvPr>
+          <p:cNvPicPr>
+            <a:picLocks noChangeAspect="1" noChangeArrowheads="1"/>
+          </p:cNvPicPr>
+          <p:nvPr/>
+        </p:nvPicPr>
+        <p:blipFill>
+          <a:blip r:embed="rId3">
+            <a:extLst>
+              <a:ext uri="{28A0092B-C50C-407E-A947-70E740481C1C}">
+                <a14:useLocalDpi xmlns:a14="http://schemas.microsoft.com/office/drawing/2010/main" val="0"/>
+              </a:ext>
+            </a:extLst>
+          </a:blip>
+          <a:srcRect/>
+          <a:stretch>
+            <a:fillRect/>
+          </a:stretch>
+        </p:blipFill>
+        <p:spPr bwMode="auto">
+          <a:xfrm>
+            <a:off x="6531042" y="4429388"/>
+            <a:ext cx="4155711" cy="685043"/>
+          </a:xfrm>
+          <a:prstGeom prst="roundRect">
+            <a:avLst>
+              <a:gd name="adj" fmla="val 16667"/>
+            </a:avLst>
+          </a:prstGeom>
+          <a:ln>
+            <a:noFill/>
+          </a:ln>
+          <a:effectLst>
+            <a:outerShdw blurRad="76200" dist="38100" dir="7800000" algn="tl" rotWithShape="0">
+              <a:srgbClr val="000000">
+                <a:alpha val="40000"/>
+              </a:srgbClr>
+            </a:outerShdw>
+          </a:effectLst>
+          <a:scene3d>
+            <a:camera prst="orthographicFront"/>
+            <a:lightRig rig="contrasting" dir="t">
+              <a:rot lat="0" lon="0" rev="4200000"/>
+            </a:lightRig>
+          </a:scene3d>
+          <a:sp3d prstMaterial="plastic">
+            <a:bevelT w="381000" h="114300" prst="relaxedInset"/>
+            <a:contourClr>
+              <a:srgbClr val="969696"/>
+            </a:contourClr>
+          </a:sp3d>
+          <a:extLst>
+            <a:ext uri="{909E8E84-426E-40DD-AFC4-6F175D3DCCD1}">
+              <a14:hiddenFill xmlns:a14="http://schemas.microsoft.com/office/drawing/2010/main">
+                <a:solidFill>
+                  <a:srgbClr val="FFFFFF"/>
+                </a:solidFill>
+              </a14:hiddenFill>
+            </a:ext>
+          </a:extLst>
+        </p:spPr>
+      </p:pic>
+      <p:sp>
+        <p:nvSpPr>
+          <p:cNvPr id="7" name="Content Placeholder 3">
+            <a:extLst>
+              <a:ext uri="{FF2B5EF4-FFF2-40B4-BE49-F238E27FC236}">
+                <a16:creationId xmlns:a16="http://schemas.microsoft.com/office/drawing/2014/main" id="{06BB8A57-85CF-0213-8A04-A2EDF8ECB9BC}"/>
+              </a:ext>
+            </a:extLst>
+          </p:cNvPr>
+          <p:cNvSpPr txBox="1">
+            <a:spLocks/>
+          </p:cNvSpPr>
+          <p:nvPr/>
+        </p:nvSpPr>
+        <p:spPr>
+          <a:xfrm>
+            <a:off x="3498707" y="4970080"/>
+            <a:ext cx="5194583" cy="2064488"/>
+          </a:xfrm>
+          <a:prstGeom prst="rect">
+            <a:avLst/>
+          </a:prstGeom>
+          <a:effectLst>
+            <a:outerShdw blurRad="50800" dir="14400000">
+              <a:srgbClr val="000000">
+                <a:alpha val="40000"/>
+              </a:srgbClr>
+            </a:outerShdw>
+          </a:effectLst>
+        </p:spPr>
+        <p:txBody>
+          <a:bodyPr vert="horz" lIns="91440" tIns="45720" rIns="91440" bIns="45720" rtlCol="0" anchor="ctr">
+            <a:normAutofit/>
+          </a:bodyPr>
+          <a:lstStyle>
+            <a:lvl1pPr marL="342900" indent="-342900" algn="l" defTabSz="457200" rtl="0" eaLnBrk="1" latinLnBrk="0" hangingPunct="1">
+              <a:spcBef>
+                <a:spcPct val="20000"/>
+              </a:spcBef>
+              <a:spcAft>
+                <a:spcPts val="600"/>
+              </a:spcAft>
+              <a:buClr>
+                <a:schemeClr val="accent1"/>
+              </a:buClr>
+              <a:buFont typeface="Wingdings 2" charset="2"/>
+              <a:buChar char=""/>
+              <a:defRPr sz="1800" kern="1200">
+                <a:solidFill>
+                  <a:schemeClr val="tx1"/>
+                </a:solidFill>
+                <a:latin typeface="+mn-lt"/>
+                <a:ea typeface="+mn-ea"/>
+                <a:cs typeface="+mn-cs"/>
+              </a:defRPr>
+            </a:lvl1pPr>
+            <a:lvl2pPr marL="742950" indent="-285750" algn="l" defTabSz="457200" rtl="0" eaLnBrk="1" latinLnBrk="0" hangingPunct="1">
+              <a:spcBef>
+                <a:spcPct val="20000"/>
+              </a:spcBef>
+              <a:spcAft>
+                <a:spcPts val="600"/>
+              </a:spcAft>
+              <a:buClr>
+                <a:schemeClr val="accent1"/>
+              </a:buClr>
+              <a:buFont typeface="Wingdings 2" charset="2"/>
+              <a:buChar char=""/>
+              <a:defRPr sz="1600" kern="1200">
+                <a:solidFill>
+                  <a:schemeClr val="tx1"/>
+                </a:solidFill>
+                <a:latin typeface="+mn-lt"/>
+                <a:ea typeface="+mn-ea"/>
+                <a:cs typeface="+mn-cs"/>
+              </a:defRPr>
+            </a:lvl2pPr>
+            <a:lvl3pPr marL="1143000" indent="-228600" algn="l" defTabSz="457200" rtl="0" eaLnBrk="1" latinLnBrk="0" hangingPunct="1">
+              <a:spcBef>
+                <a:spcPct val="20000"/>
+              </a:spcBef>
+              <a:spcAft>
+                <a:spcPts val="600"/>
+              </a:spcAft>
+              <a:buClr>
+                <a:schemeClr val="accent1"/>
+              </a:buClr>
+              <a:buFont typeface="Wingdings 2" charset="2"/>
+              <a:buChar char=""/>
+              <a:defRPr sz="1400" kern="1200">
+                <a:solidFill>
+                  <a:schemeClr val="tx1"/>
+                </a:solidFill>
+                <a:latin typeface="+mn-lt"/>
+                <a:ea typeface="+mn-ea"/>
+                <a:cs typeface="+mn-cs"/>
+              </a:defRPr>
+            </a:lvl3pPr>
+            <a:lvl4pPr marL="1600200" indent="-228600" algn="l" defTabSz="457200" rtl="0" eaLnBrk="1" latinLnBrk="0" hangingPunct="1">
+              <a:spcBef>
+                <a:spcPct val="20000"/>
+              </a:spcBef>
+              <a:spcAft>
+                <a:spcPts val="600"/>
+              </a:spcAft>
+              <a:buClr>
+                <a:schemeClr val="accent1"/>
+              </a:buClr>
+              <a:buFont typeface="Wingdings 2" charset="2"/>
+              <a:buChar char=""/>
+              <a:defRPr sz="1200" kern="1200">
+                <a:solidFill>
+                  <a:schemeClr val="tx1"/>
+                </a:solidFill>
+                <a:latin typeface="+mn-lt"/>
+                <a:ea typeface="+mn-ea"/>
+                <a:cs typeface="+mn-cs"/>
+              </a:defRPr>
+            </a:lvl4pPr>
+            <a:lvl5pPr marL="2057400" indent="-228600" algn="l" defTabSz="457200" rtl="0" eaLnBrk="1" latinLnBrk="0" hangingPunct="1">
+              <a:spcBef>
+                <a:spcPct val="20000"/>
+              </a:spcBef>
+              <a:spcAft>
+                <a:spcPts val="600"/>
+              </a:spcAft>
+              <a:buClr>
+                <a:schemeClr val="accent1"/>
+              </a:buClr>
+              <a:buFont typeface="Wingdings 2" charset="2"/>
+              <a:buChar char=""/>
+              <a:defRPr sz="1200" kern="1200">
+                <a:solidFill>
+                  <a:schemeClr val="tx1"/>
+                </a:solidFill>
+                <a:latin typeface="+mn-lt"/>
+                <a:ea typeface="+mn-ea"/>
+                <a:cs typeface="+mn-cs"/>
+              </a:defRPr>
+            </a:lvl5pPr>
+            <a:lvl6pPr marL="2400000" indent="-228600" algn="l" defTabSz="457200" rtl="0" eaLnBrk="1" latinLnBrk="0" hangingPunct="1">
+              <a:spcBef>
+                <a:spcPct val="20000"/>
+              </a:spcBef>
+              <a:spcAft>
+                <a:spcPts val="600"/>
+              </a:spcAft>
+              <a:buClr>
+                <a:schemeClr val="accent1"/>
+              </a:buClr>
+              <a:buFont typeface="Wingdings 2" charset="2"/>
+              <a:buChar char=""/>
+              <a:defRPr sz="1200" kern="1200">
+                <a:solidFill>
+                  <a:schemeClr val="tx1"/>
+                </a:solidFill>
+                <a:latin typeface="+mn-lt"/>
+                <a:ea typeface="+mn-ea"/>
+                <a:cs typeface="+mn-cs"/>
+              </a:defRPr>
+            </a:lvl6pPr>
+            <a:lvl7pPr marL="2800000" indent="-228600" algn="l" defTabSz="457200" rtl="0" eaLnBrk="1" latinLnBrk="0" hangingPunct="1">
+              <a:spcBef>
+                <a:spcPct val="20000"/>
+              </a:spcBef>
+              <a:spcAft>
+                <a:spcPts val="600"/>
+              </a:spcAft>
+              <a:buClr>
+                <a:schemeClr val="accent1"/>
+              </a:buClr>
+              <a:buFont typeface="Wingdings 2" charset="2"/>
+              <a:buChar char=""/>
+              <a:defRPr sz="1200" kern="1200">
+                <a:solidFill>
+                  <a:schemeClr val="tx1"/>
+                </a:solidFill>
+                <a:latin typeface="+mn-lt"/>
+                <a:ea typeface="+mn-ea"/>
+                <a:cs typeface="+mn-cs"/>
+              </a:defRPr>
+            </a:lvl7pPr>
+            <a:lvl8pPr marL="3200000" indent="-228600" algn="l" defTabSz="457200" rtl="0" eaLnBrk="1" latinLnBrk="0" hangingPunct="1">
+              <a:spcBef>
+                <a:spcPct val="20000"/>
+              </a:spcBef>
+              <a:spcAft>
+                <a:spcPts val="600"/>
+              </a:spcAft>
+              <a:buClr>
+                <a:schemeClr val="accent1"/>
+              </a:buClr>
+              <a:buFont typeface="Wingdings 2" charset="2"/>
+              <a:buChar char=""/>
+              <a:defRPr sz="1200" kern="1200">
+                <a:solidFill>
+                  <a:schemeClr val="tx1"/>
+                </a:solidFill>
+                <a:latin typeface="+mn-lt"/>
+                <a:ea typeface="+mn-ea"/>
+                <a:cs typeface="+mn-cs"/>
+              </a:defRPr>
+            </a:lvl8pPr>
+            <a:lvl9pPr marL="3600000" indent="-228600" algn="l" defTabSz="457200" rtl="0" eaLnBrk="1" latinLnBrk="0" hangingPunct="1">
+              <a:spcBef>
+                <a:spcPct val="20000"/>
+              </a:spcBef>
+              <a:spcAft>
+                <a:spcPts val="600"/>
+              </a:spcAft>
+              <a:buClr>
+                <a:schemeClr val="accent1"/>
+              </a:buClr>
+              <a:buFont typeface="Wingdings 2" charset="2"/>
+              <a:buChar char=""/>
+              <a:defRPr sz="1200" kern="1200">
+                <a:solidFill>
+                  <a:schemeClr val="tx1"/>
+                </a:solidFill>
+                <a:latin typeface="+mn-lt"/>
+                <a:ea typeface="+mn-ea"/>
+                <a:cs typeface="+mn-cs"/>
+              </a:defRPr>
+            </a:lvl9pPr>
+          </a:lstStyle>
+          <a:p>
+            <a:pPr marL="0" indent="0">
+              <a:buFont typeface="Wingdings 2" charset="2"/>
+              <a:buNone/>
+            </a:pPr>
+            <a:r>
+              <a:rPr lang="en-US" dirty="0"/>
+              <a:t>Follow the instructions in the notebook</a:t>
+            </a:r>
+          </a:p>
+          <a:p>
+            <a:endParaRPr lang="en-US" dirty="0"/>
+          </a:p>
+        </p:txBody>
+      </p:sp>
+    </p:spTree>
+    <p:extLst>
+      <p:ext uri="{BB962C8B-B14F-4D97-AF65-F5344CB8AC3E}">
+        <p14:creationId xmlns:p14="http://schemas.microsoft.com/office/powerpoint/2010/main" val="1216031236"/>
+      </p:ext>
+    </p:extLst>
+  </p:cSld>
+  <p:clrMapOvr>
+    <a:masterClrMapping/>
+  </p:clrMapOvr>
+</p:sld>
+</file>
+
+<file path=ppt/slides/slide7.xml><?xml version="1.0" encoding="utf-8"?>
+<p:sld xmlns:a="http://schemas.openxmlformats.org/drawingml/2006/main" xmlns:r="http://schemas.openxmlformats.org/officeDocument/2006/relationships" xmlns:p="http://schemas.openxmlformats.org/presentationml/2006/main">
+  <p:cSld>
+    <p:spTree>
+      <p:nvGrpSpPr>
+        <p:cNvPr id="1" name=""/>
+        <p:cNvGrpSpPr/>
+        <p:nvPr/>
+      </p:nvGrpSpPr>
+      <p:grpSpPr>
+        <a:xfrm>
+          <a:off x="0" y="0"/>
+          <a:ext cx="0" cy="0"/>
+          <a:chOff x="0" y="0"/>
+          <a:chExt cx="0" cy="0"/>
+        </a:xfrm>
+      </p:grpSpPr>
+      <p:sp>
+        <p:nvSpPr>
+          <p:cNvPr id="2" name="Title 1">
+            <a:extLst>
+              <a:ext uri="{FF2B5EF4-FFF2-40B4-BE49-F238E27FC236}">
+                <a16:creationId xmlns:a16="http://schemas.microsoft.com/office/drawing/2014/main" id="{ADD05594-2F69-9003-8A7E-A35921EFA2D0}"/>
+              </a:ext>
+            </a:extLst>
+          </p:cNvPr>
+          <p:cNvSpPr>
+            <a:spLocks noGrp="1"/>
+          </p:cNvSpPr>
+          <p:nvPr>
+            <p:ph type="title"/>
+          </p:nvPr>
+        </p:nvSpPr>
+        <p:spPr/>
+        <p:txBody>
+          <a:bodyPr/>
+          <a:lstStyle/>
+          <a:p>
+            <a:r>
+              <a:rPr lang="en-US" dirty="0"/>
+              <a:t>What does Data Validation mean?</a:t>
+            </a:r>
+          </a:p>
+        </p:txBody>
+      </p:sp>
+      <p:sp>
+        <p:nvSpPr>
+          <p:cNvPr id="3" name="Content Placeholder 2">
+            <a:extLst>
+              <a:ext uri="{FF2B5EF4-FFF2-40B4-BE49-F238E27FC236}">
+                <a16:creationId xmlns:a16="http://schemas.microsoft.com/office/drawing/2014/main" id="{421B0849-BA7A-D67B-7858-B7857A5B3E88}"/>
+              </a:ext>
+            </a:extLst>
+          </p:cNvPr>
+          <p:cNvSpPr>
+            <a:spLocks noGrp="1"/>
+          </p:cNvSpPr>
+          <p:nvPr>
+            <p:ph idx="1"/>
+          </p:nvPr>
+        </p:nvSpPr>
+        <p:spPr/>
+        <p:txBody>
+          <a:bodyPr/>
+          <a:lstStyle/>
+          <a:p>
+            <a:r>
+              <a:rPr lang="en-GB" dirty="0"/>
+              <a:t>Data validation is the practice of checking the integrity, accuracy and structure of data before it is used.</a:t>
+            </a:r>
+          </a:p>
+          <a:p>
+            <a:r>
+              <a:rPr lang="en-GB" dirty="0"/>
+              <a:t>Useful in any kind of work that uses data – software development, research, accounting, military intelligence.</a:t>
+            </a:r>
+          </a:p>
+          <a:p>
+            <a:r>
+              <a:rPr lang="en-GB" dirty="0"/>
+              <a:t>We can validate types, ranges, consistency and incorporate business logic.</a:t>
+            </a:r>
+            <a:endParaRPr lang="en-US" dirty="0"/>
+          </a:p>
+        </p:txBody>
+      </p:sp>
+    </p:spTree>
+    <p:extLst>
+      <p:ext uri="{BB962C8B-B14F-4D97-AF65-F5344CB8AC3E}">
+        <p14:creationId xmlns:p14="http://schemas.microsoft.com/office/powerpoint/2010/main" val="3768456785"/>
+      </p:ext>
+    </p:extLst>
+  </p:cSld>
+  <p:clrMapOvr>
+    <a:masterClrMapping/>
+  </p:clrMapOvr>
+</p:sld>
+</file>
+
+<file path=ppt/slides/slide8.xml><?xml version="1.0" encoding="utf-8"?>
+<p:sld xmlns:a="http://schemas.openxmlformats.org/drawingml/2006/main" xmlns:r="http://schemas.openxmlformats.org/officeDocument/2006/relationships" xmlns:p="http://schemas.openxmlformats.org/presentationml/2006/main">
+  <p:cSld>
+    <p:spTree>
+      <p:nvGrpSpPr>
+        <p:cNvPr id="1" name=""/>
+        <p:cNvGrpSpPr/>
+        <p:nvPr/>
+      </p:nvGrpSpPr>
+      <p:grpSpPr>
+        <a:xfrm>
+          <a:off x="0" y="0"/>
+          <a:ext cx="0" cy="0"/>
+          <a:chOff x="0" y="0"/>
+          <a:chExt cx="0" cy="0"/>
+        </a:xfrm>
+      </p:grpSpPr>
+      <p:sp>
+        <p:nvSpPr>
+          <p:cNvPr id="2" name="Title 1">
+            <a:extLst>
+              <a:ext uri="{FF2B5EF4-FFF2-40B4-BE49-F238E27FC236}">
+                <a16:creationId xmlns:a16="http://schemas.microsoft.com/office/drawing/2014/main" id="{D1F6F9CC-65B6-C127-A624-C8B0CACE87F1}"/>
+              </a:ext>
+            </a:extLst>
+          </p:cNvPr>
+          <p:cNvSpPr>
+            <a:spLocks noGrp="1"/>
+          </p:cNvSpPr>
+          <p:nvPr>
+            <p:ph type="title"/>
+          </p:nvPr>
+        </p:nvSpPr>
+        <p:spPr>
+          <a:xfrm>
+            <a:off x="714061" y="855677"/>
+            <a:ext cx="6005522" cy="784333"/>
+          </a:xfrm>
+        </p:spPr>
+        <p:txBody>
+          <a:bodyPr>
+            <a:normAutofit/>
+          </a:bodyPr>
+          <a:lstStyle/>
+          <a:p>
+            <a:r>
+              <a:rPr lang="en-US" sz="3600" dirty="0"/>
+              <a:t>Why validate your data?</a:t>
+            </a:r>
+          </a:p>
+        </p:txBody>
+      </p:sp>
+      <p:pic>
+        <p:nvPicPr>
+          <p:cNvPr id="2052" name="Picture 4" descr="Data Pipeline">
+            <a:extLst>
+              <a:ext uri="{FF2B5EF4-FFF2-40B4-BE49-F238E27FC236}">
+                <a16:creationId xmlns:a16="http://schemas.microsoft.com/office/drawing/2014/main" id="{7C6F7BC8-8A9E-1675-6C05-F28F893D896F}"/>
+              </a:ext>
+            </a:extLst>
+          </p:cNvPr>
+          <p:cNvPicPr>
+            <a:picLocks noChangeAspect="1" noChangeArrowheads="1"/>
+          </p:cNvPicPr>
+          <p:nvPr/>
+        </p:nvPicPr>
+        <p:blipFill>
+          <a:blip r:embed="rId2">
+            <a:extLst>
+              <a:ext uri="{28A0092B-C50C-407E-A947-70E740481C1C}">
+                <a14:useLocalDpi xmlns:a14="http://schemas.microsoft.com/office/drawing/2010/main" val="0"/>
+              </a:ext>
+            </a:extLst>
+          </a:blip>
+          <a:srcRect/>
+          <a:stretch>
+            <a:fillRect/>
+          </a:stretch>
+        </p:blipFill>
+        <p:spPr bwMode="auto">
+          <a:xfrm>
+            <a:off x="2020583" y="2624123"/>
+            <a:ext cx="9398000" cy="3378200"/>
+          </a:xfrm>
+          <a:prstGeom prst="rect">
+            <a:avLst/>
+          </a:prstGeom>
+          <a:noFill/>
+          <a:extLst>
+            <a:ext uri="{909E8E84-426E-40DD-AFC4-6F175D3DCCD1}">
+              <a14:hiddenFill xmlns:a14="http://schemas.microsoft.com/office/drawing/2010/main">
+                <a:solidFill>
+                  <a:srgbClr val="FFFFFF"/>
+                </a:solidFill>
+              </a14:hiddenFill>
+            </a:ext>
+          </a:extLst>
+        </p:spPr>
+      </p:pic>
+    </p:spTree>
+    <p:extLst>
+      <p:ext uri="{BB962C8B-B14F-4D97-AF65-F5344CB8AC3E}">
+        <p14:creationId xmlns:p14="http://schemas.microsoft.com/office/powerpoint/2010/main" val="3190012637"/>
+      </p:ext>
+    </p:extLst>
+  </p:cSld>
+  <p:clrMapOvr>
+    <a:masterClrMapping/>
+  </p:clrMapOvr>
+</p:sld>
+</file>
+
+<file path=ppt/slides/slide9.xml><?xml version="1.0" encoding="utf-8"?>
+<p:sld xmlns:a="http://schemas.openxmlformats.org/drawingml/2006/main" xmlns:r="http://schemas.openxmlformats.org/officeDocument/2006/relationships" xmlns:p="http://schemas.openxmlformats.org/presentationml/2006/main">
+  <p:cSld>
+    <p:spTree>
+      <p:nvGrpSpPr>
+        <p:cNvPr id="1" name=""/>
+        <p:cNvGrpSpPr/>
+        <p:nvPr/>
+      </p:nvGrpSpPr>
+      <p:grpSpPr>
+        <a:xfrm>
+          <a:off x="0" y="0"/>
+          <a:ext cx="0" cy="0"/>
+          <a:chOff x="0" y="0"/>
+          <a:chExt cx="0" cy="0"/>
+        </a:xfrm>
+      </p:grpSpPr>
+      <p:sp>
+        <p:nvSpPr>
+          <p:cNvPr id="2" name="Title 1">
+            <a:extLst>
+              <a:ext uri="{FF2B5EF4-FFF2-40B4-BE49-F238E27FC236}">
+                <a16:creationId xmlns:a16="http://schemas.microsoft.com/office/drawing/2014/main" id="{4AB31A7A-840B-1925-96BA-9215785820AF}"/>
+              </a:ext>
+            </a:extLst>
+          </p:cNvPr>
+          <p:cNvSpPr>
+            <a:spLocks noGrp="1"/>
+          </p:cNvSpPr>
+          <p:nvPr>
+            <p:ph type="title"/>
+          </p:nvPr>
+        </p:nvSpPr>
+        <p:spPr>
+          <a:xfrm>
+            <a:off x="814728" y="732575"/>
+            <a:ext cx="4852988" cy="1612110"/>
+          </a:xfrm>
+        </p:spPr>
+        <p:txBody>
+          <a:bodyPr>
+            <a:normAutofit/>
+          </a:bodyPr>
+          <a:lstStyle/>
+          <a:p>
+            <a:r>
+              <a:rPr lang="en-US" sz="3200" dirty="0"/>
+              <a:t>Maintain Data Integrity</a:t>
+            </a:r>
+          </a:p>
+        </p:txBody>
+      </p:sp>
+      <p:sp>
+        <p:nvSpPr>
+          <p:cNvPr id="5" name="Picture Placeholder 4">
+            <a:extLst>
+              <a:ext uri="{FF2B5EF4-FFF2-40B4-BE49-F238E27FC236}">
+                <a16:creationId xmlns:a16="http://schemas.microsoft.com/office/drawing/2014/main" id="{6AE7E405-F89C-DF98-B5F4-8F5C92E6F632}"/>
+              </a:ext>
+            </a:extLst>
+          </p:cNvPr>
+          <p:cNvSpPr>
+            <a:spLocks noGrp="1"/>
+          </p:cNvSpPr>
+          <p:nvPr>
+            <p:ph type="pic" sz="quarter" idx="13"/>
+          </p:nvPr>
+        </p:nvSpPr>
+        <p:spPr/>
+      </p:sp>
+      <p:sp>
+        <p:nvSpPr>
+          <p:cNvPr id="4" name="Text Placeholder 3">
+            <a:extLst>
+              <a:ext uri="{FF2B5EF4-FFF2-40B4-BE49-F238E27FC236}">
+                <a16:creationId xmlns:a16="http://schemas.microsoft.com/office/drawing/2014/main" id="{F8BCE7C0-2CC5-06FF-387A-603A4B9D1061}"/>
+              </a:ext>
+            </a:extLst>
+          </p:cNvPr>
+          <p:cNvSpPr>
+            <a:spLocks noGrp="1"/>
+          </p:cNvSpPr>
+          <p:nvPr>
+            <p:ph type="body" sz="half" idx="2"/>
+          </p:nvPr>
+        </p:nvSpPr>
+        <p:spPr>
+          <a:xfrm>
+            <a:off x="814728" y="2348917"/>
+            <a:ext cx="4852988" cy="1350628"/>
+          </a:xfrm>
+        </p:spPr>
+        <p:txBody>
+          <a:bodyPr>
+            <a:normAutofit fontScale="92500" lnSpcReduction="20000"/>
+          </a:bodyPr>
+          <a:lstStyle/>
+          <a:p>
+            <a:pPr marL="171450" indent="-171450" algn="l" defTabSz="457200" rtl="0" eaLnBrk="1" latinLnBrk="0" hangingPunct="1">
+              <a:spcBef>
+                <a:spcPct val="20000"/>
+              </a:spcBef>
+              <a:spcAft>
+                <a:spcPts val="600"/>
+              </a:spcAft>
+              <a:buClr>
+                <a:schemeClr val="accent1"/>
+              </a:buClr>
+              <a:buFont typeface="Arial" panose="020B0604020202020204" pitchFamily="34" charset="0"/>
+              <a:buChar char="•"/>
+            </a:pPr>
+            <a:r>
+              <a:rPr lang="en-US" sz="1600" dirty="0"/>
+              <a:t>Ensure system stability.</a:t>
+            </a:r>
+          </a:p>
+          <a:p>
+            <a:pPr marL="171450" indent="-171450" algn="l" defTabSz="457200" rtl="0" eaLnBrk="1" latinLnBrk="0" hangingPunct="1">
+              <a:spcBef>
+                <a:spcPct val="20000"/>
+              </a:spcBef>
+              <a:spcAft>
+                <a:spcPts val="600"/>
+              </a:spcAft>
+              <a:buClr>
+                <a:schemeClr val="accent1"/>
+              </a:buClr>
+              <a:buFont typeface="Arial" panose="020B0604020202020204" pitchFamily="34" charset="0"/>
+              <a:buChar char="•"/>
+            </a:pPr>
+            <a:r>
+              <a:rPr lang="en-US" sz="1600" dirty="0"/>
+              <a:t>Ensure system reliability.</a:t>
+            </a:r>
+          </a:p>
+          <a:p>
+            <a:pPr marL="171450" indent="-171450" algn="l" defTabSz="457200" rtl="0" eaLnBrk="1" latinLnBrk="0" hangingPunct="1">
+              <a:spcBef>
+                <a:spcPct val="20000"/>
+              </a:spcBef>
+              <a:spcAft>
+                <a:spcPts val="600"/>
+              </a:spcAft>
+              <a:buClr>
+                <a:schemeClr val="accent1"/>
+              </a:buClr>
+              <a:buFont typeface="Arial" panose="020B0604020202020204" pitchFamily="34" charset="0"/>
+              <a:buChar char="•"/>
+            </a:pPr>
+            <a:r>
+              <a:rPr lang="en-US" sz="1600" dirty="0"/>
+              <a:t>Align with the rest of the architecture by comparing downstream and upstream schemas.</a:t>
+            </a:r>
+          </a:p>
+        </p:txBody>
+      </p:sp>
+    </p:spTree>
+    <p:extLst>
+      <p:ext uri="{BB962C8B-B14F-4D97-AF65-F5344CB8AC3E}">
+        <p14:creationId xmlns:p14="http://schemas.microsoft.com/office/powerpoint/2010/main" val="3615451481"/>
       </p:ext>
     </p:extLst>
   </p:cSld>

</xml_diff>

<commit_message>
Some progress made, stuck on catching failure cases
</commit_message>
<xml_diff>
--- a/Data Validation for Data Science.pptx
+++ b/Data Validation for Data Science.pptx
@@ -4,6 +4,9 @@
   <p:sldMasterIdLst>
     <p:sldMasterId id="2147483648" r:id="rId1"/>
   </p:sldMasterIdLst>
+  <p:notesMasterIdLst>
+    <p:notesMasterId r:id="rId17"/>
+  </p:notesMasterIdLst>
   <p:sldIdLst>
     <p:sldId id="256" r:id="rId2"/>
     <p:sldId id="259" r:id="rId3"/>
@@ -13,7 +16,13 @@
     <p:sldId id="262" r:id="rId7"/>
     <p:sldId id="265" r:id="rId8"/>
     <p:sldId id="263" r:id="rId9"/>
-    <p:sldId id="264" r:id="rId10"/>
+    <p:sldId id="266" r:id="rId10"/>
+    <p:sldId id="267" r:id="rId11"/>
+    <p:sldId id="269" r:id="rId12"/>
+    <p:sldId id="270" r:id="rId13"/>
+    <p:sldId id="268" r:id="rId14"/>
+    <p:sldId id="272" r:id="rId15"/>
+    <p:sldId id="271" r:id="rId16"/>
   </p:sldIdLst>
   <p:sldSz cx="12192000" cy="6858000"/>
   <p:notesSz cx="6858000" cy="9144000"/>
@@ -120,6 +129,463 @@
 </p:presentation>
 </file>
 
+<file path=ppt/commentAuthors.xml><?xml version="1.0" encoding="utf-8"?>
+<p:cmAuthorLst xmlns:a="http://schemas.openxmlformats.org/drawingml/2006/main" xmlns:r="http://schemas.openxmlformats.org/officeDocument/2006/relationships" xmlns:p="http://schemas.openxmlformats.org/presentationml/2006/main">
+  <p:cmAuthor id="1" name="Mish, Natan" initials="MN" lastIdx="1" clrIdx="0">
+    <p:extLst>
+      <p:ext uri="{19B8F6BF-5375-455C-9EA6-DF929625EA0E}">
+        <p15:presenceInfo xmlns:p15="http://schemas.microsoft.com/office/powerpoint/2012/main" userId="S::natan.mish@zimmerbiomet.com::cb82d561-3180-48ce-aa04-827babec42ba" providerId="AD"/>
+      </p:ext>
+    </p:extLst>
+  </p:cmAuthor>
+</p:cmAuthorLst>
+</file>
+
+<file path=ppt/notesMasters/notesMaster1.xml><?xml version="1.0" encoding="utf-8"?>
+<p:notesMaster xmlns:a="http://schemas.openxmlformats.org/drawingml/2006/main" xmlns:r="http://schemas.openxmlformats.org/officeDocument/2006/relationships" xmlns:p="http://schemas.openxmlformats.org/presentationml/2006/main">
+  <p:cSld>
+    <p:bg>
+      <p:bgRef idx="1001">
+        <a:schemeClr val="bg1"/>
+      </p:bgRef>
+    </p:bg>
+    <p:spTree>
+      <p:nvGrpSpPr>
+        <p:cNvPr id="1" name=""/>
+        <p:cNvGrpSpPr/>
+        <p:nvPr/>
+      </p:nvGrpSpPr>
+      <p:grpSpPr>
+        <a:xfrm>
+          <a:off x="0" y="0"/>
+          <a:ext cx="0" cy="0"/>
+          <a:chOff x="0" y="0"/>
+          <a:chExt cx="0" cy="0"/>
+        </a:xfrm>
+      </p:grpSpPr>
+      <p:sp>
+        <p:nvSpPr>
+          <p:cNvPr id="2" name="Header Placeholder 1"/>
+          <p:cNvSpPr>
+            <a:spLocks noGrp="1"/>
+          </p:cNvSpPr>
+          <p:nvPr>
+            <p:ph type="hdr" sz="quarter"/>
+          </p:nvPr>
+        </p:nvSpPr>
+        <p:spPr>
+          <a:xfrm>
+            <a:off x="0" y="0"/>
+            <a:ext cx="2971800" cy="458788"/>
+          </a:xfrm>
+          <a:prstGeom prst="rect">
+            <a:avLst/>
+          </a:prstGeom>
+        </p:spPr>
+        <p:txBody>
+          <a:bodyPr vert="horz" lIns="91440" tIns="45720" rIns="91440" bIns="45720" rtlCol="0"/>
+          <a:lstStyle>
+            <a:lvl1pPr algn="l">
+              <a:defRPr sz="1200"/>
+            </a:lvl1pPr>
+          </a:lstStyle>
+          <a:p>
+            <a:endParaRPr lang="en-US"/>
+          </a:p>
+        </p:txBody>
+      </p:sp>
+      <p:sp>
+        <p:nvSpPr>
+          <p:cNvPr id="3" name="Date Placeholder 2"/>
+          <p:cNvSpPr>
+            <a:spLocks noGrp="1"/>
+          </p:cNvSpPr>
+          <p:nvPr>
+            <p:ph type="dt" idx="1"/>
+          </p:nvPr>
+        </p:nvSpPr>
+        <p:spPr>
+          <a:xfrm>
+            <a:off x="3884613" y="0"/>
+            <a:ext cx="2971800" cy="458788"/>
+          </a:xfrm>
+          <a:prstGeom prst="rect">
+            <a:avLst/>
+          </a:prstGeom>
+        </p:spPr>
+        <p:txBody>
+          <a:bodyPr vert="horz" lIns="91440" tIns="45720" rIns="91440" bIns="45720" rtlCol="0"/>
+          <a:lstStyle>
+            <a:lvl1pPr algn="r">
+              <a:defRPr sz="1200"/>
+            </a:lvl1pPr>
+          </a:lstStyle>
+          <a:p>
+            <a:fld id="{F9CD045C-CD78-304F-BD19-120FB2F86E8F}" type="datetimeFigureOut">
+              <a:rPr lang="en-US" smtClean="0"/>
+              <a:t>5/24/22</a:t>
+            </a:fld>
+            <a:endParaRPr lang="en-US"/>
+          </a:p>
+        </p:txBody>
+      </p:sp>
+      <p:sp>
+        <p:nvSpPr>
+          <p:cNvPr id="4" name="Slide Image Placeholder 3"/>
+          <p:cNvSpPr>
+            <a:spLocks noGrp="1" noRot="1" noChangeAspect="1"/>
+          </p:cNvSpPr>
+          <p:nvPr>
+            <p:ph type="sldImg" idx="2"/>
+          </p:nvPr>
+        </p:nvSpPr>
+        <p:spPr>
+          <a:xfrm>
+            <a:off x="685800" y="1143000"/>
+            <a:ext cx="5486400" cy="3086100"/>
+          </a:xfrm>
+          <a:prstGeom prst="rect">
+            <a:avLst/>
+          </a:prstGeom>
+          <a:noFill/>
+          <a:ln w="12700">
+            <a:solidFill>
+              <a:prstClr val="black"/>
+            </a:solidFill>
+          </a:ln>
+        </p:spPr>
+        <p:txBody>
+          <a:bodyPr vert="horz" lIns="91440" tIns="45720" rIns="91440" bIns="45720" rtlCol="0" anchor="ctr"/>
+          <a:lstStyle/>
+          <a:p>
+            <a:endParaRPr lang="en-US"/>
+          </a:p>
+        </p:txBody>
+      </p:sp>
+      <p:sp>
+        <p:nvSpPr>
+          <p:cNvPr id="5" name="Notes Placeholder 4"/>
+          <p:cNvSpPr>
+            <a:spLocks noGrp="1"/>
+          </p:cNvSpPr>
+          <p:nvPr>
+            <p:ph type="body" sz="quarter" idx="3"/>
+          </p:nvPr>
+        </p:nvSpPr>
+        <p:spPr>
+          <a:xfrm>
+            <a:off x="685800" y="4400550"/>
+            <a:ext cx="5486400" cy="3600450"/>
+          </a:xfrm>
+          <a:prstGeom prst="rect">
+            <a:avLst/>
+          </a:prstGeom>
+        </p:spPr>
+        <p:txBody>
+          <a:bodyPr vert="horz" lIns="91440" tIns="45720" rIns="91440" bIns="45720" rtlCol="0"/>
+          <a:lstStyle/>
+          <a:p>
+            <a:pPr lvl="0"/>
+            <a:r>
+              <a:rPr lang="en-GB"/>
+              <a:t>Click to edit Master text styles</a:t>
+            </a:r>
+          </a:p>
+          <a:p>
+            <a:pPr lvl="1"/>
+            <a:r>
+              <a:rPr lang="en-GB"/>
+              <a:t>Second level</a:t>
+            </a:r>
+          </a:p>
+          <a:p>
+            <a:pPr lvl="2"/>
+            <a:r>
+              <a:rPr lang="en-GB"/>
+              <a:t>Third level</a:t>
+            </a:r>
+          </a:p>
+          <a:p>
+            <a:pPr lvl="3"/>
+            <a:r>
+              <a:rPr lang="en-GB"/>
+              <a:t>Fourth level</a:t>
+            </a:r>
+          </a:p>
+          <a:p>
+            <a:pPr lvl="4"/>
+            <a:r>
+              <a:rPr lang="en-GB"/>
+              <a:t>Fifth level</a:t>
+            </a:r>
+            <a:endParaRPr lang="en-US"/>
+          </a:p>
+        </p:txBody>
+      </p:sp>
+      <p:sp>
+        <p:nvSpPr>
+          <p:cNvPr id="6" name="Footer Placeholder 5"/>
+          <p:cNvSpPr>
+            <a:spLocks noGrp="1"/>
+          </p:cNvSpPr>
+          <p:nvPr>
+            <p:ph type="ftr" sz="quarter" idx="4"/>
+          </p:nvPr>
+        </p:nvSpPr>
+        <p:spPr>
+          <a:xfrm>
+            <a:off x="0" y="8685213"/>
+            <a:ext cx="2971800" cy="458787"/>
+          </a:xfrm>
+          <a:prstGeom prst="rect">
+            <a:avLst/>
+          </a:prstGeom>
+        </p:spPr>
+        <p:txBody>
+          <a:bodyPr vert="horz" lIns="91440" tIns="45720" rIns="91440" bIns="45720" rtlCol="0" anchor="b"/>
+          <a:lstStyle>
+            <a:lvl1pPr algn="l">
+              <a:defRPr sz="1200"/>
+            </a:lvl1pPr>
+          </a:lstStyle>
+          <a:p>
+            <a:endParaRPr lang="en-US"/>
+          </a:p>
+        </p:txBody>
+      </p:sp>
+      <p:sp>
+        <p:nvSpPr>
+          <p:cNvPr id="7" name="Slide Number Placeholder 6"/>
+          <p:cNvSpPr>
+            <a:spLocks noGrp="1"/>
+          </p:cNvSpPr>
+          <p:nvPr>
+            <p:ph type="sldNum" sz="quarter" idx="5"/>
+          </p:nvPr>
+        </p:nvSpPr>
+        <p:spPr>
+          <a:xfrm>
+            <a:off x="3884613" y="8685213"/>
+            <a:ext cx="2971800" cy="458787"/>
+          </a:xfrm>
+          <a:prstGeom prst="rect">
+            <a:avLst/>
+          </a:prstGeom>
+        </p:spPr>
+        <p:txBody>
+          <a:bodyPr vert="horz" lIns="91440" tIns="45720" rIns="91440" bIns="45720" rtlCol="0" anchor="b"/>
+          <a:lstStyle>
+            <a:lvl1pPr algn="r">
+              <a:defRPr sz="1200"/>
+            </a:lvl1pPr>
+          </a:lstStyle>
+          <a:p>
+            <a:fld id="{B2F75C95-52CA-1D4F-85E2-662E67122696}" type="slidenum">
+              <a:rPr lang="en-US" smtClean="0"/>
+              <a:t>‹#›</a:t>
+            </a:fld>
+            <a:endParaRPr lang="en-US"/>
+          </a:p>
+        </p:txBody>
+      </p:sp>
+    </p:spTree>
+    <p:extLst>
+      <p:ext uri="{BB962C8B-B14F-4D97-AF65-F5344CB8AC3E}">
+        <p14:creationId xmlns:p14="http://schemas.microsoft.com/office/powerpoint/2010/main" val="581376694"/>
+      </p:ext>
+    </p:extLst>
+  </p:cSld>
+  <p:clrMap bg1="lt1" tx1="dk1" bg2="lt2" tx2="dk2" accent1="accent1" accent2="accent2" accent3="accent3" accent4="accent4" accent5="accent5" accent6="accent6" hlink="hlink" folHlink="folHlink"/>
+  <p:notesStyle>
+    <a:lvl1pPr marL="0" algn="l" defTabSz="914400" rtl="0" eaLnBrk="1" latinLnBrk="0" hangingPunct="1">
+      <a:defRPr sz="1200" kern="1200">
+        <a:solidFill>
+          <a:schemeClr val="tx1"/>
+        </a:solidFill>
+        <a:latin typeface="+mn-lt"/>
+        <a:ea typeface="+mn-ea"/>
+        <a:cs typeface="+mn-cs"/>
+      </a:defRPr>
+    </a:lvl1pPr>
+    <a:lvl2pPr marL="457200" algn="l" defTabSz="914400" rtl="0" eaLnBrk="1" latinLnBrk="0" hangingPunct="1">
+      <a:defRPr sz="1200" kern="1200">
+        <a:solidFill>
+          <a:schemeClr val="tx1"/>
+        </a:solidFill>
+        <a:latin typeface="+mn-lt"/>
+        <a:ea typeface="+mn-ea"/>
+        <a:cs typeface="+mn-cs"/>
+      </a:defRPr>
+    </a:lvl2pPr>
+    <a:lvl3pPr marL="914400" algn="l" defTabSz="914400" rtl="0" eaLnBrk="1" latinLnBrk="0" hangingPunct="1">
+      <a:defRPr sz="1200" kern="1200">
+        <a:solidFill>
+          <a:schemeClr val="tx1"/>
+        </a:solidFill>
+        <a:latin typeface="+mn-lt"/>
+        <a:ea typeface="+mn-ea"/>
+        <a:cs typeface="+mn-cs"/>
+      </a:defRPr>
+    </a:lvl3pPr>
+    <a:lvl4pPr marL="1371600" algn="l" defTabSz="914400" rtl="0" eaLnBrk="1" latinLnBrk="0" hangingPunct="1">
+      <a:defRPr sz="1200" kern="1200">
+        <a:solidFill>
+          <a:schemeClr val="tx1"/>
+        </a:solidFill>
+        <a:latin typeface="+mn-lt"/>
+        <a:ea typeface="+mn-ea"/>
+        <a:cs typeface="+mn-cs"/>
+      </a:defRPr>
+    </a:lvl4pPr>
+    <a:lvl5pPr marL="1828800" algn="l" defTabSz="914400" rtl="0" eaLnBrk="1" latinLnBrk="0" hangingPunct="1">
+      <a:defRPr sz="1200" kern="1200">
+        <a:solidFill>
+          <a:schemeClr val="tx1"/>
+        </a:solidFill>
+        <a:latin typeface="+mn-lt"/>
+        <a:ea typeface="+mn-ea"/>
+        <a:cs typeface="+mn-cs"/>
+      </a:defRPr>
+    </a:lvl5pPr>
+    <a:lvl6pPr marL="2286000" algn="l" defTabSz="914400" rtl="0" eaLnBrk="1" latinLnBrk="0" hangingPunct="1">
+      <a:defRPr sz="1200" kern="1200">
+        <a:solidFill>
+          <a:schemeClr val="tx1"/>
+        </a:solidFill>
+        <a:latin typeface="+mn-lt"/>
+        <a:ea typeface="+mn-ea"/>
+        <a:cs typeface="+mn-cs"/>
+      </a:defRPr>
+    </a:lvl6pPr>
+    <a:lvl7pPr marL="2743200" algn="l" defTabSz="914400" rtl="0" eaLnBrk="1" latinLnBrk="0" hangingPunct="1">
+      <a:defRPr sz="1200" kern="1200">
+        <a:solidFill>
+          <a:schemeClr val="tx1"/>
+        </a:solidFill>
+        <a:latin typeface="+mn-lt"/>
+        <a:ea typeface="+mn-ea"/>
+        <a:cs typeface="+mn-cs"/>
+      </a:defRPr>
+    </a:lvl7pPr>
+    <a:lvl8pPr marL="3200400" algn="l" defTabSz="914400" rtl="0" eaLnBrk="1" latinLnBrk="0" hangingPunct="1">
+      <a:defRPr sz="1200" kern="1200">
+        <a:solidFill>
+          <a:schemeClr val="tx1"/>
+        </a:solidFill>
+        <a:latin typeface="+mn-lt"/>
+        <a:ea typeface="+mn-ea"/>
+        <a:cs typeface="+mn-cs"/>
+      </a:defRPr>
+    </a:lvl8pPr>
+    <a:lvl9pPr marL="3657600" algn="l" defTabSz="914400" rtl="0" eaLnBrk="1" latinLnBrk="0" hangingPunct="1">
+      <a:defRPr sz="1200" kern="1200">
+        <a:solidFill>
+          <a:schemeClr val="tx1"/>
+        </a:solidFill>
+        <a:latin typeface="+mn-lt"/>
+        <a:ea typeface="+mn-ea"/>
+        <a:cs typeface="+mn-cs"/>
+      </a:defRPr>
+    </a:lvl9pPr>
+  </p:notesStyle>
+</p:notesMaster>
+</file>
+
+<file path=ppt/notesSlides/notesSlide1.xml><?xml version="1.0" encoding="utf-8"?>
+<p:notes xmlns:a="http://schemas.openxmlformats.org/drawingml/2006/main" xmlns:r="http://schemas.openxmlformats.org/officeDocument/2006/relationships" xmlns:p="http://schemas.openxmlformats.org/presentationml/2006/main">
+  <p:cSld>
+    <p:spTree>
+      <p:nvGrpSpPr>
+        <p:cNvPr id="1" name=""/>
+        <p:cNvGrpSpPr/>
+        <p:nvPr/>
+      </p:nvGrpSpPr>
+      <p:grpSpPr>
+        <a:xfrm>
+          <a:off x="0" y="0"/>
+          <a:ext cx="0" cy="0"/>
+          <a:chOff x="0" y="0"/>
+          <a:chExt cx="0" cy="0"/>
+        </a:xfrm>
+      </p:grpSpPr>
+      <p:sp>
+        <p:nvSpPr>
+          <p:cNvPr id="2" name="Slide Image Placeholder 1"/>
+          <p:cNvSpPr>
+            <a:spLocks noGrp="1" noRot="1" noChangeAspect="1"/>
+          </p:cNvSpPr>
+          <p:nvPr>
+            <p:ph type="sldImg"/>
+          </p:nvPr>
+        </p:nvSpPr>
+        <p:spPr/>
+      </p:sp>
+      <p:sp>
+        <p:nvSpPr>
+          <p:cNvPr id="3" name="Notes Placeholder 2"/>
+          <p:cNvSpPr>
+            <a:spLocks noGrp="1"/>
+          </p:cNvSpPr>
+          <p:nvPr>
+            <p:ph type="body" idx="1"/>
+          </p:nvPr>
+        </p:nvSpPr>
+        <p:spPr/>
+        <p:txBody>
+          <a:bodyPr/>
+          <a:lstStyle/>
+          <a:p>
+            <a:r>
+              <a:rPr lang="en-US" dirty="0"/>
+              <a:t>https://</a:t>
+            </a:r>
+            <a:r>
+              <a:rPr lang="en-US" dirty="0" err="1"/>
+              <a:t>towardsdatascience.com</a:t>
+            </a:r>
+            <a:r>
+              <a:rPr lang="en-US" dirty="0"/>
+              <a:t>/not-yet-another-article-on-machine-learning-e67f8812ba86</a:t>
+            </a:r>
+          </a:p>
+        </p:txBody>
+      </p:sp>
+      <p:sp>
+        <p:nvSpPr>
+          <p:cNvPr id="4" name="Slide Number Placeholder 3"/>
+          <p:cNvSpPr>
+            <a:spLocks noGrp="1"/>
+          </p:cNvSpPr>
+          <p:nvPr>
+            <p:ph type="sldNum" sz="quarter" idx="5"/>
+          </p:nvPr>
+        </p:nvSpPr>
+        <p:spPr/>
+        <p:txBody>
+          <a:bodyPr/>
+          <a:lstStyle/>
+          <a:p>
+            <a:fld id="{B2F75C95-52CA-1D4F-85E2-662E67122696}" type="slidenum">
+              <a:rPr lang="en-US" smtClean="0"/>
+              <a:t>13</a:t>
+            </a:fld>
+            <a:endParaRPr lang="en-US"/>
+          </a:p>
+        </p:txBody>
+      </p:sp>
+    </p:spTree>
+    <p:extLst>
+      <p:ext uri="{BB962C8B-B14F-4D97-AF65-F5344CB8AC3E}">
+        <p14:creationId xmlns:p14="http://schemas.microsoft.com/office/powerpoint/2010/main" val="3912784434"/>
+      </p:ext>
+    </p:extLst>
+  </p:cSld>
+  <p:clrMapOvr>
+    <a:masterClrMapping/>
+  </p:clrMapOvr>
+</p:notes>
+</file>
+
 <file path=ppt/slideLayouts/slideLayout1.xml><?xml version="1.0" encoding="utf-8"?>
 <p:sldLayout xmlns:a="http://schemas.openxmlformats.org/drawingml/2006/main" xmlns:r="http://schemas.openxmlformats.org/officeDocument/2006/relationships" xmlns:p="http://schemas.openxmlformats.org/presentationml/2006/main" type="title" preserve="1">
   <p:cSld name="Title Slide">
@@ -408,7 +874,7 @@
             <a:fld id="{08B9EBBA-996F-894A-B54A-D6246ED52CEA}" type="datetimeFigureOut">
               <a:rPr lang="en-US" dirty="0"/>
               <a:pPr/>
-              <a:t>5/16/22</a:t>
+              <a:t>5/24/22</a:t>
             </a:fld>
             <a:endParaRPr lang="en-US" dirty="0"/>
           </a:p>
@@ -723,7 +1189,7 @@
             <a:fld id="{18C79C5D-2A6F-F04D-97DA-BEF2467B64E4}" type="datetimeFigureOut">
               <a:rPr lang="en-US" dirty="0"/>
               <a:pPr/>
-              <a:t>5/16/22</a:t>
+              <a:t>5/24/22</a:t>
             </a:fld>
             <a:endParaRPr lang="en-US" dirty="0"/>
           </a:p>
@@ -1208,7 +1674,7 @@
             <a:fld id="{8DFA1846-DA80-1C48-A609-854EA85C59AD}" type="datetimeFigureOut">
               <a:rPr lang="en-US" dirty="0"/>
               <a:pPr/>
-              <a:t>5/16/22</a:t>
+              <a:t>5/24/22</a:t>
             </a:fld>
             <a:endParaRPr lang="en-US" dirty="0"/>
           </a:p>
@@ -1574,7 +2040,7 @@
             <a:fld id="{FBF54567-0DE4-3F47-BF90-CB84690072F9}" type="datetimeFigureOut">
               <a:rPr lang="en-US" dirty="0"/>
               <a:pPr/>
-              <a:t>5/16/22</a:t>
+              <a:t>5/24/22</a:t>
             </a:fld>
             <a:endParaRPr lang="en-US" dirty="0"/>
           </a:p>
@@ -1844,7 +2310,7 @@
             <a:fld id="{C6C52C72-DE31-F449-A4ED-4C594FD91407}" type="datetimeFigureOut">
               <a:rPr lang="en-US" dirty="0"/>
               <a:pPr/>
-              <a:t>5/16/22</a:t>
+              <a:t>5/24/22</a:t>
             </a:fld>
             <a:endParaRPr lang="en-US" dirty="0"/>
           </a:p>
@@ -2126,7 +2592,7 @@
             <a:fld id="{ED62726E-379B-B349-9EED-81ED093FA806}" type="datetimeFigureOut">
               <a:rPr lang="en-US" dirty="0"/>
               <a:pPr/>
-              <a:t>5/16/22</a:t>
+              <a:t>5/24/22</a:t>
             </a:fld>
             <a:endParaRPr lang="en-US" dirty="0"/>
           </a:p>
@@ -2406,7 +2872,7 @@
             <a:fld id="{9B3A1323-8D79-1946-B0D7-40001CF92E9D}" type="datetimeFigureOut">
               <a:rPr lang="en-US" dirty="0"/>
               <a:pPr/>
-              <a:t>5/16/22</a:t>
+              <a:t>5/24/22</a:t>
             </a:fld>
             <a:endParaRPr lang="en-US" dirty="0"/>
           </a:p>
@@ -2746,7 +3212,7 @@
             <a:fld id="{8DFA1846-DA80-1C48-A609-854EA85C59AD}" type="datetimeFigureOut">
               <a:rPr lang="en-US" dirty="0"/>
               <a:pPr/>
-              <a:t>5/16/22</a:t>
+              <a:t>5/24/22</a:t>
             </a:fld>
             <a:endParaRPr lang="en-US" dirty="0"/>
           </a:p>
@@ -3082,7 +3548,7 @@
             <a:fld id="{57302355-E14B-8545-A8F8-0FE83CC9D524}" type="datetimeFigureOut">
               <a:rPr lang="en-US" dirty="0"/>
               <a:pPr/>
-              <a:t>5/16/22</a:t>
+              <a:t>5/24/22</a:t>
             </a:fld>
             <a:endParaRPr lang="en-US" dirty="0"/>
           </a:p>
@@ -3556,7 +4022,7 @@
             <a:fld id="{02640F58-564D-2B4F-AE67-E407BA4FCF45}" type="datetimeFigureOut">
               <a:rPr lang="en-US" dirty="0"/>
               <a:pPr/>
-              <a:t>5/16/22</a:t>
+              <a:t>5/24/22</a:t>
             </a:fld>
             <a:endParaRPr lang="en-US" dirty="0"/>
           </a:p>
@@ -3774,7 +4240,7 @@
             <a:fld id="{F13A34C8-038E-2045-AF43-DF7DBB8E0E9E}" type="datetimeFigureOut">
               <a:rPr lang="en-US" dirty="0"/>
               <a:pPr/>
-              <a:t>5/16/22</a:t>
+              <a:t>5/24/22</a:t>
             </a:fld>
             <a:endParaRPr lang="en-US" dirty="0"/>
           </a:p>
@@ -3866,7 +4332,7 @@
             <a:fld id="{8818C68F-D26B-8F47-958C-23B49CF8A634}" type="datetimeFigureOut">
               <a:rPr lang="en-US" dirty="0"/>
               <a:pPr/>
-              <a:t>5/16/22</a:t>
+              <a:t>5/24/22</a:t>
             </a:fld>
             <a:endParaRPr lang="en-US" dirty="0"/>
           </a:p>
@@ -4330,7 +4796,7 @@
             <a:fld id="{D0DF5E60-9974-AC48-9591-99C2BB44B7CF}" type="datetimeFigureOut">
               <a:rPr lang="en-US" dirty="0"/>
               <a:pPr/>
-              <a:t>5/16/22</a:t>
+              <a:t>5/24/22</a:t>
             </a:fld>
             <a:endParaRPr lang="en-US" dirty="0"/>
           </a:p>
@@ -4640,7 +5106,7 @@
             <a:fld id="{18C79C5D-2A6F-F04D-97DA-BEF2467B64E4}" type="datetimeFigureOut">
               <a:rPr lang="en-US" dirty="0"/>
               <a:pPr/>
-              <a:t>5/16/22</a:t>
+              <a:t>5/24/22</a:t>
             </a:fld>
             <a:endParaRPr lang="en-US" dirty="0"/>
           </a:p>
@@ -4907,7 +5373,7 @@
             <a:fld id="{09B482E8-6E0E-1B4F-B1FD-C69DB9E858D9}" type="datetimeFigureOut">
               <a:rPr lang="en-US" dirty="0"/>
               <a:pPr/>
-              <a:t>5/16/22</a:t>
+              <a:t>5/24/22</a:t>
             </a:fld>
             <a:endParaRPr lang="en-US" dirty="0"/>
           </a:p>
@@ -5567,6 +6033,1380 @@
 </p:sld>
 </file>
 
+<file path=ppt/slides/slide10.xml><?xml version="1.0" encoding="utf-8"?>
+<p:sld xmlns:a="http://schemas.openxmlformats.org/drawingml/2006/main" xmlns:r="http://schemas.openxmlformats.org/officeDocument/2006/relationships" xmlns:p="http://schemas.openxmlformats.org/presentationml/2006/main">
+  <p:cSld>
+    <p:spTree>
+      <p:nvGrpSpPr>
+        <p:cNvPr id="1" name=""/>
+        <p:cNvGrpSpPr/>
+        <p:nvPr/>
+      </p:nvGrpSpPr>
+      <p:grpSpPr>
+        <a:xfrm>
+          <a:off x="0" y="0"/>
+          <a:ext cx="0" cy="0"/>
+          <a:chOff x="0" y="0"/>
+          <a:chExt cx="0" cy="0"/>
+        </a:xfrm>
+      </p:grpSpPr>
+      <p:sp>
+        <p:nvSpPr>
+          <p:cNvPr id="2" name="Title 1">
+            <a:extLst>
+              <a:ext uri="{FF2B5EF4-FFF2-40B4-BE49-F238E27FC236}">
+                <a16:creationId xmlns:a16="http://schemas.microsoft.com/office/drawing/2014/main" id="{E25DDF7A-5810-36DC-CC84-2FEF7A3A3986}"/>
+              </a:ext>
+            </a:extLst>
+          </p:cNvPr>
+          <p:cNvSpPr>
+            <a:spLocks noGrp="1"/>
+          </p:cNvSpPr>
+          <p:nvPr>
+            <p:ph type="title"/>
+          </p:nvPr>
+        </p:nvSpPr>
+        <p:spPr/>
+        <p:txBody>
+          <a:bodyPr/>
+          <a:lstStyle/>
+          <a:p>
+            <a:r>
+              <a:rPr lang="en-US" dirty="0"/>
+              <a:t>2. Reliability</a:t>
+            </a:r>
+          </a:p>
+        </p:txBody>
+      </p:sp>
+      <p:sp>
+        <p:nvSpPr>
+          <p:cNvPr id="3" name="Text Placeholder 2">
+            <a:extLst>
+              <a:ext uri="{FF2B5EF4-FFF2-40B4-BE49-F238E27FC236}">
+                <a16:creationId xmlns:a16="http://schemas.microsoft.com/office/drawing/2014/main" id="{F506C454-FFEE-D6B1-B77E-6B688BF3B5AF}"/>
+              </a:ext>
+            </a:extLst>
+          </p:cNvPr>
+          <p:cNvSpPr>
+            <a:spLocks noGrp="1"/>
+          </p:cNvSpPr>
+          <p:nvPr>
+            <p:ph type="body" idx="1"/>
+          </p:nvPr>
+        </p:nvSpPr>
+        <p:spPr/>
+        <p:txBody>
+          <a:bodyPr/>
+          <a:lstStyle/>
+          <a:p>
+            <a:endParaRPr lang="en-US"/>
+          </a:p>
+        </p:txBody>
+      </p:sp>
+      <p:sp>
+        <p:nvSpPr>
+          <p:cNvPr id="4" name="Text Placeholder 3">
+            <a:extLst>
+              <a:ext uri="{FF2B5EF4-FFF2-40B4-BE49-F238E27FC236}">
+                <a16:creationId xmlns:a16="http://schemas.microsoft.com/office/drawing/2014/main" id="{8B62AD72-661B-1880-5BA7-28AE1EB43511}"/>
+              </a:ext>
+            </a:extLst>
+          </p:cNvPr>
+          <p:cNvSpPr>
+            <a:spLocks noGrp="1"/>
+          </p:cNvSpPr>
+          <p:nvPr>
+            <p:ph type="body" sz="quarter" idx="16"/>
+          </p:nvPr>
+        </p:nvSpPr>
+        <p:spPr/>
+        <p:txBody>
+          <a:bodyPr/>
+          <a:lstStyle/>
+          <a:p>
+            <a:pPr marL="285750" indent="-285750">
+              <a:buFont typeface="Arial" panose="020B0604020202020204" pitchFamily="34" charset="0"/>
+              <a:buChar char="•"/>
+            </a:pPr>
+            <a:r>
+              <a:rPr lang="en-US" dirty="0"/>
+              <a:t>Prevent and detect bugs from the very first interaction with the data.</a:t>
+            </a:r>
+          </a:p>
+          <a:p>
+            <a:pPr marL="285750" indent="-285750">
+              <a:buFont typeface="Arial" panose="020B0604020202020204" pitchFamily="34" charset="0"/>
+              <a:buChar char="•"/>
+            </a:pPr>
+            <a:r>
+              <a:rPr lang="en-US" dirty="0"/>
+              <a:t>Prevent and detect bugs throughout the data science product life cycle.</a:t>
+            </a:r>
+          </a:p>
+          <a:p>
+            <a:pPr marL="285750" indent="-285750">
+              <a:buFont typeface="Arial" panose="020B0604020202020204" pitchFamily="34" charset="0"/>
+              <a:buChar char="•"/>
+            </a:pPr>
+            <a:r>
+              <a:rPr lang="en-US" dirty="0"/>
+              <a:t>Minimize surprises – know what input to expect and where to expect it.</a:t>
+            </a:r>
+          </a:p>
+          <a:p>
+            <a:pPr marL="285750" indent="-285750">
+              <a:buFont typeface="Arial" panose="020B0604020202020204" pitchFamily="34" charset="0"/>
+              <a:buChar char="•"/>
+            </a:pPr>
+            <a:r>
+              <a:rPr lang="en-US" dirty="0"/>
+              <a:t>Can help with an early detection of a data drift.</a:t>
+            </a:r>
+          </a:p>
+        </p:txBody>
+      </p:sp>
+    </p:spTree>
+    <p:extLst>
+      <p:ext uri="{BB962C8B-B14F-4D97-AF65-F5344CB8AC3E}">
+        <p14:creationId xmlns:p14="http://schemas.microsoft.com/office/powerpoint/2010/main" val="935944819"/>
+      </p:ext>
+    </p:extLst>
+  </p:cSld>
+  <p:clrMapOvr>
+    <a:masterClrMapping/>
+  </p:clrMapOvr>
+</p:sld>
+</file>
+
+<file path=ppt/slides/slide11.xml><?xml version="1.0" encoding="utf-8"?>
+<p:sld xmlns:a="http://schemas.openxmlformats.org/drawingml/2006/main" xmlns:r="http://schemas.openxmlformats.org/officeDocument/2006/relationships" xmlns:p="http://schemas.openxmlformats.org/presentationml/2006/main">
+  <p:cSld>
+    <p:spTree>
+      <p:nvGrpSpPr>
+        <p:cNvPr id="1" name=""/>
+        <p:cNvGrpSpPr/>
+        <p:nvPr/>
+      </p:nvGrpSpPr>
+      <p:grpSpPr>
+        <a:xfrm>
+          <a:off x="0" y="0"/>
+          <a:ext cx="0" cy="0"/>
+          <a:chOff x="0" y="0"/>
+          <a:chExt cx="0" cy="0"/>
+        </a:xfrm>
+      </p:grpSpPr>
+      <p:sp>
+        <p:nvSpPr>
+          <p:cNvPr id="2" name="Title 1">
+            <a:extLst>
+              <a:ext uri="{FF2B5EF4-FFF2-40B4-BE49-F238E27FC236}">
+                <a16:creationId xmlns:a16="http://schemas.microsoft.com/office/drawing/2014/main" id="{E25DDF7A-5810-36DC-CC84-2FEF7A3A3986}"/>
+              </a:ext>
+            </a:extLst>
+          </p:cNvPr>
+          <p:cNvSpPr>
+            <a:spLocks noGrp="1"/>
+          </p:cNvSpPr>
+          <p:nvPr>
+            <p:ph type="title"/>
+          </p:nvPr>
+        </p:nvSpPr>
+        <p:spPr>
+          <a:xfrm>
+            <a:off x="850986" y="1221877"/>
+            <a:ext cx="5893840" cy="2645912"/>
+          </a:xfrm>
+        </p:spPr>
+        <p:txBody>
+          <a:bodyPr/>
+          <a:lstStyle/>
+          <a:p>
+            <a:r>
+              <a:rPr lang="en-US" dirty="0"/>
+              <a:t>3. Readability</a:t>
+            </a:r>
+          </a:p>
+        </p:txBody>
+      </p:sp>
+      <p:sp>
+        <p:nvSpPr>
+          <p:cNvPr id="3" name="Text Placeholder 2">
+            <a:extLst>
+              <a:ext uri="{FF2B5EF4-FFF2-40B4-BE49-F238E27FC236}">
+                <a16:creationId xmlns:a16="http://schemas.microsoft.com/office/drawing/2014/main" id="{F506C454-FFEE-D6B1-B77E-6B688BF3B5AF}"/>
+              </a:ext>
+            </a:extLst>
+          </p:cNvPr>
+          <p:cNvSpPr>
+            <a:spLocks noGrp="1"/>
+          </p:cNvSpPr>
+          <p:nvPr>
+            <p:ph type="body" idx="1"/>
+          </p:nvPr>
+        </p:nvSpPr>
+        <p:spPr/>
+        <p:txBody>
+          <a:bodyPr/>
+          <a:lstStyle/>
+          <a:p>
+            <a:endParaRPr lang="en-US"/>
+          </a:p>
+        </p:txBody>
+      </p:sp>
+      <p:sp>
+        <p:nvSpPr>
+          <p:cNvPr id="4" name="Text Placeholder 3">
+            <a:extLst>
+              <a:ext uri="{FF2B5EF4-FFF2-40B4-BE49-F238E27FC236}">
+                <a16:creationId xmlns:a16="http://schemas.microsoft.com/office/drawing/2014/main" id="{8B62AD72-661B-1880-5BA7-28AE1EB43511}"/>
+              </a:ext>
+            </a:extLst>
+          </p:cNvPr>
+          <p:cNvSpPr>
+            <a:spLocks noGrp="1"/>
+          </p:cNvSpPr>
+          <p:nvPr>
+            <p:ph type="body" sz="quarter" idx="16"/>
+          </p:nvPr>
+        </p:nvSpPr>
+        <p:spPr/>
+        <p:txBody>
+          <a:bodyPr/>
+          <a:lstStyle/>
+          <a:p>
+            <a:pPr marL="285750" indent="-285750">
+              <a:buFont typeface="Arial" panose="020B0604020202020204" pitchFamily="34" charset="0"/>
+              <a:buChar char="•"/>
+            </a:pPr>
+            <a:r>
+              <a:rPr lang="en-US" dirty="0"/>
+              <a:t>Harnessing Python’s type hints feature, make the code more readable by specifying explicitly what are the inputs and outputs of each function or class.</a:t>
+            </a:r>
+          </a:p>
+          <a:p>
+            <a:pPr marL="285750" indent="-285750">
+              <a:buFont typeface="Arial" panose="020B0604020202020204" pitchFamily="34" charset="0"/>
+              <a:buChar char="•"/>
+            </a:pPr>
+            <a:r>
+              <a:rPr lang="en-US" dirty="0"/>
+              <a:t>Some IDEs will highlight if something is wrong before we actually run anything.</a:t>
+            </a:r>
+          </a:p>
+        </p:txBody>
+      </p:sp>
+    </p:spTree>
+    <p:extLst>
+      <p:ext uri="{BB962C8B-B14F-4D97-AF65-F5344CB8AC3E}">
+        <p14:creationId xmlns:p14="http://schemas.microsoft.com/office/powerpoint/2010/main" val="3946123073"/>
+      </p:ext>
+    </p:extLst>
+  </p:cSld>
+  <p:clrMapOvr>
+    <a:masterClrMapping/>
+  </p:clrMapOvr>
+</p:sld>
+</file>
+
+<file path=ppt/slides/slide12.xml><?xml version="1.0" encoding="utf-8"?>
+<p:sld xmlns:a="http://schemas.openxmlformats.org/drawingml/2006/main" xmlns:r="http://schemas.openxmlformats.org/officeDocument/2006/relationships" xmlns:p="http://schemas.openxmlformats.org/presentationml/2006/main">
+  <p:cSld>
+    <p:spTree>
+      <p:nvGrpSpPr>
+        <p:cNvPr id="1" name=""/>
+        <p:cNvGrpSpPr/>
+        <p:nvPr/>
+      </p:nvGrpSpPr>
+      <p:grpSpPr>
+        <a:xfrm>
+          <a:off x="0" y="0"/>
+          <a:ext cx="0" cy="0"/>
+          <a:chOff x="0" y="0"/>
+          <a:chExt cx="0" cy="0"/>
+        </a:xfrm>
+      </p:grpSpPr>
+      <p:sp>
+        <p:nvSpPr>
+          <p:cNvPr id="2" name="Title 1">
+            <a:extLst>
+              <a:ext uri="{FF2B5EF4-FFF2-40B4-BE49-F238E27FC236}">
+                <a16:creationId xmlns:a16="http://schemas.microsoft.com/office/drawing/2014/main" id="{E25DDF7A-5810-36DC-CC84-2FEF7A3A3986}"/>
+              </a:ext>
+            </a:extLst>
+          </p:cNvPr>
+          <p:cNvSpPr>
+            <a:spLocks noGrp="1"/>
+          </p:cNvSpPr>
+          <p:nvPr>
+            <p:ph type="title"/>
+          </p:nvPr>
+        </p:nvSpPr>
+        <p:spPr>
+          <a:xfrm>
+            <a:off x="807357" y="1255127"/>
+            <a:ext cx="5893840" cy="2645912"/>
+          </a:xfrm>
+        </p:spPr>
+        <p:txBody>
+          <a:bodyPr/>
+          <a:lstStyle/>
+          <a:p>
+            <a:r>
+              <a:rPr lang="en-US" dirty="0"/>
+              <a:t>4. Familiarity</a:t>
+            </a:r>
+          </a:p>
+        </p:txBody>
+      </p:sp>
+      <p:sp>
+        <p:nvSpPr>
+          <p:cNvPr id="3" name="Text Placeholder 2">
+            <a:extLst>
+              <a:ext uri="{FF2B5EF4-FFF2-40B4-BE49-F238E27FC236}">
+                <a16:creationId xmlns:a16="http://schemas.microsoft.com/office/drawing/2014/main" id="{F506C454-FFEE-D6B1-B77E-6B688BF3B5AF}"/>
+              </a:ext>
+            </a:extLst>
+          </p:cNvPr>
+          <p:cNvSpPr>
+            <a:spLocks noGrp="1"/>
+          </p:cNvSpPr>
+          <p:nvPr>
+            <p:ph type="body" idx="1"/>
+          </p:nvPr>
+        </p:nvSpPr>
+        <p:spPr/>
+        <p:txBody>
+          <a:bodyPr/>
+          <a:lstStyle/>
+          <a:p>
+            <a:endParaRPr lang="en-US"/>
+          </a:p>
+        </p:txBody>
+      </p:sp>
+      <p:sp>
+        <p:nvSpPr>
+          <p:cNvPr id="4" name="Text Placeholder 3">
+            <a:extLst>
+              <a:ext uri="{FF2B5EF4-FFF2-40B4-BE49-F238E27FC236}">
+                <a16:creationId xmlns:a16="http://schemas.microsoft.com/office/drawing/2014/main" id="{8B62AD72-661B-1880-5BA7-28AE1EB43511}"/>
+              </a:ext>
+            </a:extLst>
+          </p:cNvPr>
+          <p:cNvSpPr>
+            <a:spLocks noGrp="1"/>
+          </p:cNvSpPr>
+          <p:nvPr>
+            <p:ph type="body" sz="quarter" idx="16"/>
+          </p:nvPr>
+        </p:nvSpPr>
+        <p:spPr/>
+        <p:txBody>
+          <a:bodyPr/>
+          <a:lstStyle/>
+          <a:p>
+            <a:pPr marL="285750" indent="-285750">
+              <a:buFont typeface="Arial" panose="020B0604020202020204" pitchFamily="34" charset="0"/>
+              <a:buChar char="•"/>
+            </a:pPr>
+            <a:r>
+              <a:rPr lang="en-US" dirty="0"/>
+              <a:t>Implementing validation steps will force us to get to know our data better.</a:t>
+            </a:r>
+          </a:p>
+          <a:p>
+            <a:pPr marL="285750" indent="-285750">
+              <a:buFont typeface="Arial" panose="020B0604020202020204" pitchFamily="34" charset="0"/>
+              <a:buChar char="•"/>
+            </a:pPr>
+            <a:r>
+              <a:rPr lang="en-US" dirty="0"/>
+              <a:t>This helps us as data professionals learn about the domain and the data in our system.</a:t>
+            </a:r>
+          </a:p>
+          <a:p>
+            <a:pPr marL="285750" indent="-285750">
+              <a:buFont typeface="Arial" panose="020B0604020202020204" pitchFamily="34" charset="0"/>
+              <a:buChar char="•"/>
+            </a:pPr>
+            <a:r>
+              <a:rPr lang="en-US" dirty="0"/>
+              <a:t>Find out what are the limits, gaps, types and ranges our database consists of.</a:t>
+            </a:r>
+          </a:p>
+          <a:p>
+            <a:pPr marL="285750" indent="-285750">
+              <a:buFont typeface="Arial" panose="020B0604020202020204" pitchFamily="34" charset="0"/>
+              <a:buChar char="•"/>
+            </a:pPr>
+            <a:r>
+              <a:rPr lang="en-US" dirty="0"/>
+              <a:t>Some of the tools allow for creating automated data documentation.</a:t>
+            </a:r>
+          </a:p>
+        </p:txBody>
+      </p:sp>
+    </p:spTree>
+    <p:extLst>
+      <p:ext uri="{BB962C8B-B14F-4D97-AF65-F5344CB8AC3E}">
+        <p14:creationId xmlns:p14="http://schemas.microsoft.com/office/powerpoint/2010/main" val="3965679113"/>
+      </p:ext>
+    </p:extLst>
+  </p:cSld>
+  <p:clrMapOvr>
+    <a:masterClrMapping/>
+  </p:clrMapOvr>
+</p:sld>
+</file>
+
+<file path=ppt/slides/slide13.xml><?xml version="1.0" encoding="utf-8"?>
+<p:sld xmlns:a="http://schemas.openxmlformats.org/drawingml/2006/main" xmlns:r="http://schemas.openxmlformats.org/officeDocument/2006/relationships" xmlns:p="http://schemas.openxmlformats.org/presentationml/2006/main">
+  <p:cSld>
+    <p:spTree>
+      <p:nvGrpSpPr>
+        <p:cNvPr id="1" name=""/>
+        <p:cNvGrpSpPr/>
+        <p:nvPr/>
+      </p:nvGrpSpPr>
+      <p:grpSpPr>
+        <a:xfrm>
+          <a:off x="0" y="0"/>
+          <a:ext cx="0" cy="0"/>
+          <a:chOff x="0" y="0"/>
+          <a:chExt cx="0" cy="0"/>
+        </a:xfrm>
+      </p:grpSpPr>
+      <p:pic>
+        <p:nvPicPr>
+          <p:cNvPr id="1026" name="Picture 2">
+            <a:extLst>
+              <a:ext uri="{FF2B5EF4-FFF2-40B4-BE49-F238E27FC236}">
+                <a16:creationId xmlns:a16="http://schemas.microsoft.com/office/drawing/2014/main" id="{EF594FD1-98FA-F2C4-50BC-996FDE79ACAE}"/>
+              </a:ext>
+            </a:extLst>
+          </p:cNvPr>
+          <p:cNvPicPr>
+            <a:picLocks noChangeAspect="1" noChangeArrowheads="1"/>
+          </p:cNvPicPr>
+          <p:nvPr/>
+        </p:nvPicPr>
+        <p:blipFill>
+          <a:blip r:embed="rId3">
+            <a:extLst>
+              <a:ext uri="{28A0092B-C50C-407E-A947-70E740481C1C}">
+                <a14:useLocalDpi xmlns:a14="http://schemas.microsoft.com/office/drawing/2010/main" val="0"/>
+              </a:ext>
+            </a:extLst>
+          </a:blip>
+          <a:srcRect/>
+          <a:stretch>
+            <a:fillRect/>
+          </a:stretch>
+        </p:blipFill>
+        <p:spPr bwMode="auto">
+          <a:xfrm>
+            <a:off x="3067396" y="1591079"/>
+            <a:ext cx="8521007" cy="3886952"/>
+          </a:xfrm>
+          <a:prstGeom prst="roundRect">
+            <a:avLst>
+              <a:gd name="adj" fmla="val 16667"/>
+            </a:avLst>
+          </a:prstGeom>
+          <a:ln>
+            <a:noFill/>
+          </a:ln>
+          <a:effectLst>
+            <a:outerShdw blurRad="76200" dist="38100" dir="7800000" algn="tl" rotWithShape="0">
+              <a:srgbClr val="000000">
+                <a:alpha val="40000"/>
+              </a:srgbClr>
+            </a:outerShdw>
+          </a:effectLst>
+          <a:scene3d>
+            <a:camera prst="orthographicFront"/>
+            <a:lightRig rig="contrasting" dir="t">
+              <a:rot lat="0" lon="0" rev="4200000"/>
+            </a:lightRig>
+          </a:scene3d>
+          <a:sp3d prstMaterial="plastic">
+            <a:bevelT w="381000" h="114300" prst="relaxedInset"/>
+            <a:contourClr>
+              <a:srgbClr val="969696"/>
+            </a:contourClr>
+          </a:sp3d>
+          <a:extLst>
+            <a:ext uri="{909E8E84-426E-40DD-AFC4-6F175D3DCCD1}">
+              <a14:hiddenFill xmlns:a14="http://schemas.microsoft.com/office/drawing/2010/main">
+                <a:solidFill>
+                  <a:srgbClr val="FFFFFF"/>
+                </a:solidFill>
+              </a14:hiddenFill>
+            </a:ext>
+          </a:extLst>
+        </p:spPr>
+      </p:pic>
+      <p:sp>
+        <p:nvSpPr>
+          <p:cNvPr id="3" name="Title 1">
+            <a:extLst>
+              <a:ext uri="{FF2B5EF4-FFF2-40B4-BE49-F238E27FC236}">
+                <a16:creationId xmlns:a16="http://schemas.microsoft.com/office/drawing/2014/main" id="{40AF2F05-1799-6547-7BDC-2AEFCBE7ECF2}"/>
+              </a:ext>
+            </a:extLst>
+          </p:cNvPr>
+          <p:cNvSpPr txBox="1">
+            <a:spLocks/>
+          </p:cNvSpPr>
+          <p:nvPr/>
+        </p:nvSpPr>
+        <p:spPr>
+          <a:xfrm>
+            <a:off x="406490" y="340288"/>
+            <a:ext cx="10799066" cy="1122752"/>
+          </a:xfrm>
+          <a:prstGeom prst="rect">
+            <a:avLst/>
+          </a:prstGeom>
+        </p:spPr>
+        <p:txBody>
+          <a:bodyPr>
+            <a:normAutofit lnSpcReduction="10000"/>
+          </a:bodyPr>
+          <a:lstStyle>
+            <a:lvl1pPr algn="l" defTabSz="457200" rtl="0" eaLnBrk="1" latinLnBrk="0" hangingPunct="1">
+              <a:spcBef>
+                <a:spcPct val="0"/>
+              </a:spcBef>
+              <a:buNone/>
+              <a:defRPr sz="4000" b="1" kern="1200">
+                <a:solidFill>
+                  <a:srgbClr val="FEFEFE"/>
+                </a:solidFill>
+                <a:latin typeface="+mj-lt"/>
+                <a:ea typeface="+mj-ea"/>
+                <a:cs typeface="+mj-cs"/>
+              </a:defRPr>
+            </a:lvl1pPr>
+            <a:lvl2pPr eaLnBrk="1" hangingPunct="1">
+              <a:defRPr>
+                <a:solidFill>
+                  <a:schemeClr val="tx2"/>
+                </a:solidFill>
+              </a:defRPr>
+            </a:lvl2pPr>
+            <a:lvl3pPr eaLnBrk="1" hangingPunct="1">
+              <a:defRPr>
+                <a:solidFill>
+                  <a:schemeClr val="tx2"/>
+                </a:solidFill>
+              </a:defRPr>
+            </a:lvl3pPr>
+            <a:lvl4pPr eaLnBrk="1" hangingPunct="1">
+              <a:defRPr>
+                <a:solidFill>
+                  <a:schemeClr val="tx2"/>
+                </a:solidFill>
+              </a:defRPr>
+            </a:lvl4pPr>
+            <a:lvl5pPr eaLnBrk="1" hangingPunct="1">
+              <a:defRPr>
+                <a:solidFill>
+                  <a:schemeClr val="tx2"/>
+                </a:solidFill>
+              </a:defRPr>
+            </a:lvl5pPr>
+            <a:lvl6pPr eaLnBrk="1" hangingPunct="1">
+              <a:defRPr>
+                <a:solidFill>
+                  <a:schemeClr val="tx2"/>
+                </a:solidFill>
+              </a:defRPr>
+            </a:lvl6pPr>
+            <a:lvl7pPr eaLnBrk="1" hangingPunct="1">
+              <a:defRPr>
+                <a:solidFill>
+                  <a:schemeClr val="tx2"/>
+                </a:solidFill>
+              </a:defRPr>
+            </a:lvl7pPr>
+            <a:lvl8pPr eaLnBrk="1" hangingPunct="1">
+              <a:defRPr>
+                <a:solidFill>
+                  <a:schemeClr val="tx2"/>
+                </a:solidFill>
+              </a:defRPr>
+            </a:lvl8pPr>
+            <a:lvl9pPr eaLnBrk="1" hangingPunct="1">
+              <a:defRPr>
+                <a:solidFill>
+                  <a:schemeClr val="tx2"/>
+                </a:solidFill>
+              </a:defRPr>
+            </a:lvl9pPr>
+          </a:lstStyle>
+          <a:p>
+            <a:r>
+              <a:rPr lang="en-US" sz="3600" dirty="0"/>
+              <a:t>At what point in the model lifecycle should we implement data validation?</a:t>
+            </a:r>
+          </a:p>
+        </p:txBody>
+      </p:sp>
+      <p:grpSp>
+        <p:nvGrpSpPr>
+          <p:cNvPr id="14" name="Group 13">
+            <a:extLst>
+              <a:ext uri="{FF2B5EF4-FFF2-40B4-BE49-F238E27FC236}">
+                <a16:creationId xmlns:a16="http://schemas.microsoft.com/office/drawing/2014/main" id="{22340BEF-FA82-440C-DF66-12FF22C02F11}"/>
+              </a:ext>
+            </a:extLst>
+          </p:cNvPr>
+          <p:cNvGrpSpPr/>
+          <p:nvPr/>
+        </p:nvGrpSpPr>
+        <p:grpSpPr>
+          <a:xfrm>
+            <a:off x="4680065" y="3366655"/>
+            <a:ext cx="5128953" cy="3407078"/>
+            <a:chOff x="4680065" y="3366655"/>
+            <a:chExt cx="5128953" cy="3407078"/>
+          </a:xfrm>
+        </p:grpSpPr>
+        <p:cxnSp>
+          <p:nvCxnSpPr>
+            <p:cNvPr id="4" name="Straight Arrow Connector 3">
+              <a:extLst>
+                <a:ext uri="{FF2B5EF4-FFF2-40B4-BE49-F238E27FC236}">
+                  <a16:creationId xmlns:a16="http://schemas.microsoft.com/office/drawing/2014/main" id="{8C40C96B-2C91-11C0-7D40-7AB7B1223A30}"/>
+                </a:ext>
+              </a:extLst>
+            </p:cNvPr>
+            <p:cNvCxnSpPr/>
+            <p:nvPr/>
+          </p:nvCxnSpPr>
+          <p:spPr>
+            <a:xfrm flipH="1" flipV="1">
+              <a:off x="4680065" y="3366655"/>
+              <a:ext cx="2277688" cy="2527069"/>
+            </a:xfrm>
+            <a:prstGeom prst="straightConnector1">
+              <a:avLst/>
+            </a:prstGeom>
+            <a:ln w="76200">
+              <a:tailEnd type="triangle"/>
+            </a:ln>
+          </p:spPr>
+          <p:style>
+            <a:lnRef idx="1">
+              <a:schemeClr val="accent6"/>
+            </a:lnRef>
+            <a:fillRef idx="0">
+              <a:schemeClr val="accent6"/>
+            </a:fillRef>
+            <a:effectRef idx="0">
+              <a:schemeClr val="accent6"/>
+            </a:effectRef>
+            <a:fontRef idx="minor">
+              <a:schemeClr val="tx1"/>
+            </a:fontRef>
+          </p:style>
+        </p:cxnSp>
+        <p:cxnSp>
+          <p:nvCxnSpPr>
+            <p:cNvPr id="6" name="Straight Arrow Connector 5">
+              <a:extLst>
+                <a:ext uri="{FF2B5EF4-FFF2-40B4-BE49-F238E27FC236}">
+                  <a16:creationId xmlns:a16="http://schemas.microsoft.com/office/drawing/2014/main" id="{144A3884-E90A-C623-E1D6-4B2ACE3566DB}"/>
+                </a:ext>
+              </a:extLst>
+            </p:cNvPr>
+            <p:cNvCxnSpPr>
+              <a:cxnSpLocks/>
+            </p:cNvCxnSpPr>
+            <p:nvPr/>
+          </p:nvCxnSpPr>
+          <p:spPr>
+            <a:xfrm flipH="1" flipV="1">
+              <a:off x="5893724" y="3366655"/>
+              <a:ext cx="1221971" cy="2527069"/>
+            </a:xfrm>
+            <a:prstGeom prst="straightConnector1">
+              <a:avLst/>
+            </a:prstGeom>
+            <a:ln w="76200">
+              <a:tailEnd type="triangle"/>
+            </a:ln>
+          </p:spPr>
+          <p:style>
+            <a:lnRef idx="1">
+              <a:schemeClr val="accent6"/>
+            </a:lnRef>
+            <a:fillRef idx="0">
+              <a:schemeClr val="accent6"/>
+            </a:fillRef>
+            <a:effectRef idx="0">
+              <a:schemeClr val="accent6"/>
+            </a:effectRef>
+            <a:fontRef idx="minor">
+              <a:schemeClr val="tx1"/>
+            </a:fontRef>
+          </p:style>
+        </p:cxnSp>
+        <p:cxnSp>
+          <p:nvCxnSpPr>
+            <p:cNvPr id="9" name="Straight Arrow Connector 8">
+              <a:extLst>
+                <a:ext uri="{FF2B5EF4-FFF2-40B4-BE49-F238E27FC236}">
+                  <a16:creationId xmlns:a16="http://schemas.microsoft.com/office/drawing/2014/main" id="{C9CBD885-C177-D98A-970C-B6E3D76151AC}"/>
+                </a:ext>
+              </a:extLst>
+            </p:cNvPr>
+            <p:cNvCxnSpPr>
+              <a:cxnSpLocks/>
+            </p:cNvCxnSpPr>
+            <p:nvPr/>
+          </p:nvCxnSpPr>
+          <p:spPr>
+            <a:xfrm flipV="1">
+              <a:off x="7248698" y="3429000"/>
+              <a:ext cx="482138" cy="2464724"/>
+            </a:xfrm>
+            <a:prstGeom prst="straightConnector1">
+              <a:avLst/>
+            </a:prstGeom>
+            <a:ln w="76200">
+              <a:tailEnd type="triangle"/>
+            </a:ln>
+          </p:spPr>
+          <p:style>
+            <a:lnRef idx="1">
+              <a:schemeClr val="accent6"/>
+            </a:lnRef>
+            <a:fillRef idx="0">
+              <a:schemeClr val="accent6"/>
+            </a:fillRef>
+            <a:effectRef idx="0">
+              <a:schemeClr val="accent6"/>
+            </a:effectRef>
+            <a:fontRef idx="minor">
+              <a:schemeClr val="tx1"/>
+            </a:fontRef>
+          </p:style>
+        </p:cxnSp>
+        <p:cxnSp>
+          <p:nvCxnSpPr>
+            <p:cNvPr id="12" name="Straight Arrow Connector 11">
+              <a:extLst>
+                <a:ext uri="{FF2B5EF4-FFF2-40B4-BE49-F238E27FC236}">
+                  <a16:creationId xmlns:a16="http://schemas.microsoft.com/office/drawing/2014/main" id="{BC83E52E-177C-54EC-E317-93E18238E0FF}"/>
+                </a:ext>
+              </a:extLst>
+            </p:cNvPr>
+            <p:cNvCxnSpPr>
+              <a:cxnSpLocks/>
+            </p:cNvCxnSpPr>
+            <p:nvPr/>
+          </p:nvCxnSpPr>
+          <p:spPr>
+            <a:xfrm flipV="1">
+              <a:off x="7489767" y="3429000"/>
+              <a:ext cx="2319251" cy="2464724"/>
+            </a:xfrm>
+            <a:prstGeom prst="straightConnector1">
+              <a:avLst/>
+            </a:prstGeom>
+            <a:ln w="76200">
+              <a:tailEnd type="triangle"/>
+            </a:ln>
+          </p:spPr>
+          <p:style>
+            <a:lnRef idx="1">
+              <a:schemeClr val="accent6"/>
+            </a:lnRef>
+            <a:fillRef idx="0">
+              <a:schemeClr val="accent6"/>
+            </a:fillRef>
+            <a:effectRef idx="0">
+              <a:schemeClr val="accent6"/>
+            </a:effectRef>
+            <a:fontRef idx="minor">
+              <a:schemeClr val="tx1"/>
+            </a:fontRef>
+          </p:style>
+        </p:cxnSp>
+        <p:sp>
+          <p:nvSpPr>
+            <p:cNvPr id="15" name="Title 1">
+              <a:extLst>
+                <a:ext uri="{FF2B5EF4-FFF2-40B4-BE49-F238E27FC236}">
+                  <a16:creationId xmlns:a16="http://schemas.microsoft.com/office/drawing/2014/main" id="{25A7A0F6-ED0D-01D4-58D1-2FAC0D870B5F}"/>
+                </a:ext>
+              </a:extLst>
+            </p:cNvPr>
+            <p:cNvSpPr txBox="1">
+              <a:spLocks/>
+            </p:cNvSpPr>
+            <p:nvPr/>
+          </p:nvSpPr>
+          <p:spPr>
+            <a:xfrm>
+              <a:off x="6529186" y="5960225"/>
+              <a:ext cx="1620982" cy="813508"/>
+            </a:xfrm>
+            <a:prstGeom prst="rect">
+              <a:avLst/>
+            </a:prstGeom>
+          </p:spPr>
+          <p:txBody>
+            <a:bodyPr>
+              <a:normAutofit/>
+            </a:bodyPr>
+            <a:lstStyle>
+              <a:lvl1pPr algn="l" defTabSz="457200" rtl="0" eaLnBrk="1" latinLnBrk="0" hangingPunct="1">
+                <a:spcBef>
+                  <a:spcPct val="0"/>
+                </a:spcBef>
+                <a:buNone/>
+                <a:defRPr sz="4000" b="1" kern="1200">
+                  <a:solidFill>
+                    <a:srgbClr val="FEFEFE"/>
+                  </a:solidFill>
+                  <a:latin typeface="+mj-lt"/>
+                  <a:ea typeface="+mj-ea"/>
+                  <a:cs typeface="+mj-cs"/>
+                </a:defRPr>
+              </a:lvl1pPr>
+              <a:lvl2pPr eaLnBrk="1" hangingPunct="1">
+                <a:defRPr>
+                  <a:solidFill>
+                    <a:schemeClr val="tx2"/>
+                  </a:solidFill>
+                </a:defRPr>
+              </a:lvl2pPr>
+              <a:lvl3pPr eaLnBrk="1" hangingPunct="1">
+                <a:defRPr>
+                  <a:solidFill>
+                    <a:schemeClr val="tx2"/>
+                  </a:solidFill>
+                </a:defRPr>
+              </a:lvl3pPr>
+              <a:lvl4pPr eaLnBrk="1" hangingPunct="1">
+                <a:defRPr>
+                  <a:solidFill>
+                    <a:schemeClr val="tx2"/>
+                  </a:solidFill>
+                </a:defRPr>
+              </a:lvl4pPr>
+              <a:lvl5pPr eaLnBrk="1" hangingPunct="1">
+                <a:defRPr>
+                  <a:solidFill>
+                    <a:schemeClr val="tx2"/>
+                  </a:solidFill>
+                </a:defRPr>
+              </a:lvl5pPr>
+              <a:lvl6pPr eaLnBrk="1" hangingPunct="1">
+                <a:defRPr>
+                  <a:solidFill>
+                    <a:schemeClr val="tx2"/>
+                  </a:solidFill>
+                </a:defRPr>
+              </a:lvl6pPr>
+              <a:lvl7pPr eaLnBrk="1" hangingPunct="1">
+                <a:defRPr>
+                  <a:solidFill>
+                    <a:schemeClr val="tx2"/>
+                  </a:solidFill>
+                </a:defRPr>
+              </a:lvl7pPr>
+              <a:lvl8pPr eaLnBrk="1" hangingPunct="1">
+                <a:defRPr>
+                  <a:solidFill>
+                    <a:schemeClr val="tx2"/>
+                  </a:solidFill>
+                </a:defRPr>
+              </a:lvl8pPr>
+              <a:lvl9pPr eaLnBrk="1" hangingPunct="1">
+                <a:defRPr>
+                  <a:solidFill>
+                    <a:schemeClr val="tx2"/>
+                  </a:solidFill>
+                </a:defRPr>
+              </a:lvl9pPr>
+            </a:lstStyle>
+            <a:p>
+              <a:r>
+                <a:rPr lang="en-US" sz="3600" dirty="0">
+                  <a:solidFill>
+                    <a:srgbClr val="FF0000"/>
+                  </a:solidFill>
+                </a:rPr>
+                <a:t>Here!</a:t>
+              </a:r>
+            </a:p>
+          </p:txBody>
+        </p:sp>
+      </p:grpSp>
+    </p:spTree>
+    <p:extLst>
+      <p:ext uri="{BB962C8B-B14F-4D97-AF65-F5344CB8AC3E}">
+        <p14:creationId xmlns:p14="http://schemas.microsoft.com/office/powerpoint/2010/main" val="3430028690"/>
+      </p:ext>
+    </p:extLst>
+  </p:cSld>
+  <p:clrMapOvr>
+    <a:masterClrMapping/>
+  </p:clrMapOvr>
+  <p:timing>
+    <p:tnLst>
+      <p:par>
+        <p:cTn id="1" dur="indefinite" restart="never" nodeType="tmRoot">
+          <p:childTnLst>
+            <p:seq concurrent="1" nextAc="seek">
+              <p:cTn id="2" dur="indefinite" nodeType="mainSeq">
+                <p:childTnLst>
+                  <p:par>
+                    <p:cTn id="3" fill="hold">
+                      <p:stCondLst>
+                        <p:cond delay="indefinite"/>
+                      </p:stCondLst>
+                      <p:childTnLst>
+                        <p:par>
+                          <p:cTn id="4" fill="hold">
+                            <p:stCondLst>
+                              <p:cond delay="0"/>
+                            </p:stCondLst>
+                            <p:childTnLst>
+                              <p:par>
+                                <p:cTn id="5" presetID="1" presetClass="entr" presetSubtype="0" fill="hold" nodeType="clickEffect">
+                                  <p:stCondLst>
+                                    <p:cond delay="0"/>
+                                  </p:stCondLst>
+                                  <p:childTnLst>
+                                    <p:set>
+                                      <p:cBhvr>
+                                        <p:cTn id="6" dur="1" fill="hold">
+                                          <p:stCondLst>
+                                            <p:cond delay="0"/>
+                                          </p:stCondLst>
+                                        </p:cTn>
+                                        <p:tgtEl>
+                                          <p:spTgt spid="14"/>
+                                        </p:tgtEl>
+                                        <p:attrNameLst>
+                                          <p:attrName>style.visibility</p:attrName>
+                                        </p:attrNameLst>
+                                      </p:cBhvr>
+                                      <p:to>
+                                        <p:strVal val="visible"/>
+                                      </p:to>
+                                    </p:set>
+                                  </p:childTnLst>
+                                </p:cTn>
+                              </p:par>
+                            </p:childTnLst>
+                          </p:cTn>
+                        </p:par>
+                      </p:childTnLst>
+                    </p:cTn>
+                  </p:par>
+                </p:childTnLst>
+              </p:cTn>
+              <p:prevCondLst>
+                <p:cond evt="onPrev" delay="0">
+                  <p:tgtEl>
+                    <p:sldTgt/>
+                  </p:tgtEl>
+                </p:cond>
+              </p:prevCondLst>
+              <p:nextCondLst>
+                <p:cond evt="onNext" delay="0">
+                  <p:tgtEl>
+                    <p:sldTgt/>
+                  </p:tgtEl>
+                </p:cond>
+              </p:nextCondLst>
+            </p:seq>
+          </p:childTnLst>
+        </p:cTn>
+      </p:par>
+    </p:tnLst>
+  </p:timing>
+</p:sld>
+</file>
+
+<file path=ppt/slides/slide14.xml><?xml version="1.0" encoding="utf-8"?>
+<p:sld xmlns:a="http://schemas.openxmlformats.org/drawingml/2006/main" xmlns:r="http://schemas.openxmlformats.org/officeDocument/2006/relationships" xmlns:p="http://schemas.openxmlformats.org/presentationml/2006/main">
+  <p:cSld>
+    <p:spTree>
+      <p:nvGrpSpPr>
+        <p:cNvPr id="1" name=""/>
+        <p:cNvGrpSpPr/>
+        <p:nvPr/>
+      </p:nvGrpSpPr>
+      <p:grpSpPr>
+        <a:xfrm>
+          <a:off x="0" y="0"/>
+          <a:ext cx="0" cy="0"/>
+          <a:chOff x="0" y="0"/>
+          <a:chExt cx="0" cy="0"/>
+        </a:xfrm>
+      </p:grpSpPr>
+      <p:sp>
+        <p:nvSpPr>
+          <p:cNvPr id="2" name="Title 1">
+            <a:extLst>
+              <a:ext uri="{FF2B5EF4-FFF2-40B4-BE49-F238E27FC236}">
+                <a16:creationId xmlns:a16="http://schemas.microsoft.com/office/drawing/2014/main" id="{B9C234B5-CC6D-5CC4-4487-95BC34E66A7D}"/>
+              </a:ext>
+            </a:extLst>
+          </p:cNvPr>
+          <p:cNvSpPr>
+            <a:spLocks noGrp="1"/>
+          </p:cNvSpPr>
+          <p:nvPr>
+            <p:ph type="title"/>
+          </p:nvPr>
+        </p:nvSpPr>
+        <p:spPr/>
+        <p:txBody>
+          <a:bodyPr/>
+          <a:lstStyle/>
+          <a:p>
+            <a:r>
+              <a:rPr lang="en-US" dirty="0"/>
+              <a:t>Hands on tutorial</a:t>
+            </a:r>
+          </a:p>
+        </p:txBody>
+      </p:sp>
+      <p:sp>
+        <p:nvSpPr>
+          <p:cNvPr id="3" name="Content Placeholder 2">
+            <a:extLst>
+              <a:ext uri="{FF2B5EF4-FFF2-40B4-BE49-F238E27FC236}">
+                <a16:creationId xmlns:a16="http://schemas.microsoft.com/office/drawing/2014/main" id="{0A8EF2EF-3B20-A9BB-301B-0DB52BDFBEEA}"/>
+              </a:ext>
+            </a:extLst>
+          </p:cNvPr>
+          <p:cNvSpPr>
+            <a:spLocks noGrp="1"/>
+          </p:cNvSpPr>
+          <p:nvPr>
+            <p:ph idx="1"/>
+          </p:nvPr>
+        </p:nvSpPr>
+        <p:spPr/>
+        <p:txBody>
+          <a:bodyPr/>
+          <a:lstStyle/>
+          <a:p>
+            <a:pPr>
+              <a:buFont typeface="+mj-lt"/>
+              <a:buAutoNum type="arabicPeriod"/>
+            </a:pPr>
+            <a:r>
+              <a:rPr lang="en-US" dirty="0"/>
+              <a:t>Training pipelines validation with</a:t>
+            </a:r>
+          </a:p>
+          <a:p>
+            <a:pPr>
+              <a:buFont typeface="+mj-lt"/>
+              <a:buAutoNum type="arabicPeriod"/>
+            </a:pPr>
+            <a:r>
+              <a:rPr lang="en-US" dirty="0"/>
+              <a:t>Model serving validation with</a:t>
+            </a:r>
+          </a:p>
+          <a:p>
+            <a:pPr>
+              <a:buFont typeface="+mj-lt"/>
+              <a:buAutoNum type="arabicPeriod"/>
+            </a:pPr>
+            <a:r>
+              <a:rPr lang="en-US" dirty="0"/>
+              <a:t>Database validation with </a:t>
+            </a:r>
+            <a:endParaRPr lang="he-IL" dirty="0"/>
+          </a:p>
+          <a:p>
+            <a:pPr>
+              <a:buFont typeface="+mj-lt"/>
+              <a:buAutoNum type="arabicPeriod"/>
+            </a:pPr>
+            <a:endParaRPr lang="he-IL" dirty="0"/>
+          </a:p>
+          <a:p>
+            <a:pPr marL="0" indent="0">
+              <a:buNone/>
+            </a:pPr>
+            <a:r>
+              <a:rPr lang="en-GB" dirty="0"/>
+              <a:t>Dataset used: </a:t>
+            </a:r>
+            <a:r>
+              <a:rPr lang="en-GB" dirty="0">
+                <a:hlinkClick r:id="rId2"/>
+              </a:rPr>
+              <a:t>Kaggle house prices prediction competition</a:t>
+            </a:r>
+            <a:endParaRPr lang="en-US" dirty="0"/>
+          </a:p>
+        </p:txBody>
+      </p:sp>
+      <p:pic>
+        <p:nvPicPr>
+          <p:cNvPr id="3076" name="Picture 4" descr="GitHub - pandera-dev/pandera: A light-weight, flexible, and expressive data  validation library for dataframes">
+            <a:extLst>
+              <a:ext uri="{FF2B5EF4-FFF2-40B4-BE49-F238E27FC236}">
+                <a16:creationId xmlns:a16="http://schemas.microsoft.com/office/drawing/2014/main" id="{247792A8-3518-AF8A-DE24-F9907ED8B336}"/>
+              </a:ext>
+            </a:extLst>
+          </p:cNvPr>
+          <p:cNvPicPr>
+            <a:picLocks noChangeAspect="1" noChangeArrowheads="1"/>
+          </p:cNvPicPr>
+          <p:nvPr/>
+        </p:nvPicPr>
+        <p:blipFill>
+          <a:blip r:embed="rId3">
+            <a:extLst>
+              <a:ext uri="{28A0092B-C50C-407E-A947-70E740481C1C}">
+                <a14:useLocalDpi xmlns:a14="http://schemas.microsoft.com/office/drawing/2010/main" val="0"/>
+              </a:ext>
+            </a:extLst>
+          </a:blip>
+          <a:srcRect/>
+          <a:stretch>
+            <a:fillRect/>
+          </a:stretch>
+        </p:blipFill>
+        <p:spPr bwMode="auto">
+          <a:xfrm>
+            <a:off x="4835235" y="3055572"/>
+            <a:ext cx="1260764" cy="365917"/>
+          </a:xfrm>
+          <a:prstGeom prst="rect">
+            <a:avLst/>
+          </a:prstGeom>
+          <a:noFill/>
+          <a:extLst>
+            <a:ext uri="{909E8E84-426E-40DD-AFC4-6F175D3DCCD1}">
+              <a14:hiddenFill xmlns:a14="http://schemas.microsoft.com/office/drawing/2010/main">
+                <a:solidFill>
+                  <a:srgbClr val="FFFFFF"/>
+                </a:solidFill>
+              </a14:hiddenFill>
+            </a:ext>
+          </a:extLst>
+        </p:spPr>
+      </p:pic>
+      <p:pic>
+        <p:nvPicPr>
+          <p:cNvPr id="3078" name="Picture 6" descr="Pydantic in a Nutshell. The power of type annotation-based… | by Florian  Kromer | Python in Plain English">
+            <a:extLst>
+              <a:ext uri="{FF2B5EF4-FFF2-40B4-BE49-F238E27FC236}">
+                <a16:creationId xmlns:a16="http://schemas.microsoft.com/office/drawing/2014/main" id="{3C0FB5DF-65BF-BA77-444C-C6D63E6F6FAF}"/>
+              </a:ext>
+            </a:extLst>
+          </p:cNvPr>
+          <p:cNvPicPr>
+            <a:picLocks noChangeAspect="1" noChangeArrowheads="1"/>
+          </p:cNvPicPr>
+          <p:nvPr/>
+        </p:nvPicPr>
+        <p:blipFill rotWithShape="1">
+          <a:blip r:embed="rId4">
+            <a:extLst>
+              <a:ext uri="{28A0092B-C50C-407E-A947-70E740481C1C}">
+                <a14:useLocalDpi xmlns:a14="http://schemas.microsoft.com/office/drawing/2010/main" val="0"/>
+              </a:ext>
+            </a:extLst>
+          </a:blip>
+          <a:srcRect l="21789" t="25306" r="21152" b="28467"/>
+          <a:stretch/>
+        </p:blipFill>
+        <p:spPr bwMode="auto">
+          <a:xfrm>
+            <a:off x="4650969" y="3436512"/>
+            <a:ext cx="814648" cy="342035"/>
+          </a:xfrm>
+          <a:prstGeom prst="rect">
+            <a:avLst/>
+          </a:prstGeom>
+          <a:noFill/>
+          <a:extLst>
+            <a:ext uri="{909E8E84-426E-40DD-AFC4-6F175D3DCCD1}">
+              <a14:hiddenFill xmlns:a14="http://schemas.microsoft.com/office/drawing/2010/main">
+                <a:solidFill>
+                  <a:srgbClr val="FFFFFF"/>
+                </a:solidFill>
+              </a14:hiddenFill>
+            </a:ext>
+          </a:extLst>
+        </p:spPr>
+      </p:pic>
+      <p:pic>
+        <p:nvPicPr>
+          <p:cNvPr id="3080" name="Picture 8" descr="Result format | Great Expectations">
+            <a:extLst>
+              <a:ext uri="{FF2B5EF4-FFF2-40B4-BE49-F238E27FC236}">
+                <a16:creationId xmlns:a16="http://schemas.microsoft.com/office/drawing/2014/main" id="{9F92478E-22AF-5A8B-126E-8DD96C7F0A28}"/>
+              </a:ext>
+            </a:extLst>
+          </p:cNvPr>
+          <p:cNvPicPr>
+            <a:picLocks noChangeAspect="1" noChangeArrowheads="1"/>
+          </p:cNvPicPr>
+          <p:nvPr/>
+        </p:nvPicPr>
+        <p:blipFill>
+          <a:blip r:embed="rId5">
+            <a:alphaModFix/>
+            <a:extLst>
+              <a:ext uri="{28A0092B-C50C-407E-A947-70E740481C1C}">
+                <a14:useLocalDpi xmlns:a14="http://schemas.microsoft.com/office/drawing/2010/main" val="0"/>
+              </a:ext>
+            </a:extLst>
+          </a:blip>
+          <a:srcRect/>
+          <a:stretch>
+            <a:fillRect/>
+          </a:stretch>
+        </p:blipFill>
+        <p:spPr bwMode="auto">
+          <a:xfrm>
+            <a:off x="4148050" y="3847730"/>
+            <a:ext cx="1538861" cy="342036"/>
+          </a:xfrm>
+          <a:prstGeom prst="rect">
+            <a:avLst/>
+          </a:prstGeom>
+          <a:solidFill>
+            <a:schemeClr val="accent1"/>
+          </a:solidFill>
+        </p:spPr>
+      </p:pic>
+    </p:spTree>
+    <p:extLst>
+      <p:ext uri="{BB962C8B-B14F-4D97-AF65-F5344CB8AC3E}">
+        <p14:creationId xmlns:p14="http://schemas.microsoft.com/office/powerpoint/2010/main" val="414215793"/>
+      </p:ext>
+    </p:extLst>
+  </p:cSld>
+  <p:clrMapOvr>
+    <a:masterClrMapping/>
+  </p:clrMapOvr>
+</p:sld>
+</file>
+
+<file path=ppt/slides/slide15.xml><?xml version="1.0" encoding="utf-8"?>
+<p:sld xmlns:a="http://schemas.openxmlformats.org/drawingml/2006/main" xmlns:r="http://schemas.openxmlformats.org/officeDocument/2006/relationships" xmlns:p="http://schemas.openxmlformats.org/presentationml/2006/main">
+  <p:cSld>
+    <p:spTree>
+      <p:nvGrpSpPr>
+        <p:cNvPr id="1" name=""/>
+        <p:cNvGrpSpPr/>
+        <p:nvPr/>
+      </p:nvGrpSpPr>
+      <p:grpSpPr>
+        <a:xfrm>
+          <a:off x="0" y="0"/>
+          <a:ext cx="0" cy="0"/>
+          <a:chOff x="0" y="0"/>
+          <a:chExt cx="0" cy="0"/>
+        </a:xfrm>
+      </p:grpSpPr>
+      <p:sp>
+        <p:nvSpPr>
+          <p:cNvPr id="2" name="Title 1">
+            <a:extLst>
+              <a:ext uri="{FF2B5EF4-FFF2-40B4-BE49-F238E27FC236}">
+                <a16:creationId xmlns:a16="http://schemas.microsoft.com/office/drawing/2014/main" id="{9C347618-83BA-B560-ABCE-00B8D30A3601}"/>
+              </a:ext>
+            </a:extLst>
+          </p:cNvPr>
+          <p:cNvSpPr>
+            <a:spLocks noGrp="1"/>
+          </p:cNvSpPr>
+          <p:nvPr>
+            <p:ph type="title"/>
+          </p:nvPr>
+        </p:nvSpPr>
+        <p:spPr>
+          <a:xfrm>
+            <a:off x="593869" y="388999"/>
+            <a:ext cx="10571998" cy="970450"/>
+          </a:xfrm>
+        </p:spPr>
+        <p:txBody>
+          <a:bodyPr/>
+          <a:lstStyle/>
+          <a:p>
+            <a:r>
+              <a:rPr lang="en-US" dirty="0"/>
+              <a:t>Training pipeline validation with </a:t>
+            </a:r>
+            <a:r>
+              <a:rPr lang="en-US" dirty="0" err="1"/>
+              <a:t>Pandera</a:t>
+            </a:r>
+            <a:endParaRPr lang="en-US" dirty="0"/>
+          </a:p>
+        </p:txBody>
+      </p:sp>
+      <p:sp>
+        <p:nvSpPr>
+          <p:cNvPr id="3" name="Content Placeholder 2">
+            <a:extLst>
+              <a:ext uri="{FF2B5EF4-FFF2-40B4-BE49-F238E27FC236}">
+                <a16:creationId xmlns:a16="http://schemas.microsoft.com/office/drawing/2014/main" id="{0A1C0EED-D561-C72A-E01E-96DF19ECD0E2}"/>
+              </a:ext>
+            </a:extLst>
+          </p:cNvPr>
+          <p:cNvSpPr>
+            <a:spLocks noGrp="1"/>
+          </p:cNvSpPr>
+          <p:nvPr>
+            <p:ph idx="1"/>
+          </p:nvPr>
+        </p:nvSpPr>
+        <p:spPr/>
+        <p:txBody>
+          <a:bodyPr/>
+          <a:lstStyle/>
+          <a:p>
+            <a:r>
+              <a:rPr lang="en-US" dirty="0"/>
+              <a:t>Follow the instructions in the </a:t>
+            </a:r>
+            <a:r>
+              <a:rPr lang="en-US" dirty="0">
+                <a:hlinkClick r:id="rId2"/>
+              </a:rPr>
+              <a:t>notebook</a:t>
+            </a:r>
+            <a:r>
+              <a:rPr lang="en-US" dirty="0"/>
+              <a:t>.</a:t>
+            </a:r>
+          </a:p>
+        </p:txBody>
+      </p:sp>
+    </p:spTree>
+    <p:extLst>
+      <p:ext uri="{BB962C8B-B14F-4D97-AF65-F5344CB8AC3E}">
+        <p14:creationId xmlns:p14="http://schemas.microsoft.com/office/powerpoint/2010/main" val="3746632382"/>
+      </p:ext>
+    </p:extLst>
+  </p:cSld>
+  <p:clrMapOvr>
+    <a:masterClrMapping/>
+  </p:clrMapOvr>
+</p:sld>
+</file>
+
 <file path=ppt/slides/slide2.xml><?xml version="1.0" encoding="utf-8"?>
 <p:sld xmlns:a="http://schemas.openxmlformats.org/drawingml/2006/main" xmlns:r="http://schemas.openxmlformats.org/officeDocument/2006/relationships" xmlns:p="http://schemas.openxmlformats.org/presentationml/2006/main">
   <p:cSld>
@@ -6071,6 +7911,26 @@
               <a:rPr lang="en-US" dirty="0"/>
               <a:t>Other tools and concepts</a:t>
             </a:r>
+          </a:p>
+          <a:p>
+            <a:pPr marL="0" indent="0">
+              <a:buNone/>
+            </a:pPr>
+            <a:r>
+              <a:rPr lang="en-US" dirty="0"/>
+              <a:t>We will not cover</a:t>
+            </a:r>
+          </a:p>
+          <a:p>
+            <a:r>
+              <a:rPr lang="en-US" dirty="0"/>
+              <a:t>How to optimize your </a:t>
+            </a:r>
+            <a:r>
+              <a:rPr lang="en-US"/>
+              <a:t>validation dataset for deep learning models</a:t>
+            </a:r>
+            <a:endParaRPr lang="en-US" dirty="0"/>
           </a:p>
         </p:txBody>
       </p:sp>
@@ -6789,10 +8649,33 @@
             <a:off x="2020583" y="2624123"/>
             <a:ext cx="9398000" cy="3378200"/>
           </a:xfrm>
-          <a:prstGeom prst="rect">
-            <a:avLst/>
+          <a:prstGeom prst="roundRect">
+            <a:avLst>
+              <a:gd name="adj" fmla="val 16667"/>
+            </a:avLst>
           </a:prstGeom>
-          <a:noFill/>
+          <a:ln>
+            <a:noFill/>
+          </a:ln>
+          <a:effectLst>
+            <a:outerShdw blurRad="76200" dist="38100" dir="7800000" algn="tl" rotWithShape="0">
+              <a:srgbClr val="000000">
+                <a:alpha val="40000"/>
+              </a:srgbClr>
+            </a:outerShdw>
+          </a:effectLst>
+          <a:scene3d>
+            <a:camera prst="orthographicFront"/>
+            <a:lightRig rig="contrasting" dir="t">
+              <a:rot lat="0" lon="0" rev="4200000"/>
+            </a:lightRig>
+          </a:scene3d>
+          <a:sp3d prstMaterial="plastic">
+            <a:bevelT w="381000" h="114300" prst="relaxedInset"/>
+            <a:contourClr>
+              <a:srgbClr val="969696"/>
+            </a:contourClr>
+          </a:sp3d>
           <a:extLst>
             <a:ext uri="{909E8E84-426E-40DD-AFC4-6F175D3DCCD1}">
               <a14:hiddenFill xmlns:a14="http://schemas.microsoft.com/office/drawing/2010/main">
@@ -6839,7 +8722,7 @@
           <p:cNvPr id="2" name="Title 1">
             <a:extLst>
               <a:ext uri="{FF2B5EF4-FFF2-40B4-BE49-F238E27FC236}">
-                <a16:creationId xmlns:a16="http://schemas.microsoft.com/office/drawing/2014/main" id="{4AB31A7A-840B-1925-96BA-9215785820AF}"/>
+                <a16:creationId xmlns:a16="http://schemas.microsoft.com/office/drawing/2014/main" id="{E25DDF7A-5810-36DC-CC84-2FEF7A3A3986}"/>
               </a:ext>
             </a:extLst>
           </p:cNvPr>
@@ -6850,31 +8733,24 @@
             <p:ph type="title"/>
           </p:nvPr>
         </p:nvSpPr>
-        <p:spPr>
-          <a:xfrm>
-            <a:off x="814728" y="732575"/>
-            <a:ext cx="4852988" cy="1612110"/>
-          </a:xfrm>
-        </p:spPr>
-        <p:txBody>
-          <a:bodyPr>
-            <a:normAutofit/>
-          </a:bodyPr>
+        <p:spPr/>
+        <p:txBody>
+          <a:bodyPr/>
           <a:lstStyle/>
           <a:p>
             <a:r>
-              <a:rPr lang="en-US" sz="3200" dirty="0"/>
-              <a:t>Maintain Data Integrity</a:t>
-            </a:r>
-          </a:p>
-        </p:txBody>
-      </p:sp>
-      <p:sp>
-        <p:nvSpPr>
-          <p:cNvPr id="5" name="Picture Placeholder 4">
+              <a:rPr lang="en-US" dirty="0"/>
+              <a:t>1. Maintain data integrity</a:t>
+            </a:r>
+          </a:p>
+        </p:txBody>
+      </p:sp>
+      <p:sp>
+        <p:nvSpPr>
+          <p:cNvPr id="3" name="Text Placeholder 2">
             <a:extLst>
               <a:ext uri="{FF2B5EF4-FFF2-40B4-BE49-F238E27FC236}">
-                <a16:creationId xmlns:a16="http://schemas.microsoft.com/office/drawing/2014/main" id="{6AE7E405-F89C-DF98-B5F4-8F5C92E6F632}"/>
+                <a16:creationId xmlns:a16="http://schemas.microsoft.com/office/drawing/2014/main" id="{F506C454-FFEE-D6B1-B77E-6B688BF3B5AF}"/>
               </a:ext>
             </a:extLst>
           </p:cNvPr>
@@ -6882,17 +8758,24 @@
             <a:spLocks noGrp="1"/>
           </p:cNvSpPr>
           <p:nvPr>
-            <p:ph type="pic" sz="quarter" idx="13"/>
+            <p:ph type="body" idx="1"/>
           </p:nvPr>
         </p:nvSpPr>
         <p:spPr/>
+        <p:txBody>
+          <a:bodyPr/>
+          <a:lstStyle/>
+          <a:p>
+            <a:endParaRPr lang="en-US"/>
+          </a:p>
+        </p:txBody>
       </p:sp>
       <p:sp>
         <p:nvSpPr>
           <p:cNvPr id="4" name="Text Placeholder 3">
             <a:extLst>
               <a:ext uri="{FF2B5EF4-FFF2-40B4-BE49-F238E27FC236}">
-                <a16:creationId xmlns:a16="http://schemas.microsoft.com/office/drawing/2014/main" id="{F8BCE7C0-2CC5-06FF-387A-603A4B9D1061}"/>
+                <a16:creationId xmlns:a16="http://schemas.microsoft.com/office/drawing/2014/main" id="{8B62AD72-661B-1880-5BA7-28AE1EB43511}"/>
               </a:ext>
             </a:extLst>
           </p:cNvPr>
@@ -6900,75 +8783,31 @@
             <a:spLocks noGrp="1"/>
           </p:cNvSpPr>
           <p:nvPr>
-            <p:ph type="body" sz="half" idx="2"/>
-          </p:nvPr>
-        </p:nvSpPr>
-        <p:spPr>
-          <a:xfrm>
-            <a:off x="814728" y="2348917"/>
-            <a:ext cx="4852988" cy="1350628"/>
-          </a:xfrm>
-        </p:spPr>
-        <p:txBody>
-          <a:bodyPr>
-            <a:normAutofit fontScale="92500" lnSpcReduction="20000"/>
-          </a:bodyPr>
+            <p:ph type="body" sz="quarter" idx="16"/>
+          </p:nvPr>
+        </p:nvSpPr>
+        <p:spPr/>
+        <p:txBody>
+          <a:bodyPr/>
           <a:lstStyle/>
           <a:p>
-            <a:pPr marL="171450" indent="-171450" algn="l" defTabSz="457200" rtl="0" eaLnBrk="1" latinLnBrk="0" hangingPunct="1">
-              <a:spcBef>
-                <a:spcPct val="20000"/>
-              </a:spcBef>
-              <a:spcAft>
-                <a:spcPts val="600"/>
-              </a:spcAft>
-              <a:buClr>
-                <a:schemeClr val="accent1"/>
-              </a:buClr>
+            <a:pPr marL="285750" indent="-285750">
               <a:buFont typeface="Arial" panose="020B0604020202020204" pitchFamily="34" charset="0"/>
               <a:buChar char="•"/>
             </a:pPr>
             <a:r>
-              <a:rPr lang="en-US" sz="1600" dirty="0"/>
-              <a:t>Ensure system stability.</a:t>
-            </a:r>
-          </a:p>
-          <a:p>
-            <a:pPr marL="171450" indent="-171450" algn="l" defTabSz="457200" rtl="0" eaLnBrk="1" latinLnBrk="0" hangingPunct="1">
-              <a:spcBef>
-                <a:spcPct val="20000"/>
-              </a:spcBef>
-              <a:spcAft>
-                <a:spcPts val="600"/>
-              </a:spcAft>
-              <a:buClr>
-                <a:schemeClr val="accent1"/>
-              </a:buClr>
+              <a:rPr lang="en-US" dirty="0"/>
+              <a:t>If the database already has integrity rules in place, adding validation steps in the data science product pipelines helps align the integrity throughout the entire system.</a:t>
+            </a:r>
+          </a:p>
+          <a:p>
+            <a:pPr marL="285750" indent="-285750">
               <a:buFont typeface="Arial" panose="020B0604020202020204" pitchFamily="34" charset="0"/>
               <a:buChar char="•"/>
             </a:pPr>
             <a:r>
-              <a:rPr lang="en-US" sz="1600" dirty="0"/>
-              <a:t>Ensure system reliability.</a:t>
-            </a:r>
-          </a:p>
-          <a:p>
-            <a:pPr marL="171450" indent="-171450" algn="l" defTabSz="457200" rtl="0" eaLnBrk="1" latinLnBrk="0" hangingPunct="1">
-              <a:spcBef>
-                <a:spcPct val="20000"/>
-              </a:spcBef>
-              <a:spcAft>
-                <a:spcPts val="600"/>
-              </a:spcAft>
-              <a:buClr>
-                <a:schemeClr val="accent1"/>
-              </a:buClr>
-              <a:buFont typeface="Arial" panose="020B0604020202020204" pitchFamily="34" charset="0"/>
-              <a:buChar char="•"/>
-            </a:pPr>
-            <a:r>
-              <a:rPr lang="en-US" sz="1600" dirty="0"/>
-              <a:t>Align with the rest of the architecture by comparing downstream and upstream schemas.</a:t>
+              <a:rPr lang="en-US" dirty="0"/>
+              <a:t>This only relates to the logical integrity of the data, and not the physical one.</a:t>
             </a:r>
           </a:p>
         </p:txBody>
@@ -6976,7 +8815,7 @@
     </p:spTree>
     <p:extLst>
       <p:ext uri="{BB962C8B-B14F-4D97-AF65-F5344CB8AC3E}">
-        <p14:creationId xmlns:p14="http://schemas.microsoft.com/office/powerpoint/2010/main" val="3615451481"/>
+        <p14:creationId xmlns:p14="http://schemas.microsoft.com/office/powerpoint/2010/main" val="4030897301"/>
       </p:ext>
     </p:extLst>
   </p:cSld>
@@ -7221,4 +9060,299 @@
     </a:ext>
   </a:extLst>
 </a:theme>
+</file>
+
+<file path=ppt/theme/theme2.xml><?xml version="1.0" encoding="utf-8"?>
+<a:theme xmlns:a="http://schemas.openxmlformats.org/drawingml/2006/main" name="Office Theme">
+  <a:themeElements>
+    <a:clrScheme name="Office">
+      <a:dk1>
+        <a:sysClr val="windowText" lastClr="000000"/>
+      </a:dk1>
+      <a:lt1>
+        <a:sysClr val="window" lastClr="FFFFFF"/>
+      </a:lt1>
+      <a:dk2>
+        <a:srgbClr val="44546A"/>
+      </a:dk2>
+      <a:lt2>
+        <a:srgbClr val="E7E6E6"/>
+      </a:lt2>
+      <a:accent1>
+        <a:srgbClr val="4472C4"/>
+      </a:accent1>
+      <a:accent2>
+        <a:srgbClr val="ED7D31"/>
+      </a:accent2>
+      <a:accent3>
+        <a:srgbClr val="A5A5A5"/>
+      </a:accent3>
+      <a:accent4>
+        <a:srgbClr val="FFC000"/>
+      </a:accent4>
+      <a:accent5>
+        <a:srgbClr val="5B9BD5"/>
+      </a:accent5>
+      <a:accent6>
+        <a:srgbClr val="70AD47"/>
+      </a:accent6>
+      <a:hlink>
+        <a:srgbClr val="0563C1"/>
+      </a:hlink>
+      <a:folHlink>
+        <a:srgbClr val="954F72"/>
+      </a:folHlink>
+    </a:clrScheme>
+    <a:fontScheme name="Office">
+      <a:majorFont>
+        <a:latin typeface="Calibri Light" panose="020F0302020204030204"/>
+        <a:ea typeface=""/>
+        <a:cs typeface=""/>
+        <a:font script="Jpan" typeface="游ゴシック Light"/>
+        <a:font script="Hang" typeface="맑은 고딕"/>
+        <a:font script="Hans" typeface="等线 Light"/>
+        <a:font script="Hant" typeface="新細明體"/>
+        <a:font script="Arab" typeface="Times New Roman"/>
+        <a:font script="Hebr" typeface="Times New Roman"/>
+        <a:font script="Thai" typeface="Angsana New"/>
+        <a:font script="Ethi" typeface="Nyala"/>
+        <a:font script="Beng" typeface="Vrinda"/>
+        <a:font script="Gujr" typeface="Shruti"/>
+        <a:font script="Khmr" typeface="MoolBoran"/>
+        <a:font script="Knda" typeface="Tunga"/>
+        <a:font script="Guru" typeface="Raavi"/>
+        <a:font script="Cans" typeface="Euphemia"/>
+        <a:font script="Cher" typeface="Plantagenet Cherokee"/>
+        <a:font script="Yiii" typeface="Microsoft Yi Baiti"/>
+        <a:font script="Tibt" typeface="Microsoft Himalaya"/>
+        <a:font script="Thaa" typeface="MV Boli"/>
+        <a:font script="Deva" typeface="Mangal"/>
+        <a:font script="Telu" typeface="Gautami"/>
+        <a:font script="Taml" typeface="Latha"/>
+        <a:font script="Syrc" typeface="Estrangelo Edessa"/>
+        <a:font script="Orya" typeface="Kalinga"/>
+        <a:font script="Mlym" typeface="Kartika"/>
+        <a:font script="Laoo" typeface="DokChampa"/>
+        <a:font script="Sinh" typeface="Iskoola Pota"/>
+        <a:font script="Mong" typeface="Mongolian Baiti"/>
+        <a:font script="Viet" typeface="Times New Roman"/>
+        <a:font script="Uigh" typeface="Microsoft Uighur"/>
+        <a:font script="Geor" typeface="Sylfaen"/>
+        <a:font script="Armn" typeface="Arial"/>
+        <a:font script="Bugi" typeface="Leelawadee UI"/>
+        <a:font script="Bopo" typeface="Microsoft JhengHei"/>
+        <a:font script="Java" typeface="Javanese Text"/>
+        <a:font script="Lisu" typeface="Segoe UI"/>
+        <a:font script="Mymr" typeface="Myanmar Text"/>
+        <a:font script="Nkoo" typeface="Ebrima"/>
+        <a:font script="Olck" typeface="Nirmala UI"/>
+        <a:font script="Osma" typeface="Ebrima"/>
+        <a:font script="Phag" typeface="Phagspa"/>
+        <a:font script="Syrn" typeface="Estrangelo Edessa"/>
+        <a:font script="Syrj" typeface="Estrangelo Edessa"/>
+        <a:font script="Syre" typeface="Estrangelo Edessa"/>
+        <a:font script="Sora" typeface="Nirmala UI"/>
+        <a:font script="Tale" typeface="Microsoft Tai Le"/>
+        <a:font script="Talu" typeface="Microsoft New Tai Lue"/>
+        <a:font script="Tfng" typeface="Ebrima"/>
+      </a:majorFont>
+      <a:minorFont>
+        <a:latin typeface="Calibri" panose="020F0502020204030204"/>
+        <a:ea typeface=""/>
+        <a:cs typeface=""/>
+        <a:font script="Jpan" typeface="游ゴシック"/>
+        <a:font script="Hang" typeface="맑은 고딕"/>
+        <a:font script="Hans" typeface="等线"/>
+        <a:font script="Hant" typeface="新細明體"/>
+        <a:font script="Arab" typeface="Arial"/>
+        <a:font script="Hebr" typeface="Arial"/>
+        <a:font script="Thai" typeface="Cordia New"/>
+        <a:font script="Ethi" typeface="Nyala"/>
+        <a:font script="Beng" typeface="Vrinda"/>
+        <a:font script="Gujr" typeface="Shruti"/>
+        <a:font script="Khmr" typeface="DaunPenh"/>
+        <a:font script="Knda" typeface="Tunga"/>
+        <a:font script="Guru" typeface="Raavi"/>
+        <a:font script="Cans" typeface="Euphemia"/>
+        <a:font script="Cher" typeface="Plantagenet Cherokee"/>
+        <a:font script="Yiii" typeface="Microsoft Yi Baiti"/>
+        <a:font script="Tibt" typeface="Microsoft Himalaya"/>
+        <a:font script="Thaa" typeface="MV Boli"/>
+        <a:font script="Deva" typeface="Mangal"/>
+        <a:font script="Telu" typeface="Gautami"/>
+        <a:font script="Taml" typeface="Latha"/>
+        <a:font script="Syrc" typeface="Estrangelo Edessa"/>
+        <a:font script="Orya" typeface="Kalinga"/>
+        <a:font script="Mlym" typeface="Kartika"/>
+        <a:font script="Laoo" typeface="DokChampa"/>
+        <a:font script="Sinh" typeface="Iskoola Pota"/>
+        <a:font script="Mong" typeface="Mongolian Baiti"/>
+        <a:font script="Viet" typeface="Arial"/>
+        <a:font script="Uigh" typeface="Microsoft Uighur"/>
+        <a:font script="Geor" typeface="Sylfaen"/>
+        <a:font script="Armn" typeface="Arial"/>
+        <a:font script="Bugi" typeface="Leelawadee UI"/>
+        <a:font script="Bopo" typeface="Microsoft JhengHei"/>
+        <a:font script="Java" typeface="Javanese Text"/>
+        <a:font script="Lisu" typeface="Segoe UI"/>
+        <a:font script="Mymr" typeface="Myanmar Text"/>
+        <a:font script="Nkoo" typeface="Ebrima"/>
+        <a:font script="Olck" typeface="Nirmala UI"/>
+        <a:font script="Osma" typeface="Ebrima"/>
+        <a:font script="Phag" typeface="Phagspa"/>
+        <a:font script="Syrn" typeface="Estrangelo Edessa"/>
+        <a:font script="Syrj" typeface="Estrangelo Edessa"/>
+        <a:font script="Syre" typeface="Estrangelo Edessa"/>
+        <a:font script="Sora" typeface="Nirmala UI"/>
+        <a:font script="Tale" typeface="Microsoft Tai Le"/>
+        <a:font script="Talu" typeface="Microsoft New Tai Lue"/>
+        <a:font script="Tfng" typeface="Ebrima"/>
+      </a:minorFont>
+    </a:fontScheme>
+    <a:fmtScheme name="Office">
+      <a:fillStyleLst>
+        <a:solidFill>
+          <a:schemeClr val="phClr"/>
+        </a:solidFill>
+        <a:gradFill rotWithShape="1">
+          <a:gsLst>
+            <a:gs pos="0">
+              <a:schemeClr val="phClr">
+                <a:lumMod val="110000"/>
+                <a:satMod val="105000"/>
+                <a:tint val="67000"/>
+              </a:schemeClr>
+            </a:gs>
+            <a:gs pos="50000">
+              <a:schemeClr val="phClr">
+                <a:lumMod val="105000"/>
+                <a:satMod val="103000"/>
+                <a:tint val="73000"/>
+              </a:schemeClr>
+            </a:gs>
+            <a:gs pos="100000">
+              <a:schemeClr val="phClr">
+                <a:lumMod val="105000"/>
+                <a:satMod val="109000"/>
+                <a:tint val="81000"/>
+              </a:schemeClr>
+            </a:gs>
+          </a:gsLst>
+          <a:lin ang="5400000" scaled="0"/>
+        </a:gradFill>
+        <a:gradFill rotWithShape="1">
+          <a:gsLst>
+            <a:gs pos="0">
+              <a:schemeClr val="phClr">
+                <a:satMod val="103000"/>
+                <a:lumMod val="102000"/>
+                <a:tint val="94000"/>
+              </a:schemeClr>
+            </a:gs>
+            <a:gs pos="50000">
+              <a:schemeClr val="phClr">
+                <a:satMod val="110000"/>
+                <a:lumMod val="100000"/>
+                <a:shade val="100000"/>
+              </a:schemeClr>
+            </a:gs>
+            <a:gs pos="100000">
+              <a:schemeClr val="phClr">
+                <a:lumMod val="99000"/>
+                <a:satMod val="120000"/>
+                <a:shade val="78000"/>
+              </a:schemeClr>
+            </a:gs>
+          </a:gsLst>
+          <a:lin ang="5400000" scaled="0"/>
+        </a:gradFill>
+      </a:fillStyleLst>
+      <a:lnStyleLst>
+        <a:ln w="6350" cap="flat" cmpd="sng" algn="ctr">
+          <a:solidFill>
+            <a:schemeClr val="phClr"/>
+          </a:solidFill>
+          <a:prstDash val="solid"/>
+          <a:miter lim="800000"/>
+        </a:ln>
+        <a:ln w="12700" cap="flat" cmpd="sng" algn="ctr">
+          <a:solidFill>
+            <a:schemeClr val="phClr"/>
+          </a:solidFill>
+          <a:prstDash val="solid"/>
+          <a:miter lim="800000"/>
+        </a:ln>
+        <a:ln w="19050" cap="flat" cmpd="sng" algn="ctr">
+          <a:solidFill>
+            <a:schemeClr val="phClr"/>
+          </a:solidFill>
+          <a:prstDash val="solid"/>
+          <a:miter lim="800000"/>
+        </a:ln>
+      </a:lnStyleLst>
+      <a:effectStyleLst>
+        <a:effectStyle>
+          <a:effectLst/>
+        </a:effectStyle>
+        <a:effectStyle>
+          <a:effectLst/>
+        </a:effectStyle>
+        <a:effectStyle>
+          <a:effectLst>
+            <a:outerShdw blurRad="57150" dist="19050" dir="5400000" algn="ctr" rotWithShape="0">
+              <a:srgbClr val="000000">
+                <a:alpha val="63000"/>
+              </a:srgbClr>
+            </a:outerShdw>
+          </a:effectLst>
+        </a:effectStyle>
+      </a:effectStyleLst>
+      <a:bgFillStyleLst>
+        <a:solidFill>
+          <a:schemeClr val="phClr"/>
+        </a:solidFill>
+        <a:solidFill>
+          <a:schemeClr val="phClr">
+            <a:tint val="95000"/>
+            <a:satMod val="170000"/>
+          </a:schemeClr>
+        </a:solidFill>
+        <a:gradFill rotWithShape="1">
+          <a:gsLst>
+            <a:gs pos="0">
+              <a:schemeClr val="phClr">
+                <a:tint val="93000"/>
+                <a:satMod val="150000"/>
+                <a:shade val="98000"/>
+                <a:lumMod val="102000"/>
+              </a:schemeClr>
+            </a:gs>
+            <a:gs pos="50000">
+              <a:schemeClr val="phClr">
+                <a:tint val="98000"/>
+                <a:satMod val="130000"/>
+                <a:shade val="90000"/>
+                <a:lumMod val="103000"/>
+              </a:schemeClr>
+            </a:gs>
+            <a:gs pos="100000">
+              <a:schemeClr val="phClr">
+                <a:shade val="63000"/>
+                <a:satMod val="120000"/>
+              </a:schemeClr>
+            </a:gs>
+          </a:gsLst>
+          <a:lin ang="5400000" scaled="0"/>
+        </a:gradFill>
+      </a:bgFillStyleLst>
+    </a:fmtScheme>
+  </a:themeElements>
+  <a:objectDefaults/>
+  <a:extraClrSchemeLst/>
+  <a:extLst>
+    <a:ext uri="{05A4C25C-085E-4340-85A3-A5531E510DB2}">
+      <thm15:themeFamily xmlns:thm15="http://schemas.microsoft.com/office/thememl/2012/main" name="Office Theme" id="{62F939B6-93AF-4DB8-9C6B-D6C7DFDC589F}" vid="{4A3C46E8-61CC-4603-A589-7422A47A8E4A}"/>
+    </a:ext>
+  </a:extLst>
+</a:theme>
 </file>
</xml_diff>

<commit_message>
Fixed Python version to 3.8
</commit_message>
<xml_diff>
--- a/Data Validation for Data Science.pptx
+++ b/Data Validation for Data Science.pptx
@@ -7372,10 +7372,36 @@
             <p:ph idx="1"/>
           </p:nvPr>
         </p:nvSpPr>
-        <p:spPr/>
+        <p:spPr>
+          <a:xfrm>
+            <a:off x="593869" y="2752966"/>
+            <a:ext cx="10554574" cy="3636511"/>
+          </a:xfrm>
+        </p:spPr>
         <p:txBody>
           <a:bodyPr/>
           <a:lstStyle/>
+          <a:p>
+            <a:endParaRPr lang="en-US" dirty="0"/>
+          </a:p>
+          <a:p>
+            <a:endParaRPr lang="en-US" dirty="0"/>
+          </a:p>
+          <a:p>
+            <a:endParaRPr lang="en-US" dirty="0"/>
+          </a:p>
+          <a:p>
+            <a:endParaRPr lang="en-US" dirty="0"/>
+          </a:p>
+          <a:p>
+            <a:endParaRPr lang="en-US" dirty="0"/>
+          </a:p>
+          <a:p>
+            <a:endParaRPr lang="en-US" dirty="0"/>
+          </a:p>
+          <a:p>
+            <a:endParaRPr lang="en-US" dirty="0"/>
+          </a:p>
           <a:p>
             <a:r>
               <a:rPr lang="en-US" dirty="0"/>
@@ -7394,6 +7420,117 @@
           </a:p>
         </p:txBody>
       </p:sp>
+      <p:pic>
+        <p:nvPicPr>
+          <p:cNvPr id="4" name="Picture 2">
+            <a:extLst>
+              <a:ext uri="{FF2B5EF4-FFF2-40B4-BE49-F238E27FC236}">
+                <a16:creationId xmlns:a16="http://schemas.microsoft.com/office/drawing/2014/main" id="{6EF3906A-50BB-ECE3-FC7D-319DC91C7460}"/>
+              </a:ext>
+            </a:extLst>
+          </p:cNvPr>
+          <p:cNvPicPr>
+            <a:picLocks noChangeAspect="1" noChangeArrowheads="1"/>
+          </p:cNvPicPr>
+          <p:nvPr/>
+        </p:nvPicPr>
+        <p:blipFill>
+          <a:blip r:embed="rId3">
+            <a:extLst>
+              <a:ext uri="{28A0092B-C50C-407E-A947-70E740481C1C}">
+                <a14:useLocalDpi xmlns:a14="http://schemas.microsoft.com/office/drawing/2010/main" val="0"/>
+              </a:ext>
+            </a:extLst>
+          </a:blip>
+          <a:srcRect/>
+          <a:stretch>
+            <a:fillRect/>
+          </a:stretch>
+        </p:blipFill>
+        <p:spPr bwMode="auto">
+          <a:xfrm>
+            <a:off x="4147456" y="2260550"/>
+            <a:ext cx="6918432" cy="3155920"/>
+          </a:xfrm>
+          <a:prstGeom prst="roundRect">
+            <a:avLst>
+              <a:gd name="adj" fmla="val 16667"/>
+            </a:avLst>
+          </a:prstGeom>
+          <a:ln>
+            <a:noFill/>
+          </a:ln>
+          <a:effectLst>
+            <a:outerShdw blurRad="76200" dist="38100" dir="7800000" algn="tl" rotWithShape="0">
+              <a:srgbClr val="000000">
+                <a:alpha val="40000"/>
+              </a:srgbClr>
+            </a:outerShdw>
+          </a:effectLst>
+          <a:scene3d>
+            <a:camera prst="orthographicFront"/>
+            <a:lightRig rig="contrasting" dir="t">
+              <a:rot lat="0" lon="0" rev="4200000"/>
+            </a:lightRig>
+          </a:scene3d>
+          <a:sp3d prstMaterial="plastic">
+            <a:bevelT w="381000" h="114300" prst="relaxedInset"/>
+            <a:contourClr>
+              <a:srgbClr val="969696"/>
+            </a:contourClr>
+          </a:sp3d>
+          <a:extLst>
+            <a:ext uri="{909E8E84-426E-40DD-AFC4-6F175D3DCCD1}">
+              <a14:hiddenFill xmlns:a14="http://schemas.microsoft.com/office/drawing/2010/main">
+                <a:solidFill>
+                  <a:srgbClr val="FFFFFF"/>
+                </a:solidFill>
+              </a14:hiddenFill>
+            </a:ext>
+          </a:extLst>
+        </p:spPr>
+      </p:pic>
+      <p:cxnSp>
+        <p:nvCxnSpPr>
+          <p:cNvPr id="6" name="Straight Arrow Connector 5">
+            <a:extLst>
+              <a:ext uri="{FF2B5EF4-FFF2-40B4-BE49-F238E27FC236}">
+                <a16:creationId xmlns:a16="http://schemas.microsoft.com/office/drawing/2014/main" id="{3B5D8D21-834D-3457-CEDF-174B85293B83}"/>
+              </a:ext>
+            </a:extLst>
+          </p:cNvPr>
+          <p:cNvCxnSpPr>
+            <a:cxnSpLocks/>
+          </p:cNvCxnSpPr>
+          <p:nvPr/>
+        </p:nvCxnSpPr>
+        <p:spPr>
+          <a:xfrm flipV="1">
+            <a:off x="7266214" y="3788229"/>
+            <a:ext cx="627236" cy="2073728"/>
+          </a:xfrm>
+          <a:prstGeom prst="straightConnector1">
+            <a:avLst/>
+          </a:prstGeom>
+          <a:ln w="76200">
+            <a:tailEnd type="triangle"/>
+          </a:ln>
+        </p:spPr>
+        <p:style>
+          <a:lnRef idx="1">
+            <a:schemeClr val="accent5"/>
+          </a:lnRef>
+          <a:fillRef idx="0">
+            <a:schemeClr val="accent5"/>
+          </a:fillRef>
+          <a:effectRef idx="0">
+            <a:schemeClr val="accent5"/>
+          </a:effectRef>
+          <a:fontRef idx="minor">
+            <a:schemeClr val="tx1"/>
+          </a:fontRef>
+        </p:style>
+      </p:cxnSp>
     </p:spTree>
     <p:extLst>
       <p:ext uri="{BB962C8B-B14F-4D97-AF65-F5344CB8AC3E}">
@@ -7924,13 +8061,8 @@
           <a:p>
             <a:r>
               <a:rPr lang="en-US" dirty="0"/>
-              <a:t>How to optimize your </a:t>
-            </a:r>
-            <a:r>
-              <a:rPr lang="en-US"/>
-              <a:t>validation dataset for deep learning models</a:t>
-            </a:r>
-            <a:endParaRPr lang="en-US" dirty="0"/>
+              <a:t>How to optimize your validation dataset for deep learning models</a:t>
+            </a:r>
           </a:p>
         </p:txBody>
       </p:sp>
@@ -8020,7 +8152,7 @@
           <a:p>
             <a:r>
               <a:rPr lang="en-US" dirty="0"/>
-              <a:t>Environment requirements: Python 3.7 and up with </a:t>
+              <a:t>Environment requirements: Python 3.8 and up with </a:t>
             </a:r>
             <a:r>
               <a:rPr lang="en-US" dirty="0" err="1"/>

</xml_diff>

<commit_message>
Almost finished the database_data_validation.ipynb notebook. Still need to figure out how to validate the data
</commit_message>
<xml_diff>
--- a/Data Validation for Data Science.pptx
+++ b/Data Validation for Data Science.pptx
@@ -225,7 +225,7 @@
           <a:p>
             <a:fld id="{F9CD045C-CD78-304F-BD19-120FB2F86E8F}" type="datetimeFigureOut">
               <a:rPr lang="en-US" smtClean="0"/>
-              <a:t>5/27/22</a:t>
+              <a:t>5/31/22</a:t>
             </a:fld>
             <a:endParaRPr lang="en-US"/>
           </a:p>
@@ -683,7 +683,7 @@
           <a:effectLst/>
           <a:extLst>
             <a:ext uri="{91240B29-F687-4f45-9708-019B960494DF}">
-              <a14:hiddenLine xmlns:a14="http://schemas.microsoft.com/office/drawing/2010/main" xmlns="" w="9525">
+              <a14:hiddenLine xmlns="" xmlns:a14="http://schemas.microsoft.com/office/drawing/2010/main" w="9525">
                 <a:solidFill>
                   <a:srgbClr val="000000"/>
                 </a:solidFill>
@@ -876,7 +876,7 @@
             <a:fld id="{08B9EBBA-996F-894A-B54A-D6246ED52CEA}" type="datetimeFigureOut">
               <a:rPr lang="en-US" dirty="0"/>
               <a:pPr/>
-              <a:t>5/27/22</a:t>
+              <a:t>5/31/22</a:t>
             </a:fld>
             <a:endParaRPr lang="en-US" dirty="0"/>
           </a:p>
@@ -1191,7 +1191,7 @@
             <a:fld id="{18C79C5D-2A6F-F04D-97DA-BEF2467B64E4}" type="datetimeFigureOut">
               <a:rPr lang="en-US" dirty="0"/>
               <a:pPr/>
-              <a:t>5/27/22</a:t>
+              <a:t>5/31/22</a:t>
             </a:fld>
             <a:endParaRPr lang="en-US" dirty="0"/>
           </a:p>
@@ -1676,7 +1676,7 @@
             <a:fld id="{8DFA1846-DA80-1C48-A609-854EA85C59AD}" type="datetimeFigureOut">
               <a:rPr lang="en-US" dirty="0"/>
               <a:pPr/>
-              <a:t>5/27/22</a:t>
+              <a:t>5/31/22</a:t>
             </a:fld>
             <a:endParaRPr lang="en-US" dirty="0"/>
           </a:p>
@@ -2042,7 +2042,7 @@
             <a:fld id="{FBF54567-0DE4-3F47-BF90-CB84690072F9}" type="datetimeFigureOut">
               <a:rPr lang="en-US" dirty="0"/>
               <a:pPr/>
-              <a:t>5/27/22</a:t>
+              <a:t>5/31/22</a:t>
             </a:fld>
             <a:endParaRPr lang="en-US" dirty="0"/>
           </a:p>
@@ -2193,7 +2193,7 @@
           <a:ln/>
           <a:extLst>
             <a:ext uri="{91240B29-F687-4f45-9708-019B960494DF}">
-              <a14:hiddenLine xmlns:a14="http://schemas.microsoft.com/office/drawing/2010/main" xmlns="" w="9525">
+              <a14:hiddenLine xmlns="" xmlns:a14="http://schemas.microsoft.com/office/drawing/2010/main" w="9525">
                 <a:solidFill>
                   <a:srgbClr val="000000"/>
                 </a:solidFill>
@@ -2312,7 +2312,7 @@
             <a:fld id="{C6C52C72-DE31-F449-A4ED-4C594FD91407}" type="datetimeFigureOut">
               <a:rPr lang="en-US" dirty="0"/>
               <a:pPr/>
-              <a:t>5/27/22</a:t>
+              <a:t>5/31/22</a:t>
             </a:fld>
             <a:endParaRPr lang="en-US" dirty="0"/>
           </a:p>
@@ -2465,7 +2465,7 @@
           <a:ln/>
           <a:extLst>
             <a:ext uri="{91240B29-F687-4f45-9708-019B960494DF}">
-              <a14:hiddenLine xmlns:a14="http://schemas.microsoft.com/office/drawing/2010/main" xmlns="" w="9525">
+              <a14:hiddenLine xmlns="" xmlns:a14="http://schemas.microsoft.com/office/drawing/2010/main" w="9525">
                 <a:solidFill>
                   <a:srgbClr val="000000"/>
                 </a:solidFill>
@@ -2594,7 +2594,7 @@
             <a:fld id="{ED62726E-379B-B349-9EED-81ED093FA806}" type="datetimeFigureOut">
               <a:rPr lang="en-US" dirty="0"/>
               <a:pPr/>
-              <a:t>5/27/22</a:t>
+              <a:t>5/31/22</a:t>
             </a:fld>
             <a:endParaRPr lang="en-US" dirty="0"/>
           </a:p>
@@ -2745,7 +2745,7 @@
           <a:ln/>
           <a:extLst>
             <a:ext uri="{91240B29-F687-4f45-9708-019B960494DF}">
-              <a14:hiddenLine xmlns:a14="http://schemas.microsoft.com/office/drawing/2010/main" xmlns="" w="9525">
+              <a14:hiddenLine xmlns="" xmlns:a14="http://schemas.microsoft.com/office/drawing/2010/main" w="9525">
                 <a:solidFill>
                   <a:srgbClr val="000000"/>
                 </a:solidFill>
@@ -2874,7 +2874,7 @@
             <a:fld id="{9B3A1323-8D79-1946-B0D7-40001CF92E9D}" type="datetimeFigureOut">
               <a:rPr lang="en-US" dirty="0"/>
               <a:pPr/>
-              <a:t>5/27/22</a:t>
+              <a:t>5/31/22</a:t>
             </a:fld>
             <a:endParaRPr lang="en-US" dirty="0"/>
           </a:p>
@@ -3214,7 +3214,7 @@
             <a:fld id="{8DFA1846-DA80-1C48-A609-854EA85C59AD}" type="datetimeFigureOut">
               <a:rPr lang="en-US" dirty="0"/>
               <a:pPr/>
-              <a:t>5/27/22</a:t>
+              <a:t>5/31/22</a:t>
             </a:fld>
             <a:endParaRPr lang="en-US" dirty="0"/>
           </a:p>
@@ -3365,7 +3365,7 @@
           <a:ln/>
           <a:extLst>
             <a:ext uri="{91240B29-F687-4f45-9708-019B960494DF}">
-              <a14:hiddenLine xmlns:a14="http://schemas.microsoft.com/office/drawing/2010/main" xmlns="" w="9525">
+              <a14:hiddenLine xmlns="" xmlns:a14="http://schemas.microsoft.com/office/drawing/2010/main" w="9525">
                 <a:solidFill>
                   <a:srgbClr val="000000"/>
                 </a:solidFill>
@@ -3550,7 +3550,7 @@
             <a:fld id="{57302355-E14B-8545-A8F8-0FE83CC9D524}" type="datetimeFigureOut">
               <a:rPr lang="en-US" dirty="0"/>
               <a:pPr/>
-              <a:t>5/27/22</a:t>
+              <a:t>5/31/22</a:t>
             </a:fld>
             <a:endParaRPr lang="en-US" dirty="0"/>
           </a:p>
@@ -3701,7 +3701,7 @@
           <a:ln/>
           <a:extLst>
             <a:ext uri="{91240B29-F687-4f45-9708-019B960494DF}">
-              <a14:hiddenLine xmlns:a14="http://schemas.microsoft.com/office/drawing/2010/main" xmlns="" w="9525">
+              <a14:hiddenLine xmlns="" xmlns:a14="http://schemas.microsoft.com/office/drawing/2010/main" w="9525">
                 <a:solidFill>
                   <a:srgbClr val="000000"/>
                 </a:solidFill>
@@ -4024,7 +4024,7 @@
             <a:fld id="{02640F58-564D-2B4F-AE67-E407BA4FCF45}" type="datetimeFigureOut">
               <a:rPr lang="en-US" dirty="0"/>
               <a:pPr/>
-              <a:t>5/27/22</a:t>
+              <a:t>5/31/22</a:t>
             </a:fld>
             <a:endParaRPr lang="en-US" dirty="0"/>
           </a:p>
@@ -4175,7 +4175,7 @@
           <a:ln/>
           <a:extLst>
             <a:ext uri="{91240B29-F687-4f45-9708-019B960494DF}">
-              <a14:hiddenLine xmlns:a14="http://schemas.microsoft.com/office/drawing/2010/main" xmlns="" w="9525">
+              <a14:hiddenLine xmlns="" xmlns:a14="http://schemas.microsoft.com/office/drawing/2010/main" w="9525">
                 <a:solidFill>
                   <a:srgbClr val="000000"/>
                 </a:solidFill>
@@ -4242,7 +4242,7 @@
             <a:fld id="{F13A34C8-038E-2045-AF43-DF7DBB8E0E9E}" type="datetimeFigureOut">
               <a:rPr lang="en-US" dirty="0"/>
               <a:pPr/>
-              <a:t>5/27/22</a:t>
+              <a:t>5/31/22</a:t>
             </a:fld>
             <a:endParaRPr lang="en-US" dirty="0"/>
           </a:p>
@@ -4334,7 +4334,7 @@
             <a:fld id="{8818C68F-D26B-8F47-958C-23B49CF8A634}" type="datetimeFigureOut">
               <a:rPr lang="en-US" dirty="0"/>
               <a:pPr/>
-              <a:t>5/27/22</a:t>
+              <a:t>5/31/22</a:t>
             </a:fld>
             <a:endParaRPr lang="en-US" dirty="0"/>
           </a:p>
@@ -4598,7 +4598,7 @@
           <a:ln/>
           <a:extLst>
             <a:ext uri="{91240B29-F687-4f45-9708-019B960494DF}">
-              <a14:hiddenLine xmlns:a14="http://schemas.microsoft.com/office/drawing/2010/main" xmlns="" w="9525">
+              <a14:hiddenLine xmlns="" xmlns:a14="http://schemas.microsoft.com/office/drawing/2010/main" w="9525">
                 <a:solidFill>
                   <a:srgbClr val="000000"/>
                 </a:solidFill>
@@ -4798,7 +4798,7 @@
             <a:fld id="{D0DF5E60-9974-AC48-9591-99C2BB44B7CF}" type="datetimeFigureOut">
               <a:rPr lang="en-US" dirty="0"/>
               <a:pPr/>
-              <a:t>5/27/22</a:t>
+              <a:t>5/31/22</a:t>
             </a:fld>
             <a:endParaRPr lang="en-US" dirty="0"/>
           </a:p>
@@ -5108,7 +5108,7 @@
             <a:fld id="{18C79C5D-2A6F-F04D-97DA-BEF2467B64E4}" type="datetimeFigureOut">
               <a:rPr lang="en-US" dirty="0"/>
               <a:pPr/>
-              <a:t>5/27/22</a:t>
+              <a:t>5/31/22</a:t>
             </a:fld>
             <a:endParaRPr lang="en-US" dirty="0"/>
           </a:p>
@@ -5375,7 +5375,7 @@
             <a:fld id="{09B482E8-6E0E-1B4F-B1FD-C69DB9E858D9}" type="datetimeFigureOut">
               <a:rPr lang="en-US" dirty="0"/>
               <a:pPr/>
-              <a:t>5/27/22</a:t>
+              <a:t>5/31/22</a:t>
             </a:fld>
             <a:endParaRPr lang="en-US" dirty="0"/>
           </a:p>
@@ -8743,7 +8743,7 @@
         <p:spPr>
           <a:xfrm>
             <a:off x="593868" y="468523"/>
-            <a:ext cx="10929189" cy="970450"/>
+            <a:ext cx="11309957" cy="970450"/>
           </a:xfrm>
         </p:spPr>
         <p:txBody>
@@ -8752,7 +8752,7 @@
           <a:p>
             <a:r>
               <a:rPr lang="en-US" dirty="0"/>
-              <a:t>Datasets validation with Great Expectations</a:t>
+              <a:t>Database validation with Great Expectations</a:t>
             </a:r>
           </a:p>
         </p:txBody>

</xml_diff>

<commit_message>
Minor fixes to notebooks, presentation and README.md file
</commit_message>
<xml_diff>
--- a/Data Validation for Data Science.pptx
+++ b/Data Validation for Data Science.pptx
@@ -5,7 +5,7 @@
     <p:sldMasterId id="2147483648" r:id="rId1"/>
   </p:sldMasterIdLst>
   <p:notesMasterIdLst>
-    <p:notesMasterId r:id="rId19"/>
+    <p:notesMasterId r:id="rId21"/>
   </p:notesMasterIdLst>
   <p:sldIdLst>
     <p:sldId id="256" r:id="rId2"/>
@@ -15,16 +15,18 @@
     <p:sldId id="257" r:id="rId6"/>
     <p:sldId id="262" r:id="rId7"/>
     <p:sldId id="265" r:id="rId8"/>
-    <p:sldId id="263" r:id="rId9"/>
-    <p:sldId id="266" r:id="rId10"/>
-    <p:sldId id="267" r:id="rId11"/>
-    <p:sldId id="269" r:id="rId12"/>
-    <p:sldId id="270" r:id="rId13"/>
-    <p:sldId id="268" r:id="rId14"/>
-    <p:sldId id="272" r:id="rId15"/>
-    <p:sldId id="271" r:id="rId16"/>
-    <p:sldId id="273" r:id="rId17"/>
-    <p:sldId id="274" r:id="rId18"/>
+    <p:sldId id="275" r:id="rId9"/>
+    <p:sldId id="263" r:id="rId10"/>
+    <p:sldId id="266" r:id="rId11"/>
+    <p:sldId id="267" r:id="rId12"/>
+    <p:sldId id="269" r:id="rId13"/>
+    <p:sldId id="270" r:id="rId14"/>
+    <p:sldId id="268" r:id="rId15"/>
+    <p:sldId id="272" r:id="rId16"/>
+    <p:sldId id="274" r:id="rId17"/>
+    <p:sldId id="271" r:id="rId18"/>
+    <p:sldId id="273" r:id="rId19"/>
+    <p:sldId id="277" r:id="rId20"/>
   </p:sldIdLst>
   <p:sldSz cx="12192000" cy="6858000"/>
   <p:notesSz cx="6858000" cy="9144000"/>
@@ -225,7 +227,7 @@
           <a:p>
             <a:fld id="{F9CD045C-CD78-304F-BD19-120FB2F86E8F}" type="datetimeFigureOut">
               <a:rPr lang="en-US" smtClean="0"/>
-              <a:t>5/31/22</a:t>
+              <a:t>6/2/22</a:t>
             </a:fld>
             <a:endParaRPr lang="en-US"/>
           </a:p>
@@ -569,7 +571,7 @@
           <a:p>
             <a:fld id="{B2F75C95-52CA-1D4F-85E2-662E67122696}" type="slidenum">
               <a:rPr lang="en-US" smtClean="0"/>
-              <a:t>13</a:t>
+              <a:t>14</a:t>
             </a:fld>
             <a:endParaRPr lang="en-US"/>
           </a:p>
@@ -683,7 +685,7 @@
           <a:effectLst/>
           <a:extLst>
             <a:ext uri="{91240B29-F687-4f45-9708-019B960494DF}">
-              <a14:hiddenLine xmlns="" xmlns:a14="http://schemas.microsoft.com/office/drawing/2010/main" w="9525">
+              <a14:hiddenLine xmlns:a14="http://schemas.microsoft.com/office/drawing/2010/main" xmlns="" w="9525">
                 <a:solidFill>
                   <a:srgbClr val="000000"/>
                 </a:solidFill>
@@ -876,7 +878,7 @@
             <a:fld id="{08B9EBBA-996F-894A-B54A-D6246ED52CEA}" type="datetimeFigureOut">
               <a:rPr lang="en-US" dirty="0"/>
               <a:pPr/>
-              <a:t>5/31/22</a:t>
+              <a:t>6/2/22</a:t>
             </a:fld>
             <a:endParaRPr lang="en-US" dirty="0"/>
           </a:p>
@@ -1191,7 +1193,7 @@
             <a:fld id="{18C79C5D-2A6F-F04D-97DA-BEF2467B64E4}" type="datetimeFigureOut">
               <a:rPr lang="en-US" dirty="0"/>
               <a:pPr/>
-              <a:t>5/31/22</a:t>
+              <a:t>6/2/22</a:t>
             </a:fld>
             <a:endParaRPr lang="en-US" dirty="0"/>
           </a:p>
@@ -1676,7 +1678,7 @@
             <a:fld id="{8DFA1846-DA80-1C48-A609-854EA85C59AD}" type="datetimeFigureOut">
               <a:rPr lang="en-US" dirty="0"/>
               <a:pPr/>
-              <a:t>5/31/22</a:t>
+              <a:t>6/2/22</a:t>
             </a:fld>
             <a:endParaRPr lang="en-US" dirty="0"/>
           </a:p>
@@ -2042,7 +2044,7 @@
             <a:fld id="{FBF54567-0DE4-3F47-BF90-CB84690072F9}" type="datetimeFigureOut">
               <a:rPr lang="en-US" dirty="0"/>
               <a:pPr/>
-              <a:t>5/31/22</a:t>
+              <a:t>6/2/22</a:t>
             </a:fld>
             <a:endParaRPr lang="en-US" dirty="0"/>
           </a:p>
@@ -2193,7 +2195,7 @@
           <a:ln/>
           <a:extLst>
             <a:ext uri="{91240B29-F687-4f45-9708-019B960494DF}">
-              <a14:hiddenLine xmlns="" xmlns:a14="http://schemas.microsoft.com/office/drawing/2010/main" w="9525">
+              <a14:hiddenLine xmlns:a14="http://schemas.microsoft.com/office/drawing/2010/main" xmlns="" w="9525">
                 <a:solidFill>
                   <a:srgbClr val="000000"/>
                 </a:solidFill>
@@ -2312,7 +2314,7 @@
             <a:fld id="{C6C52C72-DE31-F449-A4ED-4C594FD91407}" type="datetimeFigureOut">
               <a:rPr lang="en-US" dirty="0"/>
               <a:pPr/>
-              <a:t>5/31/22</a:t>
+              <a:t>6/2/22</a:t>
             </a:fld>
             <a:endParaRPr lang="en-US" dirty="0"/>
           </a:p>
@@ -2465,7 +2467,7 @@
           <a:ln/>
           <a:extLst>
             <a:ext uri="{91240B29-F687-4f45-9708-019B960494DF}">
-              <a14:hiddenLine xmlns="" xmlns:a14="http://schemas.microsoft.com/office/drawing/2010/main" w="9525">
+              <a14:hiddenLine xmlns:a14="http://schemas.microsoft.com/office/drawing/2010/main" xmlns="" w="9525">
                 <a:solidFill>
                   <a:srgbClr val="000000"/>
                 </a:solidFill>
@@ -2594,7 +2596,7 @@
             <a:fld id="{ED62726E-379B-B349-9EED-81ED093FA806}" type="datetimeFigureOut">
               <a:rPr lang="en-US" dirty="0"/>
               <a:pPr/>
-              <a:t>5/31/22</a:t>
+              <a:t>6/2/22</a:t>
             </a:fld>
             <a:endParaRPr lang="en-US" dirty="0"/>
           </a:p>
@@ -2745,7 +2747,7 @@
           <a:ln/>
           <a:extLst>
             <a:ext uri="{91240B29-F687-4f45-9708-019B960494DF}">
-              <a14:hiddenLine xmlns="" xmlns:a14="http://schemas.microsoft.com/office/drawing/2010/main" w="9525">
+              <a14:hiddenLine xmlns:a14="http://schemas.microsoft.com/office/drawing/2010/main" xmlns="" w="9525">
                 <a:solidFill>
                   <a:srgbClr val="000000"/>
                 </a:solidFill>
@@ -2874,7 +2876,7 @@
             <a:fld id="{9B3A1323-8D79-1946-B0D7-40001CF92E9D}" type="datetimeFigureOut">
               <a:rPr lang="en-US" dirty="0"/>
               <a:pPr/>
-              <a:t>5/31/22</a:t>
+              <a:t>6/2/22</a:t>
             </a:fld>
             <a:endParaRPr lang="en-US" dirty="0"/>
           </a:p>
@@ -3214,7 +3216,7 @@
             <a:fld id="{8DFA1846-DA80-1C48-A609-854EA85C59AD}" type="datetimeFigureOut">
               <a:rPr lang="en-US" dirty="0"/>
               <a:pPr/>
-              <a:t>5/31/22</a:t>
+              <a:t>6/2/22</a:t>
             </a:fld>
             <a:endParaRPr lang="en-US" dirty="0"/>
           </a:p>
@@ -3365,7 +3367,7 @@
           <a:ln/>
           <a:extLst>
             <a:ext uri="{91240B29-F687-4f45-9708-019B960494DF}">
-              <a14:hiddenLine xmlns="" xmlns:a14="http://schemas.microsoft.com/office/drawing/2010/main" w="9525">
+              <a14:hiddenLine xmlns:a14="http://schemas.microsoft.com/office/drawing/2010/main" xmlns="" w="9525">
                 <a:solidFill>
                   <a:srgbClr val="000000"/>
                 </a:solidFill>
@@ -3550,7 +3552,7 @@
             <a:fld id="{57302355-E14B-8545-A8F8-0FE83CC9D524}" type="datetimeFigureOut">
               <a:rPr lang="en-US" dirty="0"/>
               <a:pPr/>
-              <a:t>5/31/22</a:t>
+              <a:t>6/2/22</a:t>
             </a:fld>
             <a:endParaRPr lang="en-US" dirty="0"/>
           </a:p>
@@ -3701,7 +3703,7 @@
           <a:ln/>
           <a:extLst>
             <a:ext uri="{91240B29-F687-4f45-9708-019B960494DF}">
-              <a14:hiddenLine xmlns="" xmlns:a14="http://schemas.microsoft.com/office/drawing/2010/main" w="9525">
+              <a14:hiddenLine xmlns:a14="http://schemas.microsoft.com/office/drawing/2010/main" xmlns="" w="9525">
                 <a:solidFill>
                   <a:srgbClr val="000000"/>
                 </a:solidFill>
@@ -4024,7 +4026,7 @@
             <a:fld id="{02640F58-564D-2B4F-AE67-E407BA4FCF45}" type="datetimeFigureOut">
               <a:rPr lang="en-US" dirty="0"/>
               <a:pPr/>
-              <a:t>5/31/22</a:t>
+              <a:t>6/2/22</a:t>
             </a:fld>
             <a:endParaRPr lang="en-US" dirty="0"/>
           </a:p>
@@ -4175,7 +4177,7 @@
           <a:ln/>
           <a:extLst>
             <a:ext uri="{91240B29-F687-4f45-9708-019B960494DF}">
-              <a14:hiddenLine xmlns="" xmlns:a14="http://schemas.microsoft.com/office/drawing/2010/main" w="9525">
+              <a14:hiddenLine xmlns:a14="http://schemas.microsoft.com/office/drawing/2010/main" xmlns="" w="9525">
                 <a:solidFill>
                   <a:srgbClr val="000000"/>
                 </a:solidFill>
@@ -4242,7 +4244,7 @@
             <a:fld id="{F13A34C8-038E-2045-AF43-DF7DBB8E0E9E}" type="datetimeFigureOut">
               <a:rPr lang="en-US" dirty="0"/>
               <a:pPr/>
-              <a:t>5/31/22</a:t>
+              <a:t>6/2/22</a:t>
             </a:fld>
             <a:endParaRPr lang="en-US" dirty="0"/>
           </a:p>
@@ -4334,7 +4336,7 @@
             <a:fld id="{8818C68F-D26B-8F47-958C-23B49CF8A634}" type="datetimeFigureOut">
               <a:rPr lang="en-US" dirty="0"/>
               <a:pPr/>
-              <a:t>5/31/22</a:t>
+              <a:t>6/2/22</a:t>
             </a:fld>
             <a:endParaRPr lang="en-US" dirty="0"/>
           </a:p>
@@ -4598,7 +4600,7 @@
           <a:ln/>
           <a:extLst>
             <a:ext uri="{91240B29-F687-4f45-9708-019B960494DF}">
-              <a14:hiddenLine xmlns="" xmlns:a14="http://schemas.microsoft.com/office/drawing/2010/main" w="9525">
+              <a14:hiddenLine xmlns:a14="http://schemas.microsoft.com/office/drawing/2010/main" xmlns="" w="9525">
                 <a:solidFill>
                   <a:srgbClr val="000000"/>
                 </a:solidFill>
@@ -4798,7 +4800,7 @@
             <a:fld id="{D0DF5E60-9974-AC48-9591-99C2BB44B7CF}" type="datetimeFigureOut">
               <a:rPr lang="en-US" dirty="0"/>
               <a:pPr/>
-              <a:t>5/31/22</a:t>
+              <a:t>6/2/22</a:t>
             </a:fld>
             <a:endParaRPr lang="en-US" dirty="0"/>
           </a:p>
@@ -5108,7 +5110,7 @@
             <a:fld id="{18C79C5D-2A6F-F04D-97DA-BEF2467B64E4}" type="datetimeFigureOut">
               <a:rPr lang="en-US" dirty="0"/>
               <a:pPr/>
-              <a:t>5/31/22</a:t>
+              <a:t>6/2/22</a:t>
             </a:fld>
             <a:endParaRPr lang="en-US" dirty="0"/>
           </a:p>
@@ -5375,7 +5377,7 @@
             <a:fld id="{09B482E8-6E0E-1B4F-B1FD-C69DB9E858D9}" type="datetimeFigureOut">
               <a:rPr lang="en-US" dirty="0"/>
               <a:pPr/>
-              <a:t>5/31/22</a:t>
+              <a:t>6/2/22</a:t>
             </a:fld>
             <a:endParaRPr lang="en-US" dirty="0"/>
           </a:p>
@@ -6075,7 +6077,7 @@
           <a:p>
             <a:r>
               <a:rPr lang="en-US" dirty="0"/>
-              <a:t>2. Reliability</a:t>
+              <a:t>1. Maintain data integrity</a:t>
             </a:r>
           </a:p>
         </p:txBody>
@@ -6132,7 +6134,7 @@
             </a:pPr>
             <a:r>
               <a:rPr lang="en-US" dirty="0"/>
-              <a:t>Prevent and detect bugs from the very first interaction with the data.</a:t>
+              <a:t>If the database already has integrity rules in place, adding validation steps in the data science product pipelines helps align the integrity throughout the entire system.</a:t>
             </a:r>
           </a:p>
           <a:p>
@@ -6142,27 +6144,7 @@
             </a:pPr>
             <a:r>
               <a:rPr lang="en-US" dirty="0"/>
-              <a:t>Prevent and detect bugs throughout the data science product life cycle.</a:t>
-            </a:r>
-          </a:p>
-          <a:p>
-            <a:pPr marL="285750" indent="-285750">
-              <a:buFont typeface="Arial" panose="020B0604020202020204" pitchFamily="34" charset="0"/>
-              <a:buChar char="•"/>
-            </a:pPr>
-            <a:r>
-              <a:rPr lang="en-US" dirty="0"/>
-              <a:t>Minimize surprises – know what input to expect and where to expect it.</a:t>
-            </a:r>
-          </a:p>
-          <a:p>
-            <a:pPr marL="285750" indent="-285750">
-              <a:buFont typeface="Arial" panose="020B0604020202020204" pitchFamily="34" charset="0"/>
-              <a:buChar char="•"/>
-            </a:pPr>
-            <a:r>
-              <a:rPr lang="en-US" dirty="0"/>
-              <a:t>Can help with an early detection of a data drift.</a:t>
+              <a:t>This only relates to the logical integrity of the data, and not the physical one.</a:t>
             </a:r>
           </a:p>
         </p:txBody>
@@ -6170,7 +6152,7 @@
     </p:spTree>
     <p:extLst>
       <p:ext uri="{BB962C8B-B14F-4D97-AF65-F5344CB8AC3E}">
-        <p14:creationId xmlns:p14="http://schemas.microsoft.com/office/powerpoint/2010/main" val="935944819"/>
+        <p14:creationId xmlns:p14="http://schemas.microsoft.com/office/powerpoint/2010/main" val="4030897301"/>
       </p:ext>
     </p:extLst>
   </p:cSld>
@@ -6213,19 +6195,14 @@
             <p:ph type="title"/>
           </p:nvPr>
         </p:nvSpPr>
-        <p:spPr>
-          <a:xfrm>
-            <a:off x="850986" y="1221877"/>
-            <a:ext cx="5893840" cy="2645912"/>
-          </a:xfrm>
-        </p:spPr>
+        <p:spPr/>
         <p:txBody>
           <a:bodyPr/>
           <a:lstStyle/>
           <a:p>
             <a:r>
               <a:rPr lang="en-US" dirty="0"/>
-              <a:t>3. Readability</a:t>
+              <a:t>2. Reliability</a:t>
             </a:r>
           </a:p>
         </p:txBody>
@@ -6282,7 +6259,7 @@
             </a:pPr>
             <a:r>
               <a:rPr lang="en-US" dirty="0"/>
-              <a:t>Harnessing Python’s type hints feature, make the code more readable by specifying explicitly what are the inputs and outputs of each function or class.</a:t>
+              <a:t>Prevent and detect bugs from the very first interaction with the data.</a:t>
             </a:r>
           </a:p>
           <a:p>
@@ -6292,7 +6269,27 @@
             </a:pPr>
             <a:r>
               <a:rPr lang="en-US" dirty="0"/>
-              <a:t>Some IDEs will highlight if something is wrong before we actually run anything.</a:t>
+              <a:t>Prevent and detect bugs throughout the data science product life cycle.</a:t>
+            </a:r>
+          </a:p>
+          <a:p>
+            <a:pPr marL="285750" indent="-285750">
+              <a:buFont typeface="Arial" panose="020B0604020202020204" pitchFamily="34" charset="0"/>
+              <a:buChar char="•"/>
+            </a:pPr>
+            <a:r>
+              <a:rPr lang="en-US" dirty="0"/>
+              <a:t>Minimize surprises – know what input to expect and where to expect it.</a:t>
+            </a:r>
+          </a:p>
+          <a:p>
+            <a:pPr marL="285750" indent="-285750">
+              <a:buFont typeface="Arial" panose="020B0604020202020204" pitchFamily="34" charset="0"/>
+              <a:buChar char="•"/>
+            </a:pPr>
+            <a:r>
+              <a:rPr lang="en-US" dirty="0"/>
+              <a:t>Can help with an early detection of a data drift.</a:t>
             </a:r>
           </a:p>
         </p:txBody>
@@ -6300,7 +6297,7 @@
     </p:spTree>
     <p:extLst>
       <p:ext uri="{BB962C8B-B14F-4D97-AF65-F5344CB8AC3E}">
-        <p14:creationId xmlns:p14="http://schemas.microsoft.com/office/powerpoint/2010/main" val="3946123073"/>
+        <p14:creationId xmlns:p14="http://schemas.microsoft.com/office/powerpoint/2010/main" val="935944819"/>
       </p:ext>
     </p:extLst>
   </p:cSld>
@@ -6345,6 +6342,136 @@
         </p:nvSpPr>
         <p:spPr>
           <a:xfrm>
+            <a:off x="850986" y="1221877"/>
+            <a:ext cx="5893840" cy="2645912"/>
+          </a:xfrm>
+        </p:spPr>
+        <p:txBody>
+          <a:bodyPr/>
+          <a:lstStyle/>
+          <a:p>
+            <a:r>
+              <a:rPr lang="en-US" dirty="0"/>
+              <a:t>3. Readability</a:t>
+            </a:r>
+          </a:p>
+        </p:txBody>
+      </p:sp>
+      <p:sp>
+        <p:nvSpPr>
+          <p:cNvPr id="3" name="Text Placeholder 2">
+            <a:extLst>
+              <a:ext uri="{FF2B5EF4-FFF2-40B4-BE49-F238E27FC236}">
+                <a16:creationId xmlns:a16="http://schemas.microsoft.com/office/drawing/2014/main" id="{F506C454-FFEE-D6B1-B77E-6B688BF3B5AF}"/>
+              </a:ext>
+            </a:extLst>
+          </p:cNvPr>
+          <p:cNvSpPr>
+            <a:spLocks noGrp="1"/>
+          </p:cNvSpPr>
+          <p:nvPr>
+            <p:ph type="body" idx="1"/>
+          </p:nvPr>
+        </p:nvSpPr>
+        <p:spPr/>
+        <p:txBody>
+          <a:bodyPr/>
+          <a:lstStyle/>
+          <a:p>
+            <a:endParaRPr lang="en-US"/>
+          </a:p>
+        </p:txBody>
+      </p:sp>
+      <p:sp>
+        <p:nvSpPr>
+          <p:cNvPr id="4" name="Text Placeholder 3">
+            <a:extLst>
+              <a:ext uri="{FF2B5EF4-FFF2-40B4-BE49-F238E27FC236}">
+                <a16:creationId xmlns:a16="http://schemas.microsoft.com/office/drawing/2014/main" id="{8B62AD72-661B-1880-5BA7-28AE1EB43511}"/>
+              </a:ext>
+            </a:extLst>
+          </p:cNvPr>
+          <p:cNvSpPr>
+            <a:spLocks noGrp="1"/>
+          </p:cNvSpPr>
+          <p:nvPr>
+            <p:ph type="body" sz="quarter" idx="16"/>
+          </p:nvPr>
+        </p:nvSpPr>
+        <p:spPr/>
+        <p:txBody>
+          <a:bodyPr/>
+          <a:lstStyle/>
+          <a:p>
+            <a:pPr marL="285750" indent="-285750">
+              <a:buFont typeface="Arial" panose="020B0604020202020204" pitchFamily="34" charset="0"/>
+              <a:buChar char="•"/>
+            </a:pPr>
+            <a:r>
+              <a:rPr lang="en-US" dirty="0"/>
+              <a:t>Harnessing Python’s type hints feature, make the code more readable by specifying explicitly what are the inputs and outputs of each function or class.</a:t>
+            </a:r>
+          </a:p>
+          <a:p>
+            <a:pPr marL="285750" indent="-285750">
+              <a:buFont typeface="Arial" panose="020B0604020202020204" pitchFamily="34" charset="0"/>
+              <a:buChar char="•"/>
+            </a:pPr>
+            <a:r>
+              <a:rPr lang="en-US" dirty="0"/>
+              <a:t>Some IDEs will highlight if something is wrong before we actually run anything.</a:t>
+            </a:r>
+          </a:p>
+        </p:txBody>
+      </p:sp>
+    </p:spTree>
+    <p:extLst>
+      <p:ext uri="{BB962C8B-B14F-4D97-AF65-F5344CB8AC3E}">
+        <p14:creationId xmlns:p14="http://schemas.microsoft.com/office/powerpoint/2010/main" val="3946123073"/>
+      </p:ext>
+    </p:extLst>
+  </p:cSld>
+  <p:clrMapOvr>
+    <a:masterClrMapping/>
+  </p:clrMapOvr>
+</p:sld>
+</file>
+
+<file path=ppt/slides/slide13.xml><?xml version="1.0" encoding="utf-8"?>
+<p:sld xmlns:a="http://schemas.openxmlformats.org/drawingml/2006/main" xmlns:r="http://schemas.openxmlformats.org/officeDocument/2006/relationships" xmlns:p="http://schemas.openxmlformats.org/presentationml/2006/main">
+  <p:cSld>
+    <p:spTree>
+      <p:nvGrpSpPr>
+        <p:cNvPr id="1" name=""/>
+        <p:cNvGrpSpPr/>
+        <p:nvPr/>
+      </p:nvGrpSpPr>
+      <p:grpSpPr>
+        <a:xfrm>
+          <a:off x="0" y="0"/>
+          <a:ext cx="0" cy="0"/>
+          <a:chOff x="0" y="0"/>
+          <a:chExt cx="0" cy="0"/>
+        </a:xfrm>
+      </p:grpSpPr>
+      <p:sp>
+        <p:nvSpPr>
+          <p:cNvPr id="2" name="Title 1">
+            <a:extLst>
+              <a:ext uri="{FF2B5EF4-FFF2-40B4-BE49-F238E27FC236}">
+                <a16:creationId xmlns:a16="http://schemas.microsoft.com/office/drawing/2014/main" id="{E25DDF7A-5810-36DC-CC84-2FEF7A3A3986}"/>
+              </a:ext>
+            </a:extLst>
+          </p:cNvPr>
+          <p:cNvSpPr>
+            <a:spLocks noGrp="1"/>
+          </p:cNvSpPr>
+          <p:nvPr>
+            <p:ph type="title"/>
+          </p:nvPr>
+        </p:nvSpPr>
+        <p:spPr>
+          <a:xfrm>
             <a:off x="807357" y="1255127"/>
             <a:ext cx="5893840" cy="2645912"/>
           </a:xfrm>
@@ -6460,7 +6587,7 @@
 </p:sld>
 </file>
 
-<file path=ppt/slides/slide13.xml><?xml version="1.0" encoding="utf-8"?>
+<file path=ppt/slides/slide14.xml><?xml version="1.0" encoding="utf-8"?>
 <p:sld xmlns:a="http://schemas.openxmlformats.org/drawingml/2006/main" xmlns:r="http://schemas.openxmlformats.org/officeDocument/2006/relationships" xmlns:p="http://schemas.openxmlformats.org/presentationml/2006/main">
   <p:cSld>
     <p:spTree>
@@ -7036,7 +7163,7 @@
 </p:sld>
 </file>
 
-<file path=ppt/slides/slide14.xml><?xml version="1.0" encoding="utf-8"?>
+<file path=ppt/slides/slide15.xml><?xml version="1.0" encoding="utf-8"?>
 <p:sld xmlns:a="http://schemas.openxmlformats.org/drawingml/2006/main" xmlns:r="http://schemas.openxmlformats.org/officeDocument/2006/relationships" xmlns:p="http://schemas.openxmlformats.org/presentationml/2006/main">
   <p:cSld>
     <p:spTree>
@@ -7303,7 +7430,245 @@
 </p:sld>
 </file>
 
-<file path=ppt/slides/slide15.xml><?xml version="1.0" encoding="utf-8"?>
+<file path=ppt/slides/slide16.xml><?xml version="1.0" encoding="utf-8"?>
+<p:sld xmlns:a="http://schemas.openxmlformats.org/drawingml/2006/main" xmlns:r="http://schemas.openxmlformats.org/officeDocument/2006/relationships" xmlns:p="http://schemas.openxmlformats.org/presentationml/2006/main">
+  <p:cSld>
+    <p:spTree>
+      <p:nvGrpSpPr>
+        <p:cNvPr id="1" name=""/>
+        <p:cNvGrpSpPr/>
+        <p:nvPr/>
+      </p:nvGrpSpPr>
+      <p:grpSpPr>
+        <a:xfrm>
+          <a:off x="0" y="0"/>
+          <a:ext cx="0" cy="0"/>
+          <a:chOff x="0" y="0"/>
+          <a:chExt cx="0" cy="0"/>
+        </a:xfrm>
+      </p:grpSpPr>
+      <p:sp>
+        <p:nvSpPr>
+          <p:cNvPr id="2" name="Title 1">
+            <a:extLst>
+              <a:ext uri="{FF2B5EF4-FFF2-40B4-BE49-F238E27FC236}">
+                <a16:creationId xmlns:a16="http://schemas.microsoft.com/office/drawing/2014/main" id="{9C347618-83BA-B560-ABCE-00B8D30A3601}"/>
+              </a:ext>
+            </a:extLst>
+          </p:cNvPr>
+          <p:cNvSpPr>
+            <a:spLocks noGrp="1"/>
+          </p:cNvSpPr>
+          <p:nvPr>
+            <p:ph type="title"/>
+          </p:nvPr>
+        </p:nvSpPr>
+        <p:spPr>
+          <a:xfrm>
+            <a:off x="593868" y="468523"/>
+            <a:ext cx="11309957" cy="970450"/>
+          </a:xfrm>
+        </p:spPr>
+        <p:txBody>
+          <a:bodyPr/>
+          <a:lstStyle/>
+          <a:p>
+            <a:r>
+              <a:rPr lang="en-US" dirty="0"/>
+              <a:t>Database validation with Great Expectations</a:t>
+            </a:r>
+          </a:p>
+        </p:txBody>
+      </p:sp>
+      <p:sp>
+        <p:nvSpPr>
+          <p:cNvPr id="3" name="Content Placeholder 2">
+            <a:extLst>
+              <a:ext uri="{FF2B5EF4-FFF2-40B4-BE49-F238E27FC236}">
+                <a16:creationId xmlns:a16="http://schemas.microsoft.com/office/drawing/2014/main" id="{0A1C0EED-D561-C72A-E01E-96DF19ECD0E2}"/>
+              </a:ext>
+            </a:extLst>
+          </p:cNvPr>
+          <p:cNvSpPr>
+            <a:spLocks noGrp="1"/>
+          </p:cNvSpPr>
+          <p:nvPr>
+            <p:ph idx="1"/>
+          </p:nvPr>
+        </p:nvSpPr>
+        <p:spPr>
+          <a:xfrm>
+            <a:off x="593869" y="2752966"/>
+            <a:ext cx="10554574" cy="3636511"/>
+          </a:xfrm>
+        </p:spPr>
+        <p:txBody>
+          <a:bodyPr/>
+          <a:lstStyle/>
+          <a:p>
+            <a:endParaRPr lang="en-US" dirty="0"/>
+          </a:p>
+          <a:p>
+            <a:endParaRPr lang="en-US" dirty="0"/>
+          </a:p>
+          <a:p>
+            <a:endParaRPr lang="en-US" dirty="0"/>
+          </a:p>
+          <a:p>
+            <a:endParaRPr lang="en-US" dirty="0"/>
+          </a:p>
+          <a:p>
+            <a:endParaRPr lang="en-US" dirty="0"/>
+          </a:p>
+          <a:p>
+            <a:endParaRPr lang="en-US" dirty="0"/>
+          </a:p>
+          <a:p>
+            <a:endParaRPr lang="en-US" dirty="0"/>
+          </a:p>
+          <a:p>
+            <a:r>
+              <a:rPr lang="en-US" dirty="0"/>
+              <a:t>Follow the instructions in the </a:t>
+            </a:r>
+            <a:r>
+              <a:rPr lang="en-US" dirty="0">
+                <a:hlinkClick r:id="rId2"/>
+              </a:rPr>
+              <a:t>notebook</a:t>
+            </a:r>
+            <a:r>
+              <a:rPr lang="en-US" dirty="0"/>
+              <a:t>.</a:t>
+            </a:r>
+          </a:p>
+        </p:txBody>
+      </p:sp>
+      <p:pic>
+        <p:nvPicPr>
+          <p:cNvPr id="4" name="Picture 2">
+            <a:extLst>
+              <a:ext uri="{FF2B5EF4-FFF2-40B4-BE49-F238E27FC236}">
+                <a16:creationId xmlns:a16="http://schemas.microsoft.com/office/drawing/2014/main" id="{6EF3906A-50BB-ECE3-FC7D-319DC91C7460}"/>
+              </a:ext>
+            </a:extLst>
+          </p:cNvPr>
+          <p:cNvPicPr>
+            <a:picLocks noChangeAspect="1" noChangeArrowheads="1"/>
+          </p:cNvPicPr>
+          <p:nvPr/>
+        </p:nvPicPr>
+        <p:blipFill>
+          <a:blip r:embed="rId3">
+            <a:extLst>
+              <a:ext uri="{28A0092B-C50C-407E-A947-70E740481C1C}">
+                <a14:useLocalDpi xmlns:a14="http://schemas.microsoft.com/office/drawing/2010/main" val="0"/>
+              </a:ext>
+            </a:extLst>
+          </a:blip>
+          <a:srcRect/>
+          <a:stretch>
+            <a:fillRect/>
+          </a:stretch>
+        </p:blipFill>
+        <p:spPr bwMode="auto">
+          <a:xfrm>
+            <a:off x="4147456" y="2260550"/>
+            <a:ext cx="6918432" cy="3155920"/>
+          </a:xfrm>
+          <a:prstGeom prst="roundRect">
+            <a:avLst>
+              <a:gd name="adj" fmla="val 16667"/>
+            </a:avLst>
+          </a:prstGeom>
+          <a:ln>
+            <a:noFill/>
+          </a:ln>
+          <a:effectLst>
+            <a:outerShdw blurRad="76200" dist="38100" dir="7800000" algn="tl" rotWithShape="0">
+              <a:srgbClr val="000000">
+                <a:alpha val="40000"/>
+              </a:srgbClr>
+            </a:outerShdw>
+          </a:effectLst>
+          <a:scene3d>
+            <a:camera prst="orthographicFront"/>
+            <a:lightRig rig="contrasting" dir="t">
+              <a:rot lat="0" lon="0" rev="4200000"/>
+            </a:lightRig>
+          </a:scene3d>
+          <a:sp3d prstMaterial="plastic">
+            <a:bevelT w="381000" h="114300" prst="relaxedInset"/>
+            <a:contourClr>
+              <a:srgbClr val="969696"/>
+            </a:contourClr>
+          </a:sp3d>
+          <a:extLst>
+            <a:ext uri="{909E8E84-426E-40DD-AFC4-6F175D3DCCD1}">
+              <a14:hiddenFill xmlns:a14="http://schemas.microsoft.com/office/drawing/2010/main">
+                <a:solidFill>
+                  <a:srgbClr val="FFFFFF"/>
+                </a:solidFill>
+              </a14:hiddenFill>
+            </a:ext>
+          </a:extLst>
+        </p:spPr>
+      </p:pic>
+      <p:cxnSp>
+        <p:nvCxnSpPr>
+          <p:cNvPr id="6" name="Straight Arrow Connector 5">
+            <a:extLst>
+              <a:ext uri="{FF2B5EF4-FFF2-40B4-BE49-F238E27FC236}">
+                <a16:creationId xmlns:a16="http://schemas.microsoft.com/office/drawing/2014/main" id="{3B5D8D21-834D-3457-CEDF-174B85293B83}"/>
+              </a:ext>
+            </a:extLst>
+          </p:cNvPr>
+          <p:cNvCxnSpPr>
+            <a:cxnSpLocks/>
+          </p:cNvCxnSpPr>
+          <p:nvPr/>
+        </p:nvCxnSpPr>
+        <p:spPr>
+          <a:xfrm flipH="1" flipV="1">
+            <a:off x="5607781" y="3714244"/>
+            <a:ext cx="1658433" cy="2147713"/>
+          </a:xfrm>
+          <a:prstGeom prst="straightConnector1">
+            <a:avLst/>
+          </a:prstGeom>
+          <a:ln w="76200">
+            <a:tailEnd type="triangle"/>
+          </a:ln>
+        </p:spPr>
+        <p:style>
+          <a:lnRef idx="1">
+            <a:schemeClr val="accent5"/>
+          </a:lnRef>
+          <a:fillRef idx="0">
+            <a:schemeClr val="accent5"/>
+          </a:fillRef>
+          <a:effectRef idx="0">
+            <a:schemeClr val="accent5"/>
+          </a:effectRef>
+          <a:fontRef idx="minor">
+            <a:schemeClr val="tx1"/>
+          </a:fontRef>
+        </p:style>
+      </p:cxnSp>
+    </p:spTree>
+    <p:extLst>
+      <p:ext uri="{BB962C8B-B14F-4D97-AF65-F5344CB8AC3E}">
+        <p14:creationId xmlns:p14="http://schemas.microsoft.com/office/powerpoint/2010/main" val="3128939340"/>
+      </p:ext>
+    </p:extLst>
+  </p:cSld>
+  <p:clrMapOvr>
+    <a:masterClrMapping/>
+  </p:clrMapOvr>
+</p:sld>
+</file>
+
+<file path=ppt/slides/slide17.xml><?xml version="1.0" encoding="utf-8"?>
 <p:sld xmlns:a="http://schemas.openxmlformats.org/drawingml/2006/main" xmlns:r="http://schemas.openxmlformats.org/officeDocument/2006/relationships" xmlns:p="http://schemas.openxmlformats.org/presentationml/2006/main">
   <p:cSld>
     <p:spTree>
@@ -7546,7 +7911,7 @@
 </p:sld>
 </file>
 
-<file path=ppt/slides/slide16.xml><?xml version="1.0" encoding="utf-8"?>
+<file path=ppt/slides/slide18.xml><?xml version="1.0" encoding="utf-8"?>
 <p:sld xmlns:a="http://schemas.openxmlformats.org/drawingml/2006/main" xmlns:r="http://schemas.openxmlformats.org/officeDocument/2006/relationships" xmlns:p="http://schemas.openxmlformats.org/presentationml/2006/main">
   <p:cSld>
     <p:spTree>
@@ -8707,7 +9072,7 @@
 </p:sld>
 </file>
 
-<file path=ppt/slides/slide17.xml><?xml version="1.0" encoding="utf-8"?>
+<file path=ppt/slides/slide19.xml><?xml version="1.0" encoding="utf-8"?>
 <p:sld xmlns:a="http://schemas.openxmlformats.org/drawingml/2006/main" xmlns:r="http://schemas.openxmlformats.org/officeDocument/2006/relationships" xmlns:p="http://schemas.openxmlformats.org/presentationml/2006/main">
   <p:cSld>
     <p:spTree>
@@ -8729,7 +9094,7 @@
           <p:cNvPr id="2" name="Title 1">
             <a:extLst>
               <a:ext uri="{FF2B5EF4-FFF2-40B4-BE49-F238E27FC236}">
-                <a16:creationId xmlns:a16="http://schemas.microsoft.com/office/drawing/2014/main" id="{9C347618-83BA-B560-ABCE-00B8D30A3601}"/>
+                <a16:creationId xmlns:a16="http://schemas.microsoft.com/office/drawing/2014/main" id="{E104701D-D10B-66CF-1F03-F3672040F878}"/>
               </a:ext>
             </a:extLst>
           </p:cNvPr>
@@ -8737,32 +9102,27 @@
             <a:spLocks noGrp="1"/>
           </p:cNvSpPr>
           <p:nvPr>
-            <p:ph type="title"/>
-          </p:nvPr>
-        </p:nvSpPr>
-        <p:spPr>
-          <a:xfrm>
-            <a:off x="593868" y="468523"/>
-            <a:ext cx="11309957" cy="970450"/>
-          </a:xfrm>
-        </p:spPr>
+            <p:ph type="ctrTitle"/>
+          </p:nvPr>
+        </p:nvSpPr>
+        <p:spPr/>
         <p:txBody>
           <a:bodyPr/>
           <a:lstStyle/>
           <a:p>
             <a:r>
               <a:rPr lang="en-US" dirty="0"/>
-              <a:t>Database validation with Great Expectations</a:t>
-            </a:r>
-          </a:p>
-        </p:txBody>
-      </p:sp>
-      <p:sp>
-        <p:nvSpPr>
-          <p:cNvPr id="3" name="Content Placeholder 2">
+              <a:t>Thank you for listening!</a:t>
+            </a:r>
+          </a:p>
+        </p:txBody>
+      </p:sp>
+      <p:sp>
+        <p:nvSpPr>
+          <p:cNvPr id="3" name="Subtitle 2">
             <a:extLst>
               <a:ext uri="{FF2B5EF4-FFF2-40B4-BE49-F238E27FC236}">
-                <a16:creationId xmlns:a16="http://schemas.microsoft.com/office/drawing/2014/main" id="{0A1C0EED-D561-C72A-E01E-96DF19ECD0E2}"/>
+                <a16:creationId xmlns:a16="http://schemas.microsoft.com/office/drawing/2014/main" id="{298BD520-F3E0-18D5-247E-53E5A313E979}"/>
               </a:ext>
             </a:extLst>
           </p:cNvPr>
@@ -8770,172 +9130,25 @@
             <a:spLocks noGrp="1"/>
           </p:cNvSpPr>
           <p:nvPr>
-            <p:ph idx="1"/>
-          </p:nvPr>
-        </p:nvSpPr>
-        <p:spPr>
-          <a:xfrm>
-            <a:off x="593869" y="2752966"/>
-            <a:ext cx="10554574" cy="3636511"/>
-          </a:xfrm>
-        </p:spPr>
+            <p:ph type="subTitle" idx="1"/>
+          </p:nvPr>
+        </p:nvSpPr>
+        <p:spPr/>
         <p:txBody>
           <a:bodyPr/>
           <a:lstStyle/>
           <a:p>
-            <a:endParaRPr lang="en-US" dirty="0"/>
-          </a:p>
-          <a:p>
-            <a:endParaRPr lang="en-US" dirty="0"/>
-          </a:p>
-          <a:p>
-            <a:endParaRPr lang="en-US" dirty="0"/>
-          </a:p>
-          <a:p>
-            <a:endParaRPr lang="en-US" dirty="0"/>
-          </a:p>
-          <a:p>
-            <a:endParaRPr lang="en-US" dirty="0"/>
-          </a:p>
-          <a:p>
-            <a:endParaRPr lang="en-US" dirty="0"/>
-          </a:p>
-          <a:p>
-            <a:endParaRPr lang="en-US" dirty="0"/>
-          </a:p>
-          <a:p>
             <a:r>
               <a:rPr lang="en-US" dirty="0"/>
-              <a:t>Follow the instructions in the </a:t>
-            </a:r>
-            <a:r>
-              <a:rPr lang="en-US" dirty="0">
-                <a:hlinkClick r:id="rId2"/>
-              </a:rPr>
-              <a:t>notebook</a:t>
-            </a:r>
-            <a:r>
-              <a:rPr lang="en-US" dirty="0"/>
-              <a:t>.</a:t>
-            </a:r>
-          </a:p>
-        </p:txBody>
-      </p:sp>
-      <p:pic>
-        <p:nvPicPr>
-          <p:cNvPr id="4" name="Picture 2">
-            <a:extLst>
-              <a:ext uri="{FF2B5EF4-FFF2-40B4-BE49-F238E27FC236}">
-                <a16:creationId xmlns:a16="http://schemas.microsoft.com/office/drawing/2014/main" id="{6EF3906A-50BB-ECE3-FC7D-319DC91C7460}"/>
-              </a:ext>
-            </a:extLst>
-          </p:cNvPr>
-          <p:cNvPicPr>
-            <a:picLocks noChangeAspect="1" noChangeArrowheads="1"/>
-          </p:cNvPicPr>
-          <p:nvPr/>
-        </p:nvPicPr>
-        <p:blipFill>
-          <a:blip r:embed="rId3">
-            <a:extLst>
-              <a:ext uri="{28A0092B-C50C-407E-A947-70E740481C1C}">
-                <a14:useLocalDpi xmlns:a14="http://schemas.microsoft.com/office/drawing/2010/main" val="0"/>
-              </a:ext>
-            </a:extLst>
-          </a:blip>
-          <a:srcRect/>
-          <a:stretch>
-            <a:fillRect/>
-          </a:stretch>
-        </p:blipFill>
-        <p:spPr bwMode="auto">
-          <a:xfrm>
-            <a:off x="4147456" y="2260550"/>
-            <a:ext cx="6918432" cy="3155920"/>
-          </a:xfrm>
-          <a:prstGeom prst="roundRect">
-            <a:avLst>
-              <a:gd name="adj" fmla="val 16667"/>
-            </a:avLst>
-          </a:prstGeom>
-          <a:ln>
-            <a:noFill/>
-          </a:ln>
-          <a:effectLst>
-            <a:outerShdw blurRad="76200" dist="38100" dir="7800000" algn="tl" rotWithShape="0">
-              <a:srgbClr val="000000">
-                <a:alpha val="40000"/>
-              </a:srgbClr>
-            </a:outerShdw>
-          </a:effectLst>
-          <a:scene3d>
-            <a:camera prst="orthographicFront"/>
-            <a:lightRig rig="contrasting" dir="t">
-              <a:rot lat="0" lon="0" rev="4200000"/>
-            </a:lightRig>
-          </a:scene3d>
-          <a:sp3d prstMaterial="plastic">
-            <a:bevelT w="381000" h="114300" prst="relaxedInset"/>
-            <a:contourClr>
-              <a:srgbClr val="969696"/>
-            </a:contourClr>
-          </a:sp3d>
-          <a:extLst>
-            <a:ext uri="{909E8E84-426E-40DD-AFC4-6F175D3DCCD1}">
-              <a14:hiddenFill xmlns:a14="http://schemas.microsoft.com/office/drawing/2010/main">
-                <a:solidFill>
-                  <a:srgbClr val="FFFFFF"/>
-                </a:solidFill>
-              </a14:hiddenFill>
-            </a:ext>
-          </a:extLst>
-        </p:spPr>
-      </p:pic>
-      <p:cxnSp>
-        <p:nvCxnSpPr>
-          <p:cNvPr id="6" name="Straight Arrow Connector 5">
-            <a:extLst>
-              <a:ext uri="{FF2B5EF4-FFF2-40B4-BE49-F238E27FC236}">
-                <a16:creationId xmlns:a16="http://schemas.microsoft.com/office/drawing/2014/main" id="{3B5D8D21-834D-3457-CEDF-174B85293B83}"/>
-              </a:ext>
-            </a:extLst>
-          </p:cNvPr>
-          <p:cNvCxnSpPr>
-            <a:cxnSpLocks/>
-          </p:cNvCxnSpPr>
-          <p:nvPr/>
-        </p:nvCxnSpPr>
-        <p:spPr>
-          <a:xfrm flipH="1" flipV="1">
-            <a:off x="5607781" y="3714244"/>
-            <a:ext cx="1658433" cy="2147713"/>
-          </a:xfrm>
-          <a:prstGeom prst="straightConnector1">
-            <a:avLst/>
-          </a:prstGeom>
-          <a:ln w="76200">
-            <a:tailEnd type="triangle"/>
-          </a:ln>
-        </p:spPr>
-        <p:style>
-          <a:lnRef idx="1">
-            <a:schemeClr val="accent5"/>
-          </a:lnRef>
-          <a:fillRef idx="0">
-            <a:schemeClr val="accent5"/>
-          </a:fillRef>
-          <a:effectRef idx="0">
-            <a:schemeClr val="accent5"/>
-          </a:effectRef>
-          <a:fontRef idx="minor">
-            <a:schemeClr val="tx1"/>
-          </a:fontRef>
-        </p:style>
-      </p:cxnSp>
+              <a:t>Any questions?</a:t>
+            </a:r>
+          </a:p>
+        </p:txBody>
+      </p:sp>
     </p:spTree>
     <p:extLst>
       <p:ext uri="{BB962C8B-B14F-4D97-AF65-F5344CB8AC3E}">
-        <p14:creationId xmlns:p14="http://schemas.microsoft.com/office/powerpoint/2010/main" val="3128939340"/>
+        <p14:creationId xmlns:p14="http://schemas.microsoft.com/office/powerpoint/2010/main" val="688793601"/>
       </p:ext>
     </p:extLst>
   </p:cSld>
@@ -9407,13 +9620,8 @@
             </a:pPr>
             <a:r>
               <a:rPr lang="en-US" dirty="0"/>
-              <a:t>Validation in training pipelines using </a:t>
-            </a:r>
-            <a:r>
-              <a:rPr lang="en-US" dirty="0" err="1"/>
-              <a:t>Pandera</a:t>
-            </a:r>
-            <a:endParaRPr lang="en-US" dirty="0"/>
+              <a:t>Validation in datasets using Great Expectations</a:t>
+            </a:r>
           </a:p>
           <a:p>
             <a:pPr>
@@ -9422,8 +9630,13 @@
             </a:pPr>
             <a:r>
               <a:rPr lang="en-US" dirty="0"/>
-              <a:t>Validation in datasets using Great Expectations</a:t>
-            </a:r>
+              <a:t>Validation in training pipelines using </a:t>
+            </a:r>
+            <a:r>
+              <a:rPr lang="en-US" dirty="0" err="1"/>
+              <a:t>Pandera</a:t>
+            </a:r>
+            <a:endParaRPr lang="en-US" dirty="0"/>
           </a:p>
           <a:p>
             <a:pPr>
@@ -10079,7 +10292,7 @@
           <a:p>
             <a:r>
               <a:rPr lang="en-GB" dirty="0"/>
-              <a:t>We can validate types, ranges, consistency and incorporate business logic.</a:t>
+              <a:t>We can validate types, ranges, consistency and incorporate business logic to make our project more robust.</a:t>
             </a:r>
             <a:endParaRPr lang="en-US" dirty="0"/>
           </a:p>
@@ -10099,6 +10312,109 @@
 </file>
 
 <file path=ppt/slides/slide8.xml><?xml version="1.0" encoding="utf-8"?>
+<p:sld xmlns:a="http://schemas.openxmlformats.org/drawingml/2006/main" xmlns:r="http://schemas.openxmlformats.org/officeDocument/2006/relationships" xmlns:p="http://schemas.openxmlformats.org/presentationml/2006/main">
+  <p:cSld>
+    <p:spTree>
+      <p:nvGrpSpPr>
+        <p:cNvPr id="1" name=""/>
+        <p:cNvGrpSpPr/>
+        <p:nvPr/>
+      </p:nvGrpSpPr>
+      <p:grpSpPr>
+        <a:xfrm>
+          <a:off x="0" y="0"/>
+          <a:ext cx="0" cy="0"/>
+          <a:chOff x="0" y="0"/>
+          <a:chExt cx="0" cy="0"/>
+        </a:xfrm>
+      </p:grpSpPr>
+      <p:sp>
+        <p:nvSpPr>
+          <p:cNvPr id="2" name="Title 1">
+            <a:extLst>
+              <a:ext uri="{FF2B5EF4-FFF2-40B4-BE49-F238E27FC236}">
+                <a16:creationId xmlns:a16="http://schemas.microsoft.com/office/drawing/2014/main" id="{ADD05594-2F69-9003-8A7E-A35921EFA2D0}"/>
+              </a:ext>
+            </a:extLst>
+          </p:cNvPr>
+          <p:cNvSpPr>
+            <a:spLocks noGrp="1"/>
+          </p:cNvSpPr>
+          <p:nvPr>
+            <p:ph type="title"/>
+          </p:nvPr>
+        </p:nvSpPr>
+        <p:spPr>
+          <a:xfrm>
+            <a:off x="801288" y="513977"/>
+            <a:ext cx="10571998" cy="970450"/>
+          </a:xfrm>
+        </p:spPr>
+        <p:txBody>
+          <a:bodyPr/>
+          <a:lstStyle/>
+          <a:p>
+            <a:r>
+              <a:rPr lang="en-US" dirty="0"/>
+              <a:t>How can data become invalid?</a:t>
+            </a:r>
+          </a:p>
+        </p:txBody>
+      </p:sp>
+      <p:sp>
+        <p:nvSpPr>
+          <p:cNvPr id="3" name="Content Placeholder 2">
+            <a:extLst>
+              <a:ext uri="{FF2B5EF4-FFF2-40B4-BE49-F238E27FC236}">
+                <a16:creationId xmlns:a16="http://schemas.microsoft.com/office/drawing/2014/main" id="{421B0849-BA7A-D67B-7858-B7857A5B3E88}"/>
+              </a:ext>
+            </a:extLst>
+          </p:cNvPr>
+          <p:cNvSpPr>
+            <a:spLocks noGrp="1"/>
+          </p:cNvSpPr>
+          <p:nvPr>
+            <p:ph idx="1"/>
+          </p:nvPr>
+        </p:nvSpPr>
+        <p:spPr/>
+        <p:txBody>
+          <a:bodyPr/>
+          <a:lstStyle/>
+          <a:p>
+            <a:r>
+              <a:rPr lang="en-US" dirty="0"/>
+              <a:t>Human error – for example when tagging labels for training models.</a:t>
+            </a:r>
+          </a:p>
+          <a:p>
+            <a:r>
+              <a:rPr lang="en-US" dirty="0"/>
+              <a:t>Outdated/expired data sets.</a:t>
+            </a:r>
+          </a:p>
+          <a:p>
+            <a:r>
+              <a:rPr lang="en-US" dirty="0"/>
+              <a:t>Bugs or changes in upstream data pipelines.</a:t>
+            </a:r>
+          </a:p>
+        </p:txBody>
+      </p:sp>
+    </p:spTree>
+    <p:extLst>
+      <p:ext uri="{BB962C8B-B14F-4D97-AF65-F5344CB8AC3E}">
+        <p14:creationId xmlns:p14="http://schemas.microsoft.com/office/powerpoint/2010/main" val="1922696547"/>
+      </p:ext>
+    </p:extLst>
+  </p:cSld>
+  <p:clrMapOvr>
+    <a:masterClrMapping/>
+  </p:clrMapOvr>
+</p:sld>
+</file>
+
+<file path=ppt/slides/slide9.xml><?xml version="1.0" encoding="utf-8"?>
 <p:sld xmlns:a="http://schemas.openxmlformats.org/drawingml/2006/main" xmlns:r="http://schemas.openxmlformats.org/officeDocument/2006/relationships" xmlns:p="http://schemas.openxmlformats.org/presentationml/2006/main">
   <p:cSld>
     <p:spTree>
@@ -10224,131 +10540,6 @@
     <p:extLst>
       <p:ext uri="{BB962C8B-B14F-4D97-AF65-F5344CB8AC3E}">
         <p14:creationId xmlns:p14="http://schemas.microsoft.com/office/powerpoint/2010/main" val="3190012637"/>
-      </p:ext>
-    </p:extLst>
-  </p:cSld>
-  <p:clrMapOvr>
-    <a:masterClrMapping/>
-  </p:clrMapOvr>
-</p:sld>
-</file>
-
-<file path=ppt/slides/slide9.xml><?xml version="1.0" encoding="utf-8"?>
-<p:sld xmlns:a="http://schemas.openxmlformats.org/drawingml/2006/main" xmlns:r="http://schemas.openxmlformats.org/officeDocument/2006/relationships" xmlns:p="http://schemas.openxmlformats.org/presentationml/2006/main">
-  <p:cSld>
-    <p:spTree>
-      <p:nvGrpSpPr>
-        <p:cNvPr id="1" name=""/>
-        <p:cNvGrpSpPr/>
-        <p:nvPr/>
-      </p:nvGrpSpPr>
-      <p:grpSpPr>
-        <a:xfrm>
-          <a:off x="0" y="0"/>
-          <a:ext cx="0" cy="0"/>
-          <a:chOff x="0" y="0"/>
-          <a:chExt cx="0" cy="0"/>
-        </a:xfrm>
-      </p:grpSpPr>
-      <p:sp>
-        <p:nvSpPr>
-          <p:cNvPr id="2" name="Title 1">
-            <a:extLst>
-              <a:ext uri="{FF2B5EF4-FFF2-40B4-BE49-F238E27FC236}">
-                <a16:creationId xmlns:a16="http://schemas.microsoft.com/office/drawing/2014/main" id="{E25DDF7A-5810-36DC-CC84-2FEF7A3A3986}"/>
-              </a:ext>
-            </a:extLst>
-          </p:cNvPr>
-          <p:cNvSpPr>
-            <a:spLocks noGrp="1"/>
-          </p:cNvSpPr>
-          <p:nvPr>
-            <p:ph type="title"/>
-          </p:nvPr>
-        </p:nvSpPr>
-        <p:spPr/>
-        <p:txBody>
-          <a:bodyPr/>
-          <a:lstStyle/>
-          <a:p>
-            <a:r>
-              <a:rPr lang="en-US" dirty="0"/>
-              <a:t>1. Maintain data integrity</a:t>
-            </a:r>
-          </a:p>
-        </p:txBody>
-      </p:sp>
-      <p:sp>
-        <p:nvSpPr>
-          <p:cNvPr id="3" name="Text Placeholder 2">
-            <a:extLst>
-              <a:ext uri="{FF2B5EF4-FFF2-40B4-BE49-F238E27FC236}">
-                <a16:creationId xmlns:a16="http://schemas.microsoft.com/office/drawing/2014/main" id="{F506C454-FFEE-D6B1-B77E-6B688BF3B5AF}"/>
-              </a:ext>
-            </a:extLst>
-          </p:cNvPr>
-          <p:cNvSpPr>
-            <a:spLocks noGrp="1"/>
-          </p:cNvSpPr>
-          <p:nvPr>
-            <p:ph type="body" idx="1"/>
-          </p:nvPr>
-        </p:nvSpPr>
-        <p:spPr/>
-        <p:txBody>
-          <a:bodyPr/>
-          <a:lstStyle/>
-          <a:p>
-            <a:endParaRPr lang="en-US"/>
-          </a:p>
-        </p:txBody>
-      </p:sp>
-      <p:sp>
-        <p:nvSpPr>
-          <p:cNvPr id="4" name="Text Placeholder 3">
-            <a:extLst>
-              <a:ext uri="{FF2B5EF4-FFF2-40B4-BE49-F238E27FC236}">
-                <a16:creationId xmlns:a16="http://schemas.microsoft.com/office/drawing/2014/main" id="{8B62AD72-661B-1880-5BA7-28AE1EB43511}"/>
-              </a:ext>
-            </a:extLst>
-          </p:cNvPr>
-          <p:cNvSpPr>
-            <a:spLocks noGrp="1"/>
-          </p:cNvSpPr>
-          <p:nvPr>
-            <p:ph type="body" sz="quarter" idx="16"/>
-          </p:nvPr>
-        </p:nvSpPr>
-        <p:spPr/>
-        <p:txBody>
-          <a:bodyPr/>
-          <a:lstStyle/>
-          <a:p>
-            <a:pPr marL="285750" indent="-285750">
-              <a:buFont typeface="Arial" panose="020B0604020202020204" pitchFamily="34" charset="0"/>
-              <a:buChar char="•"/>
-            </a:pPr>
-            <a:r>
-              <a:rPr lang="en-US" dirty="0"/>
-              <a:t>If the database already has integrity rules in place, adding validation steps in the data science product pipelines helps align the integrity throughout the entire system.</a:t>
-            </a:r>
-          </a:p>
-          <a:p>
-            <a:pPr marL="285750" indent="-285750">
-              <a:buFont typeface="Arial" panose="020B0604020202020204" pitchFamily="34" charset="0"/>
-              <a:buChar char="•"/>
-            </a:pPr>
-            <a:r>
-              <a:rPr lang="en-US" dirty="0"/>
-              <a:t>This only relates to the logical integrity of the data, and not the physical one.</a:t>
-            </a:r>
-          </a:p>
-        </p:txBody>
-      </p:sp>
-    </p:spTree>
-    <p:extLst>
-      <p:ext uri="{BB962C8B-B14F-4D97-AF65-F5344CB8AC3E}">
-        <p14:creationId xmlns:p14="http://schemas.microsoft.com/office/powerpoint/2010/main" val="4030897301"/>
       </p:ext>
     </p:extLst>
   </p:cSld>

</xml_diff>

<commit_message>
Fixed references to csv files in all notebooks
</commit_message>
<xml_diff>
--- a/Data Validation for Data Science.pptx
+++ b/Data Validation for Data Science.pptx
@@ -227,7 +227,7 @@
           <a:p>
             <a:fld id="{F9CD045C-CD78-304F-BD19-120FB2F86E8F}" type="datetimeFigureOut">
               <a:rPr lang="en-US" smtClean="0"/>
-              <a:t>6/2/22</a:t>
+              <a:t>6/7/22</a:t>
             </a:fld>
             <a:endParaRPr lang="en-US"/>
           </a:p>
@@ -685,7 +685,7 @@
           <a:effectLst/>
           <a:extLst>
             <a:ext uri="{91240B29-F687-4f45-9708-019B960494DF}">
-              <a14:hiddenLine xmlns:a14="http://schemas.microsoft.com/office/drawing/2010/main" xmlns="" w="9525">
+              <a14:hiddenLine xmlns="" xmlns:a14="http://schemas.microsoft.com/office/drawing/2010/main" w="9525">
                 <a:solidFill>
                   <a:srgbClr val="000000"/>
                 </a:solidFill>
@@ -878,7 +878,7 @@
             <a:fld id="{08B9EBBA-996F-894A-B54A-D6246ED52CEA}" type="datetimeFigureOut">
               <a:rPr lang="en-US" dirty="0"/>
               <a:pPr/>
-              <a:t>6/2/22</a:t>
+              <a:t>6/7/22</a:t>
             </a:fld>
             <a:endParaRPr lang="en-US" dirty="0"/>
           </a:p>
@@ -1193,7 +1193,7 @@
             <a:fld id="{18C79C5D-2A6F-F04D-97DA-BEF2467B64E4}" type="datetimeFigureOut">
               <a:rPr lang="en-US" dirty="0"/>
               <a:pPr/>
-              <a:t>6/2/22</a:t>
+              <a:t>6/7/22</a:t>
             </a:fld>
             <a:endParaRPr lang="en-US" dirty="0"/>
           </a:p>
@@ -1678,7 +1678,7 @@
             <a:fld id="{8DFA1846-DA80-1C48-A609-854EA85C59AD}" type="datetimeFigureOut">
               <a:rPr lang="en-US" dirty="0"/>
               <a:pPr/>
-              <a:t>6/2/22</a:t>
+              <a:t>6/7/22</a:t>
             </a:fld>
             <a:endParaRPr lang="en-US" dirty="0"/>
           </a:p>
@@ -2044,7 +2044,7 @@
             <a:fld id="{FBF54567-0DE4-3F47-BF90-CB84690072F9}" type="datetimeFigureOut">
               <a:rPr lang="en-US" dirty="0"/>
               <a:pPr/>
-              <a:t>6/2/22</a:t>
+              <a:t>6/7/22</a:t>
             </a:fld>
             <a:endParaRPr lang="en-US" dirty="0"/>
           </a:p>
@@ -2195,7 +2195,7 @@
           <a:ln/>
           <a:extLst>
             <a:ext uri="{91240B29-F687-4f45-9708-019B960494DF}">
-              <a14:hiddenLine xmlns:a14="http://schemas.microsoft.com/office/drawing/2010/main" xmlns="" w="9525">
+              <a14:hiddenLine xmlns="" xmlns:a14="http://schemas.microsoft.com/office/drawing/2010/main" w="9525">
                 <a:solidFill>
                   <a:srgbClr val="000000"/>
                 </a:solidFill>
@@ -2314,7 +2314,7 @@
             <a:fld id="{C6C52C72-DE31-F449-A4ED-4C594FD91407}" type="datetimeFigureOut">
               <a:rPr lang="en-US" dirty="0"/>
               <a:pPr/>
-              <a:t>6/2/22</a:t>
+              <a:t>6/7/22</a:t>
             </a:fld>
             <a:endParaRPr lang="en-US" dirty="0"/>
           </a:p>
@@ -2467,7 +2467,7 @@
           <a:ln/>
           <a:extLst>
             <a:ext uri="{91240B29-F687-4f45-9708-019B960494DF}">
-              <a14:hiddenLine xmlns:a14="http://schemas.microsoft.com/office/drawing/2010/main" xmlns="" w="9525">
+              <a14:hiddenLine xmlns="" xmlns:a14="http://schemas.microsoft.com/office/drawing/2010/main" w="9525">
                 <a:solidFill>
                   <a:srgbClr val="000000"/>
                 </a:solidFill>
@@ -2596,7 +2596,7 @@
             <a:fld id="{ED62726E-379B-B349-9EED-81ED093FA806}" type="datetimeFigureOut">
               <a:rPr lang="en-US" dirty="0"/>
               <a:pPr/>
-              <a:t>6/2/22</a:t>
+              <a:t>6/7/22</a:t>
             </a:fld>
             <a:endParaRPr lang="en-US" dirty="0"/>
           </a:p>
@@ -2747,7 +2747,7 @@
           <a:ln/>
           <a:extLst>
             <a:ext uri="{91240B29-F687-4f45-9708-019B960494DF}">
-              <a14:hiddenLine xmlns:a14="http://schemas.microsoft.com/office/drawing/2010/main" xmlns="" w="9525">
+              <a14:hiddenLine xmlns="" xmlns:a14="http://schemas.microsoft.com/office/drawing/2010/main" w="9525">
                 <a:solidFill>
                   <a:srgbClr val="000000"/>
                 </a:solidFill>
@@ -2876,7 +2876,7 @@
             <a:fld id="{9B3A1323-8D79-1946-B0D7-40001CF92E9D}" type="datetimeFigureOut">
               <a:rPr lang="en-US" dirty="0"/>
               <a:pPr/>
-              <a:t>6/2/22</a:t>
+              <a:t>6/7/22</a:t>
             </a:fld>
             <a:endParaRPr lang="en-US" dirty="0"/>
           </a:p>
@@ -3216,7 +3216,7 @@
             <a:fld id="{8DFA1846-DA80-1C48-A609-854EA85C59AD}" type="datetimeFigureOut">
               <a:rPr lang="en-US" dirty="0"/>
               <a:pPr/>
-              <a:t>6/2/22</a:t>
+              <a:t>6/7/22</a:t>
             </a:fld>
             <a:endParaRPr lang="en-US" dirty="0"/>
           </a:p>
@@ -3367,7 +3367,7 @@
           <a:ln/>
           <a:extLst>
             <a:ext uri="{91240B29-F687-4f45-9708-019B960494DF}">
-              <a14:hiddenLine xmlns:a14="http://schemas.microsoft.com/office/drawing/2010/main" xmlns="" w="9525">
+              <a14:hiddenLine xmlns="" xmlns:a14="http://schemas.microsoft.com/office/drawing/2010/main" w="9525">
                 <a:solidFill>
                   <a:srgbClr val="000000"/>
                 </a:solidFill>
@@ -3552,7 +3552,7 @@
             <a:fld id="{57302355-E14B-8545-A8F8-0FE83CC9D524}" type="datetimeFigureOut">
               <a:rPr lang="en-US" dirty="0"/>
               <a:pPr/>
-              <a:t>6/2/22</a:t>
+              <a:t>6/7/22</a:t>
             </a:fld>
             <a:endParaRPr lang="en-US" dirty="0"/>
           </a:p>
@@ -3703,7 +3703,7 @@
           <a:ln/>
           <a:extLst>
             <a:ext uri="{91240B29-F687-4f45-9708-019B960494DF}">
-              <a14:hiddenLine xmlns:a14="http://schemas.microsoft.com/office/drawing/2010/main" xmlns="" w="9525">
+              <a14:hiddenLine xmlns="" xmlns:a14="http://schemas.microsoft.com/office/drawing/2010/main" w="9525">
                 <a:solidFill>
                   <a:srgbClr val="000000"/>
                 </a:solidFill>
@@ -4026,7 +4026,7 @@
             <a:fld id="{02640F58-564D-2B4F-AE67-E407BA4FCF45}" type="datetimeFigureOut">
               <a:rPr lang="en-US" dirty="0"/>
               <a:pPr/>
-              <a:t>6/2/22</a:t>
+              <a:t>6/7/22</a:t>
             </a:fld>
             <a:endParaRPr lang="en-US" dirty="0"/>
           </a:p>
@@ -4177,7 +4177,7 @@
           <a:ln/>
           <a:extLst>
             <a:ext uri="{91240B29-F687-4f45-9708-019B960494DF}">
-              <a14:hiddenLine xmlns:a14="http://schemas.microsoft.com/office/drawing/2010/main" xmlns="" w="9525">
+              <a14:hiddenLine xmlns="" xmlns:a14="http://schemas.microsoft.com/office/drawing/2010/main" w="9525">
                 <a:solidFill>
                   <a:srgbClr val="000000"/>
                 </a:solidFill>
@@ -4244,7 +4244,7 @@
             <a:fld id="{F13A34C8-038E-2045-AF43-DF7DBB8E0E9E}" type="datetimeFigureOut">
               <a:rPr lang="en-US" dirty="0"/>
               <a:pPr/>
-              <a:t>6/2/22</a:t>
+              <a:t>6/7/22</a:t>
             </a:fld>
             <a:endParaRPr lang="en-US" dirty="0"/>
           </a:p>
@@ -4336,7 +4336,7 @@
             <a:fld id="{8818C68F-D26B-8F47-958C-23B49CF8A634}" type="datetimeFigureOut">
               <a:rPr lang="en-US" dirty="0"/>
               <a:pPr/>
-              <a:t>6/2/22</a:t>
+              <a:t>6/7/22</a:t>
             </a:fld>
             <a:endParaRPr lang="en-US" dirty="0"/>
           </a:p>
@@ -4600,7 +4600,7 @@
           <a:ln/>
           <a:extLst>
             <a:ext uri="{91240B29-F687-4f45-9708-019B960494DF}">
-              <a14:hiddenLine xmlns:a14="http://schemas.microsoft.com/office/drawing/2010/main" xmlns="" w="9525">
+              <a14:hiddenLine xmlns="" xmlns:a14="http://schemas.microsoft.com/office/drawing/2010/main" w="9525">
                 <a:solidFill>
                   <a:srgbClr val="000000"/>
                 </a:solidFill>
@@ -4800,7 +4800,7 @@
             <a:fld id="{D0DF5E60-9974-AC48-9591-99C2BB44B7CF}" type="datetimeFigureOut">
               <a:rPr lang="en-US" dirty="0"/>
               <a:pPr/>
-              <a:t>6/2/22</a:t>
+              <a:t>6/7/22</a:t>
             </a:fld>
             <a:endParaRPr lang="en-US" dirty="0"/>
           </a:p>
@@ -5110,7 +5110,7 @@
             <a:fld id="{18C79C5D-2A6F-F04D-97DA-BEF2467B64E4}" type="datetimeFigureOut">
               <a:rPr lang="en-US" dirty="0"/>
               <a:pPr/>
-              <a:t>6/2/22</a:t>
+              <a:t>6/7/22</a:t>
             </a:fld>
             <a:endParaRPr lang="en-US" dirty="0"/>
           </a:p>
@@ -5377,7 +5377,7 @@
             <a:fld id="{09B482E8-6E0E-1B4F-B1FD-C69DB9E858D9}" type="datetimeFigureOut">
               <a:rPr lang="en-US" dirty="0"/>
               <a:pPr/>
-              <a:t>6/2/22</a:t>
+              <a:t>6/7/22</a:t>
             </a:fld>
             <a:endParaRPr lang="en-US" dirty="0"/>
           </a:p>
@@ -6123,7 +6123,12 @@
             <p:ph type="body" sz="quarter" idx="16"/>
           </p:nvPr>
         </p:nvSpPr>
-        <p:spPr/>
+        <p:spPr>
+          <a:xfrm>
+            <a:off x="7528809" y="2178658"/>
+            <a:ext cx="3810001" cy="2707919"/>
+          </a:xfrm>
+        </p:spPr>
         <p:txBody>
           <a:bodyPr/>
           <a:lstStyle/>
@@ -6134,7 +6139,7 @@
             </a:pPr>
             <a:r>
               <a:rPr lang="en-US" dirty="0"/>
-              <a:t>If the database already has integrity rules in place, adding validation steps in the data science product pipelines helps align the integrity throughout the entire system.</a:t>
+              <a:t>Helps align the integrity throughout the entire system.</a:t>
             </a:r>
           </a:p>
           <a:p>
@@ -6398,7 +6403,12 @@
             <p:ph type="body" sz="quarter" idx="16"/>
           </p:nvPr>
         </p:nvSpPr>
-        <p:spPr/>
+        <p:spPr>
+          <a:xfrm>
+            <a:off x="7574642" y="2321781"/>
+            <a:ext cx="3810001" cy="2835140"/>
+          </a:xfrm>
+        </p:spPr>
         <p:txBody>
           <a:bodyPr/>
           <a:lstStyle/>
@@ -6409,7 +6419,7 @@
             </a:pPr>
             <a:r>
               <a:rPr lang="en-US" dirty="0"/>
-              <a:t>Harnessing Python’s type hints feature, make the code more readable by specifying explicitly what are the inputs and outputs of each function or class.</a:t>
+              <a:t>Harness Python’s type hints feature</a:t>
             </a:r>
           </a:p>
           <a:p>
@@ -6549,7 +6559,7 @@
             </a:pPr>
             <a:r>
               <a:rPr lang="en-US" dirty="0"/>
-              <a:t>This helps us as data professionals learn about the domain and the data in our system.</a:t>
+              <a:t>This helps us as data professionals gain domain knowledge.</a:t>
             </a:r>
           </a:p>
           <a:p>
@@ -9652,16 +9662,6 @@
               <a:t>Pydantic</a:t>
             </a:r>
             <a:endParaRPr lang="en-US" dirty="0"/>
-          </a:p>
-          <a:p>
-            <a:pPr>
-              <a:buFont typeface="+mj-lt"/>
-              <a:buAutoNum type="arabicPeriod"/>
-            </a:pPr>
-            <a:r>
-              <a:rPr lang="en-US" dirty="0"/>
-              <a:t>Other tools and concepts</a:t>
-            </a:r>
           </a:p>
           <a:p>
             <a:pPr marL="0" indent="0">

</xml_diff>

<commit_message>
Updated file names. Fixed order of notebooks. Added term definitions.
</commit_message>
<xml_diff>
--- a/Data Validation for Data Science.pptx
+++ b/Data Validation for Data Science.pptx
@@ -5,7 +5,7 @@
     <p:sldMasterId id="2147483648" r:id="rId1"/>
   </p:sldMasterIdLst>
   <p:notesMasterIdLst>
-    <p:notesMasterId r:id="rId21"/>
+    <p:notesMasterId r:id="rId23"/>
   </p:notesMasterIdLst>
   <p:sldIdLst>
     <p:sldId id="256" r:id="rId2"/>
@@ -14,19 +14,21 @@
     <p:sldId id="258" r:id="rId5"/>
     <p:sldId id="257" r:id="rId6"/>
     <p:sldId id="262" r:id="rId7"/>
-    <p:sldId id="265" r:id="rId8"/>
-    <p:sldId id="275" r:id="rId9"/>
-    <p:sldId id="263" r:id="rId10"/>
-    <p:sldId id="266" r:id="rId11"/>
-    <p:sldId id="267" r:id="rId12"/>
-    <p:sldId id="269" r:id="rId13"/>
-    <p:sldId id="270" r:id="rId14"/>
-    <p:sldId id="268" r:id="rId15"/>
-    <p:sldId id="272" r:id="rId16"/>
-    <p:sldId id="274" r:id="rId17"/>
-    <p:sldId id="271" r:id="rId18"/>
-    <p:sldId id="273" r:id="rId19"/>
-    <p:sldId id="277" r:id="rId20"/>
+    <p:sldId id="278" r:id="rId8"/>
+    <p:sldId id="265" r:id="rId9"/>
+    <p:sldId id="275" r:id="rId10"/>
+    <p:sldId id="263" r:id="rId11"/>
+    <p:sldId id="266" r:id="rId12"/>
+    <p:sldId id="267" r:id="rId13"/>
+    <p:sldId id="269" r:id="rId14"/>
+    <p:sldId id="270" r:id="rId15"/>
+    <p:sldId id="268" r:id="rId16"/>
+    <p:sldId id="272" r:id="rId17"/>
+    <p:sldId id="274" r:id="rId18"/>
+    <p:sldId id="271" r:id="rId19"/>
+    <p:sldId id="273" r:id="rId20"/>
+    <p:sldId id="279" r:id="rId21"/>
+    <p:sldId id="277" r:id="rId22"/>
   </p:sldIdLst>
   <p:sldSz cx="12192000" cy="6858000"/>
   <p:notesSz cx="6858000" cy="9144000"/>
@@ -227,7 +229,7 @@
           <a:p>
             <a:fld id="{F9CD045C-CD78-304F-BD19-120FB2F86E8F}" type="datetimeFigureOut">
               <a:rPr lang="en-US" smtClean="0"/>
-              <a:t>6/7/22</a:t>
+              <a:t>6/13/22</a:t>
             </a:fld>
             <a:endParaRPr lang="en-US"/>
           </a:p>
@@ -571,7 +573,7 @@
           <a:p>
             <a:fld id="{B2F75C95-52CA-1D4F-85E2-662E67122696}" type="slidenum">
               <a:rPr lang="en-US" smtClean="0"/>
-              <a:t>14</a:t>
+              <a:t>15</a:t>
             </a:fld>
             <a:endParaRPr lang="en-US"/>
           </a:p>
@@ -685,7 +687,7 @@
           <a:effectLst/>
           <a:extLst>
             <a:ext uri="{91240B29-F687-4f45-9708-019B960494DF}">
-              <a14:hiddenLine xmlns="" xmlns:a14="http://schemas.microsoft.com/office/drawing/2010/main" w="9525">
+              <a14:hiddenLine xmlns:a14="http://schemas.microsoft.com/office/drawing/2010/main" xmlns="" w="9525">
                 <a:solidFill>
                   <a:srgbClr val="000000"/>
                 </a:solidFill>
@@ -878,7 +880,7 @@
             <a:fld id="{08B9EBBA-996F-894A-B54A-D6246ED52CEA}" type="datetimeFigureOut">
               <a:rPr lang="en-US" dirty="0"/>
               <a:pPr/>
-              <a:t>6/7/22</a:t>
+              <a:t>6/13/22</a:t>
             </a:fld>
             <a:endParaRPr lang="en-US" dirty="0"/>
           </a:p>
@@ -1193,7 +1195,7 @@
             <a:fld id="{18C79C5D-2A6F-F04D-97DA-BEF2467B64E4}" type="datetimeFigureOut">
               <a:rPr lang="en-US" dirty="0"/>
               <a:pPr/>
-              <a:t>6/7/22</a:t>
+              <a:t>6/13/22</a:t>
             </a:fld>
             <a:endParaRPr lang="en-US" dirty="0"/>
           </a:p>
@@ -1678,7 +1680,7 @@
             <a:fld id="{8DFA1846-DA80-1C48-A609-854EA85C59AD}" type="datetimeFigureOut">
               <a:rPr lang="en-US" dirty="0"/>
               <a:pPr/>
-              <a:t>6/7/22</a:t>
+              <a:t>6/13/22</a:t>
             </a:fld>
             <a:endParaRPr lang="en-US" dirty="0"/>
           </a:p>
@@ -2044,7 +2046,7 @@
             <a:fld id="{FBF54567-0DE4-3F47-BF90-CB84690072F9}" type="datetimeFigureOut">
               <a:rPr lang="en-US" dirty="0"/>
               <a:pPr/>
-              <a:t>6/7/22</a:t>
+              <a:t>6/13/22</a:t>
             </a:fld>
             <a:endParaRPr lang="en-US" dirty="0"/>
           </a:p>
@@ -2195,7 +2197,7 @@
           <a:ln/>
           <a:extLst>
             <a:ext uri="{91240B29-F687-4f45-9708-019B960494DF}">
-              <a14:hiddenLine xmlns="" xmlns:a14="http://schemas.microsoft.com/office/drawing/2010/main" w="9525">
+              <a14:hiddenLine xmlns:a14="http://schemas.microsoft.com/office/drawing/2010/main" xmlns="" w="9525">
                 <a:solidFill>
                   <a:srgbClr val="000000"/>
                 </a:solidFill>
@@ -2314,7 +2316,7 @@
             <a:fld id="{C6C52C72-DE31-F449-A4ED-4C594FD91407}" type="datetimeFigureOut">
               <a:rPr lang="en-US" dirty="0"/>
               <a:pPr/>
-              <a:t>6/7/22</a:t>
+              <a:t>6/13/22</a:t>
             </a:fld>
             <a:endParaRPr lang="en-US" dirty="0"/>
           </a:p>
@@ -2467,7 +2469,7 @@
           <a:ln/>
           <a:extLst>
             <a:ext uri="{91240B29-F687-4f45-9708-019B960494DF}">
-              <a14:hiddenLine xmlns="" xmlns:a14="http://schemas.microsoft.com/office/drawing/2010/main" w="9525">
+              <a14:hiddenLine xmlns:a14="http://schemas.microsoft.com/office/drawing/2010/main" xmlns="" w="9525">
                 <a:solidFill>
                   <a:srgbClr val="000000"/>
                 </a:solidFill>
@@ -2596,7 +2598,7 @@
             <a:fld id="{ED62726E-379B-B349-9EED-81ED093FA806}" type="datetimeFigureOut">
               <a:rPr lang="en-US" dirty="0"/>
               <a:pPr/>
-              <a:t>6/7/22</a:t>
+              <a:t>6/13/22</a:t>
             </a:fld>
             <a:endParaRPr lang="en-US" dirty="0"/>
           </a:p>
@@ -2747,7 +2749,7 @@
           <a:ln/>
           <a:extLst>
             <a:ext uri="{91240B29-F687-4f45-9708-019B960494DF}">
-              <a14:hiddenLine xmlns="" xmlns:a14="http://schemas.microsoft.com/office/drawing/2010/main" w="9525">
+              <a14:hiddenLine xmlns:a14="http://schemas.microsoft.com/office/drawing/2010/main" xmlns="" w="9525">
                 <a:solidFill>
                   <a:srgbClr val="000000"/>
                 </a:solidFill>
@@ -2876,7 +2878,7 @@
             <a:fld id="{9B3A1323-8D79-1946-B0D7-40001CF92E9D}" type="datetimeFigureOut">
               <a:rPr lang="en-US" dirty="0"/>
               <a:pPr/>
-              <a:t>6/7/22</a:t>
+              <a:t>6/13/22</a:t>
             </a:fld>
             <a:endParaRPr lang="en-US" dirty="0"/>
           </a:p>
@@ -3216,7 +3218,7 @@
             <a:fld id="{8DFA1846-DA80-1C48-A609-854EA85C59AD}" type="datetimeFigureOut">
               <a:rPr lang="en-US" dirty="0"/>
               <a:pPr/>
-              <a:t>6/7/22</a:t>
+              <a:t>6/13/22</a:t>
             </a:fld>
             <a:endParaRPr lang="en-US" dirty="0"/>
           </a:p>
@@ -3367,7 +3369,7 @@
           <a:ln/>
           <a:extLst>
             <a:ext uri="{91240B29-F687-4f45-9708-019B960494DF}">
-              <a14:hiddenLine xmlns="" xmlns:a14="http://schemas.microsoft.com/office/drawing/2010/main" w="9525">
+              <a14:hiddenLine xmlns:a14="http://schemas.microsoft.com/office/drawing/2010/main" xmlns="" w="9525">
                 <a:solidFill>
                   <a:srgbClr val="000000"/>
                 </a:solidFill>
@@ -3552,7 +3554,7 @@
             <a:fld id="{57302355-E14B-8545-A8F8-0FE83CC9D524}" type="datetimeFigureOut">
               <a:rPr lang="en-US" dirty="0"/>
               <a:pPr/>
-              <a:t>6/7/22</a:t>
+              <a:t>6/13/22</a:t>
             </a:fld>
             <a:endParaRPr lang="en-US" dirty="0"/>
           </a:p>
@@ -3703,7 +3705,7 @@
           <a:ln/>
           <a:extLst>
             <a:ext uri="{91240B29-F687-4f45-9708-019B960494DF}">
-              <a14:hiddenLine xmlns="" xmlns:a14="http://schemas.microsoft.com/office/drawing/2010/main" w="9525">
+              <a14:hiddenLine xmlns:a14="http://schemas.microsoft.com/office/drawing/2010/main" xmlns="" w="9525">
                 <a:solidFill>
                   <a:srgbClr val="000000"/>
                 </a:solidFill>
@@ -4026,7 +4028,7 @@
             <a:fld id="{02640F58-564D-2B4F-AE67-E407BA4FCF45}" type="datetimeFigureOut">
               <a:rPr lang="en-US" dirty="0"/>
               <a:pPr/>
-              <a:t>6/7/22</a:t>
+              <a:t>6/13/22</a:t>
             </a:fld>
             <a:endParaRPr lang="en-US" dirty="0"/>
           </a:p>
@@ -4177,7 +4179,7 @@
           <a:ln/>
           <a:extLst>
             <a:ext uri="{91240B29-F687-4f45-9708-019B960494DF}">
-              <a14:hiddenLine xmlns="" xmlns:a14="http://schemas.microsoft.com/office/drawing/2010/main" w="9525">
+              <a14:hiddenLine xmlns:a14="http://schemas.microsoft.com/office/drawing/2010/main" xmlns="" w="9525">
                 <a:solidFill>
                   <a:srgbClr val="000000"/>
                 </a:solidFill>
@@ -4244,7 +4246,7 @@
             <a:fld id="{F13A34C8-038E-2045-AF43-DF7DBB8E0E9E}" type="datetimeFigureOut">
               <a:rPr lang="en-US" dirty="0"/>
               <a:pPr/>
-              <a:t>6/7/22</a:t>
+              <a:t>6/13/22</a:t>
             </a:fld>
             <a:endParaRPr lang="en-US" dirty="0"/>
           </a:p>
@@ -4336,7 +4338,7 @@
             <a:fld id="{8818C68F-D26B-8F47-958C-23B49CF8A634}" type="datetimeFigureOut">
               <a:rPr lang="en-US" dirty="0"/>
               <a:pPr/>
-              <a:t>6/7/22</a:t>
+              <a:t>6/13/22</a:t>
             </a:fld>
             <a:endParaRPr lang="en-US" dirty="0"/>
           </a:p>
@@ -4600,7 +4602,7 @@
           <a:ln/>
           <a:extLst>
             <a:ext uri="{91240B29-F687-4f45-9708-019B960494DF}">
-              <a14:hiddenLine xmlns="" xmlns:a14="http://schemas.microsoft.com/office/drawing/2010/main" w="9525">
+              <a14:hiddenLine xmlns:a14="http://schemas.microsoft.com/office/drawing/2010/main" xmlns="" w="9525">
                 <a:solidFill>
                   <a:srgbClr val="000000"/>
                 </a:solidFill>
@@ -4800,7 +4802,7 @@
             <a:fld id="{D0DF5E60-9974-AC48-9591-99C2BB44B7CF}" type="datetimeFigureOut">
               <a:rPr lang="en-US" dirty="0"/>
               <a:pPr/>
-              <a:t>6/7/22</a:t>
+              <a:t>6/13/22</a:t>
             </a:fld>
             <a:endParaRPr lang="en-US" dirty="0"/>
           </a:p>
@@ -5110,7 +5112,7 @@
             <a:fld id="{18C79C5D-2A6F-F04D-97DA-BEF2467B64E4}" type="datetimeFigureOut">
               <a:rPr lang="en-US" dirty="0"/>
               <a:pPr/>
-              <a:t>6/7/22</a:t>
+              <a:t>6/13/22</a:t>
             </a:fld>
             <a:endParaRPr lang="en-US" dirty="0"/>
           </a:p>
@@ -5377,7 +5379,7 @@
             <a:fld id="{09B482E8-6E0E-1B4F-B1FD-C69DB9E858D9}" type="datetimeFigureOut">
               <a:rPr lang="en-US" dirty="0"/>
               <a:pPr/>
-              <a:t>6/7/22</a:t>
+              <a:t>6/13/22</a:t>
             </a:fld>
             <a:endParaRPr lang="en-US" dirty="0"/>
           </a:p>
@@ -6059,7 +6061,7 @@
           <p:cNvPr id="2" name="Title 1">
             <a:extLst>
               <a:ext uri="{FF2B5EF4-FFF2-40B4-BE49-F238E27FC236}">
-                <a16:creationId xmlns:a16="http://schemas.microsoft.com/office/drawing/2014/main" id="{E25DDF7A-5810-36DC-CC84-2FEF7A3A3986}"/>
+                <a16:creationId xmlns:a16="http://schemas.microsoft.com/office/drawing/2014/main" id="{D1F6F9CC-65B6-C127-A624-C8B0CACE87F1}"/>
               </a:ext>
             </a:extLst>
           </p:cNvPr>
@@ -6070,94 +6072,99 @@
             <p:ph type="title"/>
           </p:nvPr>
         </p:nvSpPr>
-        <p:spPr/>
-        <p:txBody>
-          <a:bodyPr/>
+        <p:spPr>
+          <a:xfrm>
+            <a:off x="714061" y="855677"/>
+            <a:ext cx="6005522" cy="784333"/>
+          </a:xfrm>
+        </p:spPr>
+        <p:txBody>
+          <a:bodyPr>
+            <a:normAutofit/>
+          </a:bodyPr>
           <a:lstStyle/>
           <a:p>
             <a:r>
-              <a:rPr lang="en-US" dirty="0"/>
-              <a:t>1. Maintain data integrity</a:t>
-            </a:r>
-          </a:p>
-        </p:txBody>
-      </p:sp>
-      <p:sp>
-        <p:nvSpPr>
-          <p:cNvPr id="3" name="Text Placeholder 2">
+              <a:rPr lang="en-US" sz="3600" dirty="0"/>
+              <a:t>Why validate your data?</a:t>
+            </a:r>
+          </a:p>
+        </p:txBody>
+      </p:sp>
+      <p:pic>
+        <p:nvPicPr>
+          <p:cNvPr id="2052" name="Picture 4" descr="Data Pipeline">
             <a:extLst>
               <a:ext uri="{FF2B5EF4-FFF2-40B4-BE49-F238E27FC236}">
-                <a16:creationId xmlns:a16="http://schemas.microsoft.com/office/drawing/2014/main" id="{F506C454-FFEE-D6B1-B77E-6B688BF3B5AF}"/>
+                <a16:creationId xmlns:a16="http://schemas.microsoft.com/office/drawing/2014/main" id="{7C6F7BC8-8A9E-1675-6C05-F28F893D896F}"/>
               </a:ext>
             </a:extLst>
           </p:cNvPr>
-          <p:cNvSpPr>
-            <a:spLocks noGrp="1"/>
-          </p:cNvSpPr>
-          <p:nvPr>
-            <p:ph type="body" idx="1"/>
-          </p:nvPr>
-        </p:nvSpPr>
-        <p:spPr/>
-        <p:txBody>
-          <a:bodyPr/>
-          <a:lstStyle/>
-          <a:p>
-            <a:endParaRPr lang="en-US"/>
-          </a:p>
-        </p:txBody>
-      </p:sp>
-      <p:sp>
-        <p:nvSpPr>
-          <p:cNvPr id="4" name="Text Placeholder 3">
+          <p:cNvPicPr>
+            <a:picLocks noChangeAspect="1" noChangeArrowheads="1"/>
+          </p:cNvPicPr>
+          <p:nvPr/>
+        </p:nvPicPr>
+        <p:blipFill>
+          <a:blip r:embed="rId2">
             <a:extLst>
-              <a:ext uri="{FF2B5EF4-FFF2-40B4-BE49-F238E27FC236}">
-                <a16:creationId xmlns:a16="http://schemas.microsoft.com/office/drawing/2014/main" id="{8B62AD72-661B-1880-5BA7-28AE1EB43511}"/>
+              <a:ext uri="{28A0092B-C50C-407E-A947-70E740481C1C}">
+                <a14:useLocalDpi xmlns:a14="http://schemas.microsoft.com/office/drawing/2010/main" val="0"/>
               </a:ext>
             </a:extLst>
-          </p:cNvPr>
-          <p:cNvSpPr>
-            <a:spLocks noGrp="1"/>
-          </p:cNvSpPr>
-          <p:nvPr>
-            <p:ph type="body" sz="quarter" idx="16"/>
-          </p:nvPr>
-        </p:nvSpPr>
-        <p:spPr>
+          </a:blip>
+          <a:srcRect/>
+          <a:stretch>
+            <a:fillRect/>
+          </a:stretch>
+        </p:blipFill>
+        <p:spPr bwMode="auto">
           <a:xfrm>
-            <a:off x="7528809" y="2178658"/>
-            <a:ext cx="3810001" cy="2707919"/>
-          </a:xfrm>
-        </p:spPr>
-        <p:txBody>
-          <a:bodyPr/>
-          <a:lstStyle/>
-          <a:p>
-            <a:pPr marL="285750" indent="-285750">
-              <a:buFont typeface="Arial" panose="020B0604020202020204" pitchFamily="34" charset="0"/>
-              <a:buChar char="•"/>
-            </a:pPr>
-            <a:r>
-              <a:rPr lang="en-US" dirty="0"/>
-              <a:t>Helps align the integrity throughout the entire system.</a:t>
-            </a:r>
-          </a:p>
-          <a:p>
-            <a:pPr marL="285750" indent="-285750">
-              <a:buFont typeface="Arial" panose="020B0604020202020204" pitchFamily="34" charset="0"/>
-              <a:buChar char="•"/>
-            </a:pPr>
-            <a:r>
-              <a:rPr lang="en-US" dirty="0"/>
-              <a:t>This only relates to the logical integrity of the data, and not the physical one.</a:t>
-            </a:r>
-          </a:p>
-        </p:txBody>
-      </p:sp>
+            <a:off x="2020583" y="2624123"/>
+            <a:ext cx="9398000" cy="3378200"/>
+          </a:xfrm>
+          <a:prstGeom prst="roundRect">
+            <a:avLst>
+              <a:gd name="adj" fmla="val 16667"/>
+            </a:avLst>
+          </a:prstGeom>
+          <a:ln>
+            <a:noFill/>
+          </a:ln>
+          <a:effectLst>
+            <a:outerShdw blurRad="76200" dist="38100" dir="7800000" algn="tl" rotWithShape="0">
+              <a:srgbClr val="000000">
+                <a:alpha val="40000"/>
+              </a:srgbClr>
+            </a:outerShdw>
+          </a:effectLst>
+          <a:scene3d>
+            <a:camera prst="orthographicFront"/>
+            <a:lightRig rig="contrasting" dir="t">
+              <a:rot lat="0" lon="0" rev="4200000"/>
+            </a:lightRig>
+          </a:scene3d>
+          <a:sp3d prstMaterial="plastic">
+            <a:bevelT w="381000" h="114300" prst="relaxedInset"/>
+            <a:contourClr>
+              <a:srgbClr val="969696"/>
+            </a:contourClr>
+          </a:sp3d>
+          <a:extLst>
+            <a:ext uri="{909E8E84-426E-40DD-AFC4-6F175D3DCCD1}">
+              <a14:hiddenFill xmlns:a14="http://schemas.microsoft.com/office/drawing/2010/main">
+                <a:solidFill>
+                  <a:srgbClr val="FFFFFF"/>
+                </a:solidFill>
+              </a14:hiddenFill>
+            </a:ext>
+          </a:extLst>
+        </p:spPr>
+      </p:pic>
     </p:spTree>
     <p:extLst>
       <p:ext uri="{BB962C8B-B14F-4D97-AF65-F5344CB8AC3E}">
-        <p14:creationId xmlns:p14="http://schemas.microsoft.com/office/powerpoint/2010/main" val="4030897301"/>
+        <p14:creationId xmlns:p14="http://schemas.microsoft.com/office/powerpoint/2010/main" val="3190012637"/>
       </p:ext>
     </p:extLst>
   </p:cSld>
@@ -6207,7 +6214,7 @@
           <a:p>
             <a:r>
               <a:rPr lang="en-US" dirty="0"/>
-              <a:t>2. Reliability</a:t>
+              <a:t>1. Maintain data integrity</a:t>
             </a:r>
           </a:p>
         </p:txBody>
@@ -6253,7 +6260,12 @@
             <p:ph type="body" sz="quarter" idx="16"/>
           </p:nvPr>
         </p:nvSpPr>
-        <p:spPr/>
+        <p:spPr>
+          <a:xfrm>
+            <a:off x="7528809" y="2178658"/>
+            <a:ext cx="3810001" cy="2707919"/>
+          </a:xfrm>
+        </p:spPr>
         <p:txBody>
           <a:bodyPr/>
           <a:lstStyle/>
@@ -6264,7 +6276,7 @@
             </a:pPr>
             <a:r>
               <a:rPr lang="en-US" dirty="0"/>
-              <a:t>Prevent and detect bugs from the very first interaction with the data.</a:t>
+              <a:t>Helps align the integrity throughout the entire system.</a:t>
             </a:r>
           </a:p>
           <a:p>
@@ -6274,27 +6286,7 @@
             </a:pPr>
             <a:r>
               <a:rPr lang="en-US" dirty="0"/>
-              <a:t>Prevent and detect bugs throughout the data science product life cycle.</a:t>
-            </a:r>
-          </a:p>
-          <a:p>
-            <a:pPr marL="285750" indent="-285750">
-              <a:buFont typeface="Arial" panose="020B0604020202020204" pitchFamily="34" charset="0"/>
-              <a:buChar char="•"/>
-            </a:pPr>
-            <a:r>
-              <a:rPr lang="en-US" dirty="0"/>
-              <a:t>Minimize surprises – know what input to expect and where to expect it.</a:t>
-            </a:r>
-          </a:p>
-          <a:p>
-            <a:pPr marL="285750" indent="-285750">
-              <a:buFont typeface="Arial" panose="020B0604020202020204" pitchFamily="34" charset="0"/>
-              <a:buChar char="•"/>
-            </a:pPr>
-            <a:r>
-              <a:rPr lang="en-US" dirty="0"/>
-              <a:t>Can help with an early detection of a data drift.</a:t>
+              <a:t>This only relates to the logical integrity of the data, and not the physical one.</a:t>
             </a:r>
           </a:p>
         </p:txBody>
@@ -6302,7 +6294,7 @@
     </p:spTree>
     <p:extLst>
       <p:ext uri="{BB962C8B-B14F-4D97-AF65-F5344CB8AC3E}">
-        <p14:creationId xmlns:p14="http://schemas.microsoft.com/office/powerpoint/2010/main" val="935944819"/>
+        <p14:creationId xmlns:p14="http://schemas.microsoft.com/office/powerpoint/2010/main" val="4030897301"/>
       </p:ext>
     </p:extLst>
   </p:cSld>
@@ -6345,19 +6337,14 @@
             <p:ph type="title"/>
           </p:nvPr>
         </p:nvSpPr>
-        <p:spPr>
-          <a:xfrm>
-            <a:off x="850986" y="1221877"/>
-            <a:ext cx="5893840" cy="2645912"/>
-          </a:xfrm>
-        </p:spPr>
+        <p:spPr/>
         <p:txBody>
           <a:bodyPr/>
           <a:lstStyle/>
           <a:p>
             <a:r>
               <a:rPr lang="en-US" dirty="0"/>
-              <a:t>3. Readability</a:t>
+              <a:t>2. Reliability</a:t>
             </a:r>
           </a:p>
         </p:txBody>
@@ -6403,12 +6390,7 @@
             <p:ph type="body" sz="quarter" idx="16"/>
           </p:nvPr>
         </p:nvSpPr>
-        <p:spPr>
-          <a:xfrm>
-            <a:off x="7574642" y="2321781"/>
-            <a:ext cx="3810001" cy="2835140"/>
-          </a:xfrm>
-        </p:spPr>
+        <p:spPr/>
         <p:txBody>
           <a:bodyPr/>
           <a:lstStyle/>
@@ -6419,7 +6401,7 @@
             </a:pPr>
             <a:r>
               <a:rPr lang="en-US" dirty="0"/>
-              <a:t>Harness Python’s type hints feature</a:t>
+              <a:t>Prevent and detect bugs from the very first interaction with the data.</a:t>
             </a:r>
           </a:p>
           <a:p>
@@ -6429,7 +6411,27 @@
             </a:pPr>
             <a:r>
               <a:rPr lang="en-US" dirty="0"/>
-              <a:t>Some IDEs will highlight if something is wrong before we actually run anything.</a:t>
+              <a:t>Prevent and detect bugs throughout the data science product life cycle.</a:t>
+            </a:r>
+          </a:p>
+          <a:p>
+            <a:pPr marL="285750" indent="-285750">
+              <a:buFont typeface="Arial" panose="020B0604020202020204" pitchFamily="34" charset="0"/>
+              <a:buChar char="•"/>
+            </a:pPr>
+            <a:r>
+              <a:rPr lang="en-US" dirty="0"/>
+              <a:t>Minimize surprises – know what input to expect and where to expect it.</a:t>
+            </a:r>
+          </a:p>
+          <a:p>
+            <a:pPr marL="285750" indent="-285750">
+              <a:buFont typeface="Arial" panose="020B0604020202020204" pitchFamily="34" charset="0"/>
+              <a:buChar char="•"/>
+            </a:pPr>
+            <a:r>
+              <a:rPr lang="en-US" dirty="0"/>
+              <a:t>Can help with an early detection of a data drift.</a:t>
             </a:r>
           </a:p>
         </p:txBody>
@@ -6437,7 +6439,7 @@
     </p:spTree>
     <p:extLst>
       <p:ext uri="{BB962C8B-B14F-4D97-AF65-F5344CB8AC3E}">
-        <p14:creationId xmlns:p14="http://schemas.microsoft.com/office/powerpoint/2010/main" val="3946123073"/>
+        <p14:creationId xmlns:p14="http://schemas.microsoft.com/office/powerpoint/2010/main" val="935944819"/>
       </p:ext>
     </p:extLst>
   </p:cSld>
@@ -6482,6 +6484,141 @@
         </p:nvSpPr>
         <p:spPr>
           <a:xfrm>
+            <a:off x="850986" y="1221877"/>
+            <a:ext cx="5893840" cy="2645912"/>
+          </a:xfrm>
+        </p:spPr>
+        <p:txBody>
+          <a:bodyPr/>
+          <a:lstStyle/>
+          <a:p>
+            <a:r>
+              <a:rPr lang="en-US" dirty="0"/>
+              <a:t>3. Readability</a:t>
+            </a:r>
+          </a:p>
+        </p:txBody>
+      </p:sp>
+      <p:sp>
+        <p:nvSpPr>
+          <p:cNvPr id="3" name="Text Placeholder 2">
+            <a:extLst>
+              <a:ext uri="{FF2B5EF4-FFF2-40B4-BE49-F238E27FC236}">
+                <a16:creationId xmlns:a16="http://schemas.microsoft.com/office/drawing/2014/main" id="{F506C454-FFEE-D6B1-B77E-6B688BF3B5AF}"/>
+              </a:ext>
+            </a:extLst>
+          </p:cNvPr>
+          <p:cNvSpPr>
+            <a:spLocks noGrp="1"/>
+          </p:cNvSpPr>
+          <p:nvPr>
+            <p:ph type="body" idx="1"/>
+          </p:nvPr>
+        </p:nvSpPr>
+        <p:spPr/>
+        <p:txBody>
+          <a:bodyPr/>
+          <a:lstStyle/>
+          <a:p>
+            <a:endParaRPr lang="en-US"/>
+          </a:p>
+        </p:txBody>
+      </p:sp>
+      <p:sp>
+        <p:nvSpPr>
+          <p:cNvPr id="4" name="Text Placeholder 3">
+            <a:extLst>
+              <a:ext uri="{FF2B5EF4-FFF2-40B4-BE49-F238E27FC236}">
+                <a16:creationId xmlns:a16="http://schemas.microsoft.com/office/drawing/2014/main" id="{8B62AD72-661B-1880-5BA7-28AE1EB43511}"/>
+              </a:ext>
+            </a:extLst>
+          </p:cNvPr>
+          <p:cNvSpPr>
+            <a:spLocks noGrp="1"/>
+          </p:cNvSpPr>
+          <p:nvPr>
+            <p:ph type="body" sz="quarter" idx="16"/>
+          </p:nvPr>
+        </p:nvSpPr>
+        <p:spPr>
+          <a:xfrm>
+            <a:off x="7574642" y="2321781"/>
+            <a:ext cx="3810001" cy="2835140"/>
+          </a:xfrm>
+        </p:spPr>
+        <p:txBody>
+          <a:bodyPr/>
+          <a:lstStyle/>
+          <a:p>
+            <a:pPr marL="285750" indent="-285750">
+              <a:buFont typeface="Arial" panose="020B0604020202020204" pitchFamily="34" charset="0"/>
+              <a:buChar char="•"/>
+            </a:pPr>
+            <a:r>
+              <a:rPr lang="en-US" dirty="0"/>
+              <a:t>Harness Python’s type hints feature</a:t>
+            </a:r>
+          </a:p>
+          <a:p>
+            <a:pPr marL="285750" indent="-285750">
+              <a:buFont typeface="Arial" panose="020B0604020202020204" pitchFamily="34" charset="0"/>
+              <a:buChar char="•"/>
+            </a:pPr>
+            <a:r>
+              <a:rPr lang="en-US" dirty="0"/>
+              <a:t>Some IDEs will highlight if something is wrong before we actually run anything.</a:t>
+            </a:r>
+          </a:p>
+        </p:txBody>
+      </p:sp>
+    </p:spTree>
+    <p:extLst>
+      <p:ext uri="{BB962C8B-B14F-4D97-AF65-F5344CB8AC3E}">
+        <p14:creationId xmlns:p14="http://schemas.microsoft.com/office/powerpoint/2010/main" val="3946123073"/>
+      </p:ext>
+    </p:extLst>
+  </p:cSld>
+  <p:clrMapOvr>
+    <a:masterClrMapping/>
+  </p:clrMapOvr>
+</p:sld>
+</file>
+
+<file path=ppt/slides/slide14.xml><?xml version="1.0" encoding="utf-8"?>
+<p:sld xmlns:a="http://schemas.openxmlformats.org/drawingml/2006/main" xmlns:r="http://schemas.openxmlformats.org/officeDocument/2006/relationships" xmlns:p="http://schemas.openxmlformats.org/presentationml/2006/main">
+  <p:cSld>
+    <p:spTree>
+      <p:nvGrpSpPr>
+        <p:cNvPr id="1" name=""/>
+        <p:cNvGrpSpPr/>
+        <p:nvPr/>
+      </p:nvGrpSpPr>
+      <p:grpSpPr>
+        <a:xfrm>
+          <a:off x="0" y="0"/>
+          <a:ext cx="0" cy="0"/>
+          <a:chOff x="0" y="0"/>
+          <a:chExt cx="0" cy="0"/>
+        </a:xfrm>
+      </p:grpSpPr>
+      <p:sp>
+        <p:nvSpPr>
+          <p:cNvPr id="2" name="Title 1">
+            <a:extLst>
+              <a:ext uri="{FF2B5EF4-FFF2-40B4-BE49-F238E27FC236}">
+                <a16:creationId xmlns:a16="http://schemas.microsoft.com/office/drawing/2014/main" id="{E25DDF7A-5810-36DC-CC84-2FEF7A3A3986}"/>
+              </a:ext>
+            </a:extLst>
+          </p:cNvPr>
+          <p:cNvSpPr>
+            <a:spLocks noGrp="1"/>
+          </p:cNvSpPr>
+          <p:nvPr>
+            <p:ph type="title"/>
+          </p:nvPr>
+        </p:nvSpPr>
+        <p:spPr>
+          <a:xfrm>
             <a:off x="807357" y="1255127"/>
             <a:ext cx="5893840" cy="2645912"/>
           </a:xfrm>
@@ -6597,7 +6734,7 @@
 </p:sld>
 </file>
 
-<file path=ppt/slides/slide14.xml><?xml version="1.0" encoding="utf-8"?>
+<file path=ppt/slides/slide15.xml><?xml version="1.0" encoding="utf-8"?>
 <p:sld xmlns:a="http://schemas.openxmlformats.org/drawingml/2006/main" xmlns:r="http://schemas.openxmlformats.org/officeDocument/2006/relationships" xmlns:p="http://schemas.openxmlformats.org/presentationml/2006/main">
   <p:cSld>
     <p:spTree>
@@ -7173,7 +7310,7 @@
 </p:sld>
 </file>
 
-<file path=ppt/slides/slide15.xml><?xml version="1.0" encoding="utf-8"?>
+<file path=ppt/slides/slide16.xml><?xml version="1.0" encoding="utf-8"?>
 <p:sld xmlns:a="http://schemas.openxmlformats.org/drawingml/2006/main" xmlns:r="http://schemas.openxmlformats.org/officeDocument/2006/relationships" xmlns:p="http://schemas.openxmlformats.org/presentationml/2006/main">
   <p:cSld>
     <p:spTree>
@@ -7243,10 +7380,7 @@
               <a:buFont typeface="+mj-lt"/>
               <a:buAutoNum type="arabicPeriod"/>
             </a:pPr>
-            <a:r>
-              <a:rPr lang="en-US" dirty="0"/>
-              <a:t>Training pipelines validation with</a:t>
-            </a:r>
+            <a:endParaRPr lang="en-US" dirty="0"/>
           </a:p>
           <a:p>
             <a:pPr>
@@ -7255,7 +7389,7 @@
             </a:pPr>
             <a:r>
               <a:rPr lang="en-US" dirty="0"/>
-              <a:t>Model serving validation with</a:t>
+              <a:t>Dataset validation with </a:t>
             </a:r>
           </a:p>
           <a:p>
@@ -7265,32 +7399,34 @@
             </a:pPr>
             <a:r>
               <a:rPr lang="en-US" dirty="0"/>
-              <a:t>Dataset validation with </a:t>
-            </a:r>
-            <a:endParaRPr lang="he-IL" dirty="0"/>
+              <a:t>Training pipelines validation with</a:t>
+            </a:r>
           </a:p>
           <a:p>
             <a:pPr>
               <a:buFont typeface="+mj-lt"/>
               <a:buAutoNum type="arabicPeriod"/>
             </a:pPr>
-            <a:endParaRPr lang="he-IL" dirty="0"/>
+            <a:r>
+              <a:rPr lang="en-US" dirty="0"/>
+              <a:t>Model serving validation with</a:t>
+            </a:r>
           </a:p>
           <a:p>
             <a:pPr marL="0" indent="0">
               <a:buNone/>
             </a:pPr>
             <a:r>
-              <a:rPr lang="en-GB" dirty="0"/>
-              <a:t>Dataset used: </a:t>
-            </a:r>
-            <a:r>
-              <a:rPr lang="en-GB" dirty="0">
-                <a:hlinkClick r:id="rId2"/>
-              </a:rPr>
-              <a:t>Kaggle house prices prediction competition</a:t>
-            </a:r>
-            <a:endParaRPr lang="en-US" dirty="0"/>
+              <a:rPr lang="en-US" dirty="0"/>
+              <a:t>*Each of the tools could potentially be used for any of the components</a:t>
+            </a:r>
+            <a:endParaRPr lang="he-IL" dirty="0"/>
+          </a:p>
+          <a:p>
+            <a:pPr marL="0" indent="0">
+              <a:buNone/>
+            </a:pPr>
+            <a:endParaRPr lang="en-GB" dirty="0"/>
           </a:p>
         </p:txBody>
       </p:sp>
@@ -7309,7 +7445,7 @@
           <p:nvPr/>
         </p:nvPicPr>
         <p:blipFill>
-          <a:blip r:embed="rId3">
+          <a:blip r:embed="rId2">
             <a:extLst>
               <a:ext uri="{28A0092B-C50C-407E-A947-70E740481C1C}">
                 <a14:useLocalDpi xmlns:a14="http://schemas.microsoft.com/office/drawing/2010/main" val="0"/>
@@ -7323,7 +7459,7 @@
         </p:blipFill>
         <p:spPr bwMode="auto">
           <a:xfrm>
-            <a:off x="4835235" y="3055572"/>
+            <a:off x="4835235" y="3651272"/>
             <a:ext cx="1260764" cy="365917"/>
           </a:xfrm>
           <a:prstGeom prst="rect">
@@ -7356,7 +7492,7 @@
           <p:nvPr/>
         </p:nvPicPr>
         <p:blipFill rotWithShape="1">
-          <a:blip r:embed="rId4">
+          <a:blip r:embed="rId3">
             <a:extLst>
               <a:ext uri="{28A0092B-C50C-407E-A947-70E740481C1C}">
                 <a14:useLocalDpi xmlns:a14="http://schemas.microsoft.com/office/drawing/2010/main" val="0"/>
@@ -7368,7 +7504,7 @@
         </p:blipFill>
         <p:spPr bwMode="auto">
           <a:xfrm>
-            <a:off x="4650969" y="3436512"/>
+            <a:off x="4650969" y="4074572"/>
             <a:ext cx="814648" cy="342035"/>
           </a:xfrm>
           <a:prstGeom prst="rect">
@@ -7401,7 +7537,7 @@
           <p:nvPr/>
         </p:nvPicPr>
         <p:blipFill>
-          <a:blip r:embed="rId5">
+          <a:blip r:embed="rId4">
             <a:alphaModFix/>
             <a:extLst>
               <a:ext uri="{28A0092B-C50C-407E-A947-70E740481C1C}">
@@ -7416,7 +7552,7 @@
         </p:blipFill>
         <p:spPr bwMode="auto">
           <a:xfrm>
-            <a:off x="4148050" y="3847730"/>
+            <a:off x="3881538" y="3269923"/>
             <a:ext cx="1538861" cy="342036"/>
           </a:xfrm>
           <a:prstGeom prst="rect">
@@ -7440,7 +7576,7 @@
 </p:sld>
 </file>
 
-<file path=ppt/slides/slide16.xml><?xml version="1.0" encoding="utf-8"?>
+<file path=ppt/slides/slide17.xml><?xml version="1.0" encoding="utf-8"?>
 <p:sld xmlns:a="http://schemas.openxmlformats.org/drawingml/2006/main" xmlns:r="http://schemas.openxmlformats.org/officeDocument/2006/relationships" xmlns:p="http://schemas.openxmlformats.org/presentationml/2006/main">
   <p:cSld>
     <p:spTree>
@@ -7678,7 +7814,7 @@
 </p:sld>
 </file>
 
-<file path=ppt/slides/slide17.xml><?xml version="1.0" encoding="utf-8"?>
+<file path=ppt/slides/slide18.xml><?xml version="1.0" encoding="utf-8"?>
 <p:sld xmlns:a="http://schemas.openxmlformats.org/drawingml/2006/main" xmlns:r="http://schemas.openxmlformats.org/officeDocument/2006/relationships" xmlns:p="http://schemas.openxmlformats.org/presentationml/2006/main">
   <p:cSld>
     <p:spTree>
@@ -7921,7 +8057,7 @@
 </p:sld>
 </file>
 
-<file path=ppt/slides/slide18.xml><?xml version="1.0" encoding="utf-8"?>
+<file path=ppt/slides/slide19.xml><?xml version="1.0" encoding="utf-8"?>
 <p:sld xmlns:a="http://schemas.openxmlformats.org/drawingml/2006/main" xmlns:r="http://schemas.openxmlformats.org/officeDocument/2006/relationships" xmlns:p="http://schemas.openxmlformats.org/presentationml/2006/main">
   <p:cSld>
     <p:spTree>
@@ -9073,92 +9209,6 @@
     <p:extLst>
       <p:ext uri="{BB962C8B-B14F-4D97-AF65-F5344CB8AC3E}">
         <p14:creationId xmlns:p14="http://schemas.microsoft.com/office/powerpoint/2010/main" val="4198666306"/>
-      </p:ext>
-    </p:extLst>
-  </p:cSld>
-  <p:clrMapOvr>
-    <a:masterClrMapping/>
-  </p:clrMapOvr>
-</p:sld>
-</file>
-
-<file path=ppt/slides/slide19.xml><?xml version="1.0" encoding="utf-8"?>
-<p:sld xmlns:a="http://schemas.openxmlformats.org/drawingml/2006/main" xmlns:r="http://schemas.openxmlformats.org/officeDocument/2006/relationships" xmlns:p="http://schemas.openxmlformats.org/presentationml/2006/main">
-  <p:cSld>
-    <p:spTree>
-      <p:nvGrpSpPr>
-        <p:cNvPr id="1" name=""/>
-        <p:cNvGrpSpPr/>
-        <p:nvPr/>
-      </p:nvGrpSpPr>
-      <p:grpSpPr>
-        <a:xfrm>
-          <a:off x="0" y="0"/>
-          <a:ext cx="0" cy="0"/>
-          <a:chOff x="0" y="0"/>
-          <a:chExt cx="0" cy="0"/>
-        </a:xfrm>
-      </p:grpSpPr>
-      <p:sp>
-        <p:nvSpPr>
-          <p:cNvPr id="2" name="Title 1">
-            <a:extLst>
-              <a:ext uri="{FF2B5EF4-FFF2-40B4-BE49-F238E27FC236}">
-                <a16:creationId xmlns:a16="http://schemas.microsoft.com/office/drawing/2014/main" id="{E104701D-D10B-66CF-1F03-F3672040F878}"/>
-              </a:ext>
-            </a:extLst>
-          </p:cNvPr>
-          <p:cNvSpPr>
-            <a:spLocks noGrp="1"/>
-          </p:cNvSpPr>
-          <p:nvPr>
-            <p:ph type="ctrTitle"/>
-          </p:nvPr>
-        </p:nvSpPr>
-        <p:spPr/>
-        <p:txBody>
-          <a:bodyPr/>
-          <a:lstStyle/>
-          <a:p>
-            <a:r>
-              <a:rPr lang="en-US" dirty="0"/>
-              <a:t>Thank you for listening!</a:t>
-            </a:r>
-          </a:p>
-        </p:txBody>
-      </p:sp>
-      <p:sp>
-        <p:nvSpPr>
-          <p:cNvPr id="3" name="Subtitle 2">
-            <a:extLst>
-              <a:ext uri="{FF2B5EF4-FFF2-40B4-BE49-F238E27FC236}">
-                <a16:creationId xmlns:a16="http://schemas.microsoft.com/office/drawing/2014/main" id="{298BD520-F3E0-18D5-247E-53E5A313E979}"/>
-              </a:ext>
-            </a:extLst>
-          </p:cNvPr>
-          <p:cNvSpPr>
-            <a:spLocks noGrp="1"/>
-          </p:cNvSpPr>
-          <p:nvPr>
-            <p:ph type="subTitle" idx="1"/>
-          </p:nvPr>
-        </p:nvSpPr>
-        <p:spPr/>
-        <p:txBody>
-          <a:bodyPr/>
-          <a:lstStyle/>
-          <a:p>
-            <a:r>
-              <a:rPr lang="en-US" dirty="0"/>
-              <a:t>Any questions?</a:t>
-            </a:r>
-          </a:p>
-        </p:txBody>
-      </p:sp>
-    </p:spTree>
-    <p:extLst>
-      <p:ext uri="{BB962C8B-B14F-4D97-AF65-F5344CB8AC3E}">
-        <p14:creationId xmlns:p14="http://schemas.microsoft.com/office/powerpoint/2010/main" val="688793601"/>
       </p:ext>
     </p:extLst>
   </p:cSld>
@@ -9334,6 +9384,481 @@
 </p:sld>
 </file>
 
+<file path=ppt/slides/slide20.xml><?xml version="1.0" encoding="utf-8"?>
+<p:sld xmlns:a="http://schemas.openxmlformats.org/drawingml/2006/main" xmlns:r="http://schemas.openxmlformats.org/officeDocument/2006/relationships" xmlns:p="http://schemas.openxmlformats.org/presentationml/2006/main">
+  <p:cSld>
+    <p:spTree>
+      <p:nvGrpSpPr>
+        <p:cNvPr id="1" name=""/>
+        <p:cNvGrpSpPr/>
+        <p:nvPr/>
+      </p:nvGrpSpPr>
+      <p:grpSpPr>
+        <a:xfrm>
+          <a:off x="0" y="0"/>
+          <a:ext cx="0" cy="0"/>
+          <a:chOff x="0" y="0"/>
+          <a:chExt cx="0" cy="0"/>
+        </a:xfrm>
+      </p:grpSpPr>
+      <p:sp>
+        <p:nvSpPr>
+          <p:cNvPr id="2" name="Title 1">
+            <a:extLst>
+              <a:ext uri="{FF2B5EF4-FFF2-40B4-BE49-F238E27FC236}">
+                <a16:creationId xmlns:a16="http://schemas.microsoft.com/office/drawing/2014/main" id="{9C347618-83BA-B560-ABCE-00B8D30A3601}"/>
+              </a:ext>
+            </a:extLst>
+          </p:cNvPr>
+          <p:cNvSpPr>
+            <a:spLocks noGrp="1"/>
+          </p:cNvSpPr>
+          <p:nvPr>
+            <p:ph type="title"/>
+          </p:nvPr>
+        </p:nvSpPr>
+        <p:spPr>
+          <a:xfrm>
+            <a:off x="585157" y="468523"/>
+            <a:ext cx="10571998" cy="970450"/>
+          </a:xfrm>
+        </p:spPr>
+        <p:txBody>
+          <a:bodyPr/>
+          <a:lstStyle/>
+          <a:p>
+            <a:r>
+              <a:rPr lang="en-US" dirty="0"/>
+              <a:t>To wrap things up…</a:t>
+            </a:r>
+          </a:p>
+        </p:txBody>
+      </p:sp>
+      <p:pic>
+        <p:nvPicPr>
+          <p:cNvPr id="4" name="Picture 2">
+            <a:extLst>
+              <a:ext uri="{FF2B5EF4-FFF2-40B4-BE49-F238E27FC236}">
+                <a16:creationId xmlns:a16="http://schemas.microsoft.com/office/drawing/2014/main" id="{6EF3906A-50BB-ECE3-FC7D-319DC91C7460}"/>
+              </a:ext>
+            </a:extLst>
+          </p:cNvPr>
+          <p:cNvPicPr>
+            <a:picLocks noChangeAspect="1" noChangeArrowheads="1"/>
+          </p:cNvPicPr>
+          <p:nvPr/>
+        </p:nvPicPr>
+        <p:blipFill>
+          <a:blip r:embed="rId2">
+            <a:extLst>
+              <a:ext uri="{28A0092B-C50C-407E-A947-70E740481C1C}">
+                <a14:useLocalDpi xmlns:a14="http://schemas.microsoft.com/office/drawing/2010/main" val="0"/>
+              </a:ext>
+            </a:extLst>
+          </a:blip>
+          <a:srcRect/>
+          <a:stretch>
+            <a:fillRect/>
+          </a:stretch>
+        </p:blipFill>
+        <p:spPr bwMode="auto">
+          <a:xfrm>
+            <a:off x="2192611" y="2418492"/>
+            <a:ext cx="6918432" cy="3155920"/>
+          </a:xfrm>
+          <a:prstGeom prst="roundRect">
+            <a:avLst>
+              <a:gd name="adj" fmla="val 16667"/>
+            </a:avLst>
+          </a:prstGeom>
+          <a:ln>
+            <a:noFill/>
+          </a:ln>
+          <a:effectLst>
+            <a:outerShdw blurRad="76200" dist="38100" dir="7800000" algn="tl" rotWithShape="0">
+              <a:srgbClr val="000000">
+                <a:alpha val="40000"/>
+              </a:srgbClr>
+            </a:outerShdw>
+          </a:effectLst>
+          <a:scene3d>
+            <a:camera prst="orthographicFront"/>
+            <a:lightRig rig="contrasting" dir="t">
+              <a:rot lat="0" lon="0" rev="4200000"/>
+            </a:lightRig>
+          </a:scene3d>
+          <a:sp3d prstMaterial="plastic">
+            <a:bevelT w="381000" h="114300" prst="relaxedInset"/>
+            <a:contourClr>
+              <a:srgbClr val="969696"/>
+            </a:contourClr>
+          </a:sp3d>
+          <a:extLst>
+            <a:ext uri="{909E8E84-426E-40DD-AFC4-6F175D3DCCD1}">
+              <a14:hiddenFill xmlns:a14="http://schemas.microsoft.com/office/drawing/2010/main">
+                <a:solidFill>
+                  <a:srgbClr val="FFFFFF"/>
+                </a:solidFill>
+              </a14:hiddenFill>
+            </a:ext>
+          </a:extLst>
+        </p:spPr>
+      </p:pic>
+      <p:cxnSp>
+        <p:nvCxnSpPr>
+          <p:cNvPr id="6" name="Straight Arrow Connector 5">
+            <a:extLst>
+              <a:ext uri="{FF2B5EF4-FFF2-40B4-BE49-F238E27FC236}">
+                <a16:creationId xmlns:a16="http://schemas.microsoft.com/office/drawing/2014/main" id="{3B5D8D21-834D-3457-CEDF-174B85293B83}"/>
+              </a:ext>
+            </a:extLst>
+          </p:cNvPr>
+          <p:cNvCxnSpPr>
+            <a:cxnSpLocks/>
+          </p:cNvCxnSpPr>
+          <p:nvPr/>
+        </p:nvCxnSpPr>
+        <p:spPr>
+          <a:xfrm flipH="1" flipV="1">
+            <a:off x="6069372" y="3904607"/>
+            <a:ext cx="173486" cy="2022368"/>
+          </a:xfrm>
+          <a:prstGeom prst="straightConnector1">
+            <a:avLst/>
+          </a:prstGeom>
+          <a:ln w="76200">
+            <a:tailEnd type="triangle"/>
+          </a:ln>
+        </p:spPr>
+        <p:style>
+          <a:lnRef idx="1">
+            <a:schemeClr val="accent5"/>
+          </a:lnRef>
+          <a:fillRef idx="0">
+            <a:schemeClr val="accent5"/>
+          </a:fillRef>
+          <a:effectRef idx="0">
+            <a:schemeClr val="accent5"/>
+          </a:effectRef>
+          <a:fontRef idx="minor">
+            <a:schemeClr val="tx1"/>
+          </a:fontRef>
+        </p:style>
+      </p:cxnSp>
+      <p:cxnSp>
+        <p:nvCxnSpPr>
+          <p:cNvPr id="7" name="Straight Arrow Connector 6">
+            <a:extLst>
+              <a:ext uri="{FF2B5EF4-FFF2-40B4-BE49-F238E27FC236}">
+                <a16:creationId xmlns:a16="http://schemas.microsoft.com/office/drawing/2014/main" id="{5A3B6A39-6D33-E9F8-1BDB-FD74F691216D}"/>
+              </a:ext>
+            </a:extLst>
+          </p:cNvPr>
+          <p:cNvCxnSpPr>
+            <a:cxnSpLocks/>
+          </p:cNvCxnSpPr>
+          <p:nvPr/>
+        </p:nvCxnSpPr>
+        <p:spPr>
+          <a:xfrm flipH="1" flipV="1">
+            <a:off x="3467278" y="3904607"/>
+            <a:ext cx="98882" cy="1957350"/>
+          </a:xfrm>
+          <a:prstGeom prst="straightConnector1">
+            <a:avLst/>
+          </a:prstGeom>
+          <a:ln w="76200">
+            <a:tailEnd type="triangle"/>
+          </a:ln>
+        </p:spPr>
+        <p:style>
+          <a:lnRef idx="1">
+            <a:schemeClr val="accent5"/>
+          </a:lnRef>
+          <a:fillRef idx="0">
+            <a:schemeClr val="accent5"/>
+          </a:fillRef>
+          <a:effectRef idx="0">
+            <a:schemeClr val="accent5"/>
+          </a:effectRef>
+          <a:fontRef idx="minor">
+            <a:schemeClr val="tx1"/>
+          </a:fontRef>
+        </p:style>
+      </p:cxnSp>
+      <p:cxnSp>
+        <p:nvCxnSpPr>
+          <p:cNvPr id="10" name="Straight Arrow Connector 9">
+            <a:extLst>
+              <a:ext uri="{FF2B5EF4-FFF2-40B4-BE49-F238E27FC236}">
+                <a16:creationId xmlns:a16="http://schemas.microsoft.com/office/drawing/2014/main" id="{BA8723C1-9271-515C-8CFD-E22E6274077D}"/>
+              </a:ext>
+            </a:extLst>
+          </p:cNvPr>
+          <p:cNvCxnSpPr>
+            <a:cxnSpLocks/>
+          </p:cNvCxnSpPr>
+          <p:nvPr/>
+        </p:nvCxnSpPr>
+        <p:spPr>
+          <a:xfrm flipH="1" flipV="1">
+            <a:off x="7808978" y="3904607"/>
+            <a:ext cx="304244" cy="2022368"/>
+          </a:xfrm>
+          <a:prstGeom prst="straightConnector1">
+            <a:avLst/>
+          </a:prstGeom>
+          <a:ln w="76200">
+            <a:tailEnd type="triangle"/>
+          </a:ln>
+        </p:spPr>
+        <p:style>
+          <a:lnRef idx="1">
+            <a:schemeClr val="accent5"/>
+          </a:lnRef>
+          <a:fillRef idx="0">
+            <a:schemeClr val="accent5"/>
+          </a:fillRef>
+          <a:effectRef idx="0">
+            <a:schemeClr val="accent5"/>
+          </a:effectRef>
+          <a:fontRef idx="minor">
+            <a:schemeClr val="tx1"/>
+          </a:fontRef>
+        </p:style>
+      </p:cxnSp>
+      <p:pic>
+        <p:nvPicPr>
+          <p:cNvPr id="17" name="Picture 4" descr="GitHub - pandera-dev/pandera: A light-weight, flexible, and expressive data  validation library for dataframes">
+            <a:extLst>
+              <a:ext uri="{FF2B5EF4-FFF2-40B4-BE49-F238E27FC236}">
+                <a16:creationId xmlns:a16="http://schemas.microsoft.com/office/drawing/2014/main" id="{2E624792-00EC-C135-6D69-951A7F4014A9}"/>
+              </a:ext>
+            </a:extLst>
+          </p:cNvPr>
+          <p:cNvPicPr>
+            <a:picLocks noChangeAspect="1" noChangeArrowheads="1"/>
+          </p:cNvPicPr>
+          <p:nvPr/>
+        </p:nvPicPr>
+        <p:blipFill>
+          <a:blip r:embed="rId3">
+            <a:extLst>
+              <a:ext uri="{28A0092B-C50C-407E-A947-70E740481C1C}">
+                <a14:useLocalDpi xmlns:a14="http://schemas.microsoft.com/office/drawing/2010/main" val="0"/>
+              </a:ext>
+            </a:extLst>
+          </a:blip>
+          <a:srcRect/>
+          <a:stretch>
+            <a:fillRect/>
+          </a:stretch>
+        </p:blipFill>
+        <p:spPr bwMode="auto">
+          <a:xfrm>
+            <a:off x="5532984" y="5939444"/>
+            <a:ext cx="1260764" cy="365917"/>
+          </a:xfrm>
+          <a:prstGeom prst="rect">
+            <a:avLst/>
+          </a:prstGeom>
+          <a:noFill/>
+          <a:extLst>
+            <a:ext uri="{909E8E84-426E-40DD-AFC4-6F175D3DCCD1}">
+              <a14:hiddenFill xmlns:a14="http://schemas.microsoft.com/office/drawing/2010/main">
+                <a:solidFill>
+                  <a:srgbClr val="FFFFFF"/>
+                </a:solidFill>
+              </a14:hiddenFill>
+            </a:ext>
+          </a:extLst>
+        </p:spPr>
+      </p:pic>
+      <p:pic>
+        <p:nvPicPr>
+          <p:cNvPr id="18" name="Picture 6" descr="Pydantic in a Nutshell. The power of type annotation-based… | by Florian  Kromer | Python in Plain English">
+            <a:extLst>
+              <a:ext uri="{FF2B5EF4-FFF2-40B4-BE49-F238E27FC236}">
+                <a16:creationId xmlns:a16="http://schemas.microsoft.com/office/drawing/2014/main" id="{64B833C5-6E56-0FB1-E551-B180EA05B816}"/>
+              </a:ext>
+            </a:extLst>
+          </p:cNvPr>
+          <p:cNvPicPr>
+            <a:picLocks noChangeAspect="1" noChangeArrowheads="1"/>
+          </p:cNvPicPr>
+          <p:nvPr/>
+        </p:nvPicPr>
+        <p:blipFill rotWithShape="1">
+          <a:blip r:embed="rId4">
+            <a:extLst>
+              <a:ext uri="{28A0092B-C50C-407E-A947-70E740481C1C}">
+                <a14:useLocalDpi xmlns:a14="http://schemas.microsoft.com/office/drawing/2010/main" val="0"/>
+              </a:ext>
+            </a:extLst>
+          </a:blip>
+          <a:srcRect l="21789" t="25306" r="21152" b="28467"/>
+          <a:stretch/>
+        </p:blipFill>
+        <p:spPr bwMode="auto">
+          <a:xfrm>
+            <a:off x="7808978" y="6023988"/>
+            <a:ext cx="814648" cy="342035"/>
+          </a:xfrm>
+          <a:prstGeom prst="rect">
+            <a:avLst/>
+          </a:prstGeom>
+          <a:noFill/>
+          <a:extLst>
+            <a:ext uri="{909E8E84-426E-40DD-AFC4-6F175D3DCCD1}">
+              <a14:hiddenFill xmlns:a14="http://schemas.microsoft.com/office/drawing/2010/main">
+                <a:solidFill>
+                  <a:srgbClr val="FFFFFF"/>
+                </a:solidFill>
+              </a14:hiddenFill>
+            </a:ext>
+          </a:extLst>
+        </p:spPr>
+      </p:pic>
+      <p:pic>
+        <p:nvPicPr>
+          <p:cNvPr id="19" name="Picture 8" descr="Result format | Great Expectations">
+            <a:extLst>
+              <a:ext uri="{FF2B5EF4-FFF2-40B4-BE49-F238E27FC236}">
+                <a16:creationId xmlns:a16="http://schemas.microsoft.com/office/drawing/2014/main" id="{766711B7-FDC8-0F13-3BA6-E6F5998C047A}"/>
+              </a:ext>
+            </a:extLst>
+          </p:cNvPr>
+          <p:cNvPicPr>
+            <a:picLocks noChangeAspect="1" noChangeArrowheads="1"/>
+          </p:cNvPicPr>
+          <p:nvPr/>
+        </p:nvPicPr>
+        <p:blipFill>
+          <a:blip r:embed="rId5">
+            <a:alphaModFix/>
+            <a:extLst>
+              <a:ext uri="{28A0092B-C50C-407E-A947-70E740481C1C}">
+                <a14:useLocalDpi xmlns:a14="http://schemas.microsoft.com/office/drawing/2010/main" val="0"/>
+              </a:ext>
+            </a:extLst>
+          </a:blip>
+          <a:srcRect/>
+          <a:stretch>
+            <a:fillRect/>
+          </a:stretch>
+        </p:blipFill>
+        <p:spPr bwMode="auto">
+          <a:xfrm>
+            <a:off x="2865697" y="5939444"/>
+            <a:ext cx="1538861" cy="342036"/>
+          </a:xfrm>
+          <a:prstGeom prst="rect">
+            <a:avLst/>
+          </a:prstGeom>
+          <a:solidFill>
+            <a:schemeClr val="accent1"/>
+          </a:solidFill>
+        </p:spPr>
+      </p:pic>
+    </p:spTree>
+    <p:extLst>
+      <p:ext uri="{BB962C8B-B14F-4D97-AF65-F5344CB8AC3E}">
+        <p14:creationId xmlns:p14="http://schemas.microsoft.com/office/powerpoint/2010/main" val="1732810665"/>
+      </p:ext>
+    </p:extLst>
+  </p:cSld>
+  <p:clrMapOvr>
+    <a:masterClrMapping/>
+  </p:clrMapOvr>
+</p:sld>
+</file>
+
+<file path=ppt/slides/slide21.xml><?xml version="1.0" encoding="utf-8"?>
+<p:sld xmlns:a="http://schemas.openxmlformats.org/drawingml/2006/main" xmlns:r="http://schemas.openxmlformats.org/officeDocument/2006/relationships" xmlns:p="http://schemas.openxmlformats.org/presentationml/2006/main">
+  <p:cSld>
+    <p:spTree>
+      <p:nvGrpSpPr>
+        <p:cNvPr id="1" name=""/>
+        <p:cNvGrpSpPr/>
+        <p:nvPr/>
+      </p:nvGrpSpPr>
+      <p:grpSpPr>
+        <a:xfrm>
+          <a:off x="0" y="0"/>
+          <a:ext cx="0" cy="0"/>
+          <a:chOff x="0" y="0"/>
+          <a:chExt cx="0" cy="0"/>
+        </a:xfrm>
+      </p:grpSpPr>
+      <p:sp>
+        <p:nvSpPr>
+          <p:cNvPr id="2" name="Title 1">
+            <a:extLst>
+              <a:ext uri="{FF2B5EF4-FFF2-40B4-BE49-F238E27FC236}">
+                <a16:creationId xmlns:a16="http://schemas.microsoft.com/office/drawing/2014/main" id="{E104701D-D10B-66CF-1F03-F3672040F878}"/>
+              </a:ext>
+            </a:extLst>
+          </p:cNvPr>
+          <p:cNvSpPr>
+            <a:spLocks noGrp="1"/>
+          </p:cNvSpPr>
+          <p:nvPr>
+            <p:ph type="ctrTitle"/>
+          </p:nvPr>
+        </p:nvSpPr>
+        <p:spPr/>
+        <p:txBody>
+          <a:bodyPr/>
+          <a:lstStyle/>
+          <a:p>
+            <a:r>
+              <a:rPr lang="en-US" dirty="0"/>
+              <a:t>Thank you for listening!</a:t>
+            </a:r>
+          </a:p>
+        </p:txBody>
+      </p:sp>
+      <p:sp>
+        <p:nvSpPr>
+          <p:cNvPr id="3" name="Subtitle 2">
+            <a:extLst>
+              <a:ext uri="{FF2B5EF4-FFF2-40B4-BE49-F238E27FC236}">
+                <a16:creationId xmlns:a16="http://schemas.microsoft.com/office/drawing/2014/main" id="{298BD520-F3E0-18D5-247E-53E5A313E979}"/>
+              </a:ext>
+            </a:extLst>
+          </p:cNvPr>
+          <p:cNvSpPr>
+            <a:spLocks noGrp="1"/>
+          </p:cNvSpPr>
+          <p:nvPr>
+            <p:ph type="subTitle" idx="1"/>
+          </p:nvPr>
+        </p:nvSpPr>
+        <p:spPr/>
+        <p:txBody>
+          <a:bodyPr/>
+          <a:lstStyle/>
+          <a:p>
+            <a:r>
+              <a:rPr lang="en-US" dirty="0"/>
+              <a:t>Any questions?</a:t>
+            </a:r>
+          </a:p>
+        </p:txBody>
+      </p:sp>
+    </p:spTree>
+    <p:extLst>
+      <p:ext uri="{BB962C8B-B14F-4D97-AF65-F5344CB8AC3E}">
+        <p14:creationId xmlns:p14="http://schemas.microsoft.com/office/powerpoint/2010/main" val="688793601"/>
+      </p:ext>
+    </p:extLst>
+  </p:cSld>
+  <p:clrMapOvr>
+    <a:masterClrMapping/>
+  </p:clrMapOvr>
+</p:sld>
+</file>
+
 <file path=ppt/slides/slide3.xml><?xml version="1.0" encoding="utf-8"?>
 <p:sld xmlns:a="http://schemas.openxmlformats.org/drawingml/2006/main" xmlns:r="http://schemas.openxmlformats.org/officeDocument/2006/relationships" xmlns:p="http://schemas.openxmlformats.org/presentationml/2006/main">
   <p:cSld>
@@ -9498,17 +10023,6 @@
           <a:p>
             <a:r>
               <a:rPr lang="en-US" dirty="0"/>
-              <a:t>Up until a year ago Data Scientist @ </a:t>
-            </a:r>
-            <a:r>
-              <a:rPr lang="en-US" dirty="0" err="1"/>
-              <a:t>Zeelo</a:t>
-            </a:r>
-            <a:endParaRPr lang="en-US" dirty="0"/>
-          </a:p>
-          <a:p>
-            <a:r>
-              <a:rPr lang="en-US" dirty="0"/>
               <a:t>MSc in Social Data Science from the London School of Economics</a:t>
             </a:r>
           </a:p>
@@ -9530,7 +10044,7 @@
           <a:p>
             <a:r>
               <a:rPr lang="en-US" dirty="0"/>
-              <a:t>I like finding bugs</a:t>
+              <a:t>I like finding bugs(especially if they’re my own making)</a:t>
             </a:r>
           </a:p>
         </p:txBody>
@@ -9609,7 +10123,12 @@
             <p:ph idx="1"/>
           </p:nvPr>
         </p:nvSpPr>
-        <p:spPr/>
+        <p:spPr>
+          <a:xfrm>
+            <a:off x="810000" y="2596360"/>
+            <a:ext cx="10554574" cy="3636511"/>
+          </a:xfrm>
+        </p:spPr>
         <p:txBody>
           <a:bodyPr/>
           <a:lstStyle/>
@@ -9630,7 +10149,7 @@
             </a:pPr>
             <a:r>
               <a:rPr lang="en-US" dirty="0"/>
-              <a:t>Validation in datasets using Great Expectations</a:t>
+              <a:t>Validation in databases using Great Expectations</a:t>
             </a:r>
           </a:p>
           <a:p>
@@ -9675,7 +10194,7 @@
           <a:p>
             <a:r>
               <a:rPr lang="en-US" dirty="0"/>
-              <a:t>How to optimize your validation dataset for deep learning models</a:t>
+              <a:t>How to optimize your validation holdout dataset for deep learning models</a:t>
             </a:r>
           </a:p>
         </p:txBody>
@@ -10234,7 +10753,7 @@
           <p:cNvPr id="2" name="Title 1">
             <a:extLst>
               <a:ext uri="{FF2B5EF4-FFF2-40B4-BE49-F238E27FC236}">
-                <a16:creationId xmlns:a16="http://schemas.microsoft.com/office/drawing/2014/main" id="{ADD05594-2F69-9003-8A7E-A35921EFA2D0}"/>
+                <a16:creationId xmlns:a16="http://schemas.microsoft.com/office/drawing/2014/main" id="{1139AAFA-4993-B525-A3B0-99D6366BEB12}"/>
               </a:ext>
             </a:extLst>
           </p:cNvPr>
@@ -10245,54 +10764,107 @@
             <p:ph type="title"/>
           </p:nvPr>
         </p:nvSpPr>
-        <p:spPr/>
+        <p:spPr>
+          <a:xfrm>
+            <a:off x="810001" y="447188"/>
+            <a:ext cx="10571998" cy="970450"/>
+          </a:xfrm>
+        </p:spPr>
         <p:txBody>
           <a:bodyPr/>
           <a:lstStyle/>
           <a:p>
             <a:r>
               <a:rPr lang="en-US" dirty="0"/>
-              <a:t>What does Data Validation mean?</a:t>
-            </a:r>
-          </a:p>
-        </p:txBody>
-      </p:sp>
-      <p:sp>
-        <p:nvSpPr>
-          <p:cNvPr id="3" name="Content Placeholder 2">
+              <a:t>Dataset – Ames house prices prediction</a:t>
+            </a:r>
+          </a:p>
+        </p:txBody>
+      </p:sp>
+      <p:sp>
+        <p:nvSpPr>
+          <p:cNvPr id="3" name="TextBox 2">
             <a:extLst>
               <a:ext uri="{FF2B5EF4-FFF2-40B4-BE49-F238E27FC236}">
-                <a16:creationId xmlns:a16="http://schemas.microsoft.com/office/drawing/2014/main" id="{421B0849-BA7A-D67B-7858-B7857A5B3E88}"/>
+                <a16:creationId xmlns:a16="http://schemas.microsoft.com/office/drawing/2014/main" id="{CB7087AA-981C-472F-5A74-4397A79B4C04}"/>
               </a:ext>
             </a:extLst>
           </p:cNvPr>
-          <p:cNvSpPr>
-            <a:spLocks noGrp="1"/>
-          </p:cNvSpPr>
-          <p:nvPr>
-            <p:ph idx="1"/>
-          </p:nvPr>
-        </p:nvSpPr>
-        <p:spPr/>
-        <p:txBody>
-          <a:bodyPr/>
+          <p:cNvSpPr txBox="1"/>
+          <p:nvPr/>
+        </p:nvSpPr>
+        <p:spPr>
+          <a:xfrm>
+            <a:off x="889462" y="3110204"/>
+            <a:ext cx="9900458" cy="1701620"/>
+          </a:xfrm>
+          <a:prstGeom prst="rect">
+            <a:avLst/>
+          </a:prstGeom>
+          <a:noFill/>
+        </p:spPr>
+        <p:txBody>
+          <a:bodyPr wrap="square" rtlCol="0">
+            <a:spAutoFit/>
+          </a:bodyPr>
           <a:lstStyle/>
           <a:p>
+            <a:pPr marL="285750" indent="-285750">
+              <a:lnSpc>
+                <a:spcPct val="150000"/>
+              </a:lnSpc>
+              <a:buFont typeface="Arial" panose="020B0604020202020204" pitchFamily="34" charset="0"/>
+              <a:buChar char="•"/>
+            </a:pPr>
             <a:r>
               <a:rPr lang="en-GB" dirty="0"/>
-              <a:t>Data validation is the practice of checking the integrity, accuracy and structure of data before it is used.</a:t>
-            </a:r>
-          </a:p>
-          <a:p>
+              <a:t>As featured in </a:t>
+            </a:r>
+            <a:r>
+              <a:rPr lang="en-GB" dirty="0">
+                <a:hlinkClick r:id="rId2"/>
+              </a:rPr>
+              <a:t>Kaggle house prices prediction competition</a:t>
+            </a:r>
+            <a:endParaRPr lang="en-GB" dirty="0"/>
+          </a:p>
+          <a:p>
+            <a:pPr marL="285750" indent="-285750">
+              <a:lnSpc>
+                <a:spcPct val="150000"/>
+              </a:lnSpc>
+              <a:buFont typeface="Arial" panose="020B0604020202020204" pitchFamily="34" charset="0"/>
+              <a:buChar char="•"/>
+            </a:pPr>
             <a:r>
               <a:rPr lang="en-GB" dirty="0"/>
-              <a:t>Useful in any kind of work that uses data – software development, research, accounting, military intelligence.</a:t>
-            </a:r>
-          </a:p>
-          <a:p>
+              <a:t>Simple to use and understand, used extensively in tutorials and courses.</a:t>
+            </a:r>
+          </a:p>
+          <a:p>
+            <a:pPr marL="285750" indent="-285750">
+              <a:lnSpc>
+                <a:spcPct val="150000"/>
+              </a:lnSpc>
+              <a:buFont typeface="Arial" panose="020B0604020202020204" pitchFamily="34" charset="0"/>
+              <a:buChar char="•"/>
+            </a:pPr>
             <a:r>
               <a:rPr lang="en-GB" dirty="0"/>
-              <a:t>We can validate types, ranges, consistency and incorporate business logic to make our project more robust.</a:t>
+              <a:t>Variety of types of features – numerical, strings, categorical (80 different fields).</a:t>
+            </a:r>
+          </a:p>
+          <a:p>
+            <a:pPr marL="285750" indent="-285750">
+              <a:lnSpc>
+                <a:spcPct val="150000"/>
+              </a:lnSpc>
+              <a:buFont typeface="Arial" panose="020B0604020202020204" pitchFamily="34" charset="0"/>
+              <a:buChar char="•"/>
+            </a:pPr>
+            <a:r>
+              <a:rPr lang="en-GB" dirty="0"/>
+              <a:t>Target variable is the house price.</a:t>
             </a:r>
             <a:endParaRPr lang="en-US" dirty="0"/>
           </a:p>
@@ -10301,7 +10873,7 @@
     </p:spTree>
     <p:extLst>
       <p:ext uri="{BB962C8B-B14F-4D97-AF65-F5344CB8AC3E}">
-        <p14:creationId xmlns:p14="http://schemas.microsoft.com/office/powerpoint/2010/main" val="3768456785"/>
+        <p14:creationId xmlns:p14="http://schemas.microsoft.com/office/powerpoint/2010/main" val="1715024205"/>
       </p:ext>
     </p:extLst>
   </p:cSld>
@@ -10344,19 +10916,14 @@
             <p:ph type="title"/>
           </p:nvPr>
         </p:nvSpPr>
-        <p:spPr>
-          <a:xfrm>
-            <a:off x="801288" y="513977"/>
-            <a:ext cx="10571998" cy="970450"/>
-          </a:xfrm>
-        </p:spPr>
+        <p:spPr/>
         <p:txBody>
           <a:bodyPr/>
           <a:lstStyle/>
           <a:p>
             <a:r>
               <a:rPr lang="en-US" dirty="0"/>
-              <a:t>How can data become invalid?</a:t>
+              <a:t>What does Data Validation mean?</a:t>
             </a:r>
           </a:p>
         </p:txBody>
@@ -10383,28 +10950,29 @@
           <a:lstStyle/>
           <a:p>
             <a:r>
-              <a:rPr lang="en-US" dirty="0"/>
-              <a:t>Human error – for example when tagging labels for training models.</a:t>
-            </a:r>
-          </a:p>
-          <a:p>
-            <a:r>
-              <a:rPr lang="en-US" dirty="0"/>
-              <a:t>Outdated/expired data sets.</a:t>
-            </a:r>
-          </a:p>
-          <a:p>
-            <a:r>
-              <a:rPr lang="en-US" dirty="0"/>
-              <a:t>Bugs or changes in upstream data pipelines.</a:t>
-            </a:r>
+              <a:rPr lang="en-GB" dirty="0"/>
+              <a:t>Data validation is the practice of checking the integrity, accuracy and structure of data before it is used.</a:t>
+            </a:r>
+          </a:p>
+          <a:p>
+            <a:r>
+              <a:rPr lang="en-GB" dirty="0"/>
+              <a:t>Useful in any kind of work that uses data – software development, research, accounting, military intelligence.</a:t>
+            </a:r>
+          </a:p>
+          <a:p>
+            <a:r>
+              <a:rPr lang="en-GB" dirty="0"/>
+              <a:t>We can validate types, ranges, consistency and incorporate business logic to make our project more robust.</a:t>
+            </a:r>
+            <a:endParaRPr lang="en-US" dirty="0"/>
           </a:p>
         </p:txBody>
       </p:sp>
     </p:spTree>
     <p:extLst>
       <p:ext uri="{BB962C8B-B14F-4D97-AF65-F5344CB8AC3E}">
-        <p14:creationId xmlns:p14="http://schemas.microsoft.com/office/powerpoint/2010/main" val="1922696547"/>
+        <p14:creationId xmlns:p14="http://schemas.microsoft.com/office/powerpoint/2010/main" val="3768456785"/>
       </p:ext>
     </p:extLst>
   </p:cSld>
@@ -10436,7 +11004,7 @@
           <p:cNvPr id="2" name="Title 1">
             <a:extLst>
               <a:ext uri="{FF2B5EF4-FFF2-40B4-BE49-F238E27FC236}">
-                <a16:creationId xmlns:a16="http://schemas.microsoft.com/office/drawing/2014/main" id="{D1F6F9CC-65B6-C127-A624-C8B0CACE87F1}"/>
+                <a16:creationId xmlns:a16="http://schemas.microsoft.com/office/drawing/2014/main" id="{ADD05594-2F69-9003-8A7E-A35921EFA2D0}"/>
               </a:ext>
             </a:extLst>
           </p:cNvPr>
@@ -10449,97 +11017,65 @@
         </p:nvSpPr>
         <p:spPr>
           <a:xfrm>
-            <a:off x="714061" y="855677"/>
-            <a:ext cx="6005522" cy="784333"/>
-          </a:xfrm>
-        </p:spPr>
-        <p:txBody>
-          <a:bodyPr>
-            <a:normAutofit/>
-          </a:bodyPr>
+            <a:off x="801288" y="513977"/>
+            <a:ext cx="10571998" cy="970450"/>
+          </a:xfrm>
+        </p:spPr>
+        <p:txBody>
+          <a:bodyPr/>
           <a:lstStyle/>
           <a:p>
             <a:r>
-              <a:rPr lang="en-US" sz="3600" dirty="0"/>
-              <a:t>Why validate your data?</a:t>
-            </a:r>
-          </a:p>
-        </p:txBody>
-      </p:sp>
-      <p:pic>
-        <p:nvPicPr>
-          <p:cNvPr id="2052" name="Picture 4" descr="Data Pipeline">
+              <a:rPr lang="en-US" dirty="0"/>
+              <a:t>How can data become invalid?</a:t>
+            </a:r>
+          </a:p>
+        </p:txBody>
+      </p:sp>
+      <p:sp>
+        <p:nvSpPr>
+          <p:cNvPr id="3" name="Content Placeholder 2">
             <a:extLst>
               <a:ext uri="{FF2B5EF4-FFF2-40B4-BE49-F238E27FC236}">
-                <a16:creationId xmlns:a16="http://schemas.microsoft.com/office/drawing/2014/main" id="{7C6F7BC8-8A9E-1675-6C05-F28F893D896F}"/>
+                <a16:creationId xmlns:a16="http://schemas.microsoft.com/office/drawing/2014/main" id="{421B0849-BA7A-D67B-7858-B7857A5B3E88}"/>
               </a:ext>
             </a:extLst>
           </p:cNvPr>
-          <p:cNvPicPr>
-            <a:picLocks noChangeAspect="1" noChangeArrowheads="1"/>
-          </p:cNvPicPr>
-          <p:nvPr/>
-        </p:nvPicPr>
-        <p:blipFill>
-          <a:blip r:embed="rId2">
-            <a:extLst>
-              <a:ext uri="{28A0092B-C50C-407E-A947-70E740481C1C}">
-                <a14:useLocalDpi xmlns:a14="http://schemas.microsoft.com/office/drawing/2010/main" val="0"/>
-              </a:ext>
-            </a:extLst>
-          </a:blip>
-          <a:srcRect/>
-          <a:stretch>
-            <a:fillRect/>
-          </a:stretch>
-        </p:blipFill>
-        <p:spPr bwMode="auto">
-          <a:xfrm>
-            <a:off x="2020583" y="2624123"/>
-            <a:ext cx="9398000" cy="3378200"/>
-          </a:xfrm>
-          <a:prstGeom prst="roundRect">
-            <a:avLst>
-              <a:gd name="adj" fmla="val 16667"/>
-            </a:avLst>
-          </a:prstGeom>
-          <a:ln>
-            <a:noFill/>
-          </a:ln>
-          <a:effectLst>
-            <a:outerShdw blurRad="76200" dist="38100" dir="7800000" algn="tl" rotWithShape="0">
-              <a:srgbClr val="000000">
-                <a:alpha val="40000"/>
-              </a:srgbClr>
-            </a:outerShdw>
-          </a:effectLst>
-          <a:scene3d>
-            <a:camera prst="orthographicFront"/>
-            <a:lightRig rig="contrasting" dir="t">
-              <a:rot lat="0" lon="0" rev="4200000"/>
-            </a:lightRig>
-          </a:scene3d>
-          <a:sp3d prstMaterial="plastic">
-            <a:bevelT w="381000" h="114300" prst="relaxedInset"/>
-            <a:contourClr>
-              <a:srgbClr val="969696"/>
-            </a:contourClr>
-          </a:sp3d>
-          <a:extLst>
-            <a:ext uri="{909E8E84-426E-40DD-AFC4-6F175D3DCCD1}">
-              <a14:hiddenFill xmlns:a14="http://schemas.microsoft.com/office/drawing/2010/main">
-                <a:solidFill>
-                  <a:srgbClr val="FFFFFF"/>
-                </a:solidFill>
-              </a14:hiddenFill>
-            </a:ext>
-          </a:extLst>
-        </p:spPr>
-      </p:pic>
+          <p:cNvSpPr>
+            <a:spLocks noGrp="1"/>
+          </p:cNvSpPr>
+          <p:nvPr>
+            <p:ph idx="1"/>
+          </p:nvPr>
+        </p:nvSpPr>
+        <p:spPr/>
+        <p:txBody>
+          <a:bodyPr/>
+          <a:lstStyle/>
+          <a:p>
+            <a:r>
+              <a:rPr lang="en-US" dirty="0"/>
+              <a:t>Human error – for example when tagging labels for training models.</a:t>
+            </a:r>
+          </a:p>
+          <a:p>
+            <a:r>
+              <a:rPr lang="en-US" dirty="0"/>
+              <a:t>Outdated/expired data sets.</a:t>
+            </a:r>
+          </a:p>
+          <a:p>
+            <a:r>
+              <a:rPr lang="en-US" dirty="0"/>
+              <a:t>Bugs or changes in upstream data pipelines.</a:t>
+            </a:r>
+          </a:p>
+        </p:txBody>
+      </p:sp>
     </p:spTree>
     <p:extLst>
       <p:ext uri="{BB962C8B-B14F-4D97-AF65-F5344CB8AC3E}">
-        <p14:creationId xmlns:p14="http://schemas.microsoft.com/office/powerpoint/2010/main" val="3190012637"/>
+        <p14:creationId xmlns:p14="http://schemas.microsoft.com/office/powerpoint/2010/main" val="1922696547"/>
       </p:ext>
     </p:extLst>
   </p:cSld>

</xml_diff>

<commit_message>
Removed some features from the automatic profiling example in notebook 1
</commit_message>
<xml_diff>
--- a/Data Validation for Data Science.pptx
+++ b/Data Validation for Data Science.pptx
@@ -230,7 +230,7 @@
           <a:p>
             <a:fld id="{F9CD045C-CD78-304F-BD19-120FB2F86E8F}" type="datetimeFigureOut">
               <a:rPr lang="en-US" smtClean="0"/>
-              <a:t>6/20/22</a:t>
+              <a:t>7/2/22</a:t>
             </a:fld>
             <a:endParaRPr lang="en-US"/>
           </a:p>
@@ -783,7 +783,7 @@
           <a:effectLst/>
           <a:extLst>
             <a:ext uri="{91240B29-F687-4f45-9708-019B960494DF}">
-              <a14:hiddenLine xmlns="" xmlns:a14="http://schemas.microsoft.com/office/drawing/2010/main" w="9525">
+              <a14:hiddenLine xmlns:a14="http://schemas.microsoft.com/office/drawing/2010/main" xmlns="" w="9525">
                 <a:solidFill>
                   <a:srgbClr val="000000"/>
                 </a:solidFill>
@@ -976,7 +976,7 @@
             <a:fld id="{08B9EBBA-996F-894A-B54A-D6246ED52CEA}" type="datetimeFigureOut">
               <a:rPr lang="en-US" dirty="0"/>
               <a:pPr/>
-              <a:t>6/20/22</a:t>
+              <a:t>7/2/22</a:t>
             </a:fld>
             <a:endParaRPr lang="en-US" dirty="0"/>
           </a:p>
@@ -1291,7 +1291,7 @@
             <a:fld id="{18C79C5D-2A6F-F04D-97DA-BEF2467B64E4}" type="datetimeFigureOut">
               <a:rPr lang="en-US" dirty="0"/>
               <a:pPr/>
-              <a:t>6/20/22</a:t>
+              <a:t>7/2/22</a:t>
             </a:fld>
             <a:endParaRPr lang="en-US" dirty="0"/>
           </a:p>
@@ -1776,7 +1776,7 @@
             <a:fld id="{8DFA1846-DA80-1C48-A609-854EA85C59AD}" type="datetimeFigureOut">
               <a:rPr lang="en-US" dirty="0"/>
               <a:pPr/>
-              <a:t>6/20/22</a:t>
+              <a:t>7/2/22</a:t>
             </a:fld>
             <a:endParaRPr lang="en-US" dirty="0"/>
           </a:p>
@@ -2142,7 +2142,7 @@
             <a:fld id="{FBF54567-0DE4-3F47-BF90-CB84690072F9}" type="datetimeFigureOut">
               <a:rPr lang="en-US" dirty="0"/>
               <a:pPr/>
-              <a:t>6/20/22</a:t>
+              <a:t>7/2/22</a:t>
             </a:fld>
             <a:endParaRPr lang="en-US" dirty="0"/>
           </a:p>
@@ -2293,7 +2293,7 @@
           <a:ln/>
           <a:extLst>
             <a:ext uri="{91240B29-F687-4f45-9708-019B960494DF}">
-              <a14:hiddenLine xmlns="" xmlns:a14="http://schemas.microsoft.com/office/drawing/2010/main" w="9525">
+              <a14:hiddenLine xmlns:a14="http://schemas.microsoft.com/office/drawing/2010/main" xmlns="" w="9525">
                 <a:solidFill>
                   <a:srgbClr val="000000"/>
                 </a:solidFill>
@@ -2412,7 +2412,7 @@
             <a:fld id="{C6C52C72-DE31-F449-A4ED-4C594FD91407}" type="datetimeFigureOut">
               <a:rPr lang="en-US" dirty="0"/>
               <a:pPr/>
-              <a:t>6/20/22</a:t>
+              <a:t>7/2/22</a:t>
             </a:fld>
             <a:endParaRPr lang="en-US" dirty="0"/>
           </a:p>
@@ -2565,7 +2565,7 @@
           <a:ln/>
           <a:extLst>
             <a:ext uri="{91240B29-F687-4f45-9708-019B960494DF}">
-              <a14:hiddenLine xmlns="" xmlns:a14="http://schemas.microsoft.com/office/drawing/2010/main" w="9525">
+              <a14:hiddenLine xmlns:a14="http://schemas.microsoft.com/office/drawing/2010/main" xmlns="" w="9525">
                 <a:solidFill>
                   <a:srgbClr val="000000"/>
                 </a:solidFill>
@@ -2694,7 +2694,7 @@
             <a:fld id="{ED62726E-379B-B349-9EED-81ED093FA806}" type="datetimeFigureOut">
               <a:rPr lang="en-US" dirty="0"/>
               <a:pPr/>
-              <a:t>6/20/22</a:t>
+              <a:t>7/2/22</a:t>
             </a:fld>
             <a:endParaRPr lang="en-US" dirty="0"/>
           </a:p>
@@ -2845,7 +2845,7 @@
           <a:ln/>
           <a:extLst>
             <a:ext uri="{91240B29-F687-4f45-9708-019B960494DF}">
-              <a14:hiddenLine xmlns="" xmlns:a14="http://schemas.microsoft.com/office/drawing/2010/main" w="9525">
+              <a14:hiddenLine xmlns:a14="http://schemas.microsoft.com/office/drawing/2010/main" xmlns="" w="9525">
                 <a:solidFill>
                   <a:srgbClr val="000000"/>
                 </a:solidFill>
@@ -2974,7 +2974,7 @@
             <a:fld id="{9B3A1323-8D79-1946-B0D7-40001CF92E9D}" type="datetimeFigureOut">
               <a:rPr lang="en-US" dirty="0"/>
               <a:pPr/>
-              <a:t>6/20/22</a:t>
+              <a:t>7/2/22</a:t>
             </a:fld>
             <a:endParaRPr lang="en-US" dirty="0"/>
           </a:p>
@@ -3314,7 +3314,7 @@
             <a:fld id="{8DFA1846-DA80-1C48-A609-854EA85C59AD}" type="datetimeFigureOut">
               <a:rPr lang="en-US" dirty="0"/>
               <a:pPr/>
-              <a:t>6/20/22</a:t>
+              <a:t>7/2/22</a:t>
             </a:fld>
             <a:endParaRPr lang="en-US" dirty="0"/>
           </a:p>
@@ -3465,7 +3465,7 @@
           <a:ln/>
           <a:extLst>
             <a:ext uri="{91240B29-F687-4f45-9708-019B960494DF}">
-              <a14:hiddenLine xmlns="" xmlns:a14="http://schemas.microsoft.com/office/drawing/2010/main" w="9525">
+              <a14:hiddenLine xmlns:a14="http://schemas.microsoft.com/office/drawing/2010/main" xmlns="" w="9525">
                 <a:solidFill>
                   <a:srgbClr val="000000"/>
                 </a:solidFill>
@@ -3650,7 +3650,7 @@
             <a:fld id="{57302355-E14B-8545-A8F8-0FE83CC9D524}" type="datetimeFigureOut">
               <a:rPr lang="en-US" dirty="0"/>
               <a:pPr/>
-              <a:t>6/20/22</a:t>
+              <a:t>7/2/22</a:t>
             </a:fld>
             <a:endParaRPr lang="en-US" dirty="0"/>
           </a:p>
@@ -3801,7 +3801,7 @@
           <a:ln/>
           <a:extLst>
             <a:ext uri="{91240B29-F687-4f45-9708-019B960494DF}">
-              <a14:hiddenLine xmlns="" xmlns:a14="http://schemas.microsoft.com/office/drawing/2010/main" w="9525">
+              <a14:hiddenLine xmlns:a14="http://schemas.microsoft.com/office/drawing/2010/main" xmlns="" w="9525">
                 <a:solidFill>
                   <a:srgbClr val="000000"/>
                 </a:solidFill>
@@ -4124,7 +4124,7 @@
             <a:fld id="{02640F58-564D-2B4F-AE67-E407BA4FCF45}" type="datetimeFigureOut">
               <a:rPr lang="en-US" dirty="0"/>
               <a:pPr/>
-              <a:t>6/20/22</a:t>
+              <a:t>7/2/22</a:t>
             </a:fld>
             <a:endParaRPr lang="en-US" dirty="0"/>
           </a:p>
@@ -4275,7 +4275,7 @@
           <a:ln/>
           <a:extLst>
             <a:ext uri="{91240B29-F687-4f45-9708-019B960494DF}">
-              <a14:hiddenLine xmlns="" xmlns:a14="http://schemas.microsoft.com/office/drawing/2010/main" w="9525">
+              <a14:hiddenLine xmlns:a14="http://schemas.microsoft.com/office/drawing/2010/main" xmlns="" w="9525">
                 <a:solidFill>
                   <a:srgbClr val="000000"/>
                 </a:solidFill>
@@ -4342,7 +4342,7 @@
             <a:fld id="{F13A34C8-038E-2045-AF43-DF7DBB8E0E9E}" type="datetimeFigureOut">
               <a:rPr lang="en-US" dirty="0"/>
               <a:pPr/>
-              <a:t>6/20/22</a:t>
+              <a:t>7/2/22</a:t>
             </a:fld>
             <a:endParaRPr lang="en-US" dirty="0"/>
           </a:p>
@@ -4434,7 +4434,7 @@
             <a:fld id="{8818C68F-D26B-8F47-958C-23B49CF8A634}" type="datetimeFigureOut">
               <a:rPr lang="en-US" dirty="0"/>
               <a:pPr/>
-              <a:t>6/20/22</a:t>
+              <a:t>7/2/22</a:t>
             </a:fld>
             <a:endParaRPr lang="en-US" dirty="0"/>
           </a:p>
@@ -4698,7 +4698,7 @@
           <a:ln/>
           <a:extLst>
             <a:ext uri="{91240B29-F687-4f45-9708-019B960494DF}">
-              <a14:hiddenLine xmlns="" xmlns:a14="http://schemas.microsoft.com/office/drawing/2010/main" w="9525">
+              <a14:hiddenLine xmlns:a14="http://schemas.microsoft.com/office/drawing/2010/main" xmlns="" w="9525">
                 <a:solidFill>
                   <a:srgbClr val="000000"/>
                 </a:solidFill>
@@ -4898,7 +4898,7 @@
             <a:fld id="{D0DF5E60-9974-AC48-9591-99C2BB44B7CF}" type="datetimeFigureOut">
               <a:rPr lang="en-US" dirty="0"/>
               <a:pPr/>
-              <a:t>6/20/22</a:t>
+              <a:t>7/2/22</a:t>
             </a:fld>
             <a:endParaRPr lang="en-US" dirty="0"/>
           </a:p>
@@ -5208,7 +5208,7 @@
             <a:fld id="{18C79C5D-2A6F-F04D-97DA-BEF2467B64E4}" type="datetimeFigureOut">
               <a:rPr lang="en-US" dirty="0"/>
               <a:pPr/>
-              <a:t>6/20/22</a:t>
+              <a:t>7/2/22</a:t>
             </a:fld>
             <a:endParaRPr lang="en-US" dirty="0"/>
           </a:p>
@@ -5475,7 +5475,7 @@
             <a:fld id="{09B482E8-6E0E-1B4F-B1FD-C69DB9E858D9}" type="datetimeFigureOut">
               <a:rPr lang="en-US" dirty="0"/>
               <a:pPr/>
-              <a:t>6/20/22</a:t>
+              <a:t>7/2/22</a:t>
             </a:fld>
             <a:endParaRPr lang="en-US" dirty="0"/>
           </a:p>
@@ -7578,6 +7578,47 @@
           </a:p>
         </p:txBody>
       </p:sp>
+      <p:cxnSp>
+        <p:nvCxnSpPr>
+          <p:cNvPr id="11" name="Straight Arrow Connector 10">
+            <a:extLst>
+              <a:ext uri="{FF2B5EF4-FFF2-40B4-BE49-F238E27FC236}">
+                <a16:creationId xmlns:a16="http://schemas.microsoft.com/office/drawing/2014/main" id="{CAA3A2A6-23C8-7C40-DFBA-5BADD5096281}"/>
+              </a:ext>
+            </a:extLst>
+          </p:cNvPr>
+          <p:cNvCxnSpPr>
+            <a:cxnSpLocks/>
+          </p:cNvCxnSpPr>
+          <p:nvPr/>
+        </p:nvCxnSpPr>
+        <p:spPr>
+          <a:xfrm flipH="1" flipV="1">
+            <a:off x="6779144" y="3904090"/>
+            <a:ext cx="419678" cy="1989634"/>
+          </a:xfrm>
+          <a:prstGeom prst="straightConnector1">
+            <a:avLst/>
+          </a:prstGeom>
+          <a:ln w="76200">
+            <a:tailEnd type="triangle"/>
+          </a:ln>
+        </p:spPr>
+        <p:style>
+          <a:lnRef idx="1">
+            <a:schemeClr val="accent6"/>
+          </a:lnRef>
+          <a:fillRef idx="0">
+            <a:schemeClr val="accent6"/>
+          </a:fillRef>
+          <a:effectRef idx="0">
+            <a:schemeClr val="accent6"/>
+          </a:effectRef>
+          <a:fontRef idx="minor">
+            <a:schemeClr val="tx1"/>
+          </a:fontRef>
+        </p:style>
+      </p:cxnSp>
     </p:spTree>
     <p:extLst>
       <p:ext uri="{BB962C8B-B14F-4D97-AF65-F5344CB8AC3E}">
@@ -10499,6 +10540,34 @@
             </a:r>
           </a:p>
           <a:p>
+            <a:pPr lvl="1"/>
+            <a:r>
+              <a:rPr lang="en-US" dirty="0"/>
+              <a:t>Data Integrity</a:t>
+            </a:r>
+          </a:p>
+          <a:p>
+            <a:pPr lvl="1"/>
+            <a:r>
+              <a:rPr lang="en-US" dirty="0"/>
+              <a:t>Reliability</a:t>
+            </a:r>
+          </a:p>
+          <a:p>
+            <a:pPr lvl="1"/>
+            <a:r>
+              <a:rPr lang="en-US" dirty="0"/>
+              <a:t>Readability</a:t>
+            </a:r>
+          </a:p>
+          <a:p>
+            <a:pPr lvl="1"/>
+            <a:r>
+              <a:rPr lang="en-US" dirty="0"/>
+              <a:t>Familiarity</a:t>
+            </a:r>
+          </a:p>
+          <a:p>
             <a:pPr>
               <a:buFont typeface="+mj-lt"/>
               <a:buAutoNum type="arabicPeriod"/>
@@ -10537,21 +10606,6 @@
               <a:t>Pydantic</a:t>
             </a:r>
             <a:endParaRPr lang="en-US" dirty="0"/>
-          </a:p>
-          <a:p>
-            <a:pPr marL="0" indent="0">
-              <a:buNone/>
-            </a:pPr>
-            <a:r>
-              <a:rPr lang="en-US" dirty="0"/>
-              <a:t>We will not cover</a:t>
-            </a:r>
-          </a:p>
-          <a:p>
-            <a:r>
-              <a:rPr lang="en-US" dirty="0"/>
-              <a:t>How to optimize your validation holdout dataset for deep learning models</a:t>
-            </a:r>
           </a:p>
         </p:txBody>
       </p:sp>
@@ -10631,13 +10685,19 @@
         </p:nvSpPr>
         <p:spPr>
           <a:xfrm>
-            <a:off x="692819" y="2587606"/>
+            <a:off x="5804835" y="2633696"/>
             <a:ext cx="5185873" cy="2153116"/>
           </a:xfrm>
         </p:spPr>
         <p:txBody>
           <a:bodyPr/>
           <a:lstStyle/>
+          <a:p>
+            <a:r>
+              <a:rPr lang="en-US" dirty="0"/>
+              <a:t>Alternatively, use your own environment.</a:t>
+            </a:r>
+          </a:p>
           <a:p>
             <a:r>
               <a:rPr lang="en-US" dirty="0"/>
@@ -10685,7 +10745,7 @@
         </p:nvSpPr>
         <p:spPr>
           <a:xfrm>
-            <a:off x="6187415" y="2255843"/>
+            <a:off x="136473" y="2003840"/>
             <a:ext cx="5194583" cy="2064488"/>
           </a:xfrm>
         </p:spPr>
@@ -10695,7 +10755,7 @@
           <a:p>
             <a:r>
               <a:rPr lang="en-US" dirty="0"/>
-              <a:t>Alternatively, click the ”Open in </a:t>
+              <a:t>Click the ”Open in </a:t>
             </a:r>
             <a:r>
               <a:rPr lang="en-US" dirty="0" err="1"/>
@@ -10727,13 +10787,13 @@
         </p:nvPicPr>
         <p:blipFill rotWithShape="1">
           <a:blip r:embed="rId2"/>
-          <a:srcRect l="9549" t="29907" r="9540" b="28889"/>
+          <a:srcRect l="9549" t="45509" r="9540" b="28889"/>
           <a:stretch/>
         </p:blipFill>
         <p:spPr>
           <a:xfrm>
-            <a:off x="280457" y="4429388"/>
-            <a:ext cx="6032853" cy="985618"/>
+            <a:off x="3498707" y="4786812"/>
+            <a:ext cx="8431201" cy="855884"/>
           </a:xfrm>
           <a:prstGeom prst="roundRect">
             <a:avLst>
@@ -10793,7 +10853,7 @@
         </p:blipFill>
         <p:spPr bwMode="auto">
           <a:xfrm>
-            <a:off x="6938365" y="4429388"/>
+            <a:off x="513711" y="3367732"/>
             <a:ext cx="4155711" cy="685043"/>
           </a:xfrm>
           <a:prstGeom prst="roundRect">
@@ -11061,15 +11121,8 @@
           </a:lstStyle>
           <a:p>
             <a:pPr marL="0" indent="0">
-              <a:buFont typeface="Wingdings 2" charset="2"/>
               <a:buNone/>
             </a:pPr>
-            <a:r>
-              <a:rPr lang="en-US" dirty="0"/>
-              <a:t>Follow the instructions in the notebook</a:t>
-            </a:r>
-          </a:p>
-          <a:p>
             <a:endParaRPr lang="en-US" dirty="0"/>
           </a:p>
         </p:txBody>

</xml_diff>

<commit_message>
Fixed a few bugs in the notebooks and changed some of the string names
</commit_message>
<xml_diff>
--- a/Data Validation for Data Science.pptx
+++ b/Data Validation for Data Science.pptx
@@ -230,7 +230,7 @@
           <a:p>
             <a:fld id="{F9CD045C-CD78-304F-BD19-120FB2F86E8F}" type="datetimeFigureOut">
               <a:rPr lang="en-US" smtClean="0"/>
-              <a:t>7/2/22</a:t>
+              <a:t>7/3/22</a:t>
             </a:fld>
             <a:endParaRPr lang="en-US"/>
           </a:p>
@@ -783,7 +783,7 @@
           <a:effectLst/>
           <a:extLst>
             <a:ext uri="{91240B29-F687-4f45-9708-019B960494DF}">
-              <a14:hiddenLine xmlns:a14="http://schemas.microsoft.com/office/drawing/2010/main" xmlns="" w="9525">
+              <a14:hiddenLine xmlns="" xmlns:a14="http://schemas.microsoft.com/office/drawing/2010/main" w="9525">
                 <a:solidFill>
                   <a:srgbClr val="000000"/>
                 </a:solidFill>
@@ -976,7 +976,7 @@
             <a:fld id="{08B9EBBA-996F-894A-B54A-D6246ED52CEA}" type="datetimeFigureOut">
               <a:rPr lang="en-US" dirty="0"/>
               <a:pPr/>
-              <a:t>7/2/22</a:t>
+              <a:t>7/3/22</a:t>
             </a:fld>
             <a:endParaRPr lang="en-US" dirty="0"/>
           </a:p>
@@ -1291,7 +1291,7 @@
             <a:fld id="{18C79C5D-2A6F-F04D-97DA-BEF2467B64E4}" type="datetimeFigureOut">
               <a:rPr lang="en-US" dirty="0"/>
               <a:pPr/>
-              <a:t>7/2/22</a:t>
+              <a:t>7/3/22</a:t>
             </a:fld>
             <a:endParaRPr lang="en-US" dirty="0"/>
           </a:p>
@@ -1776,7 +1776,7 @@
             <a:fld id="{8DFA1846-DA80-1C48-A609-854EA85C59AD}" type="datetimeFigureOut">
               <a:rPr lang="en-US" dirty="0"/>
               <a:pPr/>
-              <a:t>7/2/22</a:t>
+              <a:t>7/3/22</a:t>
             </a:fld>
             <a:endParaRPr lang="en-US" dirty="0"/>
           </a:p>
@@ -2142,7 +2142,7 @@
             <a:fld id="{FBF54567-0DE4-3F47-BF90-CB84690072F9}" type="datetimeFigureOut">
               <a:rPr lang="en-US" dirty="0"/>
               <a:pPr/>
-              <a:t>7/2/22</a:t>
+              <a:t>7/3/22</a:t>
             </a:fld>
             <a:endParaRPr lang="en-US" dirty="0"/>
           </a:p>
@@ -2293,7 +2293,7 @@
           <a:ln/>
           <a:extLst>
             <a:ext uri="{91240B29-F687-4f45-9708-019B960494DF}">
-              <a14:hiddenLine xmlns:a14="http://schemas.microsoft.com/office/drawing/2010/main" xmlns="" w="9525">
+              <a14:hiddenLine xmlns="" xmlns:a14="http://schemas.microsoft.com/office/drawing/2010/main" w="9525">
                 <a:solidFill>
                   <a:srgbClr val="000000"/>
                 </a:solidFill>
@@ -2412,7 +2412,7 @@
             <a:fld id="{C6C52C72-DE31-F449-A4ED-4C594FD91407}" type="datetimeFigureOut">
               <a:rPr lang="en-US" dirty="0"/>
               <a:pPr/>
-              <a:t>7/2/22</a:t>
+              <a:t>7/3/22</a:t>
             </a:fld>
             <a:endParaRPr lang="en-US" dirty="0"/>
           </a:p>
@@ -2565,7 +2565,7 @@
           <a:ln/>
           <a:extLst>
             <a:ext uri="{91240B29-F687-4f45-9708-019B960494DF}">
-              <a14:hiddenLine xmlns:a14="http://schemas.microsoft.com/office/drawing/2010/main" xmlns="" w="9525">
+              <a14:hiddenLine xmlns="" xmlns:a14="http://schemas.microsoft.com/office/drawing/2010/main" w="9525">
                 <a:solidFill>
                   <a:srgbClr val="000000"/>
                 </a:solidFill>
@@ -2694,7 +2694,7 @@
             <a:fld id="{ED62726E-379B-B349-9EED-81ED093FA806}" type="datetimeFigureOut">
               <a:rPr lang="en-US" dirty="0"/>
               <a:pPr/>
-              <a:t>7/2/22</a:t>
+              <a:t>7/3/22</a:t>
             </a:fld>
             <a:endParaRPr lang="en-US" dirty="0"/>
           </a:p>
@@ -2845,7 +2845,7 @@
           <a:ln/>
           <a:extLst>
             <a:ext uri="{91240B29-F687-4f45-9708-019B960494DF}">
-              <a14:hiddenLine xmlns:a14="http://schemas.microsoft.com/office/drawing/2010/main" xmlns="" w="9525">
+              <a14:hiddenLine xmlns="" xmlns:a14="http://schemas.microsoft.com/office/drawing/2010/main" w="9525">
                 <a:solidFill>
                   <a:srgbClr val="000000"/>
                 </a:solidFill>
@@ -2974,7 +2974,7 @@
             <a:fld id="{9B3A1323-8D79-1946-B0D7-40001CF92E9D}" type="datetimeFigureOut">
               <a:rPr lang="en-US" dirty="0"/>
               <a:pPr/>
-              <a:t>7/2/22</a:t>
+              <a:t>7/3/22</a:t>
             </a:fld>
             <a:endParaRPr lang="en-US" dirty="0"/>
           </a:p>
@@ -3314,7 +3314,7 @@
             <a:fld id="{8DFA1846-DA80-1C48-A609-854EA85C59AD}" type="datetimeFigureOut">
               <a:rPr lang="en-US" dirty="0"/>
               <a:pPr/>
-              <a:t>7/2/22</a:t>
+              <a:t>7/3/22</a:t>
             </a:fld>
             <a:endParaRPr lang="en-US" dirty="0"/>
           </a:p>
@@ -3465,7 +3465,7 @@
           <a:ln/>
           <a:extLst>
             <a:ext uri="{91240B29-F687-4f45-9708-019B960494DF}">
-              <a14:hiddenLine xmlns:a14="http://schemas.microsoft.com/office/drawing/2010/main" xmlns="" w="9525">
+              <a14:hiddenLine xmlns="" xmlns:a14="http://schemas.microsoft.com/office/drawing/2010/main" w="9525">
                 <a:solidFill>
                   <a:srgbClr val="000000"/>
                 </a:solidFill>
@@ -3650,7 +3650,7 @@
             <a:fld id="{57302355-E14B-8545-A8F8-0FE83CC9D524}" type="datetimeFigureOut">
               <a:rPr lang="en-US" dirty="0"/>
               <a:pPr/>
-              <a:t>7/2/22</a:t>
+              <a:t>7/3/22</a:t>
             </a:fld>
             <a:endParaRPr lang="en-US" dirty="0"/>
           </a:p>
@@ -3801,7 +3801,7 @@
           <a:ln/>
           <a:extLst>
             <a:ext uri="{91240B29-F687-4f45-9708-019B960494DF}">
-              <a14:hiddenLine xmlns:a14="http://schemas.microsoft.com/office/drawing/2010/main" xmlns="" w="9525">
+              <a14:hiddenLine xmlns="" xmlns:a14="http://schemas.microsoft.com/office/drawing/2010/main" w="9525">
                 <a:solidFill>
                   <a:srgbClr val="000000"/>
                 </a:solidFill>
@@ -4124,7 +4124,7 @@
             <a:fld id="{02640F58-564D-2B4F-AE67-E407BA4FCF45}" type="datetimeFigureOut">
               <a:rPr lang="en-US" dirty="0"/>
               <a:pPr/>
-              <a:t>7/2/22</a:t>
+              <a:t>7/3/22</a:t>
             </a:fld>
             <a:endParaRPr lang="en-US" dirty="0"/>
           </a:p>
@@ -4275,7 +4275,7 @@
           <a:ln/>
           <a:extLst>
             <a:ext uri="{91240B29-F687-4f45-9708-019B960494DF}">
-              <a14:hiddenLine xmlns:a14="http://schemas.microsoft.com/office/drawing/2010/main" xmlns="" w="9525">
+              <a14:hiddenLine xmlns="" xmlns:a14="http://schemas.microsoft.com/office/drawing/2010/main" w="9525">
                 <a:solidFill>
                   <a:srgbClr val="000000"/>
                 </a:solidFill>
@@ -4342,7 +4342,7 @@
             <a:fld id="{F13A34C8-038E-2045-AF43-DF7DBB8E0E9E}" type="datetimeFigureOut">
               <a:rPr lang="en-US" dirty="0"/>
               <a:pPr/>
-              <a:t>7/2/22</a:t>
+              <a:t>7/3/22</a:t>
             </a:fld>
             <a:endParaRPr lang="en-US" dirty="0"/>
           </a:p>
@@ -4434,7 +4434,7 @@
             <a:fld id="{8818C68F-D26B-8F47-958C-23B49CF8A634}" type="datetimeFigureOut">
               <a:rPr lang="en-US" dirty="0"/>
               <a:pPr/>
-              <a:t>7/2/22</a:t>
+              <a:t>7/3/22</a:t>
             </a:fld>
             <a:endParaRPr lang="en-US" dirty="0"/>
           </a:p>
@@ -4698,7 +4698,7 @@
           <a:ln/>
           <a:extLst>
             <a:ext uri="{91240B29-F687-4f45-9708-019B960494DF}">
-              <a14:hiddenLine xmlns:a14="http://schemas.microsoft.com/office/drawing/2010/main" xmlns="" w="9525">
+              <a14:hiddenLine xmlns="" xmlns:a14="http://schemas.microsoft.com/office/drawing/2010/main" w="9525">
                 <a:solidFill>
                   <a:srgbClr val="000000"/>
                 </a:solidFill>
@@ -4898,7 +4898,7 @@
             <a:fld id="{D0DF5E60-9974-AC48-9591-99C2BB44B7CF}" type="datetimeFigureOut">
               <a:rPr lang="en-US" dirty="0"/>
               <a:pPr/>
-              <a:t>7/2/22</a:t>
+              <a:t>7/3/22</a:t>
             </a:fld>
             <a:endParaRPr lang="en-US" dirty="0"/>
           </a:p>
@@ -5208,7 +5208,7 @@
             <a:fld id="{18C79C5D-2A6F-F04D-97DA-BEF2467B64E4}" type="datetimeFigureOut">
               <a:rPr lang="en-US" dirty="0"/>
               <a:pPr/>
-              <a:t>7/2/22</a:t>
+              <a:t>7/3/22</a:t>
             </a:fld>
             <a:endParaRPr lang="en-US" dirty="0"/>
           </a:p>
@@ -5475,7 +5475,7 @@
             <a:fld id="{09B482E8-6E0E-1B4F-B1FD-C69DB9E858D9}" type="datetimeFigureOut">
               <a:rPr lang="en-US" dirty="0"/>
               <a:pPr/>
-              <a:t>7/2/22</a:t>
+              <a:t>7/3/22</a:t>
             </a:fld>
             <a:endParaRPr lang="en-US" dirty="0"/>
           </a:p>
@@ -7241,12 +7241,55 @@
           </a:p>
         </p:txBody>
       </p:sp>
+      <p:sp>
+        <p:nvSpPr>
+          <p:cNvPr id="2" name="TextBox 1">
+            <a:extLst>
+              <a:ext uri="{FF2B5EF4-FFF2-40B4-BE49-F238E27FC236}">
+                <a16:creationId xmlns:a16="http://schemas.microsoft.com/office/drawing/2014/main" id="{F66365F7-D090-834C-BB4D-AEBF53C9A09D}"/>
+              </a:ext>
+            </a:extLst>
+          </p:cNvPr>
+          <p:cNvSpPr txBox="1"/>
+          <p:nvPr/>
+        </p:nvSpPr>
+        <p:spPr>
+          <a:xfrm>
+            <a:off x="124691" y="6517712"/>
+            <a:ext cx="6833062" cy="230832"/>
+          </a:xfrm>
+          <a:prstGeom prst="rect">
+            <a:avLst/>
+          </a:prstGeom>
+          <a:noFill/>
+        </p:spPr>
+        <p:txBody>
+          <a:bodyPr wrap="square" rtlCol="0">
+            <a:spAutoFit/>
+          </a:bodyPr>
+          <a:lstStyle/>
+          <a:p>
+            <a:r>
+              <a:rPr lang="en-US" sz="900" dirty="0"/>
+              <a:t>https://</a:t>
+            </a:r>
+            <a:r>
+              <a:rPr lang="en-US" sz="900" dirty="0" err="1"/>
+              <a:t>towardsdatascience.com</a:t>
+            </a:r>
+            <a:r>
+              <a:rPr lang="en-US" sz="900" dirty="0"/>
+              <a:t>/not-yet-another-article-on-machine-learning-e67f8812ba86</a:t>
+            </a:r>
+          </a:p>
+        </p:txBody>
+      </p:sp>
       <p:grpSp>
         <p:nvGrpSpPr>
-          <p:cNvPr id="14" name="Group 13">
+          <p:cNvPr id="5" name="Group 4">
             <a:extLst>
               <a:ext uri="{FF2B5EF4-FFF2-40B4-BE49-F238E27FC236}">
-                <a16:creationId xmlns:a16="http://schemas.microsoft.com/office/drawing/2014/main" id="{22340BEF-FA82-440C-DF66-12FF22C02F11}"/>
+                <a16:creationId xmlns:a16="http://schemas.microsoft.com/office/drawing/2014/main" id="{BD8FE778-0607-F586-CF06-09EDC37B0BD0}"/>
               </a:ext>
             </a:extLst>
           </p:cNvPr>
@@ -7261,22 +7304,318 @@
             <a:chExt cx="5128953" cy="3407078"/>
           </a:xfrm>
         </p:grpSpPr>
-        <p:cxnSp>
-          <p:nvCxnSpPr>
-            <p:cNvPr id="4" name="Straight Arrow Connector 3">
+        <p:grpSp>
+          <p:nvGrpSpPr>
+            <p:cNvPr id="14" name="Group 13">
               <a:extLst>
                 <a:ext uri="{FF2B5EF4-FFF2-40B4-BE49-F238E27FC236}">
-                  <a16:creationId xmlns:a16="http://schemas.microsoft.com/office/drawing/2014/main" id="{8C40C96B-2C91-11C0-7D40-7AB7B1223A30}"/>
+                  <a16:creationId xmlns:a16="http://schemas.microsoft.com/office/drawing/2014/main" id="{22340BEF-FA82-440C-DF66-12FF22C02F11}"/>
                 </a:ext>
               </a:extLst>
             </p:cNvPr>
-            <p:cNvCxnSpPr/>
+            <p:cNvGrpSpPr/>
+            <p:nvPr/>
+          </p:nvGrpSpPr>
+          <p:grpSpPr>
+            <a:xfrm>
+              <a:off x="4680065" y="3366655"/>
+              <a:ext cx="5128953" cy="3407078"/>
+              <a:chOff x="4680065" y="3366655"/>
+              <a:chExt cx="5128953" cy="3407078"/>
+            </a:xfrm>
+          </p:grpSpPr>
+          <p:cxnSp>
+            <p:nvCxnSpPr>
+              <p:cNvPr id="4" name="Straight Arrow Connector 3">
+                <a:extLst>
+                  <a:ext uri="{FF2B5EF4-FFF2-40B4-BE49-F238E27FC236}">
+                    <a16:creationId xmlns:a16="http://schemas.microsoft.com/office/drawing/2014/main" id="{8C40C96B-2C91-11C0-7D40-7AB7B1223A30}"/>
+                  </a:ext>
+                </a:extLst>
+              </p:cNvPr>
+              <p:cNvCxnSpPr/>
+              <p:nvPr/>
+            </p:nvCxnSpPr>
+            <p:spPr>
+              <a:xfrm flipH="1" flipV="1">
+                <a:off x="4680065" y="3366655"/>
+                <a:ext cx="2277688" cy="2527069"/>
+              </a:xfrm>
+              <a:prstGeom prst="straightConnector1">
+                <a:avLst/>
+              </a:prstGeom>
+              <a:ln w="76200">
+                <a:tailEnd type="triangle"/>
+              </a:ln>
+            </p:spPr>
+            <p:style>
+              <a:lnRef idx="1">
+                <a:schemeClr val="accent6"/>
+              </a:lnRef>
+              <a:fillRef idx="0">
+                <a:schemeClr val="accent6"/>
+              </a:fillRef>
+              <a:effectRef idx="0">
+                <a:schemeClr val="accent6"/>
+              </a:effectRef>
+              <a:fontRef idx="minor">
+                <a:schemeClr val="tx1"/>
+              </a:fontRef>
+            </p:style>
+          </p:cxnSp>
+          <p:cxnSp>
+            <p:nvCxnSpPr>
+              <p:cNvPr id="6" name="Straight Arrow Connector 5">
+                <a:extLst>
+                  <a:ext uri="{FF2B5EF4-FFF2-40B4-BE49-F238E27FC236}">
+                    <a16:creationId xmlns:a16="http://schemas.microsoft.com/office/drawing/2014/main" id="{144A3884-E90A-C623-E1D6-4B2ACE3566DB}"/>
+                  </a:ext>
+                </a:extLst>
+              </p:cNvPr>
+              <p:cNvCxnSpPr>
+                <a:cxnSpLocks/>
+              </p:cNvCxnSpPr>
+              <p:nvPr/>
+            </p:nvCxnSpPr>
+            <p:spPr>
+              <a:xfrm flipH="1" flipV="1">
+                <a:off x="5893724" y="3366655"/>
+                <a:ext cx="1221971" cy="2527069"/>
+              </a:xfrm>
+              <a:prstGeom prst="straightConnector1">
+                <a:avLst/>
+              </a:prstGeom>
+              <a:ln w="76200">
+                <a:tailEnd type="triangle"/>
+              </a:ln>
+            </p:spPr>
+            <p:style>
+              <a:lnRef idx="1">
+                <a:schemeClr val="accent6"/>
+              </a:lnRef>
+              <a:fillRef idx="0">
+                <a:schemeClr val="accent6"/>
+              </a:fillRef>
+              <a:effectRef idx="0">
+                <a:schemeClr val="accent6"/>
+              </a:effectRef>
+              <a:fontRef idx="minor">
+                <a:schemeClr val="tx1"/>
+              </a:fontRef>
+            </p:style>
+          </p:cxnSp>
+          <p:cxnSp>
+            <p:nvCxnSpPr>
+              <p:cNvPr id="9" name="Straight Arrow Connector 8">
+                <a:extLst>
+                  <a:ext uri="{FF2B5EF4-FFF2-40B4-BE49-F238E27FC236}">
+                    <a16:creationId xmlns:a16="http://schemas.microsoft.com/office/drawing/2014/main" id="{C9CBD885-C177-D98A-970C-B6E3D76151AC}"/>
+                  </a:ext>
+                </a:extLst>
+              </p:cNvPr>
+              <p:cNvCxnSpPr>
+                <a:cxnSpLocks/>
+              </p:cNvCxnSpPr>
+              <p:nvPr/>
+            </p:nvCxnSpPr>
+            <p:spPr>
+              <a:xfrm flipV="1">
+                <a:off x="7248698" y="3429000"/>
+                <a:ext cx="482138" cy="2464724"/>
+              </a:xfrm>
+              <a:prstGeom prst="straightConnector1">
+                <a:avLst/>
+              </a:prstGeom>
+              <a:ln w="76200">
+                <a:tailEnd type="triangle"/>
+              </a:ln>
+            </p:spPr>
+            <p:style>
+              <a:lnRef idx="1">
+                <a:schemeClr val="accent6"/>
+              </a:lnRef>
+              <a:fillRef idx="0">
+                <a:schemeClr val="accent6"/>
+              </a:fillRef>
+              <a:effectRef idx="0">
+                <a:schemeClr val="accent6"/>
+              </a:effectRef>
+              <a:fontRef idx="minor">
+                <a:schemeClr val="tx1"/>
+              </a:fontRef>
+            </p:style>
+          </p:cxnSp>
+          <p:cxnSp>
+            <p:nvCxnSpPr>
+              <p:cNvPr id="12" name="Straight Arrow Connector 11">
+                <a:extLst>
+                  <a:ext uri="{FF2B5EF4-FFF2-40B4-BE49-F238E27FC236}">
+                    <a16:creationId xmlns:a16="http://schemas.microsoft.com/office/drawing/2014/main" id="{BC83E52E-177C-54EC-E317-93E18238E0FF}"/>
+                  </a:ext>
+                </a:extLst>
+              </p:cNvPr>
+              <p:cNvCxnSpPr>
+                <a:cxnSpLocks/>
+              </p:cNvCxnSpPr>
+              <p:nvPr/>
+            </p:nvCxnSpPr>
+            <p:spPr>
+              <a:xfrm flipV="1">
+                <a:off x="7489767" y="3429000"/>
+                <a:ext cx="2319251" cy="2464724"/>
+              </a:xfrm>
+              <a:prstGeom prst="straightConnector1">
+                <a:avLst/>
+              </a:prstGeom>
+              <a:ln w="76200">
+                <a:tailEnd type="triangle"/>
+              </a:ln>
+            </p:spPr>
+            <p:style>
+              <a:lnRef idx="1">
+                <a:schemeClr val="accent6"/>
+              </a:lnRef>
+              <a:fillRef idx="0">
+                <a:schemeClr val="accent6"/>
+              </a:fillRef>
+              <a:effectRef idx="0">
+                <a:schemeClr val="accent6"/>
+              </a:effectRef>
+              <a:fontRef idx="minor">
+                <a:schemeClr val="tx1"/>
+              </a:fontRef>
+            </p:style>
+          </p:cxnSp>
+          <p:sp>
+            <p:nvSpPr>
+              <p:cNvPr id="15" name="Title 1">
+                <a:extLst>
+                  <a:ext uri="{FF2B5EF4-FFF2-40B4-BE49-F238E27FC236}">
+                    <a16:creationId xmlns:a16="http://schemas.microsoft.com/office/drawing/2014/main" id="{25A7A0F6-ED0D-01D4-58D1-2FAC0D870B5F}"/>
+                  </a:ext>
+                </a:extLst>
+              </p:cNvPr>
+              <p:cNvSpPr txBox="1">
+                <a:spLocks/>
+              </p:cNvSpPr>
+              <p:nvPr/>
+            </p:nvSpPr>
+            <p:spPr>
+              <a:xfrm>
+                <a:off x="6529186" y="5960225"/>
+                <a:ext cx="1620982" cy="813508"/>
+              </a:xfrm>
+              <a:prstGeom prst="rect">
+                <a:avLst/>
+              </a:prstGeom>
+            </p:spPr>
+            <p:txBody>
+              <a:bodyPr>
+                <a:normAutofit/>
+              </a:bodyPr>
+              <a:lstStyle>
+                <a:lvl1pPr algn="l" defTabSz="457200" rtl="0" eaLnBrk="1" latinLnBrk="0" hangingPunct="1">
+                  <a:spcBef>
+                    <a:spcPct val="0"/>
+                  </a:spcBef>
+                  <a:buNone/>
+                  <a:defRPr sz="4000" b="1" kern="1200">
+                    <a:solidFill>
+                      <a:srgbClr val="FEFEFE"/>
+                    </a:solidFill>
+                    <a:latin typeface="+mj-lt"/>
+                    <a:ea typeface="+mj-ea"/>
+                    <a:cs typeface="+mj-cs"/>
+                  </a:defRPr>
+                </a:lvl1pPr>
+                <a:lvl2pPr eaLnBrk="1" hangingPunct="1">
+                  <a:defRPr>
+                    <a:solidFill>
+                      <a:schemeClr val="tx2"/>
+                    </a:solidFill>
+                  </a:defRPr>
+                </a:lvl2pPr>
+                <a:lvl3pPr eaLnBrk="1" hangingPunct="1">
+                  <a:defRPr>
+                    <a:solidFill>
+                      <a:schemeClr val="tx2"/>
+                    </a:solidFill>
+                  </a:defRPr>
+                </a:lvl3pPr>
+                <a:lvl4pPr eaLnBrk="1" hangingPunct="1">
+                  <a:defRPr>
+                    <a:solidFill>
+                      <a:schemeClr val="tx2"/>
+                    </a:solidFill>
+                  </a:defRPr>
+                </a:lvl4pPr>
+                <a:lvl5pPr eaLnBrk="1" hangingPunct="1">
+                  <a:defRPr>
+                    <a:solidFill>
+                      <a:schemeClr val="tx2"/>
+                    </a:solidFill>
+                  </a:defRPr>
+                </a:lvl5pPr>
+                <a:lvl6pPr eaLnBrk="1" hangingPunct="1">
+                  <a:defRPr>
+                    <a:solidFill>
+                      <a:schemeClr val="tx2"/>
+                    </a:solidFill>
+                  </a:defRPr>
+                </a:lvl6pPr>
+                <a:lvl7pPr eaLnBrk="1" hangingPunct="1">
+                  <a:defRPr>
+                    <a:solidFill>
+                      <a:schemeClr val="tx2"/>
+                    </a:solidFill>
+                  </a:defRPr>
+                </a:lvl7pPr>
+                <a:lvl8pPr eaLnBrk="1" hangingPunct="1">
+                  <a:defRPr>
+                    <a:solidFill>
+                      <a:schemeClr val="tx2"/>
+                    </a:solidFill>
+                  </a:defRPr>
+                </a:lvl8pPr>
+                <a:lvl9pPr eaLnBrk="1" hangingPunct="1">
+                  <a:defRPr>
+                    <a:solidFill>
+                      <a:schemeClr val="tx2"/>
+                    </a:solidFill>
+                  </a:defRPr>
+                </a:lvl9pPr>
+              </a:lstStyle>
+              <a:p>
+                <a:r>
+                  <a:rPr lang="en-US" sz="3600" dirty="0">
+                    <a:solidFill>
+                      <a:srgbClr val="FF0000"/>
+                    </a:solidFill>
+                  </a:rPr>
+                  <a:t>Here!</a:t>
+                </a:r>
+              </a:p>
+            </p:txBody>
+          </p:sp>
+        </p:grpSp>
+        <p:cxnSp>
+          <p:nvCxnSpPr>
+            <p:cNvPr id="11" name="Straight Arrow Connector 10">
+              <a:extLst>
+                <a:ext uri="{FF2B5EF4-FFF2-40B4-BE49-F238E27FC236}">
+                  <a16:creationId xmlns:a16="http://schemas.microsoft.com/office/drawing/2014/main" id="{CAA3A2A6-23C8-7C40-DFBA-5BADD5096281}"/>
+                </a:ext>
+              </a:extLst>
+            </p:cNvPr>
+            <p:cNvCxnSpPr>
+              <a:cxnSpLocks/>
+            </p:cNvCxnSpPr>
             <p:nvPr/>
           </p:nvCxnSpPr>
           <p:spPr>
             <a:xfrm flipH="1" flipV="1">
-              <a:off x="4680065" y="3366655"/>
-              <a:ext cx="2277688" cy="2527069"/>
+              <a:off x="6779144" y="3904090"/>
+              <a:ext cx="419678" cy="1989634"/>
             </a:xfrm>
             <a:prstGeom prst="straightConnector1">
               <a:avLst/>
@@ -7300,325 +7639,7 @@
             </a:fontRef>
           </p:style>
         </p:cxnSp>
-        <p:cxnSp>
-          <p:nvCxnSpPr>
-            <p:cNvPr id="6" name="Straight Arrow Connector 5">
-              <a:extLst>
-                <a:ext uri="{FF2B5EF4-FFF2-40B4-BE49-F238E27FC236}">
-                  <a16:creationId xmlns:a16="http://schemas.microsoft.com/office/drawing/2014/main" id="{144A3884-E90A-C623-E1D6-4B2ACE3566DB}"/>
-                </a:ext>
-              </a:extLst>
-            </p:cNvPr>
-            <p:cNvCxnSpPr>
-              <a:cxnSpLocks/>
-            </p:cNvCxnSpPr>
-            <p:nvPr/>
-          </p:nvCxnSpPr>
-          <p:spPr>
-            <a:xfrm flipH="1" flipV="1">
-              <a:off x="5893724" y="3366655"/>
-              <a:ext cx="1221971" cy="2527069"/>
-            </a:xfrm>
-            <a:prstGeom prst="straightConnector1">
-              <a:avLst/>
-            </a:prstGeom>
-            <a:ln w="76200">
-              <a:tailEnd type="triangle"/>
-            </a:ln>
-          </p:spPr>
-          <p:style>
-            <a:lnRef idx="1">
-              <a:schemeClr val="accent6"/>
-            </a:lnRef>
-            <a:fillRef idx="0">
-              <a:schemeClr val="accent6"/>
-            </a:fillRef>
-            <a:effectRef idx="0">
-              <a:schemeClr val="accent6"/>
-            </a:effectRef>
-            <a:fontRef idx="minor">
-              <a:schemeClr val="tx1"/>
-            </a:fontRef>
-          </p:style>
-        </p:cxnSp>
-        <p:cxnSp>
-          <p:nvCxnSpPr>
-            <p:cNvPr id="9" name="Straight Arrow Connector 8">
-              <a:extLst>
-                <a:ext uri="{FF2B5EF4-FFF2-40B4-BE49-F238E27FC236}">
-                  <a16:creationId xmlns:a16="http://schemas.microsoft.com/office/drawing/2014/main" id="{C9CBD885-C177-D98A-970C-B6E3D76151AC}"/>
-                </a:ext>
-              </a:extLst>
-            </p:cNvPr>
-            <p:cNvCxnSpPr>
-              <a:cxnSpLocks/>
-            </p:cNvCxnSpPr>
-            <p:nvPr/>
-          </p:nvCxnSpPr>
-          <p:spPr>
-            <a:xfrm flipV="1">
-              <a:off x="7248698" y="3429000"/>
-              <a:ext cx="482138" cy="2464724"/>
-            </a:xfrm>
-            <a:prstGeom prst="straightConnector1">
-              <a:avLst/>
-            </a:prstGeom>
-            <a:ln w="76200">
-              <a:tailEnd type="triangle"/>
-            </a:ln>
-          </p:spPr>
-          <p:style>
-            <a:lnRef idx="1">
-              <a:schemeClr val="accent6"/>
-            </a:lnRef>
-            <a:fillRef idx="0">
-              <a:schemeClr val="accent6"/>
-            </a:fillRef>
-            <a:effectRef idx="0">
-              <a:schemeClr val="accent6"/>
-            </a:effectRef>
-            <a:fontRef idx="minor">
-              <a:schemeClr val="tx1"/>
-            </a:fontRef>
-          </p:style>
-        </p:cxnSp>
-        <p:cxnSp>
-          <p:nvCxnSpPr>
-            <p:cNvPr id="12" name="Straight Arrow Connector 11">
-              <a:extLst>
-                <a:ext uri="{FF2B5EF4-FFF2-40B4-BE49-F238E27FC236}">
-                  <a16:creationId xmlns:a16="http://schemas.microsoft.com/office/drawing/2014/main" id="{BC83E52E-177C-54EC-E317-93E18238E0FF}"/>
-                </a:ext>
-              </a:extLst>
-            </p:cNvPr>
-            <p:cNvCxnSpPr>
-              <a:cxnSpLocks/>
-            </p:cNvCxnSpPr>
-            <p:nvPr/>
-          </p:nvCxnSpPr>
-          <p:spPr>
-            <a:xfrm flipV="1">
-              <a:off x="7489767" y="3429000"/>
-              <a:ext cx="2319251" cy="2464724"/>
-            </a:xfrm>
-            <a:prstGeom prst="straightConnector1">
-              <a:avLst/>
-            </a:prstGeom>
-            <a:ln w="76200">
-              <a:tailEnd type="triangle"/>
-            </a:ln>
-          </p:spPr>
-          <p:style>
-            <a:lnRef idx="1">
-              <a:schemeClr val="accent6"/>
-            </a:lnRef>
-            <a:fillRef idx="0">
-              <a:schemeClr val="accent6"/>
-            </a:fillRef>
-            <a:effectRef idx="0">
-              <a:schemeClr val="accent6"/>
-            </a:effectRef>
-            <a:fontRef idx="minor">
-              <a:schemeClr val="tx1"/>
-            </a:fontRef>
-          </p:style>
-        </p:cxnSp>
-        <p:sp>
-          <p:nvSpPr>
-            <p:cNvPr id="15" name="Title 1">
-              <a:extLst>
-                <a:ext uri="{FF2B5EF4-FFF2-40B4-BE49-F238E27FC236}">
-                  <a16:creationId xmlns:a16="http://schemas.microsoft.com/office/drawing/2014/main" id="{25A7A0F6-ED0D-01D4-58D1-2FAC0D870B5F}"/>
-                </a:ext>
-              </a:extLst>
-            </p:cNvPr>
-            <p:cNvSpPr txBox="1">
-              <a:spLocks/>
-            </p:cNvSpPr>
-            <p:nvPr/>
-          </p:nvSpPr>
-          <p:spPr>
-            <a:xfrm>
-              <a:off x="6529186" y="5960225"/>
-              <a:ext cx="1620982" cy="813508"/>
-            </a:xfrm>
-            <a:prstGeom prst="rect">
-              <a:avLst/>
-            </a:prstGeom>
-          </p:spPr>
-          <p:txBody>
-            <a:bodyPr>
-              <a:normAutofit/>
-            </a:bodyPr>
-            <a:lstStyle>
-              <a:lvl1pPr algn="l" defTabSz="457200" rtl="0" eaLnBrk="1" latinLnBrk="0" hangingPunct="1">
-                <a:spcBef>
-                  <a:spcPct val="0"/>
-                </a:spcBef>
-                <a:buNone/>
-                <a:defRPr sz="4000" b="1" kern="1200">
-                  <a:solidFill>
-                    <a:srgbClr val="FEFEFE"/>
-                  </a:solidFill>
-                  <a:latin typeface="+mj-lt"/>
-                  <a:ea typeface="+mj-ea"/>
-                  <a:cs typeface="+mj-cs"/>
-                </a:defRPr>
-              </a:lvl1pPr>
-              <a:lvl2pPr eaLnBrk="1" hangingPunct="1">
-                <a:defRPr>
-                  <a:solidFill>
-                    <a:schemeClr val="tx2"/>
-                  </a:solidFill>
-                </a:defRPr>
-              </a:lvl2pPr>
-              <a:lvl3pPr eaLnBrk="1" hangingPunct="1">
-                <a:defRPr>
-                  <a:solidFill>
-                    <a:schemeClr val="tx2"/>
-                  </a:solidFill>
-                </a:defRPr>
-              </a:lvl3pPr>
-              <a:lvl4pPr eaLnBrk="1" hangingPunct="1">
-                <a:defRPr>
-                  <a:solidFill>
-                    <a:schemeClr val="tx2"/>
-                  </a:solidFill>
-                </a:defRPr>
-              </a:lvl4pPr>
-              <a:lvl5pPr eaLnBrk="1" hangingPunct="1">
-                <a:defRPr>
-                  <a:solidFill>
-                    <a:schemeClr val="tx2"/>
-                  </a:solidFill>
-                </a:defRPr>
-              </a:lvl5pPr>
-              <a:lvl6pPr eaLnBrk="1" hangingPunct="1">
-                <a:defRPr>
-                  <a:solidFill>
-                    <a:schemeClr val="tx2"/>
-                  </a:solidFill>
-                </a:defRPr>
-              </a:lvl6pPr>
-              <a:lvl7pPr eaLnBrk="1" hangingPunct="1">
-                <a:defRPr>
-                  <a:solidFill>
-                    <a:schemeClr val="tx2"/>
-                  </a:solidFill>
-                </a:defRPr>
-              </a:lvl7pPr>
-              <a:lvl8pPr eaLnBrk="1" hangingPunct="1">
-                <a:defRPr>
-                  <a:solidFill>
-                    <a:schemeClr val="tx2"/>
-                  </a:solidFill>
-                </a:defRPr>
-              </a:lvl8pPr>
-              <a:lvl9pPr eaLnBrk="1" hangingPunct="1">
-                <a:defRPr>
-                  <a:solidFill>
-                    <a:schemeClr val="tx2"/>
-                  </a:solidFill>
-                </a:defRPr>
-              </a:lvl9pPr>
-            </a:lstStyle>
-            <a:p>
-              <a:r>
-                <a:rPr lang="en-US" sz="3600" dirty="0">
-                  <a:solidFill>
-                    <a:srgbClr val="FF0000"/>
-                  </a:solidFill>
-                </a:rPr>
-                <a:t>Here!</a:t>
-              </a:r>
-            </a:p>
-          </p:txBody>
-        </p:sp>
       </p:grpSp>
-      <p:sp>
-        <p:nvSpPr>
-          <p:cNvPr id="2" name="TextBox 1">
-            <a:extLst>
-              <a:ext uri="{FF2B5EF4-FFF2-40B4-BE49-F238E27FC236}">
-                <a16:creationId xmlns:a16="http://schemas.microsoft.com/office/drawing/2014/main" id="{F66365F7-D090-834C-BB4D-AEBF53C9A09D}"/>
-              </a:ext>
-            </a:extLst>
-          </p:cNvPr>
-          <p:cNvSpPr txBox="1"/>
-          <p:nvPr/>
-        </p:nvSpPr>
-        <p:spPr>
-          <a:xfrm>
-            <a:off x="124691" y="6517712"/>
-            <a:ext cx="6833062" cy="230832"/>
-          </a:xfrm>
-          <a:prstGeom prst="rect">
-            <a:avLst/>
-          </a:prstGeom>
-          <a:noFill/>
-        </p:spPr>
-        <p:txBody>
-          <a:bodyPr wrap="square" rtlCol="0">
-            <a:spAutoFit/>
-          </a:bodyPr>
-          <a:lstStyle/>
-          <a:p>
-            <a:r>
-              <a:rPr lang="en-US" sz="900" dirty="0"/>
-              <a:t>https://</a:t>
-            </a:r>
-            <a:r>
-              <a:rPr lang="en-US" sz="900" dirty="0" err="1"/>
-              <a:t>towardsdatascience.com</a:t>
-            </a:r>
-            <a:r>
-              <a:rPr lang="en-US" sz="900" dirty="0"/>
-              <a:t>/not-yet-another-article-on-machine-learning-e67f8812ba86</a:t>
-            </a:r>
-          </a:p>
-        </p:txBody>
-      </p:sp>
-      <p:cxnSp>
-        <p:nvCxnSpPr>
-          <p:cNvPr id="11" name="Straight Arrow Connector 10">
-            <a:extLst>
-              <a:ext uri="{FF2B5EF4-FFF2-40B4-BE49-F238E27FC236}">
-                <a16:creationId xmlns:a16="http://schemas.microsoft.com/office/drawing/2014/main" id="{CAA3A2A6-23C8-7C40-DFBA-5BADD5096281}"/>
-              </a:ext>
-            </a:extLst>
-          </p:cNvPr>
-          <p:cNvCxnSpPr>
-            <a:cxnSpLocks/>
-          </p:cNvCxnSpPr>
-          <p:nvPr/>
-        </p:nvCxnSpPr>
-        <p:spPr>
-          <a:xfrm flipH="1" flipV="1">
-            <a:off x="6779144" y="3904090"/>
-            <a:ext cx="419678" cy="1989634"/>
-          </a:xfrm>
-          <a:prstGeom prst="straightConnector1">
-            <a:avLst/>
-          </a:prstGeom>
-          <a:ln w="76200">
-            <a:tailEnd type="triangle"/>
-          </a:ln>
-        </p:spPr>
-        <p:style>
-          <a:lnRef idx="1">
-            <a:schemeClr val="accent6"/>
-          </a:lnRef>
-          <a:fillRef idx="0">
-            <a:schemeClr val="accent6"/>
-          </a:fillRef>
-          <a:effectRef idx="0">
-            <a:schemeClr val="accent6"/>
-          </a:effectRef>
-          <a:fontRef idx="minor">
-            <a:schemeClr val="tx1"/>
-          </a:fontRef>
-        </p:style>
-      </p:cxnSp>
     </p:spTree>
     <p:extLst>
       <p:ext uri="{BB962C8B-B14F-4D97-AF65-F5344CB8AC3E}">
@@ -7629,81 +7650,6 @@
   <p:clrMapOvr>
     <a:masterClrMapping/>
   </p:clrMapOvr>
-  <p:timing>
-    <p:tnLst>
-      <p:par>
-        <p:cTn id="1" dur="indefinite" restart="never" nodeType="tmRoot">
-          <p:childTnLst>
-            <p:seq concurrent="1" nextAc="seek">
-              <p:cTn id="2" dur="indefinite" nodeType="mainSeq">
-                <p:childTnLst>
-                  <p:par>
-                    <p:cTn id="3" fill="hold">
-                      <p:stCondLst>
-                        <p:cond delay="indefinite"/>
-                      </p:stCondLst>
-                      <p:childTnLst>
-                        <p:par>
-                          <p:cTn id="4" fill="hold">
-                            <p:stCondLst>
-                              <p:cond delay="0"/>
-                            </p:stCondLst>
-                            <p:childTnLst>
-                              <p:par>
-                                <p:cTn id="5" presetID="1" presetClass="entr" presetSubtype="0" fill="hold" nodeType="clickEffect">
-                                  <p:stCondLst>
-                                    <p:cond delay="0"/>
-                                  </p:stCondLst>
-                                  <p:childTnLst>
-                                    <p:set>
-                                      <p:cBhvr>
-                                        <p:cTn id="6" dur="1" fill="hold">
-                                          <p:stCondLst>
-                                            <p:cond delay="0"/>
-                                          </p:stCondLst>
-                                        </p:cTn>
-                                        <p:tgtEl>
-                                          <p:spTgt spid="14"/>
-                                        </p:tgtEl>
-                                        <p:attrNameLst>
-                                          <p:attrName>style.visibility</p:attrName>
-                                        </p:attrNameLst>
-                                      </p:cBhvr>
-                                      <p:to>
-                                        <p:strVal val="visible"/>
-                                      </p:to>
-                                    </p:set>
-                                  </p:childTnLst>
-                                </p:cTn>
-                              </p:par>
-                            </p:childTnLst>
-                          </p:cTn>
-                        </p:par>
-                      </p:childTnLst>
-                    </p:cTn>
-                  </p:par>
-                </p:childTnLst>
-              </p:cTn>
-              <p:prevCondLst>
-                <p:cond evt="onPrev" delay="0">
-                  <p:tgtEl>
-                    <p:sldTgt/>
-                  </p:tgtEl>
-                </p:cond>
-              </p:prevCondLst>
-              <p:nextCondLst>
-                <p:cond evt="onNext" delay="0">
-                  <p:tgtEl>
-                    <p:sldTgt/>
-                  </p:tgtEl>
-                </p:cond>
-              </p:nextCondLst>
-            </p:seq>
-          </p:childTnLst>
-        </p:cTn>
-      </p:par>
-    </p:tnLst>
-  </p:timing>
 </p:sld>
 </file>
 

</xml_diff>